<commit_message>
2 independent panels now scroll separately
</commit_message>
<xml_diff>
--- a/prototypes.pptx
+++ b/prototypes.pptx
@@ -5,7 +5,10 @@
     <p:sldMasterId id="2147483648" r:id="rId1"/>
   </p:sldMasterIdLst>
   <p:sldIdLst>
-    <p:sldId id="256" r:id="rId2"/>
+    <p:sldId id="258" r:id="rId2"/>
+    <p:sldId id="256" r:id="rId3"/>
+    <p:sldId id="260" r:id="rId4"/>
+    <p:sldId id="259" r:id="rId5"/>
   </p:sldIdLst>
   <p:sldSz cx="12192000" cy="6858000"/>
   <p:notesSz cx="6858000" cy="9144000"/>
@@ -104,6 +107,11 @@
       </a:defRPr>
     </a:lvl9pPr>
   </p:defaultTextStyle>
+  <p:extLst>
+    <p:ext uri="{EFAFB233-063F-42B5-8137-9DF3F51BA10A}">
+      <p15:sldGuideLst xmlns:p15="http://schemas.microsoft.com/office/powerpoint/2012/main"/>
+    </p:ext>
+  </p:extLst>
 </p:presentation>
 </file>
 
@@ -254,7 +262,7 @@
           <a:p>
             <a:fld id="{1B239388-45FC-456E-8776-854E70FB4B9B}" type="datetimeFigureOut">
               <a:rPr lang="en-US" smtClean="0"/>
-              <a:t>3/23/2024</a:t>
+              <a:t>3/24/2024</a:t>
             </a:fld>
             <a:endParaRPr lang="en-US"/>
           </a:p>
@@ -452,7 +460,7 @@
           <a:p>
             <a:fld id="{1B239388-45FC-456E-8776-854E70FB4B9B}" type="datetimeFigureOut">
               <a:rPr lang="en-US" smtClean="0"/>
-              <a:t>3/23/2024</a:t>
+              <a:t>3/24/2024</a:t>
             </a:fld>
             <a:endParaRPr lang="en-US"/>
           </a:p>
@@ -660,7 +668,7 @@
           <a:p>
             <a:fld id="{1B239388-45FC-456E-8776-854E70FB4B9B}" type="datetimeFigureOut">
               <a:rPr lang="en-US" smtClean="0"/>
-              <a:t>3/23/2024</a:t>
+              <a:t>3/24/2024</a:t>
             </a:fld>
             <a:endParaRPr lang="en-US"/>
           </a:p>
@@ -858,7 +866,7 @@
           <a:p>
             <a:fld id="{1B239388-45FC-456E-8776-854E70FB4B9B}" type="datetimeFigureOut">
               <a:rPr lang="en-US" smtClean="0"/>
-              <a:t>3/23/2024</a:t>
+              <a:t>3/24/2024</a:t>
             </a:fld>
             <a:endParaRPr lang="en-US"/>
           </a:p>
@@ -1133,7 +1141,7 @@
           <a:p>
             <a:fld id="{1B239388-45FC-456E-8776-854E70FB4B9B}" type="datetimeFigureOut">
               <a:rPr lang="en-US" smtClean="0"/>
-              <a:t>3/23/2024</a:t>
+              <a:t>3/24/2024</a:t>
             </a:fld>
             <a:endParaRPr lang="en-US"/>
           </a:p>
@@ -1398,7 +1406,7 @@
           <a:p>
             <a:fld id="{1B239388-45FC-456E-8776-854E70FB4B9B}" type="datetimeFigureOut">
               <a:rPr lang="en-US" smtClean="0"/>
-              <a:t>3/23/2024</a:t>
+              <a:t>3/24/2024</a:t>
             </a:fld>
             <a:endParaRPr lang="en-US"/>
           </a:p>
@@ -1810,7 +1818,7 @@
           <a:p>
             <a:fld id="{1B239388-45FC-456E-8776-854E70FB4B9B}" type="datetimeFigureOut">
               <a:rPr lang="en-US" smtClean="0"/>
-              <a:t>3/23/2024</a:t>
+              <a:t>3/24/2024</a:t>
             </a:fld>
             <a:endParaRPr lang="en-US"/>
           </a:p>
@@ -1951,7 +1959,7 @@
           <a:p>
             <a:fld id="{1B239388-45FC-456E-8776-854E70FB4B9B}" type="datetimeFigureOut">
               <a:rPr lang="en-US" smtClean="0"/>
-              <a:t>3/23/2024</a:t>
+              <a:t>3/24/2024</a:t>
             </a:fld>
             <a:endParaRPr lang="en-US"/>
           </a:p>
@@ -2064,7 +2072,7 @@
           <a:p>
             <a:fld id="{1B239388-45FC-456E-8776-854E70FB4B9B}" type="datetimeFigureOut">
               <a:rPr lang="en-US" smtClean="0"/>
-              <a:t>3/23/2024</a:t>
+              <a:t>3/24/2024</a:t>
             </a:fld>
             <a:endParaRPr lang="en-US"/>
           </a:p>
@@ -2375,7 +2383,7 @@
           <a:p>
             <a:fld id="{1B239388-45FC-456E-8776-854E70FB4B9B}" type="datetimeFigureOut">
               <a:rPr lang="en-US" smtClean="0"/>
-              <a:t>3/23/2024</a:t>
+              <a:t>3/24/2024</a:t>
             </a:fld>
             <a:endParaRPr lang="en-US"/>
           </a:p>
@@ -2663,7 +2671,7 @@
           <a:p>
             <a:fld id="{1B239388-45FC-456E-8776-854E70FB4B9B}" type="datetimeFigureOut">
               <a:rPr lang="en-US" smtClean="0"/>
-              <a:t>3/23/2024</a:t>
+              <a:t>3/24/2024</a:t>
             </a:fld>
             <a:endParaRPr lang="en-US"/>
           </a:p>
@@ -2904,7 +2912,7 @@
           <a:p>
             <a:fld id="{1B239388-45FC-456E-8776-854E70FB4B9B}" type="datetimeFigureOut">
               <a:rPr lang="en-US" smtClean="0"/>
-              <a:t>3/23/2024</a:t>
+              <a:t>3/24/2024</a:t>
             </a:fld>
             <a:endParaRPr lang="en-US"/>
           </a:p>
@@ -3323,6 +3331,172 @@
       </p:grpSpPr>
       <p:sp>
         <p:nvSpPr>
+          <p:cNvPr id="2" name="Title 1">
+            <a:extLst>
+              <a:ext uri="{FF2B5EF4-FFF2-40B4-BE49-F238E27FC236}">
+                <a16:creationId xmlns:a16="http://schemas.microsoft.com/office/drawing/2014/main" id="{7185D70D-3B2C-2B9B-EF5A-310565013FE4}"/>
+              </a:ext>
+            </a:extLst>
+          </p:cNvPr>
+          <p:cNvSpPr>
+            <a:spLocks noGrp="1"/>
+          </p:cNvSpPr>
+          <p:nvPr>
+            <p:ph type="title"/>
+          </p:nvPr>
+        </p:nvSpPr>
+        <p:spPr/>
+        <p:txBody>
+          <a:bodyPr/>
+          <a:lstStyle/>
+          <a:p>
+            <a:r>
+              <a:rPr lang="en-US" altLang="ko-KR" dirty="0"/>
+              <a:t>Main</a:t>
+            </a:r>
+            <a:r>
+              <a:rPr lang="ko-KR" altLang="en-US" dirty="0"/>
+              <a:t> </a:t>
+            </a:r>
+            <a:r>
+              <a:rPr lang="en-US" altLang="ko-KR" dirty="0"/>
+              <a:t>page</a:t>
+            </a:r>
+            <a:r>
+              <a:rPr lang="ko-KR" altLang="en-US" dirty="0"/>
+              <a:t> </a:t>
+            </a:r>
+            <a:r>
+              <a:rPr lang="en-US" altLang="ko-KR" dirty="0"/>
+              <a:t>before you do anything</a:t>
+            </a:r>
+            <a:endParaRPr lang="en-US" dirty="0"/>
+          </a:p>
+        </p:txBody>
+      </p:sp>
+      <p:sp>
+        <p:nvSpPr>
+          <p:cNvPr id="3" name="Content Placeholder 2">
+            <a:extLst>
+              <a:ext uri="{FF2B5EF4-FFF2-40B4-BE49-F238E27FC236}">
+                <a16:creationId xmlns:a16="http://schemas.microsoft.com/office/drawing/2014/main" id="{D27AE6FC-F342-B9C1-F00E-C7D8FFD0BB01}"/>
+              </a:ext>
+            </a:extLst>
+          </p:cNvPr>
+          <p:cNvSpPr>
+            <a:spLocks noGrp="1"/>
+          </p:cNvSpPr>
+          <p:nvPr>
+            <p:ph idx="1"/>
+          </p:nvPr>
+        </p:nvSpPr>
+        <p:spPr/>
+        <p:txBody>
+          <a:bodyPr/>
+          <a:lstStyle/>
+          <a:p>
+            <a:pPr marL="0" indent="0">
+              <a:buNone/>
+            </a:pPr>
+            <a:r>
+              <a:rPr lang="en-US" altLang="ko-KR" dirty="0"/>
+              <a:t>selections</a:t>
+            </a:r>
+            <a:r>
+              <a:rPr lang="ko-KR" altLang="en-US" dirty="0"/>
+              <a:t> </a:t>
+            </a:r>
+            <a:r>
+              <a:rPr lang="en-US" altLang="ko-KR" dirty="0"/>
+              <a:t>for </a:t>
+            </a:r>
+            <a:r>
+              <a:rPr lang="ko-KR" altLang="en-US" dirty="0"/>
+              <a:t>한</a:t>
+            </a:r>
+            <a:r>
+              <a:rPr lang="en-US" altLang="ko-KR" dirty="0"/>
+              <a:t>: regex</a:t>
+            </a:r>
+          </a:p>
+          <a:p>
+            <a:pPr marL="0" indent="0">
+              <a:buNone/>
+            </a:pPr>
+            <a:endParaRPr lang="en-US" dirty="0"/>
+          </a:p>
+          <a:p>
+            <a:pPr marL="0" indent="0">
+              <a:buNone/>
+            </a:pPr>
+            <a:r>
+              <a:rPr lang="en-US" dirty="0"/>
+              <a:t>Selections for </a:t>
+            </a:r>
+            <a:r>
+              <a:rPr lang="ko-KR" altLang="en-US" dirty="0"/>
+              <a:t>한자</a:t>
+            </a:r>
+            <a:r>
+              <a:rPr lang="en-US" altLang="ko-KR" dirty="0"/>
+              <a:t>: </a:t>
+            </a:r>
+            <a:r>
+              <a:rPr lang="ko-KR" altLang="en-US" dirty="0"/>
+              <a:t>훈</a:t>
+            </a:r>
+            <a:r>
+              <a:rPr lang="en-US" altLang="ko-KR" dirty="0"/>
+              <a:t>, </a:t>
+            </a:r>
+            <a:r>
+              <a:rPr lang="ko-KR" altLang="en-US" dirty="0"/>
+              <a:t>음</a:t>
+            </a:r>
+            <a:r>
+              <a:rPr lang="en-US" altLang="ko-KR" dirty="0"/>
+              <a:t>, </a:t>
+            </a:r>
+            <a:r>
+              <a:rPr lang="ko-KR" altLang="en-US" dirty="0"/>
+              <a:t>자</a:t>
+            </a:r>
+            <a:endParaRPr lang="en-US" dirty="0"/>
+          </a:p>
+        </p:txBody>
+      </p:sp>
+    </p:spTree>
+    <p:extLst>
+      <p:ext uri="{BB962C8B-B14F-4D97-AF65-F5344CB8AC3E}">
+        <p14:creationId xmlns:p14="http://schemas.microsoft.com/office/powerpoint/2010/main" val="981056910"/>
+      </p:ext>
+    </p:extLst>
+  </p:cSld>
+  <p:clrMapOvr>
+    <a:masterClrMapping/>
+  </p:clrMapOvr>
+</p:sld>
+</file>
+
+<file path=ppt/slides/slide2.xml><?xml version="1.0" encoding="utf-8"?>
+<p:sld xmlns:a="http://schemas.openxmlformats.org/drawingml/2006/main" xmlns:r="http://schemas.openxmlformats.org/officeDocument/2006/relationships" xmlns:p="http://schemas.openxmlformats.org/presentationml/2006/main">
+  <p:cSld>
+    <p:spTree>
+      <p:nvGrpSpPr>
+        <p:cNvPr id="1" name=""/>
+        <p:cNvGrpSpPr/>
+        <p:nvPr/>
+      </p:nvGrpSpPr>
+      <p:grpSpPr>
+        <a:xfrm>
+          <a:off x="0" y="0"/>
+          <a:ext cx="0" cy="0"/>
+          <a:chOff x="0" y="0"/>
+          <a:chExt cx="0" cy="0"/>
+        </a:xfrm>
+      </p:grpSpPr>
+      <p:sp>
+        <p:nvSpPr>
           <p:cNvPr id="4" name="Rectangle 3">
             <a:extLst>
               <a:ext uri="{FF2B5EF4-FFF2-40B4-BE49-F238E27FC236}">
@@ -3733,7 +3907,7 @@
         </p:nvSpPr>
         <p:spPr>
           <a:xfrm>
-            <a:off x="78912" y="260755"/>
+            <a:off x="119140" y="269260"/>
             <a:ext cx="2447998" cy="584775"/>
           </a:xfrm>
           <a:prstGeom prst="rect">
@@ -3753,7 +3927,7 @@
                   <a:schemeClr val="bg1"/>
                 </a:solidFill>
               </a:rPr>
-              <a:t>표준어사전 </a:t>
+              <a:t>한국어사전 </a:t>
             </a:r>
             <a:endParaRPr lang="en-US" sz="3200" dirty="0">
               <a:solidFill>
@@ -3777,7 +3951,7 @@
         </p:nvSpPr>
         <p:spPr>
           <a:xfrm>
-            <a:off x="2474500" y="247332"/>
+            <a:off x="2662971" y="216008"/>
             <a:ext cx="3416915" cy="628633"/>
           </a:xfrm>
           <a:prstGeom prst="rect">
@@ -3816,10 +3990,46 @@
       </p:sp>
       <p:sp>
         <p:nvSpPr>
-          <p:cNvPr id="15" name="Rectangle 14">
-            <a:extLst>
-              <a:ext uri="{FF2B5EF4-FFF2-40B4-BE49-F238E27FC236}">
-                <a16:creationId xmlns:a16="http://schemas.microsoft.com/office/drawing/2014/main" id="{833469C9-C14C-2E30-AD6B-0A6D0FDFB347}"/>
+          <p:cNvPr id="16" name="TextBox 15">
+            <a:extLst>
+              <a:ext uri="{FF2B5EF4-FFF2-40B4-BE49-F238E27FC236}">
+                <a16:creationId xmlns:a16="http://schemas.microsoft.com/office/drawing/2014/main" id="{175B4C17-22FA-F2F7-1335-24F7E865E574}"/>
+              </a:ext>
+            </a:extLst>
+          </p:cNvPr>
+          <p:cNvSpPr txBox="1"/>
+          <p:nvPr/>
+        </p:nvSpPr>
+        <p:spPr>
+          <a:xfrm>
+            <a:off x="2664110" y="282685"/>
+            <a:ext cx="1261884" cy="523220"/>
+          </a:xfrm>
+          <a:prstGeom prst="rect">
+            <a:avLst/>
+          </a:prstGeom>
+          <a:noFill/>
+        </p:spPr>
+        <p:txBody>
+          <a:bodyPr wrap="none" rtlCol="0">
+            <a:spAutoFit/>
+          </a:bodyPr>
+          <a:lstStyle/>
+          <a:p>
+            <a:r>
+              <a:rPr lang="ko-KR" altLang="en-US" sz="2800" dirty="0"/>
+              <a:t>검색어</a:t>
+            </a:r>
+            <a:endParaRPr lang="en-US" sz="2800" dirty="0"/>
+          </a:p>
+        </p:txBody>
+      </p:sp>
+      <p:sp>
+        <p:nvSpPr>
+          <p:cNvPr id="2" name="Rectangle 1">
+            <a:extLst>
+              <a:ext uri="{FF2B5EF4-FFF2-40B4-BE49-F238E27FC236}">
+                <a16:creationId xmlns:a16="http://schemas.microsoft.com/office/drawing/2014/main" id="{4A71A0B3-62AF-A77E-89A3-0FA3C2979672}"/>
               </a:ext>
             </a:extLst>
           </p:cNvPr>
@@ -3828,8 +4038,586 @@
         </p:nvSpPr>
         <p:spPr>
           <a:xfrm>
-            <a:off x="6096000" y="260754"/>
-            <a:ext cx="3208981" cy="628633"/>
+            <a:off x="5442042" y="237938"/>
+            <a:ext cx="634885" cy="584775"/>
+          </a:xfrm>
+          <a:prstGeom prst="rect">
+            <a:avLst/>
+          </a:prstGeom>
+          <a:solidFill>
+            <a:schemeClr val="tx2">
+              <a:lumMod val="25000"/>
+              <a:lumOff val="75000"/>
+            </a:schemeClr>
+          </a:solidFill>
+        </p:spPr>
+        <p:style>
+          <a:lnRef idx="2">
+            <a:schemeClr val="accent1">
+              <a:shade val="15000"/>
+            </a:schemeClr>
+          </a:lnRef>
+          <a:fillRef idx="1">
+            <a:schemeClr val="accent1"/>
+          </a:fillRef>
+          <a:effectRef idx="0">
+            <a:schemeClr val="accent1"/>
+          </a:effectRef>
+          <a:fontRef idx="minor">
+            <a:schemeClr val="lt1"/>
+          </a:fontRef>
+        </p:style>
+        <p:txBody>
+          <a:bodyPr rtlCol="0" anchor="ctr"/>
+          <a:lstStyle/>
+          <a:p>
+            <a:pPr algn="ctr"/>
+            <a:endParaRPr lang="en-US"/>
+          </a:p>
+        </p:txBody>
+      </p:sp>
+      <p:sp>
+        <p:nvSpPr>
+          <p:cNvPr id="8" name="Isosceles Triangle 7">
+            <a:extLst>
+              <a:ext uri="{FF2B5EF4-FFF2-40B4-BE49-F238E27FC236}">
+                <a16:creationId xmlns:a16="http://schemas.microsoft.com/office/drawing/2014/main" id="{866D4D09-1ADF-2E91-5DBB-D2922EBFC4AE}"/>
+              </a:ext>
+            </a:extLst>
+          </p:cNvPr>
+          <p:cNvSpPr/>
+          <p:nvPr/>
+        </p:nvSpPr>
+        <p:spPr>
+          <a:xfrm rot="10800000">
+            <a:off x="5581087" y="378791"/>
+            <a:ext cx="356794" cy="331007"/>
+          </a:xfrm>
+          <a:prstGeom prst="triangle">
+            <a:avLst/>
+          </a:prstGeom>
+          <a:solidFill>
+            <a:schemeClr val="accent1">
+              <a:lumMod val="40000"/>
+              <a:lumOff val="60000"/>
+            </a:schemeClr>
+          </a:solidFill>
+        </p:spPr>
+        <p:style>
+          <a:lnRef idx="2">
+            <a:schemeClr val="accent1">
+              <a:shade val="15000"/>
+            </a:schemeClr>
+          </a:lnRef>
+          <a:fillRef idx="1">
+            <a:schemeClr val="accent1"/>
+          </a:fillRef>
+          <a:effectRef idx="0">
+            <a:schemeClr val="accent1"/>
+          </a:effectRef>
+          <a:fontRef idx="minor">
+            <a:schemeClr val="lt1"/>
+          </a:fontRef>
+        </p:style>
+        <p:txBody>
+          <a:bodyPr rtlCol="0" anchor="ctr"/>
+          <a:lstStyle/>
+          <a:p>
+            <a:pPr algn="ctr"/>
+            <a:endParaRPr lang="en-US"/>
+          </a:p>
+        </p:txBody>
+      </p:sp>
+    </p:spTree>
+    <p:extLst>
+      <p:ext uri="{BB962C8B-B14F-4D97-AF65-F5344CB8AC3E}">
+        <p14:creationId xmlns:p14="http://schemas.microsoft.com/office/powerpoint/2010/main" val="2934239877"/>
+      </p:ext>
+    </p:extLst>
+  </p:cSld>
+  <p:clrMapOvr>
+    <a:masterClrMapping/>
+  </p:clrMapOvr>
+</p:sld>
+</file>
+
+<file path=ppt/slides/slide3.xml><?xml version="1.0" encoding="utf-8"?>
+<p:sld xmlns:a="http://schemas.openxmlformats.org/drawingml/2006/main" xmlns:r="http://schemas.openxmlformats.org/officeDocument/2006/relationships" xmlns:p="http://schemas.openxmlformats.org/presentationml/2006/main">
+  <p:cSld>
+    <p:spTree>
+      <p:nvGrpSpPr>
+        <p:cNvPr id="1" name=""/>
+        <p:cNvGrpSpPr/>
+        <p:nvPr/>
+      </p:nvGrpSpPr>
+      <p:grpSpPr>
+        <a:xfrm>
+          <a:off x="0" y="0"/>
+          <a:ext cx="0" cy="0"/>
+          <a:chOff x="0" y="0"/>
+          <a:chExt cx="0" cy="0"/>
+        </a:xfrm>
+      </p:grpSpPr>
+      <p:sp>
+        <p:nvSpPr>
+          <p:cNvPr id="4" name="Rectangle 3">
+            <a:extLst>
+              <a:ext uri="{FF2B5EF4-FFF2-40B4-BE49-F238E27FC236}">
+                <a16:creationId xmlns:a16="http://schemas.microsoft.com/office/drawing/2014/main" id="{977D01B7-2F60-C8B9-9431-C44D26050F82}"/>
+              </a:ext>
+            </a:extLst>
+          </p:cNvPr>
+          <p:cNvSpPr>
+            <a:spLocks noGrp="1" noRot="1" noMove="1" noResize="1" noEditPoints="1" noAdjustHandles="1" noChangeArrowheads="1" noChangeShapeType="1"/>
+          </p:cNvSpPr>
+          <p:nvPr/>
+        </p:nvSpPr>
+        <p:spPr>
+          <a:xfrm>
+            <a:off x="0" y="1"/>
+            <a:ext cx="12191999" cy="6858000"/>
+          </a:xfrm>
+          <a:prstGeom prst="rect">
+            <a:avLst/>
+          </a:prstGeom>
+          <a:solidFill>
+            <a:schemeClr val="tx1">
+              <a:lumMod val="85000"/>
+              <a:lumOff val="15000"/>
+            </a:schemeClr>
+          </a:solidFill>
+        </p:spPr>
+        <p:style>
+          <a:lnRef idx="2">
+            <a:schemeClr val="accent1">
+              <a:shade val="15000"/>
+            </a:schemeClr>
+          </a:lnRef>
+          <a:fillRef idx="1">
+            <a:schemeClr val="accent1"/>
+          </a:fillRef>
+          <a:effectRef idx="0">
+            <a:schemeClr val="accent1"/>
+          </a:effectRef>
+          <a:fontRef idx="minor">
+            <a:schemeClr val="lt1"/>
+          </a:fontRef>
+        </p:style>
+        <p:txBody>
+          <a:bodyPr rtlCol="0" anchor="ctr"/>
+          <a:lstStyle/>
+          <a:p>
+            <a:pPr algn="ctr"/>
+            <a:endParaRPr lang="en-US" dirty="0"/>
+          </a:p>
+        </p:txBody>
+      </p:sp>
+      <p:sp>
+        <p:nvSpPr>
+          <p:cNvPr id="5" name="Rectangle 4">
+            <a:extLst>
+              <a:ext uri="{FF2B5EF4-FFF2-40B4-BE49-F238E27FC236}">
+                <a16:creationId xmlns:a16="http://schemas.microsoft.com/office/drawing/2014/main" id="{52697334-8E7B-D2AA-EDE4-70E335350FA1}"/>
+              </a:ext>
+            </a:extLst>
+          </p:cNvPr>
+          <p:cNvSpPr/>
+          <p:nvPr/>
+        </p:nvSpPr>
+        <p:spPr>
+          <a:xfrm>
+            <a:off x="0" y="40307"/>
+            <a:ext cx="12191998" cy="980036"/>
+          </a:xfrm>
+          <a:prstGeom prst="rect">
+            <a:avLst/>
+          </a:prstGeom>
+          <a:solidFill>
+            <a:schemeClr val="tx1">
+              <a:lumMod val="75000"/>
+              <a:lumOff val="25000"/>
+            </a:schemeClr>
+          </a:solidFill>
+        </p:spPr>
+        <p:style>
+          <a:lnRef idx="2">
+            <a:schemeClr val="accent1">
+              <a:shade val="15000"/>
+            </a:schemeClr>
+          </a:lnRef>
+          <a:fillRef idx="1">
+            <a:schemeClr val="accent1"/>
+          </a:fillRef>
+          <a:effectRef idx="0">
+            <a:schemeClr val="accent1"/>
+          </a:effectRef>
+          <a:fontRef idx="minor">
+            <a:schemeClr val="lt1"/>
+          </a:fontRef>
+        </p:style>
+        <p:txBody>
+          <a:bodyPr rtlCol="0" anchor="ctr"/>
+          <a:lstStyle/>
+          <a:p>
+            <a:pPr algn="ctr"/>
+            <a:endParaRPr lang="en-US"/>
+          </a:p>
+        </p:txBody>
+      </p:sp>
+      <p:sp>
+        <p:nvSpPr>
+          <p:cNvPr id="9" name="Rectangle 8">
+            <a:extLst>
+              <a:ext uri="{FF2B5EF4-FFF2-40B4-BE49-F238E27FC236}">
+                <a16:creationId xmlns:a16="http://schemas.microsoft.com/office/drawing/2014/main" id="{28087533-1F7D-9658-751E-64415D77BB1F}"/>
+              </a:ext>
+            </a:extLst>
+          </p:cNvPr>
+          <p:cNvSpPr/>
+          <p:nvPr/>
+        </p:nvSpPr>
+        <p:spPr>
+          <a:xfrm>
+            <a:off x="9444391" y="194265"/>
+            <a:ext cx="644992" cy="761613"/>
+          </a:xfrm>
+          <a:prstGeom prst="rect">
+            <a:avLst/>
+          </a:prstGeom>
+          <a:solidFill>
+            <a:schemeClr val="accent3">
+              <a:lumMod val="50000"/>
+            </a:schemeClr>
+          </a:solidFill>
+        </p:spPr>
+        <p:style>
+          <a:lnRef idx="2">
+            <a:schemeClr val="accent1">
+              <a:shade val="15000"/>
+            </a:schemeClr>
+          </a:lnRef>
+          <a:fillRef idx="1">
+            <a:schemeClr val="accent1"/>
+          </a:fillRef>
+          <a:effectRef idx="0">
+            <a:schemeClr val="accent1"/>
+          </a:effectRef>
+          <a:fontRef idx="minor">
+            <a:schemeClr val="lt1"/>
+          </a:fontRef>
+        </p:style>
+        <p:txBody>
+          <a:bodyPr rtlCol="0" anchor="ctr"/>
+          <a:lstStyle/>
+          <a:p>
+            <a:pPr algn="ctr"/>
+            <a:endParaRPr lang="en-US"/>
+          </a:p>
+        </p:txBody>
+      </p:sp>
+      <p:sp>
+        <p:nvSpPr>
+          <p:cNvPr id="6" name="TextBox 5">
+            <a:extLst>
+              <a:ext uri="{FF2B5EF4-FFF2-40B4-BE49-F238E27FC236}">
+                <a16:creationId xmlns:a16="http://schemas.microsoft.com/office/drawing/2014/main" id="{B3BC02BD-4890-0DE1-60D2-3A0298E54D01}"/>
+              </a:ext>
+            </a:extLst>
+          </p:cNvPr>
+          <p:cNvSpPr txBox="1"/>
+          <p:nvPr/>
+        </p:nvSpPr>
+        <p:spPr>
+          <a:xfrm>
+            <a:off x="9455093" y="260755"/>
+            <a:ext cx="838874" cy="584775"/>
+          </a:xfrm>
+          <a:prstGeom prst="rect">
+            <a:avLst/>
+          </a:prstGeom>
+          <a:noFill/>
+        </p:spPr>
+        <p:txBody>
+          <a:bodyPr wrap="square" rtlCol="0">
+            <a:spAutoFit/>
+          </a:bodyPr>
+          <a:lstStyle/>
+          <a:p>
+            <a:r>
+              <a:rPr lang="ko-KR" altLang="en-US" sz="3200" dirty="0">
+                <a:solidFill>
+                  <a:schemeClr val="bg1"/>
+                </a:solidFill>
+              </a:rPr>
+              <a:t>한 </a:t>
+            </a:r>
+            <a:endParaRPr lang="en-US" sz="3200" dirty="0">
+              <a:solidFill>
+                <a:schemeClr val="bg1"/>
+              </a:solidFill>
+            </a:endParaRPr>
+          </a:p>
+        </p:txBody>
+      </p:sp>
+      <p:sp>
+        <p:nvSpPr>
+          <p:cNvPr id="10" name="Rectangle 9">
+            <a:extLst>
+              <a:ext uri="{FF2B5EF4-FFF2-40B4-BE49-F238E27FC236}">
+                <a16:creationId xmlns:a16="http://schemas.microsoft.com/office/drawing/2014/main" id="{0695E935-8227-678B-690B-D4BE40D28E27}"/>
+              </a:ext>
+            </a:extLst>
+          </p:cNvPr>
+          <p:cNvSpPr/>
+          <p:nvPr/>
+        </p:nvSpPr>
+        <p:spPr>
+          <a:xfrm>
+            <a:off x="10293968" y="194265"/>
+            <a:ext cx="644992" cy="761613"/>
+          </a:xfrm>
+          <a:prstGeom prst="rect">
+            <a:avLst/>
+          </a:prstGeom>
+          <a:solidFill>
+            <a:schemeClr val="accent1">
+              <a:lumMod val="50000"/>
+            </a:schemeClr>
+          </a:solidFill>
+        </p:spPr>
+        <p:style>
+          <a:lnRef idx="2">
+            <a:schemeClr val="accent1">
+              <a:shade val="15000"/>
+            </a:schemeClr>
+          </a:lnRef>
+          <a:fillRef idx="1">
+            <a:schemeClr val="accent1"/>
+          </a:fillRef>
+          <a:effectRef idx="0">
+            <a:schemeClr val="accent1"/>
+          </a:effectRef>
+          <a:fontRef idx="minor">
+            <a:schemeClr val="lt1"/>
+          </a:fontRef>
+        </p:style>
+        <p:txBody>
+          <a:bodyPr rtlCol="0" anchor="ctr"/>
+          <a:lstStyle/>
+          <a:p>
+            <a:pPr algn="ctr"/>
+            <a:endParaRPr lang="en-US"/>
+          </a:p>
+        </p:txBody>
+      </p:sp>
+      <p:sp>
+        <p:nvSpPr>
+          <p:cNvPr id="7" name="TextBox 6">
+            <a:extLst>
+              <a:ext uri="{FF2B5EF4-FFF2-40B4-BE49-F238E27FC236}">
+                <a16:creationId xmlns:a16="http://schemas.microsoft.com/office/drawing/2014/main" id="{B0F7C8A7-FDFB-4E80-A5EF-27754D0C1BB2}"/>
+              </a:ext>
+            </a:extLst>
+          </p:cNvPr>
+          <p:cNvSpPr txBox="1"/>
+          <p:nvPr/>
+        </p:nvSpPr>
+        <p:spPr>
+          <a:xfrm>
+            <a:off x="10325343" y="282685"/>
+            <a:ext cx="1472349" cy="584775"/>
+          </a:xfrm>
+          <a:prstGeom prst="rect">
+            <a:avLst/>
+          </a:prstGeom>
+          <a:noFill/>
+        </p:spPr>
+        <p:txBody>
+          <a:bodyPr wrap="square" rtlCol="0">
+            <a:spAutoFit/>
+          </a:bodyPr>
+          <a:lstStyle/>
+          <a:p>
+            <a:r>
+              <a:rPr lang="ko-KR" altLang="en-US" sz="3200" b="1" dirty="0">
+                <a:solidFill>
+                  <a:schemeClr val="bg1"/>
+                </a:solidFill>
+                <a:effectLst/>
+              </a:rPr>
+              <a:t>漢</a:t>
+            </a:r>
+            <a:r>
+              <a:rPr lang="ko-KR" altLang="en-US" sz="3200" dirty="0">
+                <a:solidFill>
+                  <a:schemeClr val="bg1"/>
+                </a:solidFill>
+              </a:rPr>
+              <a:t> </a:t>
+            </a:r>
+            <a:endParaRPr lang="en-US" sz="3200" dirty="0">
+              <a:solidFill>
+                <a:schemeClr val="bg1"/>
+              </a:solidFill>
+            </a:endParaRPr>
+          </a:p>
+        </p:txBody>
+      </p:sp>
+      <p:sp>
+        <p:nvSpPr>
+          <p:cNvPr id="12" name="Rectangle 11">
+            <a:extLst>
+              <a:ext uri="{FF2B5EF4-FFF2-40B4-BE49-F238E27FC236}">
+                <a16:creationId xmlns:a16="http://schemas.microsoft.com/office/drawing/2014/main" id="{D684C88E-CD31-8262-0986-4BD5D89D446F}"/>
+              </a:ext>
+            </a:extLst>
+          </p:cNvPr>
+          <p:cNvSpPr/>
+          <p:nvPr/>
+        </p:nvSpPr>
+        <p:spPr>
+          <a:xfrm>
+            <a:off x="11117940" y="155969"/>
+            <a:ext cx="1017636" cy="761613"/>
+          </a:xfrm>
+          <a:prstGeom prst="rect">
+            <a:avLst/>
+          </a:prstGeom>
+          <a:solidFill>
+            <a:schemeClr val="accent5">
+              <a:lumMod val="50000"/>
+            </a:schemeClr>
+          </a:solidFill>
+        </p:spPr>
+        <p:style>
+          <a:lnRef idx="2">
+            <a:schemeClr val="accent1">
+              <a:shade val="15000"/>
+            </a:schemeClr>
+          </a:lnRef>
+          <a:fillRef idx="1">
+            <a:schemeClr val="accent1"/>
+          </a:fillRef>
+          <a:effectRef idx="0">
+            <a:schemeClr val="accent1"/>
+          </a:effectRef>
+          <a:fontRef idx="minor">
+            <a:schemeClr val="lt1"/>
+          </a:fontRef>
+        </p:style>
+        <p:txBody>
+          <a:bodyPr rtlCol="0" anchor="ctr"/>
+          <a:lstStyle/>
+          <a:p>
+            <a:pPr algn="ctr"/>
+            <a:endParaRPr lang="en-US"/>
+          </a:p>
+        </p:txBody>
+      </p:sp>
+      <p:sp>
+        <p:nvSpPr>
+          <p:cNvPr id="11" name="TextBox 10">
+            <a:extLst>
+              <a:ext uri="{FF2B5EF4-FFF2-40B4-BE49-F238E27FC236}">
+                <a16:creationId xmlns:a16="http://schemas.microsoft.com/office/drawing/2014/main" id="{0211BA4F-BCC3-F55D-6C00-A167EBDA1BF4}"/>
+              </a:ext>
+            </a:extLst>
+          </p:cNvPr>
+          <p:cNvSpPr txBox="1"/>
+          <p:nvPr/>
+        </p:nvSpPr>
+        <p:spPr>
+          <a:xfrm>
+            <a:off x="11129634" y="282685"/>
+            <a:ext cx="1589446" cy="584775"/>
+          </a:xfrm>
+          <a:prstGeom prst="rect">
+            <a:avLst/>
+          </a:prstGeom>
+          <a:noFill/>
+        </p:spPr>
+        <p:txBody>
+          <a:bodyPr wrap="square" rtlCol="0">
+            <a:spAutoFit/>
+          </a:bodyPr>
+          <a:lstStyle/>
+          <a:p>
+            <a:r>
+              <a:rPr lang="ko-KR" altLang="en-US" sz="3200" dirty="0">
+                <a:solidFill>
+                  <a:schemeClr val="bg1"/>
+                </a:solidFill>
+              </a:rPr>
+              <a:t>연습 </a:t>
+            </a:r>
+            <a:endParaRPr lang="en-US" sz="3200" dirty="0">
+              <a:solidFill>
+                <a:schemeClr val="bg1"/>
+              </a:solidFill>
+            </a:endParaRPr>
+          </a:p>
+        </p:txBody>
+      </p:sp>
+      <p:sp>
+        <p:nvSpPr>
+          <p:cNvPr id="13" name="TextBox 12">
+            <a:extLst>
+              <a:ext uri="{FF2B5EF4-FFF2-40B4-BE49-F238E27FC236}">
+                <a16:creationId xmlns:a16="http://schemas.microsoft.com/office/drawing/2014/main" id="{4C8B326B-FDB0-4A10-31E8-96378A71D0B4}"/>
+              </a:ext>
+            </a:extLst>
+          </p:cNvPr>
+          <p:cNvSpPr txBox="1"/>
+          <p:nvPr/>
+        </p:nvSpPr>
+        <p:spPr>
+          <a:xfrm>
+            <a:off x="119140" y="269260"/>
+            <a:ext cx="2447998" cy="584775"/>
+          </a:xfrm>
+          <a:prstGeom prst="rect">
+            <a:avLst/>
+          </a:prstGeom>
+          <a:noFill/>
+        </p:spPr>
+        <p:txBody>
+          <a:bodyPr wrap="square" rtlCol="0">
+            <a:spAutoFit/>
+          </a:bodyPr>
+          <a:lstStyle/>
+          <a:p>
+            <a:r>
+              <a:rPr lang="ko-KR" altLang="en-US" sz="3200" dirty="0">
+                <a:solidFill>
+                  <a:schemeClr val="bg1"/>
+                </a:solidFill>
+              </a:rPr>
+              <a:t>한국어사전 </a:t>
+            </a:r>
+            <a:endParaRPr lang="en-US" sz="3200" dirty="0">
+              <a:solidFill>
+                <a:schemeClr val="bg1"/>
+              </a:solidFill>
+            </a:endParaRPr>
+          </a:p>
+        </p:txBody>
+      </p:sp>
+      <p:sp>
+        <p:nvSpPr>
+          <p:cNvPr id="14" name="Rectangle 13">
+            <a:extLst>
+              <a:ext uri="{FF2B5EF4-FFF2-40B4-BE49-F238E27FC236}">
+                <a16:creationId xmlns:a16="http://schemas.microsoft.com/office/drawing/2014/main" id="{01B3002A-D154-02FB-3F8F-2D0259328CB6}"/>
+              </a:ext>
+            </a:extLst>
+          </p:cNvPr>
+          <p:cNvSpPr/>
+          <p:nvPr/>
+        </p:nvSpPr>
+        <p:spPr>
+          <a:xfrm>
+            <a:off x="2662971" y="216008"/>
+            <a:ext cx="3416915" cy="628633"/>
           </a:xfrm>
           <a:prstGeom prst="rect">
             <a:avLst/>
@@ -3879,8 +4667,8 @@
         </p:nvSpPr>
         <p:spPr>
           <a:xfrm>
-            <a:off x="2514467" y="307702"/>
-            <a:ext cx="1694695" cy="523220"/>
+            <a:off x="2664110" y="282685"/>
+            <a:ext cx="1261884" cy="523220"/>
           </a:xfrm>
           <a:prstGeom prst="rect">
             <a:avLst/>
@@ -3895,7 +4683,7 @@
           <a:p>
             <a:r>
               <a:rPr lang="ko-KR" altLang="en-US" sz="2800" dirty="0"/>
-              <a:t>왼쪽 검색</a:t>
+              <a:t>검색어</a:t>
             </a:r>
             <a:endParaRPr lang="en-US" sz="2800" dirty="0"/>
           </a:p>
@@ -3903,44 +4691,1225 @@
       </p:sp>
       <p:sp>
         <p:nvSpPr>
-          <p:cNvPr id="18" name="TextBox 17">
-            <a:extLst>
-              <a:ext uri="{FF2B5EF4-FFF2-40B4-BE49-F238E27FC236}">
-                <a16:creationId xmlns:a16="http://schemas.microsoft.com/office/drawing/2014/main" id="{FD907B7D-BA73-81F9-1688-037618C2DC70}"/>
-              </a:ext>
-            </a:extLst>
-          </p:cNvPr>
-          <p:cNvSpPr txBox="1"/>
+          <p:cNvPr id="2" name="Rectangle 1">
+            <a:extLst>
+              <a:ext uri="{FF2B5EF4-FFF2-40B4-BE49-F238E27FC236}">
+                <a16:creationId xmlns:a16="http://schemas.microsoft.com/office/drawing/2014/main" id="{4A71A0B3-62AF-A77E-89A3-0FA3C2979672}"/>
+              </a:ext>
+            </a:extLst>
+          </p:cNvPr>
+          <p:cNvSpPr/>
           <p:nvPr/>
         </p:nvSpPr>
         <p:spPr>
           <a:xfrm>
-            <a:off x="6079886" y="322980"/>
-            <a:ext cx="2053767" cy="523220"/>
+            <a:off x="5442042" y="237938"/>
+            <a:ext cx="634885" cy="584775"/>
           </a:xfrm>
           <a:prstGeom prst="rect">
             <a:avLst/>
           </a:prstGeom>
-          <a:noFill/>
+          <a:solidFill>
+            <a:schemeClr val="tx2">
+              <a:lumMod val="25000"/>
+              <a:lumOff val="75000"/>
+            </a:schemeClr>
+          </a:solidFill>
         </p:spPr>
-        <p:txBody>
-          <a:bodyPr wrap="none" rtlCol="0">
-            <a:spAutoFit/>
-          </a:bodyPr>
-          <a:lstStyle/>
-          <a:p>
+        <p:style>
+          <a:lnRef idx="2">
+            <a:schemeClr val="accent1">
+              <a:shade val="15000"/>
+            </a:schemeClr>
+          </a:lnRef>
+          <a:fillRef idx="1">
+            <a:schemeClr val="accent1"/>
+          </a:fillRef>
+          <a:effectRef idx="0">
+            <a:schemeClr val="accent1"/>
+          </a:effectRef>
+          <a:fontRef idx="minor">
+            <a:schemeClr val="lt1"/>
+          </a:fontRef>
+        </p:style>
+        <p:txBody>
+          <a:bodyPr rtlCol="0" anchor="ctr"/>
+          <a:lstStyle/>
+          <a:p>
+            <a:pPr algn="ctr"/>
+            <a:endParaRPr lang="en-US"/>
+          </a:p>
+        </p:txBody>
+      </p:sp>
+      <p:sp>
+        <p:nvSpPr>
+          <p:cNvPr id="8" name="Isosceles Triangle 7">
+            <a:extLst>
+              <a:ext uri="{FF2B5EF4-FFF2-40B4-BE49-F238E27FC236}">
+                <a16:creationId xmlns:a16="http://schemas.microsoft.com/office/drawing/2014/main" id="{866D4D09-1ADF-2E91-5DBB-D2922EBFC4AE}"/>
+              </a:ext>
+            </a:extLst>
+          </p:cNvPr>
+          <p:cNvSpPr/>
+          <p:nvPr/>
+        </p:nvSpPr>
+        <p:spPr>
+          <a:xfrm rot="10800000">
+            <a:off x="5581087" y="378791"/>
+            <a:ext cx="356794" cy="331007"/>
+          </a:xfrm>
+          <a:prstGeom prst="triangle">
+            <a:avLst/>
+          </a:prstGeom>
+          <a:solidFill>
+            <a:schemeClr val="accent1">
+              <a:lumMod val="40000"/>
+              <a:lumOff val="60000"/>
+            </a:schemeClr>
+          </a:solidFill>
+        </p:spPr>
+        <p:style>
+          <a:lnRef idx="2">
+            <a:schemeClr val="accent1">
+              <a:shade val="15000"/>
+            </a:schemeClr>
+          </a:lnRef>
+          <a:fillRef idx="1">
+            <a:schemeClr val="accent1"/>
+          </a:fillRef>
+          <a:effectRef idx="0">
+            <a:schemeClr val="accent1"/>
+          </a:effectRef>
+          <a:fontRef idx="minor">
+            <a:schemeClr val="lt1"/>
+          </a:fontRef>
+        </p:style>
+        <p:txBody>
+          <a:bodyPr rtlCol="0" anchor="ctr"/>
+          <a:lstStyle/>
+          <a:p>
+            <a:pPr algn="ctr"/>
+            <a:endParaRPr lang="en-US"/>
+          </a:p>
+        </p:txBody>
+      </p:sp>
+      <p:sp>
+        <p:nvSpPr>
+          <p:cNvPr id="15" name="Rectangle 14">
+            <a:extLst>
+              <a:ext uri="{FF2B5EF4-FFF2-40B4-BE49-F238E27FC236}">
+                <a16:creationId xmlns:a16="http://schemas.microsoft.com/office/drawing/2014/main" id="{905B0B3A-0C98-1EE7-4431-6A4B1FF1CE0A}"/>
+              </a:ext>
+            </a:extLst>
+          </p:cNvPr>
+          <p:cNvSpPr/>
+          <p:nvPr/>
+        </p:nvSpPr>
+        <p:spPr>
+          <a:xfrm>
+            <a:off x="119140" y="1249296"/>
+            <a:ext cx="5818739" cy="2057430"/>
+          </a:xfrm>
+          <a:prstGeom prst="rect">
+            <a:avLst/>
+          </a:prstGeom>
+        </p:spPr>
+        <p:style>
+          <a:lnRef idx="2">
+            <a:schemeClr val="accent1">
+              <a:shade val="15000"/>
+            </a:schemeClr>
+          </a:lnRef>
+          <a:fillRef idx="1">
+            <a:schemeClr val="accent1"/>
+          </a:fillRef>
+          <a:effectRef idx="0">
+            <a:schemeClr val="accent1"/>
+          </a:effectRef>
+          <a:fontRef idx="minor">
+            <a:schemeClr val="lt1"/>
+          </a:fontRef>
+        </p:style>
+        <p:txBody>
+          <a:bodyPr rtlCol="0" anchor="t"/>
+          <a:lstStyle/>
+          <a:p>
+            <a:pPr>
+              <a:spcAft>
+                <a:spcPts val="600"/>
+              </a:spcAft>
+            </a:pPr>
             <a:r>
               <a:rPr lang="ko-KR" altLang="en-US" sz="2800" dirty="0"/>
-              <a:t>오른쪽 검색</a:t>
-            </a:r>
-            <a:endParaRPr lang="en-US" sz="2800" dirty="0"/>
-          </a:p>
-        </p:txBody>
-      </p:sp>
+              <a:t>단어</a:t>
+            </a:r>
+            <a:r>
+              <a:rPr lang="en-US" altLang="ko-KR" sz="2800" dirty="0"/>
+              <a:t>(</a:t>
+            </a:r>
+            <a:r>
+              <a:rPr lang="ko-KR" altLang="en-US" sz="2800" dirty="0"/>
+              <a:t>어원</a:t>
+            </a:r>
+            <a:r>
+              <a:rPr lang="en-US" altLang="ko-KR" sz="2800" dirty="0"/>
+              <a:t>)</a:t>
+            </a:r>
+          </a:p>
+          <a:p>
+            <a:pPr marL="342900" indent="-342900">
+              <a:buAutoNum type="arabicPeriod"/>
+            </a:pPr>
+            <a:r>
+              <a:rPr lang="ko-KR" altLang="en-US" dirty="0"/>
+              <a:t>분야 정의</a:t>
+            </a:r>
+            <a:r>
+              <a:rPr lang="en-US" altLang="ko-KR" dirty="0"/>
+              <a:t>.</a:t>
+            </a:r>
+          </a:p>
+          <a:p>
+            <a:pPr marL="342900" indent="-342900">
+              <a:buAutoNum type="arabicPeriod"/>
+            </a:pPr>
+            <a:r>
+              <a:rPr lang="ko-KR" altLang="en-US" dirty="0"/>
+              <a:t>분야 정의</a:t>
+            </a:r>
+            <a:r>
+              <a:rPr lang="en-US" altLang="ko-KR" dirty="0"/>
+              <a:t>.</a:t>
+            </a:r>
+          </a:p>
+          <a:p>
+            <a:pPr marL="342900" indent="-342900">
+              <a:buAutoNum type="arabicPeriod"/>
+            </a:pPr>
+            <a:r>
+              <a:rPr lang="ko-KR" altLang="en-US" dirty="0"/>
+              <a:t>분야 정의</a:t>
+            </a:r>
+            <a:r>
+              <a:rPr lang="en-US" altLang="ko-KR" dirty="0"/>
+              <a:t>.</a:t>
+            </a:r>
+          </a:p>
+          <a:p>
+            <a:pPr marL="342900" indent="-342900">
+              <a:buAutoNum type="arabicPeriod"/>
+            </a:pPr>
+            <a:r>
+              <a:rPr lang="ko-KR" altLang="en-US" dirty="0"/>
+              <a:t>분야 정의</a:t>
+            </a:r>
+            <a:r>
+              <a:rPr lang="en-US" altLang="ko-KR" dirty="0"/>
+              <a:t>.</a:t>
+            </a:r>
+          </a:p>
+          <a:p>
+            <a:pPr>
+              <a:spcBef>
+                <a:spcPts val="600"/>
+              </a:spcBef>
+            </a:pPr>
+            <a:r>
+              <a:rPr lang="ko-KR" altLang="en-US" dirty="0"/>
+              <a:t>출처</a:t>
+            </a:r>
+            <a:r>
+              <a:rPr lang="en-US" altLang="ko-KR" dirty="0"/>
+              <a:t>: </a:t>
+            </a:r>
+            <a:r>
+              <a:rPr lang="ko-KR" altLang="en-US" dirty="0"/>
+              <a:t>출처</a:t>
+            </a:r>
+            <a:endParaRPr lang="en-US" altLang="ko-KR" dirty="0"/>
+          </a:p>
+        </p:txBody>
+      </p:sp>
+      <p:cxnSp>
+        <p:nvCxnSpPr>
+          <p:cNvPr id="18" name="Straight Connector 17">
+            <a:extLst>
+              <a:ext uri="{FF2B5EF4-FFF2-40B4-BE49-F238E27FC236}">
+                <a16:creationId xmlns:a16="http://schemas.microsoft.com/office/drawing/2014/main" id="{7E0FFF9C-95B7-B4F5-0432-249FB59C5342}"/>
+              </a:ext>
+            </a:extLst>
+          </p:cNvPr>
+          <p:cNvCxnSpPr>
+            <a:stCxn id="4" idx="2"/>
+            <a:endCxn id="5" idx="2"/>
+          </p:cNvCxnSpPr>
+          <p:nvPr/>
+        </p:nvCxnSpPr>
+        <p:spPr>
+          <a:xfrm flipH="1" flipV="1">
+            <a:off x="6095999" y="1020343"/>
+            <a:ext cx="1" cy="5837658"/>
+          </a:xfrm>
+          <a:prstGeom prst="line">
+            <a:avLst/>
+          </a:prstGeom>
+        </p:spPr>
+        <p:style>
+          <a:lnRef idx="2">
+            <a:schemeClr val="accent1"/>
+          </a:lnRef>
+          <a:fillRef idx="0">
+            <a:schemeClr val="accent1"/>
+          </a:fillRef>
+          <a:effectRef idx="1">
+            <a:schemeClr val="accent1"/>
+          </a:effectRef>
+          <a:fontRef idx="minor">
+            <a:schemeClr val="tx1"/>
+          </a:fontRef>
+        </p:style>
+      </p:cxnSp>
+      <p:pic>
+        <p:nvPicPr>
+          <p:cNvPr id="25" name="Graphic 24" descr="Checkbox Checked outline">
+            <a:extLst>
+              <a:ext uri="{FF2B5EF4-FFF2-40B4-BE49-F238E27FC236}">
+                <a16:creationId xmlns:a16="http://schemas.microsoft.com/office/drawing/2014/main" id="{AC6E0C69-1D65-2A11-4DCE-FFD391470422}"/>
+              </a:ext>
+            </a:extLst>
+          </p:cNvPr>
+          <p:cNvPicPr>
+            <a:picLocks noChangeAspect="1"/>
+          </p:cNvPicPr>
+          <p:nvPr/>
+        </p:nvPicPr>
+        <p:blipFill>
+          <a:blip r:embed="rId2">
+            <a:extLst>
+              <a:ext uri="{28A0092B-C50C-407E-A947-70E740481C1C}">
+                <a14:useLocalDpi xmlns:a14="http://schemas.microsoft.com/office/drawing/2010/main" val="0"/>
+              </a:ext>
+              <a:ext uri="{96DAC541-7B7A-43D3-8B79-37D633B846F1}">
+                <asvg:svgBlip xmlns:asvg="http://schemas.microsoft.com/office/drawing/2016/SVG/main" r:embed="rId3"/>
+              </a:ext>
+            </a:extLst>
+          </a:blip>
+          <a:stretch>
+            <a:fillRect/>
+          </a:stretch>
+        </p:blipFill>
+        <p:spPr>
+          <a:xfrm>
+            <a:off x="5323560" y="1161196"/>
+            <a:ext cx="664535" cy="664535"/>
+          </a:xfrm>
+          <a:prstGeom prst="rect">
+            <a:avLst/>
+          </a:prstGeom>
+        </p:spPr>
+      </p:pic>
+      <p:pic>
+        <p:nvPicPr>
+          <p:cNvPr id="28" name="Graphic 27" descr="Storytelling outline">
+            <a:extLst>
+              <a:ext uri="{FF2B5EF4-FFF2-40B4-BE49-F238E27FC236}">
+                <a16:creationId xmlns:a16="http://schemas.microsoft.com/office/drawing/2014/main" id="{75175C61-1F1D-C4A9-A6DA-0997B4713887}"/>
+              </a:ext>
+            </a:extLst>
+          </p:cNvPr>
+          <p:cNvPicPr>
+            <a:picLocks noChangeAspect="1"/>
+          </p:cNvPicPr>
+          <p:nvPr/>
+        </p:nvPicPr>
+        <p:blipFill>
+          <a:blip r:embed="rId4">
+            <a:extLst>
+              <a:ext uri="{28A0092B-C50C-407E-A947-70E740481C1C}">
+                <a14:useLocalDpi xmlns:a14="http://schemas.microsoft.com/office/drawing/2010/main" val="0"/>
+              </a:ext>
+              <a:ext uri="{96DAC541-7B7A-43D3-8B79-37D633B846F1}">
+                <asvg:svgBlip xmlns:asvg="http://schemas.microsoft.com/office/drawing/2016/SVG/main" r:embed="rId5"/>
+              </a:ext>
+            </a:extLst>
+          </a:blip>
+          <a:stretch>
+            <a:fillRect/>
+          </a:stretch>
+        </p:blipFill>
+        <p:spPr>
+          <a:xfrm>
+            <a:off x="4818102" y="1249296"/>
+            <a:ext cx="473178" cy="473178"/>
+          </a:xfrm>
+          <a:prstGeom prst="rect">
+            <a:avLst/>
+          </a:prstGeom>
+        </p:spPr>
+      </p:pic>
+      <p:sp>
+        <p:nvSpPr>
+          <p:cNvPr id="29" name="Rectangle 28">
+            <a:extLst>
+              <a:ext uri="{FF2B5EF4-FFF2-40B4-BE49-F238E27FC236}">
+                <a16:creationId xmlns:a16="http://schemas.microsoft.com/office/drawing/2014/main" id="{E98E71DF-C674-14C4-4B82-7CB6429598B0}"/>
+              </a:ext>
+            </a:extLst>
+          </p:cNvPr>
+          <p:cNvSpPr/>
+          <p:nvPr/>
+        </p:nvSpPr>
+        <p:spPr>
+          <a:xfrm>
+            <a:off x="119139" y="3394826"/>
+            <a:ext cx="5818739" cy="2057430"/>
+          </a:xfrm>
+          <a:prstGeom prst="rect">
+            <a:avLst/>
+          </a:prstGeom>
+        </p:spPr>
+        <p:style>
+          <a:lnRef idx="2">
+            <a:schemeClr val="accent1">
+              <a:shade val="15000"/>
+            </a:schemeClr>
+          </a:lnRef>
+          <a:fillRef idx="1">
+            <a:schemeClr val="accent1"/>
+          </a:fillRef>
+          <a:effectRef idx="0">
+            <a:schemeClr val="accent1"/>
+          </a:effectRef>
+          <a:fontRef idx="minor">
+            <a:schemeClr val="lt1"/>
+          </a:fontRef>
+        </p:style>
+        <p:txBody>
+          <a:bodyPr rtlCol="0" anchor="t"/>
+          <a:lstStyle/>
+          <a:p>
+            <a:pPr>
+              <a:spcAft>
+                <a:spcPts val="600"/>
+              </a:spcAft>
+            </a:pPr>
+            <a:r>
+              <a:rPr lang="ko-KR" altLang="en-US" sz="2800" dirty="0"/>
+              <a:t>단어</a:t>
+            </a:r>
+            <a:r>
+              <a:rPr lang="en-US" altLang="ko-KR" sz="2800" dirty="0"/>
+              <a:t>(</a:t>
+            </a:r>
+            <a:r>
+              <a:rPr lang="ko-KR" altLang="en-US" sz="2800" dirty="0"/>
+              <a:t>어원</a:t>
+            </a:r>
+            <a:r>
+              <a:rPr lang="en-US" altLang="ko-KR" sz="2800" dirty="0"/>
+              <a:t>)</a:t>
+            </a:r>
+          </a:p>
+          <a:p>
+            <a:pPr marL="342900" indent="-342900">
+              <a:buAutoNum type="arabicPeriod"/>
+            </a:pPr>
+            <a:r>
+              <a:rPr lang="ko-KR" altLang="en-US" dirty="0"/>
+              <a:t>분야 정의</a:t>
+            </a:r>
+            <a:r>
+              <a:rPr lang="en-US" altLang="ko-KR" dirty="0"/>
+              <a:t>.</a:t>
+            </a:r>
+          </a:p>
+          <a:p>
+            <a:pPr marL="342900" indent="-342900">
+              <a:buAutoNum type="arabicPeriod"/>
+            </a:pPr>
+            <a:r>
+              <a:rPr lang="ko-KR" altLang="en-US" dirty="0"/>
+              <a:t>분야 정의</a:t>
+            </a:r>
+            <a:r>
+              <a:rPr lang="en-US" altLang="ko-KR" dirty="0"/>
+              <a:t>.</a:t>
+            </a:r>
+          </a:p>
+          <a:p>
+            <a:pPr marL="342900" indent="-342900">
+              <a:buAutoNum type="arabicPeriod"/>
+            </a:pPr>
+            <a:r>
+              <a:rPr lang="ko-KR" altLang="en-US" dirty="0"/>
+              <a:t>분야 정의</a:t>
+            </a:r>
+            <a:r>
+              <a:rPr lang="en-US" altLang="ko-KR" dirty="0"/>
+              <a:t>.</a:t>
+            </a:r>
+          </a:p>
+          <a:p>
+            <a:pPr marL="342900" indent="-342900">
+              <a:buAutoNum type="arabicPeriod"/>
+            </a:pPr>
+            <a:r>
+              <a:rPr lang="ko-KR" altLang="en-US" dirty="0"/>
+              <a:t>분야 정의</a:t>
+            </a:r>
+            <a:r>
+              <a:rPr lang="en-US" altLang="ko-KR" dirty="0"/>
+              <a:t>.</a:t>
+            </a:r>
+          </a:p>
+          <a:p>
+            <a:pPr>
+              <a:spcBef>
+                <a:spcPts val="600"/>
+              </a:spcBef>
+            </a:pPr>
+            <a:r>
+              <a:rPr lang="ko-KR" altLang="en-US" dirty="0"/>
+              <a:t>출처</a:t>
+            </a:r>
+            <a:r>
+              <a:rPr lang="en-US" altLang="ko-KR" dirty="0"/>
+              <a:t>: </a:t>
+            </a:r>
+            <a:r>
+              <a:rPr lang="ko-KR" altLang="en-US" dirty="0"/>
+              <a:t>출처</a:t>
+            </a:r>
+            <a:endParaRPr lang="en-US" altLang="ko-KR" dirty="0"/>
+          </a:p>
+        </p:txBody>
+      </p:sp>
+      <p:pic>
+        <p:nvPicPr>
+          <p:cNvPr id="30" name="Graphic 29" descr="Storytelling outline">
+            <a:extLst>
+              <a:ext uri="{FF2B5EF4-FFF2-40B4-BE49-F238E27FC236}">
+                <a16:creationId xmlns:a16="http://schemas.microsoft.com/office/drawing/2014/main" id="{DB9206FC-90CD-04F1-32AC-2A5C0F3B7045}"/>
+              </a:ext>
+            </a:extLst>
+          </p:cNvPr>
+          <p:cNvPicPr>
+            <a:picLocks noChangeAspect="1"/>
+          </p:cNvPicPr>
+          <p:nvPr/>
+        </p:nvPicPr>
+        <p:blipFill>
+          <a:blip r:embed="rId4">
+            <a:extLst>
+              <a:ext uri="{28A0092B-C50C-407E-A947-70E740481C1C}">
+                <a14:useLocalDpi xmlns:a14="http://schemas.microsoft.com/office/drawing/2010/main" val="0"/>
+              </a:ext>
+              <a:ext uri="{96DAC541-7B7A-43D3-8B79-37D633B846F1}">
+                <asvg:svgBlip xmlns:asvg="http://schemas.microsoft.com/office/drawing/2016/SVG/main" r:embed="rId5"/>
+              </a:ext>
+            </a:extLst>
+          </a:blip>
+          <a:stretch>
+            <a:fillRect/>
+          </a:stretch>
+        </p:blipFill>
+        <p:spPr>
+          <a:xfrm>
+            <a:off x="4824187" y="3466198"/>
+            <a:ext cx="473178" cy="473178"/>
+          </a:xfrm>
+          <a:prstGeom prst="rect">
+            <a:avLst/>
+          </a:prstGeom>
+        </p:spPr>
+      </p:pic>
+      <p:pic>
+        <p:nvPicPr>
+          <p:cNvPr id="31" name="Graphic 30" descr="Checkbox Checked outline">
+            <a:extLst>
+              <a:ext uri="{FF2B5EF4-FFF2-40B4-BE49-F238E27FC236}">
+                <a16:creationId xmlns:a16="http://schemas.microsoft.com/office/drawing/2014/main" id="{38DF0D92-1C8C-2BFF-CCDA-DC870FFAC0C0}"/>
+              </a:ext>
+            </a:extLst>
+          </p:cNvPr>
+          <p:cNvPicPr>
+            <a:picLocks noChangeAspect="1"/>
+          </p:cNvPicPr>
+          <p:nvPr/>
+        </p:nvPicPr>
+        <p:blipFill>
+          <a:blip r:embed="rId2">
+            <a:extLst>
+              <a:ext uri="{28A0092B-C50C-407E-A947-70E740481C1C}">
+                <a14:useLocalDpi xmlns:a14="http://schemas.microsoft.com/office/drawing/2010/main" val="0"/>
+              </a:ext>
+              <a:ext uri="{96DAC541-7B7A-43D3-8B79-37D633B846F1}">
+                <asvg:svgBlip xmlns:asvg="http://schemas.microsoft.com/office/drawing/2016/SVG/main" r:embed="rId3"/>
+              </a:ext>
+            </a:extLst>
+          </a:blip>
+          <a:stretch>
+            <a:fillRect/>
+          </a:stretch>
+        </p:blipFill>
+        <p:spPr>
+          <a:xfrm>
+            <a:off x="5323559" y="3345063"/>
+            <a:ext cx="664535" cy="664535"/>
+          </a:xfrm>
+          <a:prstGeom prst="rect">
+            <a:avLst/>
+          </a:prstGeom>
+        </p:spPr>
+      </p:pic>
+      <p:sp>
+        <p:nvSpPr>
+          <p:cNvPr id="32" name="Rectangle 31">
+            <a:extLst>
+              <a:ext uri="{FF2B5EF4-FFF2-40B4-BE49-F238E27FC236}">
+                <a16:creationId xmlns:a16="http://schemas.microsoft.com/office/drawing/2014/main" id="{2A5741CC-9A3A-420E-26E7-F3429D9C7469}"/>
+              </a:ext>
+            </a:extLst>
+          </p:cNvPr>
+          <p:cNvSpPr/>
+          <p:nvPr/>
+        </p:nvSpPr>
+        <p:spPr>
+          <a:xfrm>
+            <a:off x="6234629" y="1222331"/>
+            <a:ext cx="5818739" cy="2057430"/>
+          </a:xfrm>
+          <a:prstGeom prst="rect">
+            <a:avLst/>
+          </a:prstGeom>
+        </p:spPr>
+        <p:style>
+          <a:lnRef idx="2">
+            <a:schemeClr val="accent1">
+              <a:shade val="15000"/>
+            </a:schemeClr>
+          </a:lnRef>
+          <a:fillRef idx="1">
+            <a:schemeClr val="accent1"/>
+          </a:fillRef>
+          <a:effectRef idx="0">
+            <a:schemeClr val="accent1"/>
+          </a:effectRef>
+          <a:fontRef idx="minor">
+            <a:schemeClr val="lt1"/>
+          </a:fontRef>
+        </p:style>
+        <p:txBody>
+          <a:bodyPr rtlCol="0" anchor="t"/>
+          <a:lstStyle/>
+          <a:p>
+            <a:pPr>
+              <a:spcAft>
+                <a:spcPts val="600"/>
+              </a:spcAft>
+            </a:pPr>
+            <a:r>
+              <a:rPr lang="ko-KR" altLang="en-US" sz="2800" dirty="0"/>
+              <a:t>자 훈 음</a:t>
+            </a:r>
+            <a:endParaRPr lang="en-US" altLang="ko-KR" sz="2800" dirty="0"/>
+          </a:p>
+          <a:p>
+            <a:pPr>
+              <a:spcAft>
+                <a:spcPts val="600"/>
+              </a:spcAft>
+            </a:pPr>
+            <a:r>
+              <a:rPr lang="ko-KR" altLang="en-US" dirty="0"/>
+              <a:t>단어</a:t>
+            </a:r>
+            <a:r>
+              <a:rPr lang="en-US" altLang="ko-KR" dirty="0"/>
+              <a:t>(</a:t>
+            </a:r>
+            <a:r>
+              <a:rPr lang="ko-KR" altLang="en-US" dirty="0"/>
+              <a:t>한자</a:t>
+            </a:r>
+            <a:r>
+              <a:rPr lang="en-US" altLang="ko-KR" dirty="0"/>
+              <a:t>): </a:t>
+            </a:r>
+            <a:r>
+              <a:rPr lang="ko-KR" altLang="en-US" dirty="0"/>
+              <a:t>정의</a:t>
+            </a:r>
+            <a:r>
+              <a:rPr lang="en-US" altLang="ko-KR" dirty="0"/>
+              <a:t>.</a:t>
+            </a:r>
+          </a:p>
+          <a:p>
+            <a:pPr>
+              <a:spcAft>
+                <a:spcPts val="600"/>
+              </a:spcAft>
+            </a:pPr>
+            <a:r>
+              <a:rPr lang="ko-KR" altLang="en-US" dirty="0"/>
+              <a:t>단어</a:t>
+            </a:r>
+            <a:r>
+              <a:rPr lang="en-US" altLang="ko-KR" dirty="0"/>
+              <a:t>(</a:t>
+            </a:r>
+            <a:r>
+              <a:rPr lang="ko-KR" altLang="en-US" dirty="0"/>
+              <a:t>한자</a:t>
+            </a:r>
+            <a:r>
+              <a:rPr lang="en-US" altLang="ko-KR" dirty="0"/>
+              <a:t>): </a:t>
+            </a:r>
+            <a:r>
+              <a:rPr lang="ko-KR" altLang="en-US" dirty="0"/>
+              <a:t>정의</a:t>
+            </a:r>
+            <a:r>
+              <a:rPr lang="en-US" altLang="ko-KR" dirty="0"/>
+              <a:t>.</a:t>
+            </a:r>
+          </a:p>
+          <a:p>
+            <a:pPr>
+              <a:spcAft>
+                <a:spcPts val="600"/>
+              </a:spcAft>
+            </a:pPr>
+            <a:r>
+              <a:rPr lang="ko-KR" altLang="en-US" dirty="0"/>
+              <a:t>단어</a:t>
+            </a:r>
+            <a:r>
+              <a:rPr lang="en-US" altLang="ko-KR" dirty="0"/>
+              <a:t>(</a:t>
+            </a:r>
+            <a:r>
+              <a:rPr lang="ko-KR" altLang="en-US" dirty="0"/>
+              <a:t>한자</a:t>
+            </a:r>
+            <a:r>
+              <a:rPr lang="en-US" altLang="ko-KR" dirty="0"/>
+              <a:t>): </a:t>
+            </a:r>
+            <a:r>
+              <a:rPr lang="ko-KR" altLang="en-US" dirty="0"/>
+              <a:t>정의</a:t>
+            </a:r>
+            <a:r>
+              <a:rPr lang="en-US" altLang="ko-KR" dirty="0"/>
+              <a:t>.</a:t>
+            </a:r>
+          </a:p>
+          <a:p>
+            <a:pPr>
+              <a:spcBef>
+                <a:spcPts val="600"/>
+              </a:spcBef>
+            </a:pPr>
+            <a:r>
+              <a:rPr lang="ko-KR" altLang="en-US" dirty="0" err="1"/>
+              <a:t>자훈음</a:t>
+            </a:r>
+            <a:r>
+              <a:rPr lang="ko-KR" altLang="en-US" dirty="0"/>
+              <a:t> 출처</a:t>
+            </a:r>
+            <a:r>
+              <a:rPr lang="en-US" altLang="ko-KR" dirty="0"/>
+              <a:t>: </a:t>
+            </a:r>
+            <a:r>
+              <a:rPr lang="ko-KR" altLang="en-US" dirty="0"/>
+              <a:t>나무위키</a:t>
+            </a:r>
+            <a:endParaRPr lang="en-US" altLang="ko-KR" dirty="0"/>
+          </a:p>
+          <a:p>
+            <a:pPr>
+              <a:spcAft>
+                <a:spcPts val="600"/>
+              </a:spcAft>
+            </a:pPr>
+            <a:endParaRPr lang="en-US" altLang="ko-KR" dirty="0"/>
+          </a:p>
+        </p:txBody>
+      </p:sp>
+      <p:sp>
+        <p:nvSpPr>
+          <p:cNvPr id="33" name="Rectangle 32">
+            <a:extLst>
+              <a:ext uri="{FF2B5EF4-FFF2-40B4-BE49-F238E27FC236}">
+                <a16:creationId xmlns:a16="http://schemas.microsoft.com/office/drawing/2014/main" id="{DF5AA66D-BB62-7741-CAD0-1048EA695DF8}"/>
+              </a:ext>
+            </a:extLst>
+          </p:cNvPr>
+          <p:cNvSpPr/>
+          <p:nvPr/>
+        </p:nvSpPr>
+        <p:spPr>
+          <a:xfrm>
+            <a:off x="6238175" y="3429000"/>
+            <a:ext cx="5818739" cy="2057430"/>
+          </a:xfrm>
+          <a:prstGeom prst="rect">
+            <a:avLst/>
+          </a:prstGeom>
+        </p:spPr>
+        <p:style>
+          <a:lnRef idx="2">
+            <a:schemeClr val="accent1">
+              <a:shade val="15000"/>
+            </a:schemeClr>
+          </a:lnRef>
+          <a:fillRef idx="1">
+            <a:schemeClr val="accent1"/>
+          </a:fillRef>
+          <a:effectRef idx="0">
+            <a:schemeClr val="accent1"/>
+          </a:effectRef>
+          <a:fontRef idx="minor">
+            <a:schemeClr val="lt1"/>
+          </a:fontRef>
+        </p:style>
+        <p:txBody>
+          <a:bodyPr rtlCol="0" anchor="t"/>
+          <a:lstStyle/>
+          <a:p>
+            <a:pPr>
+              <a:spcAft>
+                <a:spcPts val="600"/>
+              </a:spcAft>
+            </a:pPr>
+            <a:r>
+              <a:rPr lang="ko-KR" altLang="en-US" sz="2800" dirty="0"/>
+              <a:t>자 훈 음</a:t>
+            </a:r>
+            <a:endParaRPr lang="en-US" altLang="ko-KR" sz="2800" dirty="0"/>
+          </a:p>
+          <a:p>
+            <a:pPr>
+              <a:spcAft>
+                <a:spcPts val="600"/>
+              </a:spcAft>
+            </a:pPr>
+            <a:r>
+              <a:rPr lang="ko-KR" altLang="en-US" dirty="0"/>
+              <a:t>단어</a:t>
+            </a:r>
+            <a:r>
+              <a:rPr lang="en-US" altLang="ko-KR" dirty="0"/>
+              <a:t>(</a:t>
+            </a:r>
+            <a:r>
+              <a:rPr lang="ko-KR" altLang="en-US" dirty="0"/>
+              <a:t>한자</a:t>
+            </a:r>
+            <a:r>
+              <a:rPr lang="en-US" altLang="ko-KR" dirty="0"/>
+              <a:t>): </a:t>
+            </a:r>
+            <a:r>
+              <a:rPr lang="ko-KR" altLang="en-US" dirty="0"/>
+              <a:t>정의</a:t>
+            </a:r>
+            <a:r>
+              <a:rPr lang="en-US" altLang="ko-KR" dirty="0"/>
+              <a:t>.</a:t>
+            </a:r>
+          </a:p>
+          <a:p>
+            <a:pPr>
+              <a:spcAft>
+                <a:spcPts val="600"/>
+              </a:spcAft>
+            </a:pPr>
+            <a:r>
+              <a:rPr lang="ko-KR" altLang="en-US" dirty="0"/>
+              <a:t>단어</a:t>
+            </a:r>
+            <a:r>
+              <a:rPr lang="en-US" altLang="ko-KR" dirty="0"/>
+              <a:t>(</a:t>
+            </a:r>
+            <a:r>
+              <a:rPr lang="ko-KR" altLang="en-US" dirty="0"/>
+              <a:t>한자</a:t>
+            </a:r>
+            <a:r>
+              <a:rPr lang="en-US" altLang="ko-KR" dirty="0"/>
+              <a:t>): </a:t>
+            </a:r>
+            <a:r>
+              <a:rPr lang="ko-KR" altLang="en-US" dirty="0"/>
+              <a:t>정의</a:t>
+            </a:r>
+            <a:r>
+              <a:rPr lang="en-US" altLang="ko-KR" dirty="0"/>
+              <a:t>.</a:t>
+            </a:r>
+          </a:p>
+          <a:p>
+            <a:pPr>
+              <a:spcAft>
+                <a:spcPts val="600"/>
+              </a:spcAft>
+            </a:pPr>
+            <a:r>
+              <a:rPr lang="ko-KR" altLang="en-US" dirty="0"/>
+              <a:t>단어</a:t>
+            </a:r>
+            <a:r>
+              <a:rPr lang="en-US" altLang="ko-KR" dirty="0"/>
+              <a:t>(</a:t>
+            </a:r>
+            <a:r>
+              <a:rPr lang="ko-KR" altLang="en-US" dirty="0"/>
+              <a:t>한자</a:t>
+            </a:r>
+            <a:r>
+              <a:rPr lang="en-US" altLang="ko-KR" dirty="0"/>
+              <a:t>): </a:t>
+            </a:r>
+            <a:r>
+              <a:rPr lang="ko-KR" altLang="en-US" dirty="0"/>
+              <a:t>정의</a:t>
+            </a:r>
+            <a:r>
+              <a:rPr lang="en-US" altLang="ko-KR" dirty="0"/>
+              <a:t>.</a:t>
+            </a:r>
+          </a:p>
+          <a:p>
+            <a:pPr>
+              <a:spcBef>
+                <a:spcPts val="600"/>
+              </a:spcBef>
+            </a:pPr>
+            <a:r>
+              <a:rPr lang="ko-KR" altLang="en-US" dirty="0" err="1"/>
+              <a:t>자훈음</a:t>
+            </a:r>
+            <a:r>
+              <a:rPr lang="ko-KR" altLang="en-US" dirty="0"/>
+              <a:t> 출처</a:t>
+            </a:r>
+            <a:r>
+              <a:rPr lang="en-US" altLang="ko-KR" dirty="0"/>
+              <a:t>: </a:t>
+            </a:r>
+            <a:r>
+              <a:rPr lang="ko-KR" altLang="en-US" dirty="0"/>
+              <a:t>나무위키</a:t>
+            </a:r>
+            <a:endParaRPr lang="en-US" altLang="ko-KR" dirty="0"/>
+          </a:p>
+          <a:p>
+            <a:pPr>
+              <a:spcAft>
+                <a:spcPts val="600"/>
+              </a:spcAft>
+            </a:pPr>
+            <a:endParaRPr lang="en-US" altLang="ko-KR" dirty="0"/>
+          </a:p>
+        </p:txBody>
+      </p:sp>
+      <p:pic>
+        <p:nvPicPr>
+          <p:cNvPr id="34" name="Graphic 33" descr="Storytelling outline">
+            <a:extLst>
+              <a:ext uri="{FF2B5EF4-FFF2-40B4-BE49-F238E27FC236}">
+                <a16:creationId xmlns:a16="http://schemas.microsoft.com/office/drawing/2014/main" id="{73B7E99B-3DB3-A035-009C-824F8814E24E}"/>
+              </a:ext>
+            </a:extLst>
+          </p:cNvPr>
+          <p:cNvPicPr>
+            <a:picLocks noChangeAspect="1"/>
+          </p:cNvPicPr>
+          <p:nvPr/>
+        </p:nvPicPr>
+        <p:blipFill>
+          <a:blip r:embed="rId4">
+            <a:extLst>
+              <a:ext uri="{28A0092B-C50C-407E-A947-70E740481C1C}">
+                <a14:useLocalDpi xmlns:a14="http://schemas.microsoft.com/office/drawing/2010/main" val="0"/>
+              </a:ext>
+              <a:ext uri="{96DAC541-7B7A-43D3-8B79-37D633B846F1}">
+                <asvg:svgBlip xmlns:asvg="http://schemas.microsoft.com/office/drawing/2016/SVG/main" r:embed="rId5"/>
+              </a:ext>
+            </a:extLst>
+          </a:blip>
+          <a:stretch>
+            <a:fillRect/>
+          </a:stretch>
+        </p:blipFill>
+        <p:spPr>
+          <a:xfrm>
+            <a:off x="10955925" y="3459774"/>
+            <a:ext cx="473178" cy="473178"/>
+          </a:xfrm>
+          <a:prstGeom prst="rect">
+            <a:avLst/>
+          </a:prstGeom>
+        </p:spPr>
+      </p:pic>
+      <p:pic>
+        <p:nvPicPr>
+          <p:cNvPr id="35" name="Graphic 34" descr="Storytelling outline">
+            <a:extLst>
+              <a:ext uri="{FF2B5EF4-FFF2-40B4-BE49-F238E27FC236}">
+                <a16:creationId xmlns:a16="http://schemas.microsoft.com/office/drawing/2014/main" id="{383C51BB-7CEB-712E-A99F-173271852DFA}"/>
+              </a:ext>
+            </a:extLst>
+          </p:cNvPr>
+          <p:cNvPicPr>
+            <a:picLocks noChangeAspect="1"/>
+          </p:cNvPicPr>
+          <p:nvPr/>
+        </p:nvPicPr>
+        <p:blipFill>
+          <a:blip r:embed="rId4">
+            <a:extLst>
+              <a:ext uri="{28A0092B-C50C-407E-A947-70E740481C1C}">
+                <a14:useLocalDpi xmlns:a14="http://schemas.microsoft.com/office/drawing/2010/main" val="0"/>
+              </a:ext>
+              <a:ext uri="{96DAC541-7B7A-43D3-8B79-37D633B846F1}">
+                <asvg:svgBlip xmlns:asvg="http://schemas.microsoft.com/office/drawing/2016/SVG/main" r:embed="rId5"/>
+              </a:ext>
+            </a:extLst>
+          </a:blip>
+          <a:stretch>
+            <a:fillRect/>
+          </a:stretch>
+        </p:blipFill>
+        <p:spPr>
+          <a:xfrm>
+            <a:off x="10955925" y="1262721"/>
+            <a:ext cx="473178" cy="473178"/>
+          </a:xfrm>
+          <a:prstGeom prst="rect">
+            <a:avLst/>
+          </a:prstGeom>
+        </p:spPr>
+      </p:pic>
+      <p:pic>
+        <p:nvPicPr>
+          <p:cNvPr id="36" name="Graphic 35" descr="Checkbox Checked outline">
+            <a:extLst>
+              <a:ext uri="{FF2B5EF4-FFF2-40B4-BE49-F238E27FC236}">
+                <a16:creationId xmlns:a16="http://schemas.microsoft.com/office/drawing/2014/main" id="{F524E29A-471C-B1B7-CFC6-8442E8FFA04F}"/>
+              </a:ext>
+            </a:extLst>
+          </p:cNvPr>
+          <p:cNvPicPr>
+            <a:picLocks noChangeAspect="1"/>
+          </p:cNvPicPr>
+          <p:nvPr/>
+        </p:nvPicPr>
+        <p:blipFill>
+          <a:blip r:embed="rId2">
+            <a:extLst>
+              <a:ext uri="{28A0092B-C50C-407E-A947-70E740481C1C}">
+                <a14:useLocalDpi xmlns:a14="http://schemas.microsoft.com/office/drawing/2010/main" val="0"/>
+              </a:ext>
+              <a:ext uri="{96DAC541-7B7A-43D3-8B79-37D633B846F1}">
+                <asvg:svgBlip xmlns:asvg="http://schemas.microsoft.com/office/drawing/2016/SVG/main" r:embed="rId3"/>
+              </a:ext>
+            </a:extLst>
+          </a:blip>
+          <a:stretch>
+            <a:fillRect/>
+          </a:stretch>
+        </p:blipFill>
+        <p:spPr>
+          <a:xfrm>
+            <a:off x="11399315" y="3370519"/>
+            <a:ext cx="664535" cy="664535"/>
+          </a:xfrm>
+          <a:prstGeom prst="rect">
+            <a:avLst/>
+          </a:prstGeom>
+        </p:spPr>
+      </p:pic>
+      <p:pic>
+        <p:nvPicPr>
+          <p:cNvPr id="37" name="Graphic 36" descr="Checkbox Checked outline">
+            <a:extLst>
+              <a:ext uri="{FF2B5EF4-FFF2-40B4-BE49-F238E27FC236}">
+                <a16:creationId xmlns:a16="http://schemas.microsoft.com/office/drawing/2014/main" id="{591B03DB-1248-F1F9-EF07-4A858CEC868D}"/>
+              </a:ext>
+            </a:extLst>
+          </p:cNvPr>
+          <p:cNvPicPr>
+            <a:picLocks noChangeAspect="1"/>
+          </p:cNvPicPr>
+          <p:nvPr/>
+        </p:nvPicPr>
+        <p:blipFill>
+          <a:blip r:embed="rId2">
+            <a:extLst>
+              <a:ext uri="{28A0092B-C50C-407E-A947-70E740481C1C}">
+                <a14:useLocalDpi xmlns:a14="http://schemas.microsoft.com/office/drawing/2010/main" val="0"/>
+              </a:ext>
+              <a:ext uri="{96DAC541-7B7A-43D3-8B79-37D633B846F1}">
+                <asvg:svgBlip xmlns:asvg="http://schemas.microsoft.com/office/drawing/2016/SVG/main" r:embed="rId3"/>
+              </a:ext>
+            </a:extLst>
+          </a:blip>
+          <a:stretch>
+            <a:fillRect/>
+          </a:stretch>
+        </p:blipFill>
+        <p:spPr>
+          <a:xfrm>
+            <a:off x="11425559" y="1184315"/>
+            <a:ext cx="664535" cy="664535"/>
+          </a:xfrm>
+          <a:prstGeom prst="rect">
+            <a:avLst/>
+          </a:prstGeom>
+        </p:spPr>
+      </p:pic>
     </p:spTree>
     <p:extLst>
       <p:ext uri="{BB962C8B-B14F-4D97-AF65-F5344CB8AC3E}">
-        <p14:creationId xmlns:p14="http://schemas.microsoft.com/office/powerpoint/2010/main" val="2934239877"/>
+        <p14:creationId xmlns:p14="http://schemas.microsoft.com/office/powerpoint/2010/main" val="2859023949"/>
+      </p:ext>
+    </p:extLst>
+  </p:cSld>
+  <p:clrMapOvr>
+    <a:masterClrMapping/>
+  </p:clrMapOvr>
+</p:sld>
+</file>
+
+<file path=ppt/slides/slide4.xml><?xml version="1.0" encoding="utf-8"?>
+<p:sld xmlns:a="http://schemas.openxmlformats.org/drawingml/2006/main" xmlns:r="http://schemas.openxmlformats.org/officeDocument/2006/relationships" xmlns:p="http://schemas.openxmlformats.org/presentationml/2006/main">
+  <p:cSld>
+    <p:spTree>
+      <p:nvGrpSpPr>
+        <p:cNvPr id="1" name=""/>
+        <p:cNvGrpSpPr/>
+        <p:nvPr/>
+      </p:nvGrpSpPr>
+      <p:grpSpPr>
+        <a:xfrm>
+          <a:off x="0" y="0"/>
+          <a:ext cx="0" cy="0"/>
+          <a:chOff x="0" y="0"/>
+          <a:chExt cx="0" cy="0"/>
+        </a:xfrm>
+      </p:grpSpPr>
+      <p:sp>
+        <p:nvSpPr>
+          <p:cNvPr id="2" name="Title 1">
+            <a:extLst>
+              <a:ext uri="{FF2B5EF4-FFF2-40B4-BE49-F238E27FC236}">
+                <a16:creationId xmlns:a16="http://schemas.microsoft.com/office/drawing/2014/main" id="{5D0D82AF-1FC2-649B-B836-D427E1DDED1F}"/>
+              </a:ext>
+            </a:extLst>
+          </p:cNvPr>
+          <p:cNvSpPr>
+            <a:spLocks noGrp="1"/>
+          </p:cNvSpPr>
+          <p:nvPr>
+            <p:ph type="title"/>
+          </p:nvPr>
+        </p:nvSpPr>
+        <p:spPr/>
+        <p:txBody>
+          <a:bodyPr/>
+          <a:lstStyle/>
+          <a:p>
+            <a:endParaRPr lang="en-US"/>
+          </a:p>
+        </p:txBody>
+      </p:sp>
+      <p:sp>
+        <p:nvSpPr>
+          <p:cNvPr id="3" name="Content Placeholder 2">
+            <a:extLst>
+              <a:ext uri="{FF2B5EF4-FFF2-40B4-BE49-F238E27FC236}">
+                <a16:creationId xmlns:a16="http://schemas.microsoft.com/office/drawing/2014/main" id="{4CEDF7D7-8FEA-C0E0-AD14-6E74DACD8220}"/>
+              </a:ext>
+            </a:extLst>
+          </p:cNvPr>
+          <p:cNvSpPr>
+            <a:spLocks noGrp="1"/>
+          </p:cNvSpPr>
+          <p:nvPr>
+            <p:ph idx="1"/>
+          </p:nvPr>
+        </p:nvSpPr>
+        <p:spPr/>
+        <p:txBody>
+          <a:bodyPr/>
+          <a:lstStyle/>
+          <a:p>
+            <a:r>
+              <a:rPr lang="en-US" dirty="0"/>
+              <a:t>Screen</a:t>
+            </a:r>
+          </a:p>
+          <a:p>
+            <a:pPr lvl="1"/>
+            <a:r>
+              <a:rPr lang="en-US" dirty="0" err="1"/>
+              <a:t>NavBar</a:t>
+            </a:r>
+            <a:endParaRPr lang="en-US" dirty="0"/>
+          </a:p>
+          <a:p>
+            <a:pPr lvl="1"/>
+            <a:r>
+              <a:rPr lang="en-US" dirty="0"/>
+              <a:t>Pane</a:t>
+            </a:r>
+          </a:p>
+          <a:p>
+            <a:pPr lvl="2"/>
+            <a:r>
+              <a:rPr lang="en-US" dirty="0" err="1"/>
+              <a:t>KorSearchResults</a:t>
+            </a:r>
+            <a:endParaRPr lang="en-US" dirty="0"/>
+          </a:p>
+          <a:p>
+            <a:pPr lvl="2"/>
+            <a:r>
+              <a:rPr lang="en-US" dirty="0" err="1"/>
+              <a:t>KorWordInspect</a:t>
+            </a:r>
+            <a:endParaRPr lang="en-US" dirty="0"/>
+          </a:p>
+          <a:p>
+            <a:pPr lvl="2"/>
+            <a:r>
+              <a:rPr lang="en-US" dirty="0" err="1"/>
+              <a:t>HanSearchResults</a:t>
+            </a:r>
+            <a:endParaRPr lang="en-US" dirty="0"/>
+          </a:p>
+          <a:p>
+            <a:pPr lvl="2"/>
+            <a:r>
+              <a:rPr lang="en-US" dirty="0" err="1"/>
+              <a:t>HanCharInspect</a:t>
+            </a:r>
+            <a:endParaRPr lang="en-US" dirty="0"/>
+          </a:p>
+        </p:txBody>
+      </p:sp>
+    </p:spTree>
+    <p:extLst>
+      <p:ext uri="{BB962C8B-B14F-4D97-AF65-F5344CB8AC3E}">
+        <p14:creationId xmlns:p14="http://schemas.microsoft.com/office/powerpoint/2010/main" val="3488755468"/>
       </p:ext>
     </p:extLst>
   </p:cSld>

</xml_diff>

<commit_message>
started hanja game board
</commit_message>
<xml_diff>
--- a/prototypes.pptx
+++ b/prototypes.pptx
@@ -9,6 +9,7 @@
     <p:sldId id="256" r:id="rId3"/>
     <p:sldId id="260" r:id="rId4"/>
     <p:sldId id="259" r:id="rId5"/>
+    <p:sldId id="262" r:id="rId6"/>
   </p:sldIdLst>
   <p:sldSz cx="12192000" cy="6858000"/>
   <p:notesSz cx="6858000" cy="9144000"/>
@@ -262,7 +263,7 @@
           <a:p>
             <a:fld id="{1B239388-45FC-456E-8776-854E70FB4B9B}" type="datetimeFigureOut">
               <a:rPr lang="en-US" smtClean="0"/>
-              <a:t>3/24/2024</a:t>
+              <a:t>5/19/2024</a:t>
             </a:fld>
             <a:endParaRPr lang="en-US"/>
           </a:p>
@@ -460,7 +461,7 @@
           <a:p>
             <a:fld id="{1B239388-45FC-456E-8776-854E70FB4B9B}" type="datetimeFigureOut">
               <a:rPr lang="en-US" smtClean="0"/>
-              <a:t>3/24/2024</a:t>
+              <a:t>5/19/2024</a:t>
             </a:fld>
             <a:endParaRPr lang="en-US"/>
           </a:p>
@@ -668,7 +669,7 @@
           <a:p>
             <a:fld id="{1B239388-45FC-456E-8776-854E70FB4B9B}" type="datetimeFigureOut">
               <a:rPr lang="en-US" smtClean="0"/>
-              <a:t>3/24/2024</a:t>
+              <a:t>5/19/2024</a:t>
             </a:fld>
             <a:endParaRPr lang="en-US"/>
           </a:p>
@@ -866,7 +867,7 @@
           <a:p>
             <a:fld id="{1B239388-45FC-456E-8776-854E70FB4B9B}" type="datetimeFigureOut">
               <a:rPr lang="en-US" smtClean="0"/>
-              <a:t>3/24/2024</a:t>
+              <a:t>5/19/2024</a:t>
             </a:fld>
             <a:endParaRPr lang="en-US"/>
           </a:p>
@@ -1141,7 +1142,7 @@
           <a:p>
             <a:fld id="{1B239388-45FC-456E-8776-854E70FB4B9B}" type="datetimeFigureOut">
               <a:rPr lang="en-US" smtClean="0"/>
-              <a:t>3/24/2024</a:t>
+              <a:t>5/19/2024</a:t>
             </a:fld>
             <a:endParaRPr lang="en-US"/>
           </a:p>
@@ -1406,7 +1407,7 @@
           <a:p>
             <a:fld id="{1B239388-45FC-456E-8776-854E70FB4B9B}" type="datetimeFigureOut">
               <a:rPr lang="en-US" smtClean="0"/>
-              <a:t>3/24/2024</a:t>
+              <a:t>5/19/2024</a:t>
             </a:fld>
             <a:endParaRPr lang="en-US"/>
           </a:p>
@@ -1818,7 +1819,7 @@
           <a:p>
             <a:fld id="{1B239388-45FC-456E-8776-854E70FB4B9B}" type="datetimeFigureOut">
               <a:rPr lang="en-US" smtClean="0"/>
-              <a:t>3/24/2024</a:t>
+              <a:t>5/19/2024</a:t>
             </a:fld>
             <a:endParaRPr lang="en-US"/>
           </a:p>
@@ -1959,7 +1960,7 @@
           <a:p>
             <a:fld id="{1B239388-45FC-456E-8776-854E70FB4B9B}" type="datetimeFigureOut">
               <a:rPr lang="en-US" smtClean="0"/>
-              <a:t>3/24/2024</a:t>
+              <a:t>5/19/2024</a:t>
             </a:fld>
             <a:endParaRPr lang="en-US"/>
           </a:p>
@@ -2072,7 +2073,7 @@
           <a:p>
             <a:fld id="{1B239388-45FC-456E-8776-854E70FB4B9B}" type="datetimeFigureOut">
               <a:rPr lang="en-US" smtClean="0"/>
-              <a:t>3/24/2024</a:t>
+              <a:t>5/19/2024</a:t>
             </a:fld>
             <a:endParaRPr lang="en-US"/>
           </a:p>
@@ -2383,7 +2384,7 @@
           <a:p>
             <a:fld id="{1B239388-45FC-456E-8776-854E70FB4B9B}" type="datetimeFigureOut">
               <a:rPr lang="en-US" smtClean="0"/>
-              <a:t>3/24/2024</a:t>
+              <a:t>5/19/2024</a:t>
             </a:fld>
             <a:endParaRPr lang="en-US"/>
           </a:p>
@@ -2671,7 +2672,7 @@
           <a:p>
             <a:fld id="{1B239388-45FC-456E-8776-854E70FB4B9B}" type="datetimeFigureOut">
               <a:rPr lang="en-US" smtClean="0"/>
-              <a:t>3/24/2024</a:t>
+              <a:t>5/19/2024</a:t>
             </a:fld>
             <a:endParaRPr lang="en-US"/>
           </a:p>
@@ -2912,7 +2913,7 @@
           <a:p>
             <a:fld id="{1B239388-45FC-456E-8776-854E70FB4B9B}" type="datetimeFigureOut">
               <a:rPr lang="en-US" smtClean="0"/>
-              <a:t>3/24/2024</a:t>
+              <a:t>5/19/2024</a:t>
             </a:fld>
             <a:endParaRPr lang="en-US"/>
           </a:p>
@@ -5910,6 +5911,1828 @@
     <p:extLst>
       <p:ext uri="{BB962C8B-B14F-4D97-AF65-F5344CB8AC3E}">
         <p14:creationId xmlns:p14="http://schemas.microsoft.com/office/powerpoint/2010/main" val="3488755468"/>
+      </p:ext>
+    </p:extLst>
+  </p:cSld>
+  <p:clrMapOvr>
+    <a:masterClrMapping/>
+  </p:clrMapOvr>
+</p:sld>
+</file>
+
+<file path=ppt/slides/slide5.xml><?xml version="1.0" encoding="utf-8"?>
+<p:sld xmlns:a="http://schemas.openxmlformats.org/drawingml/2006/main" xmlns:r="http://schemas.openxmlformats.org/officeDocument/2006/relationships" xmlns:p="http://schemas.openxmlformats.org/presentationml/2006/main">
+  <p:cSld>
+    <p:spTree>
+      <p:nvGrpSpPr>
+        <p:cNvPr id="1" name=""/>
+        <p:cNvGrpSpPr/>
+        <p:nvPr/>
+      </p:nvGrpSpPr>
+      <p:grpSpPr>
+        <a:xfrm>
+          <a:off x="0" y="0"/>
+          <a:ext cx="0" cy="0"/>
+          <a:chOff x="0" y="0"/>
+          <a:chExt cx="0" cy="0"/>
+        </a:xfrm>
+      </p:grpSpPr>
+      <p:sp>
+        <p:nvSpPr>
+          <p:cNvPr id="5" name="Rectangle 4">
+            <a:extLst>
+              <a:ext uri="{FF2B5EF4-FFF2-40B4-BE49-F238E27FC236}">
+                <a16:creationId xmlns:a16="http://schemas.microsoft.com/office/drawing/2014/main" id="{52697334-8E7B-D2AA-EDE4-70E335350FA1}"/>
+              </a:ext>
+            </a:extLst>
+          </p:cNvPr>
+          <p:cNvSpPr/>
+          <p:nvPr/>
+        </p:nvSpPr>
+        <p:spPr>
+          <a:xfrm>
+            <a:off x="0" y="40307"/>
+            <a:ext cx="12191998" cy="980036"/>
+          </a:xfrm>
+          <a:prstGeom prst="rect">
+            <a:avLst/>
+          </a:prstGeom>
+          <a:solidFill>
+            <a:schemeClr val="tx1">
+              <a:lumMod val="75000"/>
+              <a:lumOff val="25000"/>
+            </a:schemeClr>
+          </a:solidFill>
+        </p:spPr>
+        <p:style>
+          <a:lnRef idx="2">
+            <a:schemeClr val="accent1">
+              <a:shade val="15000"/>
+            </a:schemeClr>
+          </a:lnRef>
+          <a:fillRef idx="1">
+            <a:schemeClr val="accent1"/>
+          </a:fillRef>
+          <a:effectRef idx="0">
+            <a:schemeClr val="accent1"/>
+          </a:effectRef>
+          <a:fontRef idx="minor">
+            <a:schemeClr val="lt1"/>
+          </a:fontRef>
+        </p:style>
+        <p:txBody>
+          <a:bodyPr rtlCol="0" anchor="ctr"/>
+          <a:lstStyle/>
+          <a:p>
+            <a:pPr algn="ctr"/>
+            <a:endParaRPr lang="en-US"/>
+          </a:p>
+        </p:txBody>
+      </p:sp>
+      <p:sp>
+        <p:nvSpPr>
+          <p:cNvPr id="9" name="Rectangle 8">
+            <a:extLst>
+              <a:ext uri="{FF2B5EF4-FFF2-40B4-BE49-F238E27FC236}">
+                <a16:creationId xmlns:a16="http://schemas.microsoft.com/office/drawing/2014/main" id="{28087533-1F7D-9658-751E-64415D77BB1F}"/>
+              </a:ext>
+            </a:extLst>
+          </p:cNvPr>
+          <p:cNvSpPr/>
+          <p:nvPr/>
+        </p:nvSpPr>
+        <p:spPr>
+          <a:xfrm>
+            <a:off x="9444391" y="194265"/>
+            <a:ext cx="644992" cy="761613"/>
+          </a:xfrm>
+          <a:prstGeom prst="rect">
+            <a:avLst/>
+          </a:prstGeom>
+          <a:solidFill>
+            <a:schemeClr val="accent3">
+              <a:lumMod val="50000"/>
+            </a:schemeClr>
+          </a:solidFill>
+        </p:spPr>
+        <p:style>
+          <a:lnRef idx="2">
+            <a:schemeClr val="accent1">
+              <a:shade val="15000"/>
+            </a:schemeClr>
+          </a:lnRef>
+          <a:fillRef idx="1">
+            <a:schemeClr val="accent1"/>
+          </a:fillRef>
+          <a:effectRef idx="0">
+            <a:schemeClr val="accent1"/>
+          </a:effectRef>
+          <a:fontRef idx="minor">
+            <a:schemeClr val="lt1"/>
+          </a:fontRef>
+        </p:style>
+        <p:txBody>
+          <a:bodyPr rtlCol="0" anchor="ctr"/>
+          <a:lstStyle/>
+          <a:p>
+            <a:pPr algn="ctr"/>
+            <a:endParaRPr lang="en-US"/>
+          </a:p>
+        </p:txBody>
+      </p:sp>
+      <p:sp>
+        <p:nvSpPr>
+          <p:cNvPr id="6" name="TextBox 5">
+            <a:extLst>
+              <a:ext uri="{FF2B5EF4-FFF2-40B4-BE49-F238E27FC236}">
+                <a16:creationId xmlns:a16="http://schemas.microsoft.com/office/drawing/2014/main" id="{B3BC02BD-4890-0DE1-60D2-3A0298E54D01}"/>
+              </a:ext>
+            </a:extLst>
+          </p:cNvPr>
+          <p:cNvSpPr txBox="1"/>
+          <p:nvPr/>
+        </p:nvSpPr>
+        <p:spPr>
+          <a:xfrm>
+            <a:off x="9455093" y="260755"/>
+            <a:ext cx="838874" cy="584775"/>
+          </a:xfrm>
+          <a:prstGeom prst="rect">
+            <a:avLst/>
+          </a:prstGeom>
+          <a:noFill/>
+        </p:spPr>
+        <p:txBody>
+          <a:bodyPr wrap="square" rtlCol="0">
+            <a:spAutoFit/>
+          </a:bodyPr>
+          <a:lstStyle/>
+          <a:p>
+            <a:r>
+              <a:rPr lang="ko-KR" altLang="en-US" sz="3200" dirty="0">
+                <a:solidFill>
+                  <a:schemeClr val="bg1"/>
+                </a:solidFill>
+              </a:rPr>
+              <a:t>한 </a:t>
+            </a:r>
+            <a:endParaRPr lang="en-US" sz="3200" dirty="0">
+              <a:solidFill>
+                <a:schemeClr val="bg1"/>
+              </a:solidFill>
+            </a:endParaRPr>
+          </a:p>
+        </p:txBody>
+      </p:sp>
+      <p:sp>
+        <p:nvSpPr>
+          <p:cNvPr id="10" name="Rectangle 9">
+            <a:extLst>
+              <a:ext uri="{FF2B5EF4-FFF2-40B4-BE49-F238E27FC236}">
+                <a16:creationId xmlns:a16="http://schemas.microsoft.com/office/drawing/2014/main" id="{0695E935-8227-678B-690B-D4BE40D28E27}"/>
+              </a:ext>
+            </a:extLst>
+          </p:cNvPr>
+          <p:cNvSpPr/>
+          <p:nvPr/>
+        </p:nvSpPr>
+        <p:spPr>
+          <a:xfrm>
+            <a:off x="10293968" y="194265"/>
+            <a:ext cx="644992" cy="761613"/>
+          </a:xfrm>
+          <a:prstGeom prst="rect">
+            <a:avLst/>
+          </a:prstGeom>
+          <a:solidFill>
+            <a:schemeClr val="accent1">
+              <a:lumMod val="50000"/>
+            </a:schemeClr>
+          </a:solidFill>
+        </p:spPr>
+        <p:style>
+          <a:lnRef idx="2">
+            <a:schemeClr val="accent1">
+              <a:shade val="15000"/>
+            </a:schemeClr>
+          </a:lnRef>
+          <a:fillRef idx="1">
+            <a:schemeClr val="accent1"/>
+          </a:fillRef>
+          <a:effectRef idx="0">
+            <a:schemeClr val="accent1"/>
+          </a:effectRef>
+          <a:fontRef idx="minor">
+            <a:schemeClr val="lt1"/>
+          </a:fontRef>
+        </p:style>
+        <p:txBody>
+          <a:bodyPr rtlCol="0" anchor="ctr"/>
+          <a:lstStyle/>
+          <a:p>
+            <a:pPr algn="ctr"/>
+            <a:endParaRPr lang="en-US"/>
+          </a:p>
+        </p:txBody>
+      </p:sp>
+      <p:sp>
+        <p:nvSpPr>
+          <p:cNvPr id="7" name="TextBox 6">
+            <a:extLst>
+              <a:ext uri="{FF2B5EF4-FFF2-40B4-BE49-F238E27FC236}">
+                <a16:creationId xmlns:a16="http://schemas.microsoft.com/office/drawing/2014/main" id="{B0F7C8A7-FDFB-4E80-A5EF-27754D0C1BB2}"/>
+              </a:ext>
+            </a:extLst>
+          </p:cNvPr>
+          <p:cNvSpPr txBox="1"/>
+          <p:nvPr/>
+        </p:nvSpPr>
+        <p:spPr>
+          <a:xfrm>
+            <a:off x="10325343" y="282685"/>
+            <a:ext cx="1472349" cy="584775"/>
+          </a:xfrm>
+          <a:prstGeom prst="rect">
+            <a:avLst/>
+          </a:prstGeom>
+          <a:noFill/>
+        </p:spPr>
+        <p:txBody>
+          <a:bodyPr wrap="square" rtlCol="0">
+            <a:spAutoFit/>
+          </a:bodyPr>
+          <a:lstStyle/>
+          <a:p>
+            <a:r>
+              <a:rPr lang="ko-KR" altLang="en-US" sz="3200" b="1" dirty="0">
+                <a:solidFill>
+                  <a:schemeClr val="bg1"/>
+                </a:solidFill>
+                <a:effectLst/>
+              </a:rPr>
+              <a:t>漢</a:t>
+            </a:r>
+            <a:r>
+              <a:rPr lang="ko-KR" altLang="en-US" sz="3200" dirty="0">
+                <a:solidFill>
+                  <a:schemeClr val="bg1"/>
+                </a:solidFill>
+              </a:rPr>
+              <a:t> </a:t>
+            </a:r>
+            <a:endParaRPr lang="en-US" sz="3200" dirty="0">
+              <a:solidFill>
+                <a:schemeClr val="bg1"/>
+              </a:solidFill>
+            </a:endParaRPr>
+          </a:p>
+        </p:txBody>
+      </p:sp>
+      <p:sp>
+        <p:nvSpPr>
+          <p:cNvPr id="12" name="Rectangle 11">
+            <a:extLst>
+              <a:ext uri="{FF2B5EF4-FFF2-40B4-BE49-F238E27FC236}">
+                <a16:creationId xmlns:a16="http://schemas.microsoft.com/office/drawing/2014/main" id="{D684C88E-CD31-8262-0986-4BD5D89D446F}"/>
+              </a:ext>
+            </a:extLst>
+          </p:cNvPr>
+          <p:cNvSpPr/>
+          <p:nvPr/>
+        </p:nvSpPr>
+        <p:spPr>
+          <a:xfrm>
+            <a:off x="11117940" y="155969"/>
+            <a:ext cx="1017636" cy="761613"/>
+          </a:xfrm>
+          <a:prstGeom prst="rect">
+            <a:avLst/>
+          </a:prstGeom>
+          <a:solidFill>
+            <a:schemeClr val="accent5">
+              <a:lumMod val="50000"/>
+            </a:schemeClr>
+          </a:solidFill>
+        </p:spPr>
+        <p:style>
+          <a:lnRef idx="2">
+            <a:schemeClr val="accent1">
+              <a:shade val="15000"/>
+            </a:schemeClr>
+          </a:lnRef>
+          <a:fillRef idx="1">
+            <a:schemeClr val="accent1"/>
+          </a:fillRef>
+          <a:effectRef idx="0">
+            <a:schemeClr val="accent1"/>
+          </a:effectRef>
+          <a:fontRef idx="minor">
+            <a:schemeClr val="lt1"/>
+          </a:fontRef>
+        </p:style>
+        <p:txBody>
+          <a:bodyPr rtlCol="0" anchor="ctr"/>
+          <a:lstStyle/>
+          <a:p>
+            <a:pPr algn="ctr"/>
+            <a:endParaRPr lang="en-US"/>
+          </a:p>
+        </p:txBody>
+      </p:sp>
+      <p:sp>
+        <p:nvSpPr>
+          <p:cNvPr id="11" name="TextBox 10">
+            <a:extLst>
+              <a:ext uri="{FF2B5EF4-FFF2-40B4-BE49-F238E27FC236}">
+                <a16:creationId xmlns:a16="http://schemas.microsoft.com/office/drawing/2014/main" id="{0211BA4F-BCC3-F55D-6C00-A167EBDA1BF4}"/>
+              </a:ext>
+            </a:extLst>
+          </p:cNvPr>
+          <p:cNvSpPr txBox="1"/>
+          <p:nvPr/>
+        </p:nvSpPr>
+        <p:spPr>
+          <a:xfrm>
+            <a:off x="11129634" y="282685"/>
+            <a:ext cx="1589446" cy="584775"/>
+          </a:xfrm>
+          <a:prstGeom prst="rect">
+            <a:avLst/>
+          </a:prstGeom>
+          <a:noFill/>
+        </p:spPr>
+        <p:txBody>
+          <a:bodyPr wrap="square" rtlCol="0">
+            <a:spAutoFit/>
+          </a:bodyPr>
+          <a:lstStyle/>
+          <a:p>
+            <a:r>
+              <a:rPr lang="ko-KR" altLang="en-US" sz="3200" dirty="0">
+                <a:solidFill>
+                  <a:schemeClr val="bg1"/>
+                </a:solidFill>
+              </a:rPr>
+              <a:t>연습 </a:t>
+            </a:r>
+            <a:endParaRPr lang="en-US" sz="3200" dirty="0">
+              <a:solidFill>
+                <a:schemeClr val="bg1"/>
+              </a:solidFill>
+            </a:endParaRPr>
+          </a:p>
+        </p:txBody>
+      </p:sp>
+      <p:sp>
+        <p:nvSpPr>
+          <p:cNvPr id="13" name="TextBox 12">
+            <a:extLst>
+              <a:ext uri="{FF2B5EF4-FFF2-40B4-BE49-F238E27FC236}">
+                <a16:creationId xmlns:a16="http://schemas.microsoft.com/office/drawing/2014/main" id="{4C8B326B-FDB0-4A10-31E8-96378A71D0B4}"/>
+              </a:ext>
+            </a:extLst>
+          </p:cNvPr>
+          <p:cNvSpPr txBox="1"/>
+          <p:nvPr/>
+        </p:nvSpPr>
+        <p:spPr>
+          <a:xfrm>
+            <a:off x="119140" y="269260"/>
+            <a:ext cx="2447998" cy="584775"/>
+          </a:xfrm>
+          <a:prstGeom prst="rect">
+            <a:avLst/>
+          </a:prstGeom>
+          <a:noFill/>
+        </p:spPr>
+        <p:txBody>
+          <a:bodyPr wrap="square" rtlCol="0">
+            <a:spAutoFit/>
+          </a:bodyPr>
+          <a:lstStyle/>
+          <a:p>
+            <a:r>
+              <a:rPr lang="ko-KR" altLang="en-US" sz="3200" dirty="0">
+                <a:solidFill>
+                  <a:schemeClr val="bg1"/>
+                </a:solidFill>
+              </a:rPr>
+              <a:t>한국어사전 </a:t>
+            </a:r>
+            <a:endParaRPr lang="en-US" sz="3200" dirty="0">
+              <a:solidFill>
+                <a:schemeClr val="bg1"/>
+              </a:solidFill>
+            </a:endParaRPr>
+          </a:p>
+        </p:txBody>
+      </p:sp>
+      <p:sp>
+        <p:nvSpPr>
+          <p:cNvPr id="14" name="Rectangle 13">
+            <a:extLst>
+              <a:ext uri="{FF2B5EF4-FFF2-40B4-BE49-F238E27FC236}">
+                <a16:creationId xmlns:a16="http://schemas.microsoft.com/office/drawing/2014/main" id="{01B3002A-D154-02FB-3F8F-2D0259328CB6}"/>
+              </a:ext>
+            </a:extLst>
+          </p:cNvPr>
+          <p:cNvSpPr/>
+          <p:nvPr/>
+        </p:nvSpPr>
+        <p:spPr>
+          <a:xfrm>
+            <a:off x="2662971" y="216008"/>
+            <a:ext cx="3416915" cy="628633"/>
+          </a:xfrm>
+          <a:prstGeom prst="rect">
+            <a:avLst/>
+          </a:prstGeom>
+          <a:solidFill>
+            <a:schemeClr val="bg2">
+              <a:lumMod val="75000"/>
+            </a:schemeClr>
+          </a:solidFill>
+        </p:spPr>
+        <p:style>
+          <a:lnRef idx="2">
+            <a:schemeClr val="accent1">
+              <a:shade val="15000"/>
+            </a:schemeClr>
+          </a:lnRef>
+          <a:fillRef idx="1">
+            <a:schemeClr val="accent1"/>
+          </a:fillRef>
+          <a:effectRef idx="0">
+            <a:schemeClr val="accent1"/>
+          </a:effectRef>
+          <a:fontRef idx="minor">
+            <a:schemeClr val="lt1"/>
+          </a:fontRef>
+        </p:style>
+        <p:txBody>
+          <a:bodyPr rtlCol="0" anchor="ctr"/>
+          <a:lstStyle/>
+          <a:p>
+            <a:pPr algn="ctr"/>
+            <a:endParaRPr lang="en-US"/>
+          </a:p>
+        </p:txBody>
+      </p:sp>
+      <p:sp>
+        <p:nvSpPr>
+          <p:cNvPr id="16" name="TextBox 15">
+            <a:extLst>
+              <a:ext uri="{FF2B5EF4-FFF2-40B4-BE49-F238E27FC236}">
+                <a16:creationId xmlns:a16="http://schemas.microsoft.com/office/drawing/2014/main" id="{175B4C17-22FA-F2F7-1335-24F7E865E574}"/>
+              </a:ext>
+            </a:extLst>
+          </p:cNvPr>
+          <p:cNvSpPr txBox="1"/>
+          <p:nvPr/>
+        </p:nvSpPr>
+        <p:spPr>
+          <a:xfrm>
+            <a:off x="2664110" y="282685"/>
+            <a:ext cx="1261884" cy="523220"/>
+          </a:xfrm>
+          <a:prstGeom prst="rect">
+            <a:avLst/>
+          </a:prstGeom>
+          <a:noFill/>
+        </p:spPr>
+        <p:txBody>
+          <a:bodyPr wrap="none" rtlCol="0">
+            <a:spAutoFit/>
+          </a:bodyPr>
+          <a:lstStyle/>
+          <a:p>
+            <a:r>
+              <a:rPr lang="ko-KR" altLang="en-US" sz="2800" dirty="0"/>
+              <a:t>검색어</a:t>
+            </a:r>
+            <a:endParaRPr lang="en-US" sz="2800" dirty="0"/>
+          </a:p>
+        </p:txBody>
+      </p:sp>
+      <p:sp>
+        <p:nvSpPr>
+          <p:cNvPr id="2" name="Rectangle 1">
+            <a:extLst>
+              <a:ext uri="{FF2B5EF4-FFF2-40B4-BE49-F238E27FC236}">
+                <a16:creationId xmlns:a16="http://schemas.microsoft.com/office/drawing/2014/main" id="{4A71A0B3-62AF-A77E-89A3-0FA3C2979672}"/>
+              </a:ext>
+            </a:extLst>
+          </p:cNvPr>
+          <p:cNvSpPr/>
+          <p:nvPr/>
+        </p:nvSpPr>
+        <p:spPr>
+          <a:xfrm>
+            <a:off x="5442042" y="237938"/>
+            <a:ext cx="634885" cy="584775"/>
+          </a:xfrm>
+          <a:prstGeom prst="rect">
+            <a:avLst/>
+          </a:prstGeom>
+          <a:solidFill>
+            <a:schemeClr val="tx2">
+              <a:lumMod val="25000"/>
+              <a:lumOff val="75000"/>
+            </a:schemeClr>
+          </a:solidFill>
+        </p:spPr>
+        <p:style>
+          <a:lnRef idx="2">
+            <a:schemeClr val="accent1">
+              <a:shade val="15000"/>
+            </a:schemeClr>
+          </a:lnRef>
+          <a:fillRef idx="1">
+            <a:schemeClr val="accent1"/>
+          </a:fillRef>
+          <a:effectRef idx="0">
+            <a:schemeClr val="accent1"/>
+          </a:effectRef>
+          <a:fontRef idx="minor">
+            <a:schemeClr val="lt1"/>
+          </a:fontRef>
+        </p:style>
+        <p:txBody>
+          <a:bodyPr rtlCol="0" anchor="ctr"/>
+          <a:lstStyle/>
+          <a:p>
+            <a:pPr algn="ctr"/>
+            <a:endParaRPr lang="en-US"/>
+          </a:p>
+        </p:txBody>
+      </p:sp>
+      <p:sp>
+        <p:nvSpPr>
+          <p:cNvPr id="8" name="Isosceles Triangle 7">
+            <a:extLst>
+              <a:ext uri="{FF2B5EF4-FFF2-40B4-BE49-F238E27FC236}">
+                <a16:creationId xmlns:a16="http://schemas.microsoft.com/office/drawing/2014/main" id="{866D4D09-1ADF-2E91-5DBB-D2922EBFC4AE}"/>
+              </a:ext>
+            </a:extLst>
+          </p:cNvPr>
+          <p:cNvSpPr/>
+          <p:nvPr/>
+        </p:nvSpPr>
+        <p:spPr>
+          <a:xfrm rot="10800000">
+            <a:off x="5581087" y="378791"/>
+            <a:ext cx="356794" cy="331007"/>
+          </a:xfrm>
+          <a:prstGeom prst="triangle">
+            <a:avLst/>
+          </a:prstGeom>
+          <a:solidFill>
+            <a:schemeClr val="accent1">
+              <a:lumMod val="40000"/>
+              <a:lumOff val="60000"/>
+            </a:schemeClr>
+          </a:solidFill>
+        </p:spPr>
+        <p:style>
+          <a:lnRef idx="2">
+            <a:schemeClr val="accent1">
+              <a:shade val="15000"/>
+            </a:schemeClr>
+          </a:lnRef>
+          <a:fillRef idx="1">
+            <a:schemeClr val="accent1"/>
+          </a:fillRef>
+          <a:effectRef idx="0">
+            <a:schemeClr val="accent1"/>
+          </a:effectRef>
+          <a:fontRef idx="minor">
+            <a:schemeClr val="lt1"/>
+          </a:fontRef>
+        </p:style>
+        <p:txBody>
+          <a:bodyPr rtlCol="0" anchor="ctr"/>
+          <a:lstStyle/>
+          <a:p>
+            <a:pPr algn="ctr"/>
+            <a:endParaRPr lang="en-US"/>
+          </a:p>
+        </p:txBody>
+      </p:sp>
+      <p:cxnSp>
+        <p:nvCxnSpPr>
+          <p:cNvPr id="18" name="Straight Connector 17">
+            <a:extLst>
+              <a:ext uri="{FF2B5EF4-FFF2-40B4-BE49-F238E27FC236}">
+                <a16:creationId xmlns:a16="http://schemas.microsoft.com/office/drawing/2014/main" id="{7E0FFF9C-95B7-B4F5-0432-249FB59C5342}"/>
+              </a:ext>
+            </a:extLst>
+          </p:cNvPr>
+          <p:cNvCxnSpPr>
+            <a:cxnSpLocks/>
+            <a:endCxn id="5" idx="2"/>
+          </p:cNvCxnSpPr>
+          <p:nvPr/>
+        </p:nvCxnSpPr>
+        <p:spPr>
+          <a:xfrm flipH="1" flipV="1">
+            <a:off x="6095999" y="1020343"/>
+            <a:ext cx="1" cy="5837658"/>
+          </a:xfrm>
+          <a:prstGeom prst="line">
+            <a:avLst/>
+          </a:prstGeom>
+        </p:spPr>
+        <p:style>
+          <a:lnRef idx="2">
+            <a:schemeClr val="accent1"/>
+          </a:lnRef>
+          <a:fillRef idx="0">
+            <a:schemeClr val="accent1"/>
+          </a:fillRef>
+          <a:effectRef idx="1">
+            <a:schemeClr val="accent1"/>
+          </a:effectRef>
+          <a:fontRef idx="minor">
+            <a:schemeClr val="tx1"/>
+          </a:fontRef>
+        </p:style>
+      </p:cxnSp>
+      <p:sp>
+        <p:nvSpPr>
+          <p:cNvPr id="32" name="Rectangle 31">
+            <a:extLst>
+              <a:ext uri="{FF2B5EF4-FFF2-40B4-BE49-F238E27FC236}">
+                <a16:creationId xmlns:a16="http://schemas.microsoft.com/office/drawing/2014/main" id="{2A5741CC-9A3A-420E-26E7-F3429D9C7469}"/>
+              </a:ext>
+            </a:extLst>
+          </p:cNvPr>
+          <p:cNvSpPr/>
+          <p:nvPr/>
+        </p:nvSpPr>
+        <p:spPr>
+          <a:xfrm>
+            <a:off x="6234629" y="1222331"/>
+            <a:ext cx="5818739" cy="2057430"/>
+          </a:xfrm>
+          <a:prstGeom prst="rect">
+            <a:avLst/>
+          </a:prstGeom>
+        </p:spPr>
+        <p:style>
+          <a:lnRef idx="2">
+            <a:schemeClr val="accent1">
+              <a:shade val="15000"/>
+            </a:schemeClr>
+          </a:lnRef>
+          <a:fillRef idx="1">
+            <a:schemeClr val="accent1"/>
+          </a:fillRef>
+          <a:effectRef idx="0">
+            <a:schemeClr val="accent1"/>
+          </a:effectRef>
+          <a:fontRef idx="minor">
+            <a:schemeClr val="lt1"/>
+          </a:fontRef>
+        </p:style>
+        <p:txBody>
+          <a:bodyPr rtlCol="0" anchor="t"/>
+          <a:lstStyle/>
+          <a:p>
+            <a:pPr>
+              <a:spcAft>
+                <a:spcPts val="600"/>
+              </a:spcAft>
+            </a:pPr>
+            <a:r>
+              <a:rPr lang="ko-KR" altLang="en-US" sz="2800" dirty="0"/>
+              <a:t>자 훈 음</a:t>
+            </a:r>
+            <a:endParaRPr lang="en-US" altLang="ko-KR" sz="2800" dirty="0"/>
+          </a:p>
+          <a:p>
+            <a:pPr>
+              <a:spcAft>
+                <a:spcPts val="600"/>
+              </a:spcAft>
+            </a:pPr>
+            <a:r>
+              <a:rPr lang="ko-KR" altLang="en-US" dirty="0"/>
+              <a:t>단어</a:t>
+            </a:r>
+            <a:r>
+              <a:rPr lang="en-US" altLang="ko-KR" dirty="0"/>
+              <a:t>(</a:t>
+            </a:r>
+            <a:r>
+              <a:rPr lang="ko-KR" altLang="en-US" dirty="0"/>
+              <a:t>한자</a:t>
+            </a:r>
+            <a:r>
+              <a:rPr lang="en-US" altLang="ko-KR" dirty="0"/>
+              <a:t>): </a:t>
+            </a:r>
+            <a:r>
+              <a:rPr lang="ko-KR" altLang="en-US" dirty="0"/>
+              <a:t>정의</a:t>
+            </a:r>
+            <a:r>
+              <a:rPr lang="en-US" altLang="ko-KR" dirty="0"/>
+              <a:t>.</a:t>
+            </a:r>
+          </a:p>
+          <a:p>
+            <a:pPr>
+              <a:spcAft>
+                <a:spcPts val="600"/>
+              </a:spcAft>
+            </a:pPr>
+            <a:r>
+              <a:rPr lang="ko-KR" altLang="en-US" dirty="0"/>
+              <a:t>단어</a:t>
+            </a:r>
+            <a:r>
+              <a:rPr lang="en-US" altLang="ko-KR" dirty="0"/>
+              <a:t>(</a:t>
+            </a:r>
+            <a:r>
+              <a:rPr lang="ko-KR" altLang="en-US" dirty="0"/>
+              <a:t>한자</a:t>
+            </a:r>
+            <a:r>
+              <a:rPr lang="en-US" altLang="ko-KR" dirty="0"/>
+              <a:t>): </a:t>
+            </a:r>
+            <a:r>
+              <a:rPr lang="ko-KR" altLang="en-US" dirty="0"/>
+              <a:t>정의</a:t>
+            </a:r>
+            <a:r>
+              <a:rPr lang="en-US" altLang="ko-KR" dirty="0"/>
+              <a:t>.</a:t>
+            </a:r>
+          </a:p>
+          <a:p>
+            <a:pPr>
+              <a:spcAft>
+                <a:spcPts val="600"/>
+              </a:spcAft>
+            </a:pPr>
+            <a:r>
+              <a:rPr lang="ko-KR" altLang="en-US" dirty="0"/>
+              <a:t>단어</a:t>
+            </a:r>
+            <a:r>
+              <a:rPr lang="en-US" altLang="ko-KR" dirty="0"/>
+              <a:t>(</a:t>
+            </a:r>
+            <a:r>
+              <a:rPr lang="ko-KR" altLang="en-US" dirty="0"/>
+              <a:t>한자</a:t>
+            </a:r>
+            <a:r>
+              <a:rPr lang="en-US" altLang="ko-KR" dirty="0"/>
+              <a:t>): </a:t>
+            </a:r>
+            <a:r>
+              <a:rPr lang="ko-KR" altLang="en-US" dirty="0"/>
+              <a:t>정의</a:t>
+            </a:r>
+            <a:r>
+              <a:rPr lang="en-US" altLang="ko-KR" dirty="0"/>
+              <a:t>.</a:t>
+            </a:r>
+          </a:p>
+          <a:p>
+            <a:pPr>
+              <a:spcBef>
+                <a:spcPts val="600"/>
+              </a:spcBef>
+            </a:pPr>
+            <a:r>
+              <a:rPr lang="ko-KR" altLang="en-US" dirty="0" err="1"/>
+              <a:t>자훈음</a:t>
+            </a:r>
+            <a:r>
+              <a:rPr lang="ko-KR" altLang="en-US" dirty="0"/>
+              <a:t> 출처</a:t>
+            </a:r>
+            <a:r>
+              <a:rPr lang="en-US" altLang="ko-KR" dirty="0"/>
+              <a:t>: </a:t>
+            </a:r>
+            <a:r>
+              <a:rPr lang="ko-KR" altLang="en-US" dirty="0"/>
+              <a:t>나무위키</a:t>
+            </a:r>
+            <a:endParaRPr lang="en-US" altLang="ko-KR" dirty="0"/>
+          </a:p>
+          <a:p>
+            <a:pPr>
+              <a:spcAft>
+                <a:spcPts val="600"/>
+              </a:spcAft>
+            </a:pPr>
+            <a:endParaRPr lang="en-US" altLang="ko-KR" dirty="0"/>
+          </a:p>
+        </p:txBody>
+      </p:sp>
+      <p:sp>
+        <p:nvSpPr>
+          <p:cNvPr id="33" name="Rectangle 32">
+            <a:extLst>
+              <a:ext uri="{FF2B5EF4-FFF2-40B4-BE49-F238E27FC236}">
+                <a16:creationId xmlns:a16="http://schemas.microsoft.com/office/drawing/2014/main" id="{DF5AA66D-BB62-7741-CAD0-1048EA695DF8}"/>
+              </a:ext>
+            </a:extLst>
+          </p:cNvPr>
+          <p:cNvSpPr/>
+          <p:nvPr/>
+        </p:nvSpPr>
+        <p:spPr>
+          <a:xfrm>
+            <a:off x="6238175" y="3429000"/>
+            <a:ext cx="5818739" cy="2057430"/>
+          </a:xfrm>
+          <a:prstGeom prst="rect">
+            <a:avLst/>
+          </a:prstGeom>
+        </p:spPr>
+        <p:style>
+          <a:lnRef idx="2">
+            <a:schemeClr val="accent1">
+              <a:shade val="15000"/>
+            </a:schemeClr>
+          </a:lnRef>
+          <a:fillRef idx="1">
+            <a:schemeClr val="accent1"/>
+          </a:fillRef>
+          <a:effectRef idx="0">
+            <a:schemeClr val="accent1"/>
+          </a:effectRef>
+          <a:fontRef idx="minor">
+            <a:schemeClr val="lt1"/>
+          </a:fontRef>
+        </p:style>
+        <p:txBody>
+          <a:bodyPr rtlCol="0" anchor="t"/>
+          <a:lstStyle/>
+          <a:p>
+            <a:pPr>
+              <a:spcAft>
+                <a:spcPts val="600"/>
+              </a:spcAft>
+            </a:pPr>
+            <a:r>
+              <a:rPr lang="ko-KR" altLang="en-US" sz="2800" dirty="0"/>
+              <a:t>자 훈 음</a:t>
+            </a:r>
+            <a:endParaRPr lang="en-US" altLang="ko-KR" sz="2800" dirty="0"/>
+          </a:p>
+          <a:p>
+            <a:pPr>
+              <a:spcAft>
+                <a:spcPts val="600"/>
+              </a:spcAft>
+            </a:pPr>
+            <a:r>
+              <a:rPr lang="ko-KR" altLang="en-US" dirty="0"/>
+              <a:t>단어</a:t>
+            </a:r>
+            <a:r>
+              <a:rPr lang="en-US" altLang="ko-KR" dirty="0"/>
+              <a:t>(</a:t>
+            </a:r>
+            <a:r>
+              <a:rPr lang="ko-KR" altLang="en-US" dirty="0"/>
+              <a:t>한자</a:t>
+            </a:r>
+            <a:r>
+              <a:rPr lang="en-US" altLang="ko-KR" dirty="0"/>
+              <a:t>): </a:t>
+            </a:r>
+            <a:r>
+              <a:rPr lang="ko-KR" altLang="en-US" dirty="0"/>
+              <a:t>정의</a:t>
+            </a:r>
+            <a:r>
+              <a:rPr lang="en-US" altLang="ko-KR" dirty="0"/>
+              <a:t>.</a:t>
+            </a:r>
+          </a:p>
+          <a:p>
+            <a:pPr>
+              <a:spcAft>
+                <a:spcPts val="600"/>
+              </a:spcAft>
+            </a:pPr>
+            <a:r>
+              <a:rPr lang="ko-KR" altLang="en-US" dirty="0"/>
+              <a:t>단어</a:t>
+            </a:r>
+            <a:r>
+              <a:rPr lang="en-US" altLang="ko-KR" dirty="0"/>
+              <a:t>(</a:t>
+            </a:r>
+            <a:r>
+              <a:rPr lang="ko-KR" altLang="en-US" dirty="0"/>
+              <a:t>한자</a:t>
+            </a:r>
+            <a:r>
+              <a:rPr lang="en-US" altLang="ko-KR" dirty="0"/>
+              <a:t>): </a:t>
+            </a:r>
+            <a:r>
+              <a:rPr lang="ko-KR" altLang="en-US" dirty="0"/>
+              <a:t>정의</a:t>
+            </a:r>
+            <a:r>
+              <a:rPr lang="en-US" altLang="ko-KR" dirty="0"/>
+              <a:t>.</a:t>
+            </a:r>
+          </a:p>
+          <a:p>
+            <a:pPr>
+              <a:spcAft>
+                <a:spcPts val="600"/>
+              </a:spcAft>
+            </a:pPr>
+            <a:r>
+              <a:rPr lang="ko-KR" altLang="en-US" dirty="0"/>
+              <a:t>단어</a:t>
+            </a:r>
+            <a:r>
+              <a:rPr lang="en-US" altLang="ko-KR" dirty="0"/>
+              <a:t>(</a:t>
+            </a:r>
+            <a:r>
+              <a:rPr lang="ko-KR" altLang="en-US" dirty="0"/>
+              <a:t>한자</a:t>
+            </a:r>
+            <a:r>
+              <a:rPr lang="en-US" altLang="ko-KR" dirty="0"/>
+              <a:t>): </a:t>
+            </a:r>
+            <a:r>
+              <a:rPr lang="ko-KR" altLang="en-US" dirty="0"/>
+              <a:t>정의</a:t>
+            </a:r>
+            <a:r>
+              <a:rPr lang="en-US" altLang="ko-KR" dirty="0"/>
+              <a:t>.</a:t>
+            </a:r>
+          </a:p>
+          <a:p>
+            <a:pPr>
+              <a:spcBef>
+                <a:spcPts val="600"/>
+              </a:spcBef>
+            </a:pPr>
+            <a:r>
+              <a:rPr lang="ko-KR" altLang="en-US" dirty="0" err="1"/>
+              <a:t>자훈음</a:t>
+            </a:r>
+            <a:r>
+              <a:rPr lang="ko-KR" altLang="en-US" dirty="0"/>
+              <a:t> 출처</a:t>
+            </a:r>
+            <a:r>
+              <a:rPr lang="en-US" altLang="ko-KR" dirty="0"/>
+              <a:t>: </a:t>
+            </a:r>
+            <a:r>
+              <a:rPr lang="ko-KR" altLang="en-US" dirty="0"/>
+              <a:t>나무위키</a:t>
+            </a:r>
+            <a:endParaRPr lang="en-US" altLang="ko-KR" dirty="0"/>
+          </a:p>
+          <a:p>
+            <a:pPr>
+              <a:spcAft>
+                <a:spcPts val="600"/>
+              </a:spcAft>
+            </a:pPr>
+            <a:endParaRPr lang="en-US" altLang="ko-KR" dirty="0"/>
+          </a:p>
+        </p:txBody>
+      </p:sp>
+      <p:pic>
+        <p:nvPicPr>
+          <p:cNvPr id="34" name="Graphic 33" descr="Storytelling outline">
+            <a:extLst>
+              <a:ext uri="{FF2B5EF4-FFF2-40B4-BE49-F238E27FC236}">
+                <a16:creationId xmlns:a16="http://schemas.microsoft.com/office/drawing/2014/main" id="{73B7E99B-3DB3-A035-009C-824F8814E24E}"/>
+              </a:ext>
+            </a:extLst>
+          </p:cNvPr>
+          <p:cNvPicPr>
+            <a:picLocks noChangeAspect="1"/>
+          </p:cNvPicPr>
+          <p:nvPr/>
+        </p:nvPicPr>
+        <p:blipFill>
+          <a:blip r:embed="rId2">
+            <a:extLst>
+              <a:ext uri="{28A0092B-C50C-407E-A947-70E740481C1C}">
+                <a14:useLocalDpi xmlns:a14="http://schemas.microsoft.com/office/drawing/2010/main" val="0"/>
+              </a:ext>
+              <a:ext uri="{96DAC541-7B7A-43D3-8B79-37D633B846F1}">
+                <asvg:svgBlip xmlns:asvg="http://schemas.microsoft.com/office/drawing/2016/SVG/main" r:embed="rId3"/>
+              </a:ext>
+            </a:extLst>
+          </a:blip>
+          <a:stretch>
+            <a:fillRect/>
+          </a:stretch>
+        </p:blipFill>
+        <p:spPr>
+          <a:xfrm>
+            <a:off x="10955925" y="3459774"/>
+            <a:ext cx="473178" cy="473178"/>
+          </a:xfrm>
+          <a:prstGeom prst="rect">
+            <a:avLst/>
+          </a:prstGeom>
+        </p:spPr>
+      </p:pic>
+      <p:pic>
+        <p:nvPicPr>
+          <p:cNvPr id="35" name="Graphic 34" descr="Storytelling outline">
+            <a:extLst>
+              <a:ext uri="{FF2B5EF4-FFF2-40B4-BE49-F238E27FC236}">
+                <a16:creationId xmlns:a16="http://schemas.microsoft.com/office/drawing/2014/main" id="{383C51BB-7CEB-712E-A99F-173271852DFA}"/>
+              </a:ext>
+            </a:extLst>
+          </p:cNvPr>
+          <p:cNvPicPr>
+            <a:picLocks noChangeAspect="1"/>
+          </p:cNvPicPr>
+          <p:nvPr/>
+        </p:nvPicPr>
+        <p:blipFill>
+          <a:blip r:embed="rId2">
+            <a:extLst>
+              <a:ext uri="{28A0092B-C50C-407E-A947-70E740481C1C}">
+                <a14:useLocalDpi xmlns:a14="http://schemas.microsoft.com/office/drawing/2010/main" val="0"/>
+              </a:ext>
+              <a:ext uri="{96DAC541-7B7A-43D3-8B79-37D633B846F1}">
+                <asvg:svgBlip xmlns:asvg="http://schemas.microsoft.com/office/drawing/2016/SVG/main" r:embed="rId3"/>
+              </a:ext>
+            </a:extLst>
+          </a:blip>
+          <a:stretch>
+            <a:fillRect/>
+          </a:stretch>
+        </p:blipFill>
+        <p:spPr>
+          <a:xfrm>
+            <a:off x="10955925" y="1262721"/>
+            <a:ext cx="473178" cy="473178"/>
+          </a:xfrm>
+          <a:prstGeom prst="rect">
+            <a:avLst/>
+          </a:prstGeom>
+        </p:spPr>
+      </p:pic>
+      <p:pic>
+        <p:nvPicPr>
+          <p:cNvPr id="36" name="Graphic 35" descr="Checkbox Checked outline">
+            <a:extLst>
+              <a:ext uri="{FF2B5EF4-FFF2-40B4-BE49-F238E27FC236}">
+                <a16:creationId xmlns:a16="http://schemas.microsoft.com/office/drawing/2014/main" id="{F524E29A-471C-B1B7-CFC6-8442E8FFA04F}"/>
+              </a:ext>
+            </a:extLst>
+          </p:cNvPr>
+          <p:cNvPicPr>
+            <a:picLocks noChangeAspect="1"/>
+          </p:cNvPicPr>
+          <p:nvPr/>
+        </p:nvPicPr>
+        <p:blipFill>
+          <a:blip r:embed="rId4">
+            <a:extLst>
+              <a:ext uri="{28A0092B-C50C-407E-A947-70E740481C1C}">
+                <a14:useLocalDpi xmlns:a14="http://schemas.microsoft.com/office/drawing/2010/main" val="0"/>
+              </a:ext>
+              <a:ext uri="{96DAC541-7B7A-43D3-8B79-37D633B846F1}">
+                <asvg:svgBlip xmlns:asvg="http://schemas.microsoft.com/office/drawing/2016/SVG/main" r:embed="rId5"/>
+              </a:ext>
+            </a:extLst>
+          </a:blip>
+          <a:stretch>
+            <a:fillRect/>
+          </a:stretch>
+        </p:blipFill>
+        <p:spPr>
+          <a:xfrm>
+            <a:off x="11399315" y="3370519"/>
+            <a:ext cx="664535" cy="664535"/>
+          </a:xfrm>
+          <a:prstGeom prst="rect">
+            <a:avLst/>
+          </a:prstGeom>
+        </p:spPr>
+      </p:pic>
+      <p:pic>
+        <p:nvPicPr>
+          <p:cNvPr id="37" name="Graphic 36" descr="Checkbox Checked outline">
+            <a:extLst>
+              <a:ext uri="{FF2B5EF4-FFF2-40B4-BE49-F238E27FC236}">
+                <a16:creationId xmlns:a16="http://schemas.microsoft.com/office/drawing/2014/main" id="{591B03DB-1248-F1F9-EF07-4A858CEC868D}"/>
+              </a:ext>
+            </a:extLst>
+          </p:cNvPr>
+          <p:cNvPicPr>
+            <a:picLocks noChangeAspect="1"/>
+          </p:cNvPicPr>
+          <p:nvPr/>
+        </p:nvPicPr>
+        <p:blipFill>
+          <a:blip r:embed="rId4">
+            <a:extLst>
+              <a:ext uri="{28A0092B-C50C-407E-A947-70E740481C1C}">
+                <a14:useLocalDpi xmlns:a14="http://schemas.microsoft.com/office/drawing/2010/main" val="0"/>
+              </a:ext>
+              <a:ext uri="{96DAC541-7B7A-43D3-8B79-37D633B846F1}">
+                <asvg:svgBlip xmlns:asvg="http://schemas.microsoft.com/office/drawing/2016/SVG/main" r:embed="rId5"/>
+              </a:ext>
+            </a:extLst>
+          </a:blip>
+          <a:stretch>
+            <a:fillRect/>
+          </a:stretch>
+        </p:blipFill>
+        <p:spPr>
+          <a:xfrm>
+            <a:off x="11425559" y="1184315"/>
+            <a:ext cx="664535" cy="664535"/>
+          </a:xfrm>
+          <a:prstGeom prst="rect">
+            <a:avLst/>
+          </a:prstGeom>
+        </p:spPr>
+      </p:pic>
+      <p:sp>
+        <p:nvSpPr>
+          <p:cNvPr id="17" name="Rectangle 16">
+            <a:extLst>
+              <a:ext uri="{FF2B5EF4-FFF2-40B4-BE49-F238E27FC236}">
+                <a16:creationId xmlns:a16="http://schemas.microsoft.com/office/drawing/2014/main" id="{1143126B-FA9B-C758-4BBF-5CCDC4F73974}"/>
+              </a:ext>
+            </a:extLst>
+          </p:cNvPr>
+          <p:cNvSpPr/>
+          <p:nvPr/>
+        </p:nvSpPr>
+        <p:spPr>
+          <a:xfrm>
+            <a:off x="101906" y="1119819"/>
+            <a:ext cx="5851915" cy="1517055"/>
+          </a:xfrm>
+          <a:prstGeom prst="rect">
+            <a:avLst/>
+          </a:prstGeom>
+        </p:spPr>
+        <p:style>
+          <a:lnRef idx="2">
+            <a:schemeClr val="accent1">
+              <a:shade val="15000"/>
+            </a:schemeClr>
+          </a:lnRef>
+          <a:fillRef idx="1">
+            <a:schemeClr val="accent1"/>
+          </a:fillRef>
+          <a:effectRef idx="0">
+            <a:schemeClr val="accent1"/>
+          </a:effectRef>
+          <a:fontRef idx="minor">
+            <a:schemeClr val="lt1"/>
+          </a:fontRef>
+        </p:style>
+        <p:txBody>
+          <a:bodyPr rtlCol="0" anchor="ctr"/>
+          <a:lstStyle/>
+          <a:p>
+            <a:pPr algn="ctr"/>
+            <a:endParaRPr lang="en-US"/>
+          </a:p>
+        </p:txBody>
+      </p:sp>
+      <p:sp>
+        <p:nvSpPr>
+          <p:cNvPr id="3" name="TextBox 2">
+            <a:extLst>
+              <a:ext uri="{FF2B5EF4-FFF2-40B4-BE49-F238E27FC236}">
+                <a16:creationId xmlns:a16="http://schemas.microsoft.com/office/drawing/2014/main" id="{CFF8AFC9-0C7A-B222-38C9-ED40A2F35217}"/>
+              </a:ext>
+            </a:extLst>
+          </p:cNvPr>
+          <p:cNvSpPr txBox="1"/>
+          <p:nvPr/>
+        </p:nvSpPr>
+        <p:spPr>
+          <a:xfrm>
+            <a:off x="101906" y="1184315"/>
+            <a:ext cx="5735368" cy="1200329"/>
+          </a:xfrm>
+          <a:prstGeom prst="rect">
+            <a:avLst/>
+          </a:prstGeom>
+          <a:noFill/>
+        </p:spPr>
+        <p:txBody>
+          <a:bodyPr wrap="square" rtlCol="0">
+            <a:spAutoFit/>
+          </a:bodyPr>
+          <a:lstStyle/>
+          <a:p>
+            <a:r>
+              <a:rPr lang="en-US" altLang="ko-KR" dirty="0"/>
+              <a:t>[</a:t>
+            </a:r>
+            <a:r>
+              <a:rPr lang="ko-KR" altLang="en-US" dirty="0"/>
+              <a:t>자 </a:t>
+            </a:r>
+            <a:r>
+              <a:rPr lang="ko-KR" altLang="en-US" dirty="0" err="1"/>
+              <a:t>볷</a:t>
+            </a:r>
+            <a:r>
+              <a:rPr lang="en-US" altLang="ko-KR" dirty="0"/>
+              <a:t>]</a:t>
+            </a:r>
+            <a:r>
+              <a:rPr lang="ko-KR" altLang="en-US" dirty="0"/>
+              <a:t> </a:t>
+            </a:r>
+            <a:r>
+              <a:rPr lang="en-US" altLang="ko-KR" dirty="0"/>
+              <a:t>[</a:t>
+            </a:r>
+            <a:r>
+              <a:rPr lang="ko-KR" altLang="en-US" dirty="0"/>
+              <a:t>자 </a:t>
+            </a:r>
+            <a:r>
+              <a:rPr lang="ko-KR" altLang="en-US" dirty="0" err="1"/>
+              <a:t>볷</a:t>
+            </a:r>
+            <a:r>
+              <a:rPr lang="en-US" altLang="ko-KR" dirty="0"/>
+              <a:t>]</a:t>
+            </a:r>
+            <a:r>
+              <a:rPr lang="ko-KR" altLang="en-US" dirty="0"/>
+              <a:t> </a:t>
+            </a:r>
+            <a:r>
+              <a:rPr lang="en-US" altLang="ko-KR" dirty="0"/>
+              <a:t>[</a:t>
+            </a:r>
+            <a:r>
+              <a:rPr lang="ko-KR" altLang="en-US" dirty="0"/>
+              <a:t>자 </a:t>
+            </a:r>
+            <a:r>
+              <a:rPr lang="ko-KR" altLang="en-US" dirty="0" err="1"/>
+              <a:t>볷</a:t>
+            </a:r>
+            <a:r>
+              <a:rPr lang="en-US" altLang="ko-KR" dirty="0"/>
+              <a:t>]</a:t>
+            </a:r>
+            <a:r>
+              <a:rPr lang="ko-KR" altLang="en-US" dirty="0"/>
+              <a:t> </a:t>
+            </a:r>
+            <a:r>
+              <a:rPr lang="en-US" altLang="ko-KR" dirty="0"/>
+              <a:t>[</a:t>
+            </a:r>
+            <a:r>
+              <a:rPr lang="ko-KR" altLang="en-US" dirty="0"/>
+              <a:t>자 </a:t>
+            </a:r>
+            <a:r>
+              <a:rPr lang="ko-KR" altLang="en-US" dirty="0" err="1"/>
+              <a:t>볷</a:t>
+            </a:r>
+            <a:r>
+              <a:rPr lang="en-US" altLang="ko-KR" dirty="0"/>
+              <a:t>]</a:t>
+            </a:r>
+            <a:r>
+              <a:rPr lang="ko-KR" altLang="en-US" dirty="0"/>
+              <a:t> </a:t>
+            </a:r>
+            <a:r>
+              <a:rPr lang="en-US" altLang="ko-KR" dirty="0"/>
+              <a:t>[</a:t>
+            </a:r>
+            <a:r>
+              <a:rPr lang="ko-KR" altLang="en-US" dirty="0"/>
+              <a:t>자 </a:t>
+            </a:r>
+            <a:r>
+              <a:rPr lang="ko-KR" altLang="en-US" dirty="0" err="1"/>
+              <a:t>볷</a:t>
+            </a:r>
+            <a:r>
+              <a:rPr lang="en-US" altLang="ko-KR" dirty="0"/>
+              <a:t>] [</a:t>
+            </a:r>
+            <a:r>
+              <a:rPr lang="ko-KR" altLang="en-US" dirty="0"/>
+              <a:t>자 </a:t>
+            </a:r>
+            <a:r>
+              <a:rPr lang="ko-KR" altLang="en-US" dirty="0" err="1"/>
+              <a:t>볷</a:t>
+            </a:r>
+            <a:r>
+              <a:rPr lang="en-US" altLang="ko-KR" dirty="0"/>
+              <a:t>]</a:t>
+            </a:r>
+            <a:r>
+              <a:rPr lang="ko-KR" altLang="en-US" dirty="0"/>
+              <a:t> </a:t>
+            </a:r>
+            <a:r>
+              <a:rPr lang="en-US" altLang="ko-KR" dirty="0"/>
+              <a:t>[</a:t>
+            </a:r>
+            <a:r>
+              <a:rPr lang="ko-KR" altLang="en-US" dirty="0"/>
+              <a:t>자 </a:t>
+            </a:r>
+            <a:r>
+              <a:rPr lang="ko-KR" altLang="en-US" dirty="0" err="1"/>
+              <a:t>볷</a:t>
+            </a:r>
+            <a:r>
+              <a:rPr lang="en-US" altLang="ko-KR" dirty="0"/>
+              <a:t>]</a:t>
+            </a:r>
+            <a:r>
+              <a:rPr lang="ko-KR" altLang="en-US" dirty="0"/>
+              <a:t> </a:t>
+            </a:r>
+            <a:r>
+              <a:rPr lang="en-US" altLang="ko-KR" dirty="0"/>
+              <a:t>[</a:t>
+            </a:r>
+            <a:r>
+              <a:rPr lang="ko-KR" altLang="en-US" dirty="0"/>
+              <a:t>자 </a:t>
+            </a:r>
+            <a:r>
+              <a:rPr lang="ko-KR" altLang="en-US" dirty="0" err="1"/>
+              <a:t>볷</a:t>
+            </a:r>
+            <a:r>
+              <a:rPr lang="en-US" altLang="ko-KR" dirty="0"/>
+              <a:t>]</a:t>
+            </a:r>
+            <a:r>
+              <a:rPr lang="ko-KR" altLang="en-US" dirty="0"/>
+              <a:t> </a:t>
+            </a:r>
+            <a:r>
+              <a:rPr lang="en-US" altLang="ko-KR" dirty="0"/>
+              <a:t>[</a:t>
+            </a:r>
+            <a:r>
+              <a:rPr lang="ko-KR" altLang="en-US" dirty="0"/>
+              <a:t>자 </a:t>
+            </a:r>
+            <a:r>
+              <a:rPr lang="ko-KR" altLang="en-US" dirty="0" err="1"/>
+              <a:t>볷</a:t>
+            </a:r>
+            <a:r>
+              <a:rPr lang="en-US" altLang="ko-KR" dirty="0"/>
+              <a:t>]</a:t>
+            </a:r>
+            <a:r>
+              <a:rPr lang="ko-KR" altLang="en-US" dirty="0"/>
+              <a:t> </a:t>
+            </a:r>
+            <a:r>
+              <a:rPr lang="en-US" altLang="ko-KR" dirty="0"/>
+              <a:t>[</a:t>
+            </a:r>
+            <a:r>
+              <a:rPr lang="ko-KR" altLang="en-US" dirty="0"/>
+              <a:t>자 </a:t>
+            </a:r>
+            <a:r>
+              <a:rPr lang="ko-KR" altLang="en-US" dirty="0" err="1"/>
+              <a:t>볷</a:t>
+            </a:r>
+            <a:r>
+              <a:rPr lang="en-US" altLang="ko-KR" dirty="0"/>
+              <a:t>] [</a:t>
+            </a:r>
+            <a:r>
+              <a:rPr lang="ko-KR" altLang="en-US" dirty="0"/>
+              <a:t>자 </a:t>
+            </a:r>
+            <a:r>
+              <a:rPr lang="ko-KR" altLang="en-US" dirty="0" err="1"/>
+              <a:t>볷</a:t>
+            </a:r>
+            <a:r>
+              <a:rPr lang="en-US" altLang="ko-KR" dirty="0"/>
+              <a:t>]</a:t>
+            </a:r>
+            <a:r>
+              <a:rPr lang="ko-KR" altLang="en-US" dirty="0"/>
+              <a:t> </a:t>
+            </a:r>
+            <a:r>
+              <a:rPr lang="en-US" altLang="ko-KR" dirty="0"/>
+              <a:t>[</a:t>
+            </a:r>
+            <a:r>
+              <a:rPr lang="ko-KR" altLang="en-US" dirty="0"/>
+              <a:t>자 </a:t>
+            </a:r>
+            <a:r>
+              <a:rPr lang="ko-KR" altLang="en-US" dirty="0" err="1"/>
+              <a:t>볷</a:t>
+            </a:r>
+            <a:r>
+              <a:rPr lang="en-US" altLang="ko-KR" dirty="0"/>
+              <a:t>]</a:t>
+            </a:r>
+            <a:r>
+              <a:rPr lang="ko-KR" altLang="en-US" dirty="0"/>
+              <a:t> </a:t>
+            </a:r>
+            <a:r>
+              <a:rPr lang="en-US" altLang="ko-KR" dirty="0"/>
+              <a:t>[</a:t>
+            </a:r>
+            <a:r>
+              <a:rPr lang="ko-KR" altLang="en-US" dirty="0"/>
+              <a:t>자 </a:t>
+            </a:r>
+            <a:r>
+              <a:rPr lang="ko-KR" altLang="en-US" dirty="0" err="1"/>
+              <a:t>볷</a:t>
+            </a:r>
+            <a:r>
+              <a:rPr lang="en-US" altLang="ko-KR" dirty="0"/>
+              <a:t>]</a:t>
+            </a:r>
+            <a:r>
+              <a:rPr lang="ko-KR" altLang="en-US" dirty="0"/>
+              <a:t> </a:t>
+            </a:r>
+            <a:r>
+              <a:rPr lang="en-US" altLang="ko-KR" dirty="0"/>
+              <a:t>[</a:t>
+            </a:r>
+            <a:r>
+              <a:rPr lang="ko-KR" altLang="en-US" dirty="0"/>
+              <a:t>자 </a:t>
+            </a:r>
+            <a:r>
+              <a:rPr lang="ko-KR" altLang="en-US" dirty="0" err="1"/>
+              <a:t>볷</a:t>
+            </a:r>
+            <a:r>
+              <a:rPr lang="en-US" altLang="ko-KR" dirty="0"/>
+              <a:t>]</a:t>
+            </a:r>
+            <a:r>
+              <a:rPr lang="ko-KR" altLang="en-US" dirty="0"/>
+              <a:t> </a:t>
+            </a:r>
+            <a:r>
+              <a:rPr lang="en-US" altLang="ko-KR" dirty="0"/>
+              <a:t>[</a:t>
+            </a:r>
+            <a:r>
+              <a:rPr lang="ko-KR" altLang="en-US" dirty="0"/>
+              <a:t>자 </a:t>
+            </a:r>
+            <a:r>
+              <a:rPr lang="ko-KR" altLang="en-US" dirty="0" err="1"/>
+              <a:t>볷</a:t>
+            </a:r>
+            <a:r>
+              <a:rPr lang="en-US" altLang="ko-KR" dirty="0"/>
+              <a:t>] [</a:t>
+            </a:r>
+            <a:r>
+              <a:rPr lang="ko-KR" altLang="en-US" dirty="0"/>
+              <a:t>자 </a:t>
+            </a:r>
+            <a:r>
+              <a:rPr lang="ko-KR" altLang="en-US" dirty="0" err="1"/>
+              <a:t>볷</a:t>
+            </a:r>
+            <a:r>
+              <a:rPr lang="en-US" altLang="ko-KR" dirty="0"/>
+              <a:t>]</a:t>
+            </a:r>
+            <a:r>
+              <a:rPr lang="ko-KR" altLang="en-US" dirty="0"/>
+              <a:t> </a:t>
+            </a:r>
+            <a:r>
+              <a:rPr lang="en-US" altLang="ko-KR" dirty="0"/>
+              <a:t>[</a:t>
+            </a:r>
+            <a:r>
+              <a:rPr lang="ko-KR" altLang="en-US" dirty="0"/>
+              <a:t>자 </a:t>
+            </a:r>
+            <a:r>
+              <a:rPr lang="ko-KR" altLang="en-US" dirty="0" err="1"/>
+              <a:t>볷</a:t>
+            </a:r>
+            <a:r>
+              <a:rPr lang="en-US" altLang="ko-KR" dirty="0"/>
+              <a:t>]</a:t>
+            </a:r>
+            <a:r>
+              <a:rPr lang="ko-KR" altLang="en-US" dirty="0"/>
+              <a:t> </a:t>
+            </a:r>
+            <a:r>
+              <a:rPr lang="en-US" altLang="ko-KR" dirty="0"/>
+              <a:t>[</a:t>
+            </a:r>
+            <a:r>
+              <a:rPr lang="ko-KR" altLang="en-US" dirty="0"/>
+              <a:t>자 </a:t>
+            </a:r>
+            <a:r>
+              <a:rPr lang="ko-KR" altLang="en-US" dirty="0" err="1"/>
+              <a:t>볷</a:t>
+            </a:r>
+            <a:r>
+              <a:rPr lang="en-US" altLang="ko-KR" dirty="0"/>
+              <a:t>]</a:t>
+            </a:r>
+            <a:r>
+              <a:rPr lang="ko-KR" altLang="en-US" dirty="0"/>
+              <a:t> </a:t>
+            </a:r>
+            <a:r>
+              <a:rPr lang="en-US" altLang="ko-KR" dirty="0"/>
+              <a:t>[</a:t>
+            </a:r>
+            <a:r>
+              <a:rPr lang="ko-KR" altLang="en-US" dirty="0"/>
+              <a:t>자 </a:t>
+            </a:r>
+            <a:r>
+              <a:rPr lang="ko-KR" altLang="en-US" dirty="0" err="1"/>
+              <a:t>볷</a:t>
+            </a:r>
+            <a:r>
+              <a:rPr lang="en-US" altLang="ko-KR" dirty="0"/>
+              <a:t>]</a:t>
+            </a:r>
+            <a:r>
+              <a:rPr lang="ko-KR" altLang="en-US" dirty="0"/>
+              <a:t> </a:t>
+            </a:r>
+            <a:r>
+              <a:rPr lang="en-US" altLang="ko-KR" dirty="0"/>
+              <a:t>[</a:t>
+            </a:r>
+            <a:r>
+              <a:rPr lang="ko-KR" altLang="en-US" dirty="0"/>
+              <a:t>자 </a:t>
+            </a:r>
+            <a:r>
+              <a:rPr lang="ko-KR" altLang="en-US" dirty="0" err="1"/>
+              <a:t>볷</a:t>
+            </a:r>
+            <a:r>
+              <a:rPr lang="en-US" altLang="ko-KR" dirty="0"/>
+              <a:t>] [</a:t>
+            </a:r>
+            <a:r>
+              <a:rPr lang="ko-KR" altLang="en-US" dirty="0"/>
+              <a:t>자 </a:t>
+            </a:r>
+            <a:r>
+              <a:rPr lang="ko-KR" altLang="en-US" dirty="0" err="1"/>
+              <a:t>볷</a:t>
+            </a:r>
+            <a:r>
+              <a:rPr lang="en-US" altLang="ko-KR" dirty="0"/>
+              <a:t>]</a:t>
+            </a:r>
+            <a:r>
+              <a:rPr lang="ko-KR" altLang="en-US" dirty="0"/>
+              <a:t> </a:t>
+            </a:r>
+            <a:r>
+              <a:rPr lang="en-US" altLang="ko-KR" dirty="0"/>
+              <a:t>[</a:t>
+            </a:r>
+            <a:r>
+              <a:rPr lang="ko-KR" altLang="en-US" dirty="0"/>
+              <a:t>자 </a:t>
+            </a:r>
+            <a:r>
+              <a:rPr lang="ko-KR" altLang="en-US" dirty="0" err="1"/>
+              <a:t>볷</a:t>
+            </a:r>
+            <a:r>
+              <a:rPr lang="en-US" altLang="ko-KR" dirty="0"/>
+              <a:t>]</a:t>
+            </a:r>
+            <a:r>
+              <a:rPr lang="ko-KR" altLang="en-US" dirty="0"/>
+              <a:t> </a:t>
+            </a:r>
+            <a:r>
+              <a:rPr lang="en-US" altLang="ko-KR" dirty="0"/>
+              <a:t>[</a:t>
+            </a:r>
+            <a:r>
+              <a:rPr lang="ko-KR" altLang="en-US" dirty="0"/>
+              <a:t>자 </a:t>
+            </a:r>
+            <a:r>
+              <a:rPr lang="ko-KR" altLang="en-US" dirty="0" err="1"/>
+              <a:t>볷</a:t>
+            </a:r>
+            <a:r>
+              <a:rPr lang="en-US" altLang="ko-KR" dirty="0"/>
+              <a:t>]</a:t>
+            </a:r>
+            <a:r>
+              <a:rPr lang="ko-KR" altLang="en-US" dirty="0"/>
+              <a:t> </a:t>
+            </a:r>
+            <a:r>
+              <a:rPr lang="en-US" altLang="ko-KR" dirty="0"/>
+              <a:t>[</a:t>
+            </a:r>
+            <a:r>
+              <a:rPr lang="ko-KR" altLang="en-US" dirty="0"/>
+              <a:t>자 </a:t>
+            </a:r>
+            <a:r>
+              <a:rPr lang="ko-KR" altLang="en-US" dirty="0" err="1"/>
+              <a:t>볷</a:t>
+            </a:r>
+            <a:r>
+              <a:rPr lang="en-US" altLang="ko-KR" dirty="0"/>
+              <a:t>]</a:t>
+            </a:r>
+            <a:r>
+              <a:rPr lang="ko-KR" altLang="en-US" dirty="0"/>
+              <a:t> </a:t>
+            </a:r>
+            <a:r>
+              <a:rPr lang="en-US" altLang="ko-KR" dirty="0"/>
+              <a:t>[</a:t>
+            </a:r>
+            <a:r>
+              <a:rPr lang="ko-KR" altLang="en-US" dirty="0"/>
+              <a:t>자 </a:t>
+            </a:r>
+            <a:r>
+              <a:rPr lang="ko-KR" altLang="en-US" dirty="0" err="1"/>
+              <a:t>볷</a:t>
+            </a:r>
+            <a:r>
+              <a:rPr lang="en-US" altLang="ko-KR" dirty="0"/>
+              <a:t>] [</a:t>
+            </a:r>
+            <a:r>
+              <a:rPr lang="ko-KR" altLang="en-US" dirty="0"/>
+              <a:t>자 </a:t>
+            </a:r>
+            <a:r>
+              <a:rPr lang="ko-KR" altLang="en-US" dirty="0" err="1"/>
+              <a:t>볷</a:t>
+            </a:r>
+            <a:r>
+              <a:rPr lang="en-US" altLang="ko-KR" dirty="0"/>
+              <a:t>]</a:t>
+            </a:r>
+            <a:r>
+              <a:rPr lang="ko-KR" altLang="en-US" dirty="0"/>
+              <a:t> </a:t>
+            </a:r>
+            <a:r>
+              <a:rPr lang="en-US" altLang="ko-KR" dirty="0"/>
+              <a:t>[</a:t>
+            </a:r>
+            <a:r>
+              <a:rPr lang="ko-KR" altLang="en-US" dirty="0"/>
+              <a:t>자 </a:t>
+            </a:r>
+            <a:r>
+              <a:rPr lang="ko-KR" altLang="en-US" dirty="0" err="1"/>
+              <a:t>볷</a:t>
+            </a:r>
+            <a:r>
+              <a:rPr lang="en-US" altLang="ko-KR" dirty="0"/>
+              <a:t>]</a:t>
+            </a:r>
+            <a:r>
+              <a:rPr lang="ko-KR" altLang="en-US" dirty="0"/>
+              <a:t> </a:t>
+            </a:r>
+            <a:r>
+              <a:rPr lang="en-US" altLang="ko-KR" dirty="0"/>
+              <a:t>[</a:t>
+            </a:r>
+            <a:r>
+              <a:rPr lang="ko-KR" altLang="en-US" dirty="0"/>
+              <a:t>자 </a:t>
+            </a:r>
+            <a:r>
+              <a:rPr lang="ko-KR" altLang="en-US" dirty="0" err="1"/>
+              <a:t>볷</a:t>
+            </a:r>
+            <a:r>
+              <a:rPr lang="en-US" altLang="ko-KR" dirty="0"/>
+              <a:t>]</a:t>
+            </a:r>
+            <a:r>
+              <a:rPr lang="ko-KR" altLang="en-US" dirty="0"/>
+              <a:t> </a:t>
+            </a:r>
+            <a:r>
+              <a:rPr lang="en-US" altLang="ko-KR" dirty="0"/>
+              <a:t>[</a:t>
+            </a:r>
+            <a:r>
+              <a:rPr lang="ko-KR" altLang="en-US" dirty="0"/>
+              <a:t>자 </a:t>
+            </a:r>
+            <a:r>
+              <a:rPr lang="ko-KR" altLang="en-US" dirty="0" err="1"/>
+              <a:t>볷</a:t>
+            </a:r>
+            <a:r>
+              <a:rPr lang="en-US" altLang="ko-KR" dirty="0"/>
+              <a:t>]</a:t>
+            </a:r>
+            <a:r>
+              <a:rPr lang="ko-KR" altLang="en-US" dirty="0"/>
+              <a:t> </a:t>
+            </a:r>
+            <a:r>
+              <a:rPr lang="en-US" altLang="ko-KR" dirty="0"/>
+              <a:t>[</a:t>
+            </a:r>
+            <a:r>
+              <a:rPr lang="ko-KR" altLang="en-US" dirty="0"/>
+              <a:t>자 </a:t>
+            </a:r>
+            <a:r>
+              <a:rPr lang="ko-KR" altLang="en-US" dirty="0" err="1"/>
+              <a:t>볷</a:t>
+            </a:r>
+            <a:r>
+              <a:rPr lang="en-US" altLang="ko-KR" dirty="0"/>
+              <a:t>] [</a:t>
+            </a:r>
+            <a:r>
+              <a:rPr lang="ko-KR" altLang="en-US" dirty="0"/>
+              <a:t>자 </a:t>
+            </a:r>
+            <a:r>
+              <a:rPr lang="ko-KR" altLang="en-US" dirty="0" err="1"/>
+              <a:t>볷</a:t>
+            </a:r>
+            <a:r>
+              <a:rPr lang="en-US" altLang="ko-KR" dirty="0"/>
+              <a:t>] [</a:t>
+            </a:r>
+            <a:r>
+              <a:rPr lang="ko-KR" altLang="en-US" dirty="0"/>
+              <a:t>자 </a:t>
+            </a:r>
+            <a:r>
+              <a:rPr lang="ko-KR" altLang="en-US" dirty="0" err="1"/>
+              <a:t>볷</a:t>
+            </a:r>
+            <a:r>
+              <a:rPr lang="en-US" altLang="ko-KR" dirty="0"/>
+              <a:t>]</a:t>
+            </a:r>
+            <a:endParaRPr lang="en-US" dirty="0"/>
+          </a:p>
+        </p:txBody>
+      </p:sp>
+    </p:spTree>
+    <p:extLst>
+      <p:ext uri="{BB962C8B-B14F-4D97-AF65-F5344CB8AC3E}">
+        <p14:creationId xmlns:p14="http://schemas.microsoft.com/office/powerpoint/2010/main" val="1065442106"/>
       </p:ext>
     </p:extLst>
   </p:cSld>

</xml_diff>

<commit_message>
added writer to home page
</commit_message>
<xml_diff>
--- a/prototypes.pptx
+++ b/prototypes.pptx
@@ -10,6 +10,7 @@
     <p:sldId id="260" r:id="rId4"/>
     <p:sldId id="259" r:id="rId5"/>
     <p:sldId id="262" r:id="rId6"/>
+    <p:sldId id="263" r:id="rId7"/>
   </p:sldIdLst>
   <p:sldSz cx="12192000" cy="6858000"/>
   <p:notesSz cx="6858000" cy="9144000"/>
@@ -263,7 +264,7 @@
           <a:p>
             <a:fld id="{1B239388-45FC-456E-8776-854E70FB4B9B}" type="datetimeFigureOut">
               <a:rPr lang="en-US" smtClean="0"/>
-              <a:t>5/19/2024</a:t>
+              <a:t>5/21/2024</a:t>
             </a:fld>
             <a:endParaRPr lang="en-US"/>
           </a:p>
@@ -461,7 +462,7 @@
           <a:p>
             <a:fld id="{1B239388-45FC-456E-8776-854E70FB4B9B}" type="datetimeFigureOut">
               <a:rPr lang="en-US" smtClean="0"/>
-              <a:t>5/19/2024</a:t>
+              <a:t>5/21/2024</a:t>
             </a:fld>
             <a:endParaRPr lang="en-US"/>
           </a:p>
@@ -669,7 +670,7 @@
           <a:p>
             <a:fld id="{1B239388-45FC-456E-8776-854E70FB4B9B}" type="datetimeFigureOut">
               <a:rPr lang="en-US" smtClean="0"/>
-              <a:t>5/19/2024</a:t>
+              <a:t>5/21/2024</a:t>
             </a:fld>
             <a:endParaRPr lang="en-US"/>
           </a:p>
@@ -867,7 +868,7 @@
           <a:p>
             <a:fld id="{1B239388-45FC-456E-8776-854E70FB4B9B}" type="datetimeFigureOut">
               <a:rPr lang="en-US" smtClean="0"/>
-              <a:t>5/19/2024</a:t>
+              <a:t>5/21/2024</a:t>
             </a:fld>
             <a:endParaRPr lang="en-US"/>
           </a:p>
@@ -1142,7 +1143,7 @@
           <a:p>
             <a:fld id="{1B239388-45FC-456E-8776-854E70FB4B9B}" type="datetimeFigureOut">
               <a:rPr lang="en-US" smtClean="0"/>
-              <a:t>5/19/2024</a:t>
+              <a:t>5/21/2024</a:t>
             </a:fld>
             <a:endParaRPr lang="en-US"/>
           </a:p>
@@ -1407,7 +1408,7 @@
           <a:p>
             <a:fld id="{1B239388-45FC-456E-8776-854E70FB4B9B}" type="datetimeFigureOut">
               <a:rPr lang="en-US" smtClean="0"/>
-              <a:t>5/19/2024</a:t>
+              <a:t>5/21/2024</a:t>
             </a:fld>
             <a:endParaRPr lang="en-US"/>
           </a:p>
@@ -1819,7 +1820,7 @@
           <a:p>
             <a:fld id="{1B239388-45FC-456E-8776-854E70FB4B9B}" type="datetimeFigureOut">
               <a:rPr lang="en-US" smtClean="0"/>
-              <a:t>5/19/2024</a:t>
+              <a:t>5/21/2024</a:t>
             </a:fld>
             <a:endParaRPr lang="en-US"/>
           </a:p>
@@ -1960,7 +1961,7 @@
           <a:p>
             <a:fld id="{1B239388-45FC-456E-8776-854E70FB4B9B}" type="datetimeFigureOut">
               <a:rPr lang="en-US" smtClean="0"/>
-              <a:t>5/19/2024</a:t>
+              <a:t>5/21/2024</a:t>
             </a:fld>
             <a:endParaRPr lang="en-US"/>
           </a:p>
@@ -2073,7 +2074,7 @@
           <a:p>
             <a:fld id="{1B239388-45FC-456E-8776-854E70FB4B9B}" type="datetimeFigureOut">
               <a:rPr lang="en-US" smtClean="0"/>
-              <a:t>5/19/2024</a:t>
+              <a:t>5/21/2024</a:t>
             </a:fld>
             <a:endParaRPr lang="en-US"/>
           </a:p>
@@ -2384,7 +2385,7 @@
           <a:p>
             <a:fld id="{1B239388-45FC-456E-8776-854E70FB4B9B}" type="datetimeFigureOut">
               <a:rPr lang="en-US" smtClean="0"/>
-              <a:t>5/19/2024</a:t>
+              <a:t>5/21/2024</a:t>
             </a:fld>
             <a:endParaRPr lang="en-US"/>
           </a:p>
@@ -2672,7 +2673,7 @@
           <a:p>
             <a:fld id="{1B239388-45FC-456E-8776-854E70FB4B9B}" type="datetimeFigureOut">
               <a:rPr lang="en-US" smtClean="0"/>
-              <a:t>5/19/2024</a:t>
+              <a:t>5/21/2024</a:t>
             </a:fld>
             <a:endParaRPr lang="en-US"/>
           </a:p>
@@ -2913,7 +2914,7 @@
           <a:p>
             <a:fld id="{1B239388-45FC-456E-8776-854E70FB4B9B}" type="datetimeFigureOut">
               <a:rPr lang="en-US" smtClean="0"/>
-              <a:t>5/19/2024</a:t>
+              <a:t>5/21/2024</a:t>
             </a:fld>
             <a:endParaRPr lang="en-US"/>
           </a:p>
@@ -7733,6 +7734,1461 @@
     <p:extLst>
       <p:ext uri="{BB962C8B-B14F-4D97-AF65-F5344CB8AC3E}">
         <p14:creationId xmlns:p14="http://schemas.microsoft.com/office/powerpoint/2010/main" val="1065442106"/>
+      </p:ext>
+    </p:extLst>
+  </p:cSld>
+  <p:clrMapOvr>
+    <a:masterClrMapping/>
+  </p:clrMapOvr>
+</p:sld>
+</file>
+
+<file path=ppt/slides/slide6.xml><?xml version="1.0" encoding="utf-8"?>
+<p:sld xmlns:a="http://schemas.openxmlformats.org/drawingml/2006/main" xmlns:r="http://schemas.openxmlformats.org/officeDocument/2006/relationships" xmlns:p="http://schemas.openxmlformats.org/presentationml/2006/main">
+  <p:cSld>
+    <p:spTree>
+      <p:nvGrpSpPr>
+        <p:cNvPr id="1" name=""/>
+        <p:cNvGrpSpPr/>
+        <p:nvPr/>
+      </p:nvGrpSpPr>
+      <p:grpSpPr>
+        <a:xfrm>
+          <a:off x="0" y="0"/>
+          <a:ext cx="0" cy="0"/>
+          <a:chOff x="0" y="0"/>
+          <a:chExt cx="0" cy="0"/>
+        </a:xfrm>
+      </p:grpSpPr>
+      <p:sp>
+        <p:nvSpPr>
+          <p:cNvPr id="5" name="Rectangle 4">
+            <a:extLst>
+              <a:ext uri="{FF2B5EF4-FFF2-40B4-BE49-F238E27FC236}">
+                <a16:creationId xmlns:a16="http://schemas.microsoft.com/office/drawing/2014/main" id="{52697334-8E7B-D2AA-EDE4-70E335350FA1}"/>
+              </a:ext>
+            </a:extLst>
+          </p:cNvPr>
+          <p:cNvSpPr/>
+          <p:nvPr/>
+        </p:nvSpPr>
+        <p:spPr>
+          <a:xfrm>
+            <a:off x="0" y="40307"/>
+            <a:ext cx="12191998" cy="980036"/>
+          </a:xfrm>
+          <a:prstGeom prst="rect">
+            <a:avLst/>
+          </a:prstGeom>
+          <a:solidFill>
+            <a:schemeClr val="tx1">
+              <a:lumMod val="75000"/>
+              <a:lumOff val="25000"/>
+            </a:schemeClr>
+          </a:solidFill>
+        </p:spPr>
+        <p:style>
+          <a:lnRef idx="2">
+            <a:schemeClr val="accent1">
+              <a:shade val="15000"/>
+            </a:schemeClr>
+          </a:lnRef>
+          <a:fillRef idx="1">
+            <a:schemeClr val="accent1"/>
+          </a:fillRef>
+          <a:effectRef idx="0">
+            <a:schemeClr val="accent1"/>
+          </a:effectRef>
+          <a:fontRef idx="minor">
+            <a:schemeClr val="lt1"/>
+          </a:fontRef>
+        </p:style>
+        <p:txBody>
+          <a:bodyPr rtlCol="0" anchor="ctr"/>
+          <a:lstStyle/>
+          <a:p>
+            <a:pPr algn="ctr"/>
+            <a:endParaRPr lang="en-US"/>
+          </a:p>
+        </p:txBody>
+      </p:sp>
+      <p:sp>
+        <p:nvSpPr>
+          <p:cNvPr id="9" name="Rectangle 8">
+            <a:extLst>
+              <a:ext uri="{FF2B5EF4-FFF2-40B4-BE49-F238E27FC236}">
+                <a16:creationId xmlns:a16="http://schemas.microsoft.com/office/drawing/2014/main" id="{28087533-1F7D-9658-751E-64415D77BB1F}"/>
+              </a:ext>
+            </a:extLst>
+          </p:cNvPr>
+          <p:cNvSpPr/>
+          <p:nvPr/>
+        </p:nvSpPr>
+        <p:spPr>
+          <a:xfrm>
+            <a:off x="9444391" y="194265"/>
+            <a:ext cx="644992" cy="761613"/>
+          </a:xfrm>
+          <a:prstGeom prst="rect">
+            <a:avLst/>
+          </a:prstGeom>
+          <a:solidFill>
+            <a:schemeClr val="accent3">
+              <a:lumMod val="50000"/>
+            </a:schemeClr>
+          </a:solidFill>
+        </p:spPr>
+        <p:style>
+          <a:lnRef idx="2">
+            <a:schemeClr val="accent1">
+              <a:shade val="15000"/>
+            </a:schemeClr>
+          </a:lnRef>
+          <a:fillRef idx="1">
+            <a:schemeClr val="accent1"/>
+          </a:fillRef>
+          <a:effectRef idx="0">
+            <a:schemeClr val="accent1"/>
+          </a:effectRef>
+          <a:fontRef idx="minor">
+            <a:schemeClr val="lt1"/>
+          </a:fontRef>
+        </p:style>
+        <p:txBody>
+          <a:bodyPr rtlCol="0" anchor="ctr"/>
+          <a:lstStyle/>
+          <a:p>
+            <a:pPr algn="ctr"/>
+            <a:endParaRPr lang="en-US"/>
+          </a:p>
+        </p:txBody>
+      </p:sp>
+      <p:sp>
+        <p:nvSpPr>
+          <p:cNvPr id="6" name="TextBox 5">
+            <a:extLst>
+              <a:ext uri="{FF2B5EF4-FFF2-40B4-BE49-F238E27FC236}">
+                <a16:creationId xmlns:a16="http://schemas.microsoft.com/office/drawing/2014/main" id="{B3BC02BD-4890-0DE1-60D2-3A0298E54D01}"/>
+              </a:ext>
+            </a:extLst>
+          </p:cNvPr>
+          <p:cNvSpPr txBox="1"/>
+          <p:nvPr/>
+        </p:nvSpPr>
+        <p:spPr>
+          <a:xfrm>
+            <a:off x="9455093" y="260755"/>
+            <a:ext cx="838874" cy="584775"/>
+          </a:xfrm>
+          <a:prstGeom prst="rect">
+            <a:avLst/>
+          </a:prstGeom>
+          <a:noFill/>
+        </p:spPr>
+        <p:txBody>
+          <a:bodyPr wrap="square" rtlCol="0">
+            <a:spAutoFit/>
+          </a:bodyPr>
+          <a:lstStyle/>
+          <a:p>
+            <a:r>
+              <a:rPr lang="ko-KR" altLang="en-US" sz="3200" dirty="0">
+                <a:solidFill>
+                  <a:schemeClr val="bg1"/>
+                </a:solidFill>
+              </a:rPr>
+              <a:t>한 </a:t>
+            </a:r>
+            <a:endParaRPr lang="en-US" sz="3200" dirty="0">
+              <a:solidFill>
+                <a:schemeClr val="bg1"/>
+              </a:solidFill>
+            </a:endParaRPr>
+          </a:p>
+        </p:txBody>
+      </p:sp>
+      <p:sp>
+        <p:nvSpPr>
+          <p:cNvPr id="10" name="Rectangle 9">
+            <a:extLst>
+              <a:ext uri="{FF2B5EF4-FFF2-40B4-BE49-F238E27FC236}">
+                <a16:creationId xmlns:a16="http://schemas.microsoft.com/office/drawing/2014/main" id="{0695E935-8227-678B-690B-D4BE40D28E27}"/>
+              </a:ext>
+            </a:extLst>
+          </p:cNvPr>
+          <p:cNvSpPr/>
+          <p:nvPr/>
+        </p:nvSpPr>
+        <p:spPr>
+          <a:xfrm>
+            <a:off x="10293968" y="194265"/>
+            <a:ext cx="644992" cy="761613"/>
+          </a:xfrm>
+          <a:prstGeom prst="rect">
+            <a:avLst/>
+          </a:prstGeom>
+          <a:solidFill>
+            <a:schemeClr val="accent1">
+              <a:lumMod val="50000"/>
+            </a:schemeClr>
+          </a:solidFill>
+        </p:spPr>
+        <p:style>
+          <a:lnRef idx="2">
+            <a:schemeClr val="accent1">
+              <a:shade val="15000"/>
+            </a:schemeClr>
+          </a:lnRef>
+          <a:fillRef idx="1">
+            <a:schemeClr val="accent1"/>
+          </a:fillRef>
+          <a:effectRef idx="0">
+            <a:schemeClr val="accent1"/>
+          </a:effectRef>
+          <a:fontRef idx="minor">
+            <a:schemeClr val="lt1"/>
+          </a:fontRef>
+        </p:style>
+        <p:txBody>
+          <a:bodyPr rtlCol="0" anchor="ctr"/>
+          <a:lstStyle/>
+          <a:p>
+            <a:pPr algn="ctr"/>
+            <a:endParaRPr lang="en-US"/>
+          </a:p>
+        </p:txBody>
+      </p:sp>
+      <p:sp>
+        <p:nvSpPr>
+          <p:cNvPr id="7" name="TextBox 6">
+            <a:extLst>
+              <a:ext uri="{FF2B5EF4-FFF2-40B4-BE49-F238E27FC236}">
+                <a16:creationId xmlns:a16="http://schemas.microsoft.com/office/drawing/2014/main" id="{B0F7C8A7-FDFB-4E80-A5EF-27754D0C1BB2}"/>
+              </a:ext>
+            </a:extLst>
+          </p:cNvPr>
+          <p:cNvSpPr txBox="1"/>
+          <p:nvPr/>
+        </p:nvSpPr>
+        <p:spPr>
+          <a:xfrm>
+            <a:off x="10325343" y="282685"/>
+            <a:ext cx="1472349" cy="584775"/>
+          </a:xfrm>
+          <a:prstGeom prst="rect">
+            <a:avLst/>
+          </a:prstGeom>
+          <a:noFill/>
+        </p:spPr>
+        <p:txBody>
+          <a:bodyPr wrap="square" rtlCol="0">
+            <a:spAutoFit/>
+          </a:bodyPr>
+          <a:lstStyle/>
+          <a:p>
+            <a:r>
+              <a:rPr lang="ko-KR" altLang="en-US" sz="3200" b="1" dirty="0">
+                <a:solidFill>
+                  <a:schemeClr val="bg1"/>
+                </a:solidFill>
+                <a:effectLst/>
+              </a:rPr>
+              <a:t>漢</a:t>
+            </a:r>
+            <a:r>
+              <a:rPr lang="ko-KR" altLang="en-US" sz="3200" dirty="0">
+                <a:solidFill>
+                  <a:schemeClr val="bg1"/>
+                </a:solidFill>
+              </a:rPr>
+              <a:t> </a:t>
+            </a:r>
+            <a:endParaRPr lang="en-US" sz="3200" dirty="0">
+              <a:solidFill>
+                <a:schemeClr val="bg1"/>
+              </a:solidFill>
+            </a:endParaRPr>
+          </a:p>
+        </p:txBody>
+      </p:sp>
+      <p:sp>
+        <p:nvSpPr>
+          <p:cNvPr id="12" name="Rectangle 11">
+            <a:extLst>
+              <a:ext uri="{FF2B5EF4-FFF2-40B4-BE49-F238E27FC236}">
+                <a16:creationId xmlns:a16="http://schemas.microsoft.com/office/drawing/2014/main" id="{D684C88E-CD31-8262-0986-4BD5D89D446F}"/>
+              </a:ext>
+            </a:extLst>
+          </p:cNvPr>
+          <p:cNvSpPr/>
+          <p:nvPr/>
+        </p:nvSpPr>
+        <p:spPr>
+          <a:xfrm>
+            <a:off x="11117940" y="155969"/>
+            <a:ext cx="1017636" cy="761613"/>
+          </a:xfrm>
+          <a:prstGeom prst="rect">
+            <a:avLst/>
+          </a:prstGeom>
+          <a:solidFill>
+            <a:schemeClr val="accent5">
+              <a:lumMod val="50000"/>
+            </a:schemeClr>
+          </a:solidFill>
+        </p:spPr>
+        <p:style>
+          <a:lnRef idx="2">
+            <a:schemeClr val="accent1">
+              <a:shade val="15000"/>
+            </a:schemeClr>
+          </a:lnRef>
+          <a:fillRef idx="1">
+            <a:schemeClr val="accent1"/>
+          </a:fillRef>
+          <a:effectRef idx="0">
+            <a:schemeClr val="accent1"/>
+          </a:effectRef>
+          <a:fontRef idx="minor">
+            <a:schemeClr val="lt1"/>
+          </a:fontRef>
+        </p:style>
+        <p:txBody>
+          <a:bodyPr rtlCol="0" anchor="ctr"/>
+          <a:lstStyle/>
+          <a:p>
+            <a:pPr algn="ctr"/>
+            <a:endParaRPr lang="en-US"/>
+          </a:p>
+        </p:txBody>
+      </p:sp>
+      <p:sp>
+        <p:nvSpPr>
+          <p:cNvPr id="11" name="TextBox 10">
+            <a:extLst>
+              <a:ext uri="{FF2B5EF4-FFF2-40B4-BE49-F238E27FC236}">
+                <a16:creationId xmlns:a16="http://schemas.microsoft.com/office/drawing/2014/main" id="{0211BA4F-BCC3-F55D-6C00-A167EBDA1BF4}"/>
+              </a:ext>
+            </a:extLst>
+          </p:cNvPr>
+          <p:cNvSpPr txBox="1"/>
+          <p:nvPr/>
+        </p:nvSpPr>
+        <p:spPr>
+          <a:xfrm>
+            <a:off x="11129634" y="282685"/>
+            <a:ext cx="1589446" cy="584775"/>
+          </a:xfrm>
+          <a:prstGeom prst="rect">
+            <a:avLst/>
+          </a:prstGeom>
+          <a:noFill/>
+        </p:spPr>
+        <p:txBody>
+          <a:bodyPr wrap="square" rtlCol="0">
+            <a:spAutoFit/>
+          </a:bodyPr>
+          <a:lstStyle/>
+          <a:p>
+            <a:r>
+              <a:rPr lang="ko-KR" altLang="en-US" sz="3200" dirty="0">
+                <a:solidFill>
+                  <a:schemeClr val="bg1"/>
+                </a:solidFill>
+              </a:rPr>
+              <a:t>연습 </a:t>
+            </a:r>
+            <a:endParaRPr lang="en-US" sz="3200" dirty="0">
+              <a:solidFill>
+                <a:schemeClr val="bg1"/>
+              </a:solidFill>
+            </a:endParaRPr>
+          </a:p>
+        </p:txBody>
+      </p:sp>
+      <p:sp>
+        <p:nvSpPr>
+          <p:cNvPr id="13" name="TextBox 12">
+            <a:extLst>
+              <a:ext uri="{FF2B5EF4-FFF2-40B4-BE49-F238E27FC236}">
+                <a16:creationId xmlns:a16="http://schemas.microsoft.com/office/drawing/2014/main" id="{4C8B326B-FDB0-4A10-31E8-96378A71D0B4}"/>
+              </a:ext>
+            </a:extLst>
+          </p:cNvPr>
+          <p:cNvSpPr txBox="1"/>
+          <p:nvPr/>
+        </p:nvSpPr>
+        <p:spPr>
+          <a:xfrm>
+            <a:off x="119140" y="269260"/>
+            <a:ext cx="2447998" cy="584775"/>
+          </a:xfrm>
+          <a:prstGeom prst="rect">
+            <a:avLst/>
+          </a:prstGeom>
+          <a:noFill/>
+        </p:spPr>
+        <p:txBody>
+          <a:bodyPr wrap="square" rtlCol="0">
+            <a:spAutoFit/>
+          </a:bodyPr>
+          <a:lstStyle/>
+          <a:p>
+            <a:r>
+              <a:rPr lang="ko-KR" altLang="en-US" sz="3200" dirty="0">
+                <a:solidFill>
+                  <a:schemeClr val="bg1"/>
+                </a:solidFill>
+              </a:rPr>
+              <a:t>한국어사전 </a:t>
+            </a:r>
+            <a:endParaRPr lang="en-US" sz="3200" dirty="0">
+              <a:solidFill>
+                <a:schemeClr val="bg1"/>
+              </a:solidFill>
+            </a:endParaRPr>
+          </a:p>
+        </p:txBody>
+      </p:sp>
+      <p:sp>
+        <p:nvSpPr>
+          <p:cNvPr id="14" name="Rectangle 13">
+            <a:extLst>
+              <a:ext uri="{FF2B5EF4-FFF2-40B4-BE49-F238E27FC236}">
+                <a16:creationId xmlns:a16="http://schemas.microsoft.com/office/drawing/2014/main" id="{01B3002A-D154-02FB-3F8F-2D0259328CB6}"/>
+              </a:ext>
+            </a:extLst>
+          </p:cNvPr>
+          <p:cNvSpPr/>
+          <p:nvPr/>
+        </p:nvSpPr>
+        <p:spPr>
+          <a:xfrm>
+            <a:off x="2662971" y="216008"/>
+            <a:ext cx="3416915" cy="628633"/>
+          </a:xfrm>
+          <a:prstGeom prst="rect">
+            <a:avLst/>
+          </a:prstGeom>
+          <a:solidFill>
+            <a:schemeClr val="bg2">
+              <a:lumMod val="75000"/>
+            </a:schemeClr>
+          </a:solidFill>
+        </p:spPr>
+        <p:style>
+          <a:lnRef idx="2">
+            <a:schemeClr val="accent1">
+              <a:shade val="15000"/>
+            </a:schemeClr>
+          </a:lnRef>
+          <a:fillRef idx="1">
+            <a:schemeClr val="accent1"/>
+          </a:fillRef>
+          <a:effectRef idx="0">
+            <a:schemeClr val="accent1"/>
+          </a:effectRef>
+          <a:fontRef idx="minor">
+            <a:schemeClr val="lt1"/>
+          </a:fontRef>
+        </p:style>
+        <p:txBody>
+          <a:bodyPr rtlCol="0" anchor="ctr"/>
+          <a:lstStyle/>
+          <a:p>
+            <a:pPr algn="ctr"/>
+            <a:endParaRPr lang="en-US"/>
+          </a:p>
+        </p:txBody>
+      </p:sp>
+      <p:sp>
+        <p:nvSpPr>
+          <p:cNvPr id="16" name="TextBox 15">
+            <a:extLst>
+              <a:ext uri="{FF2B5EF4-FFF2-40B4-BE49-F238E27FC236}">
+                <a16:creationId xmlns:a16="http://schemas.microsoft.com/office/drawing/2014/main" id="{175B4C17-22FA-F2F7-1335-24F7E865E574}"/>
+              </a:ext>
+            </a:extLst>
+          </p:cNvPr>
+          <p:cNvSpPr txBox="1"/>
+          <p:nvPr/>
+        </p:nvSpPr>
+        <p:spPr>
+          <a:xfrm>
+            <a:off x="2664110" y="282685"/>
+            <a:ext cx="1261884" cy="523220"/>
+          </a:xfrm>
+          <a:prstGeom prst="rect">
+            <a:avLst/>
+          </a:prstGeom>
+          <a:noFill/>
+        </p:spPr>
+        <p:txBody>
+          <a:bodyPr wrap="none" rtlCol="0">
+            <a:spAutoFit/>
+          </a:bodyPr>
+          <a:lstStyle/>
+          <a:p>
+            <a:r>
+              <a:rPr lang="ko-KR" altLang="en-US" sz="2800" dirty="0"/>
+              <a:t>검색어</a:t>
+            </a:r>
+            <a:endParaRPr lang="en-US" sz="2800" dirty="0"/>
+          </a:p>
+        </p:txBody>
+      </p:sp>
+      <p:sp>
+        <p:nvSpPr>
+          <p:cNvPr id="2" name="Rectangle 1">
+            <a:extLst>
+              <a:ext uri="{FF2B5EF4-FFF2-40B4-BE49-F238E27FC236}">
+                <a16:creationId xmlns:a16="http://schemas.microsoft.com/office/drawing/2014/main" id="{4A71A0B3-62AF-A77E-89A3-0FA3C2979672}"/>
+              </a:ext>
+            </a:extLst>
+          </p:cNvPr>
+          <p:cNvSpPr/>
+          <p:nvPr/>
+        </p:nvSpPr>
+        <p:spPr>
+          <a:xfrm>
+            <a:off x="5442042" y="237938"/>
+            <a:ext cx="634885" cy="584775"/>
+          </a:xfrm>
+          <a:prstGeom prst="rect">
+            <a:avLst/>
+          </a:prstGeom>
+          <a:solidFill>
+            <a:schemeClr val="tx2">
+              <a:lumMod val="25000"/>
+              <a:lumOff val="75000"/>
+            </a:schemeClr>
+          </a:solidFill>
+        </p:spPr>
+        <p:style>
+          <a:lnRef idx="2">
+            <a:schemeClr val="accent1">
+              <a:shade val="15000"/>
+            </a:schemeClr>
+          </a:lnRef>
+          <a:fillRef idx="1">
+            <a:schemeClr val="accent1"/>
+          </a:fillRef>
+          <a:effectRef idx="0">
+            <a:schemeClr val="accent1"/>
+          </a:effectRef>
+          <a:fontRef idx="minor">
+            <a:schemeClr val="lt1"/>
+          </a:fontRef>
+        </p:style>
+        <p:txBody>
+          <a:bodyPr rtlCol="0" anchor="ctr"/>
+          <a:lstStyle/>
+          <a:p>
+            <a:pPr algn="ctr"/>
+            <a:endParaRPr lang="en-US"/>
+          </a:p>
+        </p:txBody>
+      </p:sp>
+      <p:sp>
+        <p:nvSpPr>
+          <p:cNvPr id="8" name="Isosceles Triangle 7">
+            <a:extLst>
+              <a:ext uri="{FF2B5EF4-FFF2-40B4-BE49-F238E27FC236}">
+                <a16:creationId xmlns:a16="http://schemas.microsoft.com/office/drawing/2014/main" id="{866D4D09-1ADF-2E91-5DBB-D2922EBFC4AE}"/>
+              </a:ext>
+            </a:extLst>
+          </p:cNvPr>
+          <p:cNvSpPr/>
+          <p:nvPr/>
+        </p:nvSpPr>
+        <p:spPr>
+          <a:xfrm rot="10800000">
+            <a:off x="5581087" y="378791"/>
+            <a:ext cx="356794" cy="331007"/>
+          </a:xfrm>
+          <a:prstGeom prst="triangle">
+            <a:avLst/>
+          </a:prstGeom>
+          <a:solidFill>
+            <a:schemeClr val="accent1">
+              <a:lumMod val="40000"/>
+              <a:lumOff val="60000"/>
+            </a:schemeClr>
+          </a:solidFill>
+        </p:spPr>
+        <p:style>
+          <a:lnRef idx="2">
+            <a:schemeClr val="accent1">
+              <a:shade val="15000"/>
+            </a:schemeClr>
+          </a:lnRef>
+          <a:fillRef idx="1">
+            <a:schemeClr val="accent1"/>
+          </a:fillRef>
+          <a:effectRef idx="0">
+            <a:schemeClr val="accent1"/>
+          </a:effectRef>
+          <a:fontRef idx="minor">
+            <a:schemeClr val="lt1"/>
+          </a:fontRef>
+        </p:style>
+        <p:txBody>
+          <a:bodyPr rtlCol="0" anchor="ctr"/>
+          <a:lstStyle/>
+          <a:p>
+            <a:pPr algn="ctr"/>
+            <a:endParaRPr lang="en-US"/>
+          </a:p>
+        </p:txBody>
+      </p:sp>
+      <p:cxnSp>
+        <p:nvCxnSpPr>
+          <p:cNvPr id="18" name="Straight Connector 17">
+            <a:extLst>
+              <a:ext uri="{FF2B5EF4-FFF2-40B4-BE49-F238E27FC236}">
+                <a16:creationId xmlns:a16="http://schemas.microsoft.com/office/drawing/2014/main" id="{7E0FFF9C-95B7-B4F5-0432-249FB59C5342}"/>
+              </a:ext>
+            </a:extLst>
+          </p:cNvPr>
+          <p:cNvCxnSpPr>
+            <a:cxnSpLocks/>
+            <a:endCxn id="5" idx="2"/>
+          </p:cNvCxnSpPr>
+          <p:nvPr/>
+        </p:nvCxnSpPr>
+        <p:spPr>
+          <a:xfrm flipH="1" flipV="1">
+            <a:off x="6095999" y="1020343"/>
+            <a:ext cx="1" cy="5837658"/>
+          </a:xfrm>
+          <a:prstGeom prst="line">
+            <a:avLst/>
+          </a:prstGeom>
+        </p:spPr>
+        <p:style>
+          <a:lnRef idx="2">
+            <a:schemeClr val="accent1"/>
+          </a:lnRef>
+          <a:fillRef idx="0">
+            <a:schemeClr val="accent1"/>
+          </a:fillRef>
+          <a:effectRef idx="1">
+            <a:schemeClr val="accent1"/>
+          </a:effectRef>
+          <a:fontRef idx="minor">
+            <a:schemeClr val="tx1"/>
+          </a:fontRef>
+        </p:style>
+      </p:cxnSp>
+      <p:sp>
+        <p:nvSpPr>
+          <p:cNvPr id="32" name="Rectangle 31">
+            <a:extLst>
+              <a:ext uri="{FF2B5EF4-FFF2-40B4-BE49-F238E27FC236}">
+                <a16:creationId xmlns:a16="http://schemas.microsoft.com/office/drawing/2014/main" id="{2A5741CC-9A3A-420E-26E7-F3429D9C7469}"/>
+              </a:ext>
+            </a:extLst>
+          </p:cNvPr>
+          <p:cNvSpPr/>
+          <p:nvPr/>
+        </p:nvSpPr>
+        <p:spPr>
+          <a:xfrm>
+            <a:off x="6234629" y="1222331"/>
+            <a:ext cx="5818739" cy="2057430"/>
+          </a:xfrm>
+          <a:prstGeom prst="rect">
+            <a:avLst/>
+          </a:prstGeom>
+        </p:spPr>
+        <p:style>
+          <a:lnRef idx="2">
+            <a:schemeClr val="accent1">
+              <a:shade val="15000"/>
+            </a:schemeClr>
+          </a:lnRef>
+          <a:fillRef idx="1">
+            <a:schemeClr val="accent1"/>
+          </a:fillRef>
+          <a:effectRef idx="0">
+            <a:schemeClr val="accent1"/>
+          </a:effectRef>
+          <a:fontRef idx="minor">
+            <a:schemeClr val="lt1"/>
+          </a:fontRef>
+        </p:style>
+        <p:txBody>
+          <a:bodyPr rtlCol="0" anchor="t"/>
+          <a:lstStyle/>
+          <a:p>
+            <a:pPr>
+              <a:spcAft>
+                <a:spcPts val="600"/>
+              </a:spcAft>
+            </a:pPr>
+            <a:r>
+              <a:rPr lang="ko-KR" altLang="en-US" sz="2800" dirty="0"/>
+              <a:t>자 훈 음</a:t>
+            </a:r>
+            <a:endParaRPr lang="en-US" altLang="ko-KR" sz="2800" dirty="0"/>
+          </a:p>
+          <a:p>
+            <a:pPr>
+              <a:spcAft>
+                <a:spcPts val="600"/>
+              </a:spcAft>
+            </a:pPr>
+            <a:r>
+              <a:rPr lang="ko-KR" altLang="en-US" dirty="0"/>
+              <a:t>단어</a:t>
+            </a:r>
+            <a:r>
+              <a:rPr lang="en-US" altLang="ko-KR" dirty="0"/>
+              <a:t>(</a:t>
+            </a:r>
+            <a:r>
+              <a:rPr lang="ko-KR" altLang="en-US" dirty="0"/>
+              <a:t>한자</a:t>
+            </a:r>
+            <a:r>
+              <a:rPr lang="en-US" altLang="ko-KR" dirty="0"/>
+              <a:t>): </a:t>
+            </a:r>
+            <a:r>
+              <a:rPr lang="ko-KR" altLang="en-US" dirty="0"/>
+              <a:t>정의</a:t>
+            </a:r>
+            <a:r>
+              <a:rPr lang="en-US" altLang="ko-KR" dirty="0"/>
+              <a:t>.</a:t>
+            </a:r>
+          </a:p>
+          <a:p>
+            <a:pPr>
+              <a:spcAft>
+                <a:spcPts val="600"/>
+              </a:spcAft>
+            </a:pPr>
+            <a:r>
+              <a:rPr lang="ko-KR" altLang="en-US" dirty="0"/>
+              <a:t>단어</a:t>
+            </a:r>
+            <a:r>
+              <a:rPr lang="en-US" altLang="ko-KR" dirty="0"/>
+              <a:t>(</a:t>
+            </a:r>
+            <a:r>
+              <a:rPr lang="ko-KR" altLang="en-US" dirty="0"/>
+              <a:t>한자</a:t>
+            </a:r>
+            <a:r>
+              <a:rPr lang="en-US" altLang="ko-KR" dirty="0"/>
+              <a:t>): </a:t>
+            </a:r>
+            <a:r>
+              <a:rPr lang="ko-KR" altLang="en-US" dirty="0"/>
+              <a:t>정의</a:t>
+            </a:r>
+            <a:r>
+              <a:rPr lang="en-US" altLang="ko-KR" dirty="0"/>
+              <a:t>.</a:t>
+            </a:r>
+          </a:p>
+          <a:p>
+            <a:pPr>
+              <a:spcAft>
+                <a:spcPts val="600"/>
+              </a:spcAft>
+            </a:pPr>
+            <a:r>
+              <a:rPr lang="ko-KR" altLang="en-US" dirty="0"/>
+              <a:t>단어</a:t>
+            </a:r>
+            <a:r>
+              <a:rPr lang="en-US" altLang="ko-KR" dirty="0"/>
+              <a:t>(</a:t>
+            </a:r>
+            <a:r>
+              <a:rPr lang="ko-KR" altLang="en-US" dirty="0"/>
+              <a:t>한자</a:t>
+            </a:r>
+            <a:r>
+              <a:rPr lang="en-US" altLang="ko-KR" dirty="0"/>
+              <a:t>): </a:t>
+            </a:r>
+            <a:r>
+              <a:rPr lang="ko-KR" altLang="en-US" dirty="0"/>
+              <a:t>정의</a:t>
+            </a:r>
+            <a:r>
+              <a:rPr lang="en-US" altLang="ko-KR" dirty="0"/>
+              <a:t>.</a:t>
+            </a:r>
+          </a:p>
+          <a:p>
+            <a:pPr>
+              <a:spcBef>
+                <a:spcPts val="600"/>
+              </a:spcBef>
+            </a:pPr>
+            <a:r>
+              <a:rPr lang="ko-KR" altLang="en-US" dirty="0" err="1"/>
+              <a:t>자훈음</a:t>
+            </a:r>
+            <a:r>
+              <a:rPr lang="ko-KR" altLang="en-US" dirty="0"/>
+              <a:t> 출처</a:t>
+            </a:r>
+            <a:r>
+              <a:rPr lang="en-US" altLang="ko-KR" dirty="0"/>
+              <a:t>: </a:t>
+            </a:r>
+            <a:r>
+              <a:rPr lang="ko-KR" altLang="en-US" dirty="0"/>
+              <a:t>나무위키</a:t>
+            </a:r>
+            <a:endParaRPr lang="en-US" altLang="ko-KR" dirty="0"/>
+          </a:p>
+          <a:p>
+            <a:pPr>
+              <a:spcAft>
+                <a:spcPts val="600"/>
+              </a:spcAft>
+            </a:pPr>
+            <a:endParaRPr lang="en-US" altLang="ko-KR" dirty="0"/>
+          </a:p>
+        </p:txBody>
+      </p:sp>
+      <p:sp>
+        <p:nvSpPr>
+          <p:cNvPr id="33" name="Rectangle 32">
+            <a:extLst>
+              <a:ext uri="{FF2B5EF4-FFF2-40B4-BE49-F238E27FC236}">
+                <a16:creationId xmlns:a16="http://schemas.microsoft.com/office/drawing/2014/main" id="{DF5AA66D-BB62-7741-CAD0-1048EA695DF8}"/>
+              </a:ext>
+            </a:extLst>
+          </p:cNvPr>
+          <p:cNvSpPr/>
+          <p:nvPr/>
+        </p:nvSpPr>
+        <p:spPr>
+          <a:xfrm>
+            <a:off x="6238175" y="3429000"/>
+            <a:ext cx="5818739" cy="2057430"/>
+          </a:xfrm>
+          <a:prstGeom prst="rect">
+            <a:avLst/>
+          </a:prstGeom>
+        </p:spPr>
+        <p:style>
+          <a:lnRef idx="2">
+            <a:schemeClr val="accent1">
+              <a:shade val="15000"/>
+            </a:schemeClr>
+          </a:lnRef>
+          <a:fillRef idx="1">
+            <a:schemeClr val="accent1"/>
+          </a:fillRef>
+          <a:effectRef idx="0">
+            <a:schemeClr val="accent1"/>
+          </a:effectRef>
+          <a:fontRef idx="minor">
+            <a:schemeClr val="lt1"/>
+          </a:fontRef>
+        </p:style>
+        <p:txBody>
+          <a:bodyPr rtlCol="0" anchor="t"/>
+          <a:lstStyle/>
+          <a:p>
+            <a:pPr>
+              <a:spcAft>
+                <a:spcPts val="600"/>
+              </a:spcAft>
+            </a:pPr>
+            <a:r>
+              <a:rPr lang="ko-KR" altLang="en-US" sz="2800" dirty="0"/>
+              <a:t>자 훈 음</a:t>
+            </a:r>
+            <a:endParaRPr lang="en-US" altLang="ko-KR" sz="2800" dirty="0"/>
+          </a:p>
+          <a:p>
+            <a:pPr>
+              <a:spcAft>
+                <a:spcPts val="600"/>
+              </a:spcAft>
+            </a:pPr>
+            <a:r>
+              <a:rPr lang="ko-KR" altLang="en-US" dirty="0"/>
+              <a:t>단어</a:t>
+            </a:r>
+            <a:r>
+              <a:rPr lang="en-US" altLang="ko-KR" dirty="0"/>
+              <a:t>(</a:t>
+            </a:r>
+            <a:r>
+              <a:rPr lang="ko-KR" altLang="en-US" dirty="0"/>
+              <a:t>한자</a:t>
+            </a:r>
+            <a:r>
+              <a:rPr lang="en-US" altLang="ko-KR" dirty="0"/>
+              <a:t>): </a:t>
+            </a:r>
+            <a:r>
+              <a:rPr lang="ko-KR" altLang="en-US" dirty="0"/>
+              <a:t>정의</a:t>
+            </a:r>
+            <a:r>
+              <a:rPr lang="en-US" altLang="ko-KR" dirty="0"/>
+              <a:t>.</a:t>
+            </a:r>
+          </a:p>
+          <a:p>
+            <a:pPr>
+              <a:spcAft>
+                <a:spcPts val="600"/>
+              </a:spcAft>
+            </a:pPr>
+            <a:r>
+              <a:rPr lang="ko-KR" altLang="en-US" dirty="0"/>
+              <a:t>단어</a:t>
+            </a:r>
+            <a:r>
+              <a:rPr lang="en-US" altLang="ko-KR" dirty="0"/>
+              <a:t>(</a:t>
+            </a:r>
+            <a:r>
+              <a:rPr lang="ko-KR" altLang="en-US" dirty="0"/>
+              <a:t>한자</a:t>
+            </a:r>
+            <a:r>
+              <a:rPr lang="en-US" altLang="ko-KR" dirty="0"/>
+              <a:t>): </a:t>
+            </a:r>
+            <a:r>
+              <a:rPr lang="ko-KR" altLang="en-US" dirty="0"/>
+              <a:t>정의</a:t>
+            </a:r>
+            <a:r>
+              <a:rPr lang="en-US" altLang="ko-KR" dirty="0"/>
+              <a:t>.</a:t>
+            </a:r>
+          </a:p>
+          <a:p>
+            <a:pPr>
+              <a:spcAft>
+                <a:spcPts val="600"/>
+              </a:spcAft>
+            </a:pPr>
+            <a:r>
+              <a:rPr lang="ko-KR" altLang="en-US" dirty="0"/>
+              <a:t>단어</a:t>
+            </a:r>
+            <a:r>
+              <a:rPr lang="en-US" altLang="ko-KR" dirty="0"/>
+              <a:t>(</a:t>
+            </a:r>
+            <a:r>
+              <a:rPr lang="ko-KR" altLang="en-US" dirty="0"/>
+              <a:t>한자</a:t>
+            </a:r>
+            <a:r>
+              <a:rPr lang="en-US" altLang="ko-KR" dirty="0"/>
+              <a:t>): </a:t>
+            </a:r>
+            <a:r>
+              <a:rPr lang="ko-KR" altLang="en-US" dirty="0"/>
+              <a:t>정의</a:t>
+            </a:r>
+            <a:r>
+              <a:rPr lang="en-US" altLang="ko-KR" dirty="0"/>
+              <a:t>.</a:t>
+            </a:r>
+          </a:p>
+          <a:p>
+            <a:pPr>
+              <a:spcBef>
+                <a:spcPts val="600"/>
+              </a:spcBef>
+            </a:pPr>
+            <a:r>
+              <a:rPr lang="ko-KR" altLang="en-US" dirty="0" err="1"/>
+              <a:t>자훈음</a:t>
+            </a:r>
+            <a:r>
+              <a:rPr lang="ko-KR" altLang="en-US" dirty="0"/>
+              <a:t> 출처</a:t>
+            </a:r>
+            <a:r>
+              <a:rPr lang="en-US" altLang="ko-KR" dirty="0"/>
+              <a:t>: </a:t>
+            </a:r>
+            <a:r>
+              <a:rPr lang="ko-KR" altLang="en-US" dirty="0"/>
+              <a:t>나무위키</a:t>
+            </a:r>
+            <a:endParaRPr lang="en-US" altLang="ko-KR" dirty="0"/>
+          </a:p>
+          <a:p>
+            <a:pPr>
+              <a:spcAft>
+                <a:spcPts val="600"/>
+              </a:spcAft>
+            </a:pPr>
+            <a:endParaRPr lang="en-US" altLang="ko-KR" dirty="0"/>
+          </a:p>
+        </p:txBody>
+      </p:sp>
+      <p:pic>
+        <p:nvPicPr>
+          <p:cNvPr id="34" name="Graphic 33" descr="Storytelling outline">
+            <a:extLst>
+              <a:ext uri="{FF2B5EF4-FFF2-40B4-BE49-F238E27FC236}">
+                <a16:creationId xmlns:a16="http://schemas.microsoft.com/office/drawing/2014/main" id="{73B7E99B-3DB3-A035-009C-824F8814E24E}"/>
+              </a:ext>
+            </a:extLst>
+          </p:cNvPr>
+          <p:cNvPicPr>
+            <a:picLocks noChangeAspect="1"/>
+          </p:cNvPicPr>
+          <p:nvPr/>
+        </p:nvPicPr>
+        <p:blipFill>
+          <a:blip r:embed="rId2">
+            <a:extLst>
+              <a:ext uri="{28A0092B-C50C-407E-A947-70E740481C1C}">
+                <a14:useLocalDpi xmlns:a14="http://schemas.microsoft.com/office/drawing/2010/main" val="0"/>
+              </a:ext>
+              <a:ext uri="{96DAC541-7B7A-43D3-8B79-37D633B846F1}">
+                <asvg:svgBlip xmlns:asvg="http://schemas.microsoft.com/office/drawing/2016/SVG/main" r:embed="rId3"/>
+              </a:ext>
+            </a:extLst>
+          </a:blip>
+          <a:stretch>
+            <a:fillRect/>
+          </a:stretch>
+        </p:blipFill>
+        <p:spPr>
+          <a:xfrm>
+            <a:off x="10955925" y="3459774"/>
+            <a:ext cx="473178" cy="473178"/>
+          </a:xfrm>
+          <a:prstGeom prst="rect">
+            <a:avLst/>
+          </a:prstGeom>
+        </p:spPr>
+      </p:pic>
+      <p:pic>
+        <p:nvPicPr>
+          <p:cNvPr id="35" name="Graphic 34" descr="Storytelling outline">
+            <a:extLst>
+              <a:ext uri="{FF2B5EF4-FFF2-40B4-BE49-F238E27FC236}">
+                <a16:creationId xmlns:a16="http://schemas.microsoft.com/office/drawing/2014/main" id="{383C51BB-7CEB-712E-A99F-173271852DFA}"/>
+              </a:ext>
+            </a:extLst>
+          </p:cNvPr>
+          <p:cNvPicPr>
+            <a:picLocks noChangeAspect="1"/>
+          </p:cNvPicPr>
+          <p:nvPr/>
+        </p:nvPicPr>
+        <p:blipFill>
+          <a:blip r:embed="rId2">
+            <a:extLst>
+              <a:ext uri="{28A0092B-C50C-407E-A947-70E740481C1C}">
+                <a14:useLocalDpi xmlns:a14="http://schemas.microsoft.com/office/drawing/2010/main" val="0"/>
+              </a:ext>
+              <a:ext uri="{96DAC541-7B7A-43D3-8B79-37D633B846F1}">
+                <asvg:svgBlip xmlns:asvg="http://schemas.microsoft.com/office/drawing/2016/SVG/main" r:embed="rId3"/>
+              </a:ext>
+            </a:extLst>
+          </a:blip>
+          <a:stretch>
+            <a:fillRect/>
+          </a:stretch>
+        </p:blipFill>
+        <p:spPr>
+          <a:xfrm>
+            <a:off x="10955925" y="1262721"/>
+            <a:ext cx="473178" cy="473178"/>
+          </a:xfrm>
+          <a:prstGeom prst="rect">
+            <a:avLst/>
+          </a:prstGeom>
+        </p:spPr>
+      </p:pic>
+      <p:pic>
+        <p:nvPicPr>
+          <p:cNvPr id="36" name="Graphic 35" descr="Checkbox Checked outline">
+            <a:extLst>
+              <a:ext uri="{FF2B5EF4-FFF2-40B4-BE49-F238E27FC236}">
+                <a16:creationId xmlns:a16="http://schemas.microsoft.com/office/drawing/2014/main" id="{F524E29A-471C-B1B7-CFC6-8442E8FFA04F}"/>
+              </a:ext>
+            </a:extLst>
+          </p:cNvPr>
+          <p:cNvPicPr>
+            <a:picLocks noChangeAspect="1"/>
+          </p:cNvPicPr>
+          <p:nvPr/>
+        </p:nvPicPr>
+        <p:blipFill>
+          <a:blip r:embed="rId4">
+            <a:extLst>
+              <a:ext uri="{28A0092B-C50C-407E-A947-70E740481C1C}">
+                <a14:useLocalDpi xmlns:a14="http://schemas.microsoft.com/office/drawing/2010/main" val="0"/>
+              </a:ext>
+              <a:ext uri="{96DAC541-7B7A-43D3-8B79-37D633B846F1}">
+                <asvg:svgBlip xmlns:asvg="http://schemas.microsoft.com/office/drawing/2016/SVG/main" r:embed="rId5"/>
+              </a:ext>
+            </a:extLst>
+          </a:blip>
+          <a:stretch>
+            <a:fillRect/>
+          </a:stretch>
+        </p:blipFill>
+        <p:spPr>
+          <a:xfrm>
+            <a:off x="11399315" y="3370519"/>
+            <a:ext cx="664535" cy="664535"/>
+          </a:xfrm>
+          <a:prstGeom prst="rect">
+            <a:avLst/>
+          </a:prstGeom>
+        </p:spPr>
+      </p:pic>
+      <p:pic>
+        <p:nvPicPr>
+          <p:cNvPr id="37" name="Graphic 36" descr="Checkbox Checked outline">
+            <a:extLst>
+              <a:ext uri="{FF2B5EF4-FFF2-40B4-BE49-F238E27FC236}">
+                <a16:creationId xmlns:a16="http://schemas.microsoft.com/office/drawing/2014/main" id="{591B03DB-1248-F1F9-EF07-4A858CEC868D}"/>
+              </a:ext>
+            </a:extLst>
+          </p:cNvPr>
+          <p:cNvPicPr>
+            <a:picLocks noChangeAspect="1"/>
+          </p:cNvPicPr>
+          <p:nvPr/>
+        </p:nvPicPr>
+        <p:blipFill>
+          <a:blip r:embed="rId4">
+            <a:extLst>
+              <a:ext uri="{28A0092B-C50C-407E-A947-70E740481C1C}">
+                <a14:useLocalDpi xmlns:a14="http://schemas.microsoft.com/office/drawing/2010/main" val="0"/>
+              </a:ext>
+              <a:ext uri="{96DAC541-7B7A-43D3-8B79-37D633B846F1}">
+                <asvg:svgBlip xmlns:asvg="http://schemas.microsoft.com/office/drawing/2016/SVG/main" r:embed="rId5"/>
+              </a:ext>
+            </a:extLst>
+          </a:blip>
+          <a:stretch>
+            <a:fillRect/>
+          </a:stretch>
+        </p:blipFill>
+        <p:spPr>
+          <a:xfrm>
+            <a:off x="11425559" y="1184315"/>
+            <a:ext cx="664535" cy="664535"/>
+          </a:xfrm>
+          <a:prstGeom prst="rect">
+            <a:avLst/>
+          </a:prstGeom>
+        </p:spPr>
+      </p:pic>
+      <p:sp>
+        <p:nvSpPr>
+          <p:cNvPr id="17" name="Rectangle 16">
+            <a:extLst>
+              <a:ext uri="{FF2B5EF4-FFF2-40B4-BE49-F238E27FC236}">
+                <a16:creationId xmlns:a16="http://schemas.microsoft.com/office/drawing/2014/main" id="{1143126B-FA9B-C758-4BBF-5CCDC4F73974}"/>
+              </a:ext>
+            </a:extLst>
+          </p:cNvPr>
+          <p:cNvSpPr/>
+          <p:nvPr/>
+        </p:nvSpPr>
+        <p:spPr>
+          <a:xfrm>
+            <a:off x="101906" y="1119820"/>
+            <a:ext cx="5851915" cy="980036"/>
+          </a:xfrm>
+          <a:prstGeom prst="rect">
+            <a:avLst/>
+          </a:prstGeom>
+        </p:spPr>
+        <p:style>
+          <a:lnRef idx="2">
+            <a:schemeClr val="accent1">
+              <a:shade val="15000"/>
+            </a:schemeClr>
+          </a:lnRef>
+          <a:fillRef idx="1">
+            <a:schemeClr val="accent1"/>
+          </a:fillRef>
+          <a:effectRef idx="0">
+            <a:schemeClr val="accent1"/>
+          </a:effectRef>
+          <a:fontRef idx="minor">
+            <a:schemeClr val="lt1"/>
+          </a:fontRef>
+        </p:style>
+        <p:txBody>
+          <a:bodyPr rtlCol="0" anchor="ctr"/>
+          <a:lstStyle/>
+          <a:p>
+            <a:pPr algn="ctr"/>
+            <a:endParaRPr lang="en-US"/>
+          </a:p>
+        </p:txBody>
+      </p:sp>
+      <p:sp>
+        <p:nvSpPr>
+          <p:cNvPr id="3" name="TextBox 2">
+            <a:extLst>
+              <a:ext uri="{FF2B5EF4-FFF2-40B4-BE49-F238E27FC236}">
+                <a16:creationId xmlns:a16="http://schemas.microsoft.com/office/drawing/2014/main" id="{CFF8AFC9-0C7A-B222-38C9-ED40A2F35217}"/>
+              </a:ext>
+            </a:extLst>
+          </p:cNvPr>
+          <p:cNvSpPr txBox="1"/>
+          <p:nvPr/>
+        </p:nvSpPr>
+        <p:spPr>
+          <a:xfrm>
+            <a:off x="101906" y="1184315"/>
+            <a:ext cx="5735368" cy="369332"/>
+          </a:xfrm>
+          <a:prstGeom prst="rect">
+            <a:avLst/>
+          </a:prstGeom>
+          <a:noFill/>
+        </p:spPr>
+        <p:txBody>
+          <a:bodyPr wrap="square" rtlCol="0">
+            <a:spAutoFit/>
+          </a:bodyPr>
+          <a:lstStyle/>
+          <a:p>
+            <a:pPr algn="ctr"/>
+            <a:r>
+              <a:rPr lang="ko-KR" altLang="en-US" dirty="0"/>
+              <a:t>버튼</a:t>
+            </a:r>
+            <a:endParaRPr lang="en-US" dirty="0"/>
+          </a:p>
+        </p:txBody>
+      </p:sp>
+      <p:sp>
+        <p:nvSpPr>
+          <p:cNvPr id="4" name="Rectangle 3">
+            <a:extLst>
+              <a:ext uri="{FF2B5EF4-FFF2-40B4-BE49-F238E27FC236}">
+                <a16:creationId xmlns:a16="http://schemas.microsoft.com/office/drawing/2014/main" id="{ECF2ACB9-D04F-E2B5-2C3B-5291ECEC2924}"/>
+              </a:ext>
+            </a:extLst>
+          </p:cNvPr>
+          <p:cNvSpPr/>
+          <p:nvPr/>
+        </p:nvSpPr>
+        <p:spPr>
+          <a:xfrm>
+            <a:off x="119139" y="2173012"/>
+            <a:ext cx="5851915" cy="426909"/>
+          </a:xfrm>
+          <a:prstGeom prst="rect">
+            <a:avLst/>
+          </a:prstGeom>
+        </p:spPr>
+        <p:style>
+          <a:lnRef idx="2">
+            <a:schemeClr val="accent1">
+              <a:shade val="15000"/>
+            </a:schemeClr>
+          </a:lnRef>
+          <a:fillRef idx="1">
+            <a:schemeClr val="accent1"/>
+          </a:fillRef>
+          <a:effectRef idx="0">
+            <a:schemeClr val="accent1"/>
+          </a:effectRef>
+          <a:fontRef idx="minor">
+            <a:schemeClr val="lt1"/>
+          </a:fontRef>
+        </p:style>
+        <p:txBody>
+          <a:bodyPr rtlCol="0" anchor="ctr"/>
+          <a:lstStyle/>
+          <a:p>
+            <a:pPr algn="ctr"/>
+            <a:r>
+              <a:rPr lang="ko-KR" altLang="en-US" dirty="0"/>
+              <a:t>다른 지식</a:t>
+            </a:r>
+            <a:r>
+              <a:rPr lang="en-US" altLang="ko-KR" dirty="0"/>
+              <a:t>.</a:t>
+            </a:r>
+            <a:endParaRPr lang="en-US" dirty="0"/>
+          </a:p>
+        </p:txBody>
+      </p:sp>
+      <p:sp>
+        <p:nvSpPr>
+          <p:cNvPr id="15" name="Rectangle 14">
+            <a:extLst>
+              <a:ext uri="{FF2B5EF4-FFF2-40B4-BE49-F238E27FC236}">
+                <a16:creationId xmlns:a16="http://schemas.microsoft.com/office/drawing/2014/main" id="{4F174D05-3638-0839-1330-7D1ED40E2498}"/>
+              </a:ext>
+            </a:extLst>
+          </p:cNvPr>
+          <p:cNvSpPr/>
+          <p:nvPr/>
+        </p:nvSpPr>
+        <p:spPr>
+          <a:xfrm>
+            <a:off x="85966" y="2659161"/>
+            <a:ext cx="5851915" cy="1742129"/>
+          </a:xfrm>
+          <a:prstGeom prst="rect">
+            <a:avLst/>
+          </a:prstGeom>
+        </p:spPr>
+        <p:style>
+          <a:lnRef idx="2">
+            <a:schemeClr val="accent1">
+              <a:shade val="15000"/>
+            </a:schemeClr>
+          </a:lnRef>
+          <a:fillRef idx="1">
+            <a:schemeClr val="accent1"/>
+          </a:fillRef>
+          <a:effectRef idx="0">
+            <a:schemeClr val="accent1"/>
+          </a:effectRef>
+          <a:fontRef idx="minor">
+            <a:schemeClr val="lt1"/>
+          </a:fontRef>
+        </p:style>
+        <p:txBody>
+          <a:bodyPr rtlCol="0" anchor="ctr"/>
+          <a:lstStyle/>
+          <a:p>
+            <a:pPr algn="ctr"/>
+            <a:r>
+              <a:rPr lang="ko-KR" altLang="en-US" dirty="0"/>
+              <a:t>단어장 연습</a:t>
+            </a:r>
+            <a:endParaRPr lang="en-US" dirty="0"/>
+          </a:p>
+        </p:txBody>
+      </p:sp>
+      <p:sp>
+        <p:nvSpPr>
+          <p:cNvPr id="19" name="Rectangle 18">
+            <a:extLst>
+              <a:ext uri="{FF2B5EF4-FFF2-40B4-BE49-F238E27FC236}">
+                <a16:creationId xmlns:a16="http://schemas.microsoft.com/office/drawing/2014/main" id="{972978E0-F67E-5D12-394B-F63315CBCC4B}"/>
+              </a:ext>
+            </a:extLst>
+          </p:cNvPr>
+          <p:cNvSpPr/>
+          <p:nvPr/>
+        </p:nvSpPr>
+        <p:spPr>
+          <a:xfrm>
+            <a:off x="101905" y="4899755"/>
+            <a:ext cx="5851915" cy="1883847"/>
+          </a:xfrm>
+          <a:prstGeom prst="rect">
+            <a:avLst/>
+          </a:prstGeom>
+        </p:spPr>
+        <p:style>
+          <a:lnRef idx="2">
+            <a:schemeClr val="accent1">
+              <a:shade val="15000"/>
+            </a:schemeClr>
+          </a:lnRef>
+          <a:fillRef idx="1">
+            <a:schemeClr val="accent1"/>
+          </a:fillRef>
+          <a:effectRef idx="0">
+            <a:schemeClr val="accent1"/>
+          </a:effectRef>
+          <a:fontRef idx="minor">
+            <a:schemeClr val="lt1"/>
+          </a:fontRef>
+        </p:style>
+        <p:txBody>
+          <a:bodyPr rtlCol="0" anchor="ctr"/>
+          <a:lstStyle/>
+          <a:p>
+            <a:pPr algn="ctr"/>
+            <a:r>
+              <a:rPr lang="ko-KR" altLang="en-US" dirty="0"/>
+              <a:t>한자 똑같은 거 아셨나요</a:t>
+            </a:r>
+            <a:endParaRPr lang="en-US" dirty="0"/>
+          </a:p>
+        </p:txBody>
+      </p:sp>
+      <p:sp>
+        <p:nvSpPr>
+          <p:cNvPr id="20" name="Rectangle 19">
+            <a:extLst>
+              <a:ext uri="{FF2B5EF4-FFF2-40B4-BE49-F238E27FC236}">
+                <a16:creationId xmlns:a16="http://schemas.microsoft.com/office/drawing/2014/main" id="{E6BBB6A7-80F8-4B5B-CE3B-0328331FC70B}"/>
+              </a:ext>
+            </a:extLst>
+          </p:cNvPr>
+          <p:cNvSpPr/>
+          <p:nvPr/>
+        </p:nvSpPr>
+        <p:spPr>
+          <a:xfrm>
+            <a:off x="66372" y="4434370"/>
+            <a:ext cx="5851915" cy="426909"/>
+          </a:xfrm>
+          <a:prstGeom prst="rect">
+            <a:avLst/>
+          </a:prstGeom>
+        </p:spPr>
+        <p:style>
+          <a:lnRef idx="2">
+            <a:schemeClr val="accent1">
+              <a:shade val="15000"/>
+            </a:schemeClr>
+          </a:lnRef>
+          <a:fillRef idx="1">
+            <a:schemeClr val="accent1"/>
+          </a:fillRef>
+          <a:effectRef idx="0">
+            <a:schemeClr val="accent1"/>
+          </a:effectRef>
+          <a:fontRef idx="minor">
+            <a:schemeClr val="lt1"/>
+          </a:fontRef>
+        </p:style>
+        <p:txBody>
+          <a:bodyPr rtlCol="0" anchor="ctr"/>
+          <a:lstStyle/>
+          <a:p>
+            <a:pPr algn="ctr"/>
+            <a:r>
+              <a:rPr lang="ko-KR" altLang="en-US" dirty="0"/>
+              <a:t>다른 지식</a:t>
+            </a:r>
+            <a:r>
+              <a:rPr lang="en-US" altLang="ko-KR" dirty="0"/>
+              <a:t>.</a:t>
+            </a:r>
+            <a:endParaRPr lang="en-US" dirty="0"/>
+          </a:p>
+        </p:txBody>
+      </p:sp>
+    </p:spTree>
+    <p:extLst>
+      <p:ext uri="{BB962C8B-B14F-4D97-AF65-F5344CB8AC3E}">
+        <p14:creationId xmlns:p14="http://schemas.microsoft.com/office/powerpoint/2010/main" val="52878898"/>
       </p:ext>
     </p:extLst>
   </p:cSld>

</xml_diff>

<commit_message>
made grid submit area of hanja game
</commit_message>
<xml_diff>
--- a/prototypes.pptx
+++ b/prototypes.pptx
@@ -11,6 +11,7 @@
     <p:sldId id="259" r:id="rId5"/>
     <p:sldId id="262" r:id="rId6"/>
     <p:sldId id="263" r:id="rId7"/>
+    <p:sldId id="264" r:id="rId8"/>
   </p:sldIdLst>
   <p:sldSz cx="12192000" cy="6858000"/>
   <p:notesSz cx="6858000" cy="9144000"/>
@@ -117,6 +118,1071 @@
 </p:presentation>
 </file>
 
+<file path=ppt/ink/ink1.xml><?xml version="1.0" encoding="utf-8"?>
+<inkml:ink xmlns:inkml="http://www.w3.org/2003/InkML">
+  <inkml:definitions>
+    <inkml:context xml:id="ctx0">
+      <inkml:inkSource xml:id="inkSrc0">
+        <inkml:traceFormat>
+          <inkml:channel name="X" type="integer" min="-2.14748E9" max="2.14748E9" units="cm"/>
+          <inkml:channel name="Y" type="integer" min="-2.14748E9" max="2.14748E9" units="cm"/>
+          <inkml:channel name="F" type="integer" max="32767" units="dev"/>
+        </inkml:traceFormat>
+        <inkml:channelProperties>
+          <inkml:channelProperty channel="X" name="resolution" value="1000" units="1/cm"/>
+          <inkml:channelProperty channel="Y" name="resolution" value="1000" units="1/cm"/>
+          <inkml:channelProperty channel="F" name="resolution" value="0" units="1/dev"/>
+        </inkml:channelProperties>
+      </inkml:inkSource>
+      <inkml:timestamp xml:id="ts0" timeString="2024-06-24T22:09:41.022"/>
+    </inkml:context>
+    <inkml:brush xml:id="br0">
+      <inkml:brushProperty name="width" value="0.035" units="cm"/>
+      <inkml:brushProperty name="height" value="0.035" units="cm"/>
+      <inkml:brushProperty name="color" value="#E71224"/>
+    </inkml:brush>
+  </inkml:definitions>
+  <inkml:trace contextRef="#ctx0" brushRef="#br0">1 0 24575,'0'10'0,"0"34"0,0 39 0,0 30 0,0 17 0,0 11 0,0-4 0,0-14 0,0-19 0,0-21 0,0-21 0,0-20-8191</inkml:trace>
+</inkml:ink>
+</file>
+
+<file path=ppt/ink/ink10.xml><?xml version="1.0" encoding="utf-8"?>
+<inkml:ink xmlns:inkml="http://www.w3.org/2003/InkML">
+  <inkml:definitions>
+    <inkml:context xml:id="ctx0">
+      <inkml:inkSource xml:id="inkSrc0">
+        <inkml:traceFormat>
+          <inkml:channel name="X" type="integer" min="-2.14748E9" max="2.14748E9" units="cm"/>
+          <inkml:channel name="Y" type="integer" min="-2.14748E9" max="2.14748E9" units="cm"/>
+          <inkml:channel name="F" type="integer" max="32767" units="dev"/>
+        </inkml:traceFormat>
+        <inkml:channelProperties>
+          <inkml:channelProperty channel="X" name="resolution" value="1000" units="1/cm"/>
+          <inkml:channelProperty channel="Y" name="resolution" value="1000" units="1/cm"/>
+          <inkml:channelProperty channel="F" name="resolution" value="0" units="1/dev"/>
+        </inkml:channelProperties>
+      </inkml:inkSource>
+      <inkml:timestamp xml:id="ts0" timeString="2024-06-24T22:10:08.707"/>
+    </inkml:context>
+    <inkml:brush xml:id="br0">
+      <inkml:brushProperty name="width" value="0.035" units="cm"/>
+      <inkml:brushProperty name="height" value="0.035" units="cm"/>
+      <inkml:brushProperty name="color" value="#FFFFFF"/>
+    </inkml:brush>
+  </inkml:definitions>
+  <inkml:trace contextRef="#ctx0" brushRef="#br0">4 264 24575,'-4'-1'0,"11"-5"0,22-14 0,1 1 0,64-28 0,73-19 0,-90 36 0,2 5 0,103-21 0,-175 45 0,-1 0 0,1 0 0,0 1 0,1 0 0,7 1 0,-14-1 0,0 0 0,0 0 0,0 0 0,0 1 0,0-1 0,0 0 0,1 1 0,-1-1 0,0 1 0,0-1 0,0 1 0,-1 0 0,1-1 0,0 1 0,0 0 0,0 0 0,0-1 0,-1 1 0,1 0 0,0 0 0,-1 0 0,1 0 0,-1 0 0,1 0 0,-1 0 0,1 0 0,-1 0 0,0 1 0,1-1 0,-1 0 0,0 0 0,0 0 0,0 0 0,0 0 0,0 1 0,0-1 0,0 0 0,-1 1 0,0 6 0,-1-1 0,0 0 0,-1 0 0,1 0 0,-2 0 0,1 0 0,-1-1 0,1 1 0,-7 6 0,-9 11 0,-23 24 0,-38 29 0,-119 88 0,-49 46 0,240-204 0,-34 38 0,38-40 0,0-1 0,1 1 0,0 0 0,0 0 0,0 0 0,1 0 0,-3 9 0,4-13 0,1 0 0,0 0 0,0 0 0,-1 0 0,1 0 0,0 0 0,0 0 0,0 0 0,0 0 0,1 0 0,-1 0 0,0 0 0,0 0 0,1 0 0,-1 0 0,0 0 0,1 0 0,-1 0 0,1 0 0,-1 0 0,1 0 0,0-1 0,-1 1 0,1 0 0,0 0 0,0 0 0,-1-1 0,1 1 0,0-1 0,0 1 0,0 0 0,0-1 0,0 1 0,0-1 0,2 1 0,3 1 0,1 0 0,0-1 0,0 0 0,10 1 0,-16-2 0,43 1 0,0-2 0,0-1 0,61-13 0,18-8-677,-1-5 0,190-70 1,-139 30-5485</inkml:trace>
+</inkml:ink>
+</file>
+
+<file path=ppt/ink/ink11.xml><?xml version="1.0" encoding="utf-8"?>
+<inkml:ink xmlns:inkml="http://www.w3.org/2003/InkML">
+  <inkml:definitions>
+    <inkml:context xml:id="ctx0">
+      <inkml:inkSource xml:id="inkSrc0">
+        <inkml:traceFormat>
+          <inkml:channel name="X" type="integer" min="-2.14748E9" max="2.14748E9" units="cm"/>
+          <inkml:channel name="Y" type="integer" min="-2.14748E9" max="2.14748E9" units="cm"/>
+          <inkml:channel name="F" type="integer" max="32767" units="dev"/>
+        </inkml:traceFormat>
+        <inkml:channelProperties>
+          <inkml:channelProperty channel="X" name="resolution" value="1000" units="1/cm"/>
+          <inkml:channelProperty channel="Y" name="resolution" value="1000" units="1/cm"/>
+          <inkml:channelProperty channel="F" name="resolution" value="0" units="1/dev"/>
+        </inkml:channelProperties>
+      </inkml:inkSource>
+      <inkml:timestamp xml:id="ts0" timeString="2024-06-24T22:10:07.640"/>
+    </inkml:context>
+    <inkml:brush xml:id="br0">
+      <inkml:brushProperty name="width" value="0.035" units="cm"/>
+      <inkml:brushProperty name="height" value="0.035" units="cm"/>
+      <inkml:brushProperty name="color" value="#FFFFFF"/>
+    </inkml:brush>
+  </inkml:definitions>
+  <inkml:trace contextRef="#ctx0" brushRef="#br0">1324 1 24575,'-7'1'0,"0"0"0,0 1 0,0-1 0,0 2 0,0-1 0,0 1 0,0 0 0,1 1 0,0-1 0,-12 10 0,7-6 0,-50 36-17,1 2-1,-62 62 1,-104 122-977,-376 463 785,581-665 216,-13 13 75,3 2 1,-32 54 0,62-95-79,1 1-1,-1-1 1,0 0 0,0 1-1,1-1 1,-1 1 0,1-1-1,-1 1 1,1-1-1,0 1 1,-1 0 0,1-1-1,0 4 1,1-5-4,-1 0 1,0 0-1,0 1 1,1-1-1,-1 0 0,0 0 1,1 0-1,-1 1 0,1-1 1,-1 0-1,0 0 1,1 0-1,-1 0 0,0 0 1,1 0-1,-1 0 0,1 0 1,-1 0-1,0 0 1,1 0-1,-1 0 0,0 0 1,1 0-1,-1 0 0,1 0 1,-1 0-1,0-1 1,1 1-1,-1 0 0,0 0 1,1 0-1,-1-1 0,1 1 1,8-5-4,0-1-1,0 1 1,8-9 0,53-46 3,114-127 0,46-92 0,-214 258-8,2-2 63,1 0 1,40-37-1,-57 58-27,1 0-1,-1-1 0,1 2 1,0-1-1,0 0 0,0 0 1,0 1-1,0 0 0,1 0 1,-1 0-1,0 0 0,1 0 1,-1 0-1,0 1 0,1 0 1,-1 0-1,1 0 0,-1 0 1,0 0-1,1 1 0,-1-1 1,0 1-1,1 0 0,-1 0 1,0 0-1,0 0 0,0 1 1,0-1-1,0 1 0,5 3 1,5 6-50,0 1 1,0-1-1,-2 2 1,21 27 0,-18-22 71,95 119-128,226 265-1209,-288-354-5539</inkml:trace>
+</inkml:ink>
+</file>
+
+<file path=ppt/ink/ink12.xml><?xml version="1.0" encoding="utf-8"?>
+<inkml:ink xmlns:inkml="http://www.w3.org/2003/InkML">
+  <inkml:definitions>
+    <inkml:context xml:id="ctx0">
+      <inkml:inkSource xml:id="inkSrc0">
+        <inkml:traceFormat>
+          <inkml:channel name="X" type="integer" min="-2.14748E9" max="2.14748E9" units="cm"/>
+          <inkml:channel name="Y" type="integer" min="-2.14748E9" max="2.14748E9" units="cm"/>
+          <inkml:channel name="F" type="integer" max="32767" units="dev"/>
+        </inkml:traceFormat>
+        <inkml:channelProperties>
+          <inkml:channelProperty channel="X" name="resolution" value="1000" units="1/cm"/>
+          <inkml:channelProperty channel="Y" name="resolution" value="1000" units="1/cm"/>
+          <inkml:channelProperty channel="F" name="resolution" value="0" units="1/dev"/>
+        </inkml:channelProperties>
+      </inkml:inkSource>
+      <inkml:timestamp xml:id="ts0" timeString="2024-06-24T22:10:07.986"/>
+    </inkml:context>
+    <inkml:brush xml:id="br0">
+      <inkml:brushProperty name="width" value="0.035" units="cm"/>
+      <inkml:brushProperty name="height" value="0.035" units="cm"/>
+      <inkml:brushProperty name="color" value="#FFFFFF"/>
+    </inkml:brush>
+  </inkml:definitions>
+  <inkml:trace contextRef="#ctx0" brushRef="#br0">1 323 24575,'10'0'0,"23"0"0,36 0 0,42 0 0,37 0 0,38 0 0,19 0-1203,-2 0 1203,-20-5 0,-30-7 0,-32-1 294,-26-4-294,-25-3 0,-23-9 0,-21-10 0,-14-12 0,-15-19 909,-5 3-9100</inkml:trace>
+</inkml:ink>
+</file>
+
+<file path=ppt/ink/ink13.xml><?xml version="1.0" encoding="utf-8"?>
+<inkml:ink xmlns:inkml="http://www.w3.org/2003/InkML">
+  <inkml:definitions>
+    <inkml:context xml:id="ctx0">
+      <inkml:inkSource xml:id="inkSrc0">
+        <inkml:traceFormat>
+          <inkml:channel name="X" type="integer" min="-2.14748E9" max="2.14748E9" units="cm"/>
+          <inkml:channel name="Y" type="integer" min="-2.14748E9" max="2.14748E9" units="cm"/>
+          <inkml:channel name="F" type="integer" max="32767" units="dev"/>
+        </inkml:traceFormat>
+        <inkml:channelProperties>
+          <inkml:channelProperty channel="X" name="resolution" value="1000" units="1/cm"/>
+          <inkml:channelProperty channel="Y" name="resolution" value="1000" units="1/cm"/>
+          <inkml:channelProperty channel="F" name="resolution" value="0" units="1/dev"/>
+        </inkml:channelProperties>
+      </inkml:inkSource>
+      <inkml:timestamp xml:id="ts0" timeString="2024-06-24T22:10:08.361"/>
+    </inkml:context>
+    <inkml:brush xml:id="br0">
+      <inkml:brushProperty name="width" value="0.035" units="cm"/>
+      <inkml:brushProperty name="height" value="0.035" units="cm"/>
+      <inkml:brushProperty name="color" value="#FFFFFF"/>
+    </inkml:brush>
+  </inkml:definitions>
+  <inkml:trace contextRef="#ctx0" brushRef="#br0">152 2 24575,'-22'0'0,"14"-1"0,0 1 0,0 0 0,-14 2 0,19-2 0,1 1 0,0 0 0,-1-1 0,1 1 0,0 0 0,0 0 0,0 0 0,0 0 0,0 1 0,0-1 0,0 1 0,0-1 0,1 1 0,-1 0 0,0-1 0,1 1 0,-2 3 0,-3 7 0,1 1 0,0 0 0,1 0 0,0 0 0,1 0 0,1 1 0,0-1 0,0 20 0,1-22 0,-11 200-289,16 254 0,2-374 266,3 0-1,4-1 1,3-1 0,30 89 0,-39-157-156,0-1 1,2 0-1,0 0 1,1-1-1,1 0 1,22 30-1,-7-21-6068</inkml:trace>
+</inkml:ink>
+</file>
+
+<file path=ppt/ink/ink14.xml><?xml version="1.0" encoding="utf-8"?>
+<inkml:ink xmlns:inkml="http://www.w3.org/2003/InkML">
+  <inkml:definitions>
+    <inkml:context xml:id="ctx0">
+      <inkml:inkSource xml:id="inkSrc0">
+        <inkml:traceFormat>
+          <inkml:channel name="X" type="integer" min="-2.14748E9" max="2.14748E9" units="cm"/>
+          <inkml:channel name="Y" type="integer" min="-2.14748E9" max="2.14748E9" units="cm"/>
+          <inkml:channel name="F" type="integer" max="32767" units="dev"/>
+        </inkml:traceFormat>
+        <inkml:channelProperties>
+          <inkml:channelProperty channel="X" name="resolution" value="1000" units="1/cm"/>
+          <inkml:channelProperty channel="Y" name="resolution" value="1000" units="1/cm"/>
+          <inkml:channelProperty channel="F" name="resolution" value="0" units="1/dev"/>
+        </inkml:channelProperties>
+      </inkml:inkSource>
+      <inkml:timestamp xml:id="ts0" timeString="2024-06-24T22:10:09.075"/>
+    </inkml:context>
+    <inkml:brush xml:id="br0">
+      <inkml:brushProperty name="width" value="0.035" units="cm"/>
+      <inkml:brushProperty name="height" value="0.035" units="cm"/>
+      <inkml:brushProperty name="color" value="#FFFFFF"/>
+    </inkml:brush>
+  </inkml:definitions>
+  <inkml:trace contextRef="#ctx0" brushRef="#br0">2 52 24575,'0'20'0,"5"38"0,2 37 0,-1 30 0,0 2 0,-3-10 0,5-25 0,5-29 0,5-24 0,0-19-8191</inkml:trace>
+  <inkml:trace contextRef="#ctx0" brushRef="#br0" timeOffset="1">210 24 24575,'3'-3'0,"1"1"0,0 0 0,-1 0 0,1 1 0,0-1 0,0 1 0,1 0 0,-1 0 0,0 0 0,0 0 0,0 1 0,1 0 0,4 0 0,6-1 0,24-3 0,-1 3 0,1 1 0,0 1 0,45 9 0,-63-7 0,0 2 0,-1 0 0,1 1 0,-1 1 0,-1 1 0,1 1 0,-1 0 0,-1 2 0,23 16 0,-34-21 0,0 0 0,0 0 0,-1 1 0,1-1 0,-2 2 0,1-1 0,-1 1 0,0-1 0,-1 1 0,1 1 0,-2-1 0,5 14 0,-6-15 0,-1 1 0,1 0 0,-1-1 0,-1 1 0,0 0 0,0 0 0,0 0 0,-1-1 0,0 1 0,-1 0 0,1-1 0,-2 1 0,1-1 0,-1 1 0,-4 7 0,-3 2 0,0 0 0,-1 0 0,-1-1 0,-1-1 0,0 0 0,-1-1 0,-25 21 0,-121 75 0,151-104 0,-232 134 0,16-10 0,218-126 0,0 1 0,0 0 0,1-1 0,-11 12 0,17-16 0,-1 0 0,1 1 0,-1-1 0,1 1 0,0-1 0,-1 0 0,1 1 0,0-1 0,0 1 0,-1-1 0,1 1 0,0-1 0,0 1 0,0 0 0,-1-1 0,1 1 0,0-1 0,0 1 0,0-1 0,0 1 0,0-1 0,0 1 0,0 0 0,0-1 0,1 1 0,-1-1 0,0 1 0,0-1 0,0 1 0,1-1 0,-1 1 0,0-1 0,0 1 0,1-1 0,-1 1 0,0-1 0,1 1 0,-1-1 0,1 0 0,-1 1 0,0-1 0,1 0 0,-1 1 0,1-1 0,-1 0 0,2 1 0,5 1 0,-1 1 0,1-1 0,0 0 0,1-1 0,-1 0 0,8 1 0,381 5-55,-318-9-58,351-23-1925,-243 4-3947</inkml:trace>
+</inkml:ink>
+</file>
+
+<file path=ppt/ink/ink15.xml><?xml version="1.0" encoding="utf-8"?>
+<inkml:ink xmlns:inkml="http://www.w3.org/2003/InkML">
+  <inkml:definitions>
+    <inkml:context xml:id="ctx0">
+      <inkml:inkSource xml:id="inkSrc0">
+        <inkml:traceFormat>
+          <inkml:channel name="X" type="integer" min="-2.14748E9" max="2.14748E9" units="cm"/>
+          <inkml:channel name="Y" type="integer" min="-2.14748E9" max="2.14748E9" units="cm"/>
+          <inkml:channel name="F" type="integer" max="32767" units="dev"/>
+        </inkml:traceFormat>
+        <inkml:channelProperties>
+          <inkml:channelProperty channel="X" name="resolution" value="1000" units="1/cm"/>
+          <inkml:channelProperty channel="Y" name="resolution" value="1000" units="1/cm"/>
+          <inkml:channelProperty channel="F" name="resolution" value="0" units="1/dev"/>
+        </inkml:channelProperties>
+      </inkml:inkSource>
+      <inkml:timestamp xml:id="ts0" timeString="2024-06-24T22:10:09.478"/>
+    </inkml:context>
+    <inkml:brush xml:id="br0">
+      <inkml:brushProperty name="width" value="0.035" units="cm"/>
+      <inkml:brushProperty name="height" value="0.035" units="cm"/>
+      <inkml:brushProperty name="color" value="#FFFFFF"/>
+    </inkml:brush>
+  </inkml:definitions>
+  <inkml:trace contextRef="#ctx0" brushRef="#br0">1 185 24575,'0'-1'0,"1"0"0,-1 1 0,1-1 0,0 0 0,0 0 0,-1 1 0,1-1 0,0 1 0,0-1 0,0 0 0,0 1 0,0-1 0,-1 1 0,1 0 0,0-1 0,0 1 0,0 0 0,0 0 0,0-1 0,0 1 0,2 0 0,6-2 0,379-86 0,-325 77 0,-27 3 0,-20 4 0,1 1 0,-1 0 0,0 1 0,19 1 0,-29 4 0,-13 5 0,-79 47 0,31-21 0,-172 117 0,160-102 0,-75 73 0,113-89 0,29-33 0,0 0 0,0 1 0,-1-1 0,1 0 0,0 0 0,0 0 0,0 1 0,0-1 0,-1 0 0,1 0 0,0 1 0,0-1 0,0 0 0,0 0 0,0 1 0,0-1 0,0 0 0,-1 1 0,1-1 0,0 0 0,0 1 0,0-1 0,0 0 0,0 0 0,0 1 0,1-1 0,-1 0 0,0 1 0,0-1 0,0 1 0,16-9 0,10-10 0,-1-1 0,-1-1 0,36-39 0,61-82 0,-117 136 0,94-123-1365,-14 11-5461</inkml:trace>
+</inkml:ink>
+</file>
+
+<file path=ppt/ink/ink16.xml><?xml version="1.0" encoding="utf-8"?>
+<inkml:ink xmlns:inkml="http://www.w3.org/2003/InkML">
+  <inkml:definitions>
+    <inkml:context xml:id="ctx0">
+      <inkml:inkSource xml:id="inkSrc0">
+        <inkml:traceFormat>
+          <inkml:channel name="X" type="integer" min="-2.14748E9" max="2.14748E9" units="cm"/>
+          <inkml:channel name="Y" type="integer" min="-2.14748E9" max="2.14748E9" units="cm"/>
+          <inkml:channel name="F" type="integer" max="32767" units="dev"/>
+        </inkml:traceFormat>
+        <inkml:channelProperties>
+          <inkml:channelProperty channel="X" name="resolution" value="1000" units="1/cm"/>
+          <inkml:channelProperty channel="Y" name="resolution" value="1000" units="1/cm"/>
+          <inkml:channelProperty channel="F" name="resolution" value="0" units="1/dev"/>
+        </inkml:channelProperties>
+      </inkml:inkSource>
+      <inkml:timestamp xml:id="ts0" timeString="2024-06-24T22:10:09.845"/>
+    </inkml:context>
+    <inkml:brush xml:id="br0">
+      <inkml:brushProperty name="width" value="0.035" units="cm"/>
+      <inkml:brushProperty name="height" value="0.035" units="cm"/>
+      <inkml:brushProperty name="color" value="#FFFFFF"/>
+    </inkml:brush>
+  </inkml:definitions>
+  <inkml:trace contextRef="#ctx0" brushRef="#br0">0 1 24575,'0'5'0,"0"21"0,0 37 0,0 53 0,0 42 0,0 34 0,0 19-1285,0 4 1285,0-9 0,0-29 0,0-46-6906</inkml:trace>
+</inkml:ink>
+</file>
+
+<file path=ppt/ink/ink17.xml><?xml version="1.0" encoding="utf-8"?>
+<inkml:ink xmlns:inkml="http://www.w3.org/2003/InkML">
+  <inkml:definitions>
+    <inkml:context xml:id="ctx0">
+      <inkml:inkSource xml:id="inkSrc0">
+        <inkml:traceFormat>
+          <inkml:channel name="X" type="integer" min="-2.14748E9" max="2.14748E9" units="cm"/>
+          <inkml:channel name="Y" type="integer" min="-2.14748E9" max="2.14748E9" units="cm"/>
+          <inkml:channel name="F" type="integer" max="32767" units="dev"/>
+        </inkml:traceFormat>
+        <inkml:channelProperties>
+          <inkml:channelProperty channel="X" name="resolution" value="1000" units="1/cm"/>
+          <inkml:channelProperty channel="Y" name="resolution" value="1000" units="1/cm"/>
+          <inkml:channelProperty channel="F" name="resolution" value="0" units="1/dev"/>
+        </inkml:channelProperties>
+      </inkml:inkSource>
+      <inkml:timestamp xml:id="ts0" timeString="2024-06-24T22:10:10.206"/>
+    </inkml:context>
+    <inkml:brush xml:id="br0">
+      <inkml:brushProperty name="width" value="0.035" units="cm"/>
+      <inkml:brushProperty name="height" value="0.035" units="cm"/>
+      <inkml:brushProperty name="color" value="#FFFFFF"/>
+    </inkml:brush>
+  </inkml:definitions>
+  <inkml:trace contextRef="#ctx0" brushRef="#br0">289 219 24575,'-33'26'0,"0"1"0,-49 53 0,64-59 0,2 0 0,0 1 0,1 1 0,1 1 0,-13 30 0,21-40 0,0 0 0,1 0 0,1 1 0,0 0 0,1 0 0,0 0 0,0 28 0,3-37 0,0-1 0,1 1 0,-1-1 0,1 0 0,1 1 0,-1-1 0,1 0 0,0 0 0,0 0 0,0 0 0,1 0 0,-1-1 0,1 1 0,1-1 0,-1 0 0,0 0 0,1 0 0,0 0 0,0 0 0,0-1 0,0 0 0,1 1 0,0-2 0,-1 1 0,10 3 0,6 2 0,1-1 0,0-2 0,1 0 0,-1-1 0,1-1 0,0-1 0,33-1 0,-9-3 0,0-2 0,73-17 0,-83 13 0,0-3 0,-1-1 0,-1-1 0,0-2 0,57-34 0,-73 37 0,0 0 0,-1-1 0,0-1 0,-1 0 0,0-2 0,-1 1 0,-1-2 0,-1 0 0,0-1 0,-2 0 0,14-26 0,-22 37 0,0 0 0,0 1 0,-1-1 0,0 0 0,0-1 0,-1 1 0,0 0 0,0 0 0,0-1 0,-1 1 0,0 0 0,-1-1 0,0 1 0,0 0 0,0 0 0,-1 0 0,0-1 0,-1 2 0,1-1 0,-1 0 0,0 0 0,-1 1 0,0 0 0,0 0 0,0 0 0,-9-9 0,-2 1 0,0 1 0,0 1 0,-1 0 0,-1 1 0,0 0 0,-21-8 0,-115-42 0,131 53 0,-250-77-1365,162 57-5461</inkml:trace>
+</inkml:ink>
+</file>
+
+<file path=ppt/ink/ink18.xml><?xml version="1.0" encoding="utf-8"?>
+<inkml:ink xmlns:inkml="http://www.w3.org/2003/InkML">
+  <inkml:definitions>
+    <inkml:context xml:id="ctx0">
+      <inkml:inkSource xml:id="inkSrc0">
+        <inkml:traceFormat>
+          <inkml:channel name="X" type="integer" min="-2.14748E9" max="2.14748E9" units="cm"/>
+          <inkml:channel name="Y" type="integer" min="-2.14748E9" max="2.14748E9" units="cm"/>
+          <inkml:channel name="F" type="integer" max="32767" units="dev"/>
+        </inkml:traceFormat>
+        <inkml:channelProperties>
+          <inkml:channelProperty channel="X" name="resolution" value="1000" units="1/cm"/>
+          <inkml:channelProperty channel="Y" name="resolution" value="1000" units="1/cm"/>
+          <inkml:channelProperty channel="F" name="resolution" value="0" units="1/dev"/>
+        </inkml:channelProperties>
+      </inkml:inkSource>
+      <inkml:timestamp xml:id="ts0" timeString="2024-06-24T22:10:12.554"/>
+    </inkml:context>
+    <inkml:brush xml:id="br0">
+      <inkml:brushProperty name="width" value="0.035" units="cm"/>
+      <inkml:brushProperty name="height" value="0.035" units="cm"/>
+      <inkml:brushProperty name="color" value="#FFFFFF"/>
+    </inkml:brush>
+  </inkml:definitions>
+  <inkml:trace contextRef="#ctx0" brushRef="#br0">1141 0 24575,'-11'37'0,"0"-1"0,-19 38 0,6-17 0,-43 112 0,-21 53-457,-17 43-2,-177 456-775,28 11 641,177-476 467,-78 474 0,129-537-744,15-134-3456</inkml:trace>
+</inkml:ink>
+</file>
+
+<file path=ppt/ink/ink19.xml><?xml version="1.0" encoding="utf-8"?>
+<inkml:ink xmlns:inkml="http://www.w3.org/2003/InkML">
+  <inkml:definitions>
+    <inkml:context xml:id="ctx0">
+      <inkml:inkSource xml:id="inkSrc0">
+        <inkml:traceFormat>
+          <inkml:channel name="X" type="integer" min="-2.14748E9" max="2.14748E9" units="cm"/>
+          <inkml:channel name="Y" type="integer" min="-2.14748E9" max="2.14748E9" units="cm"/>
+          <inkml:channel name="F" type="integer" max="32767" units="dev"/>
+        </inkml:traceFormat>
+        <inkml:channelProperties>
+          <inkml:channelProperty channel="X" name="resolution" value="1000" units="1/cm"/>
+          <inkml:channelProperty channel="Y" name="resolution" value="1000" units="1/cm"/>
+          <inkml:channelProperty channel="F" name="resolution" value="0" units="1/dev"/>
+        </inkml:channelProperties>
+      </inkml:inkSource>
+      <inkml:timestamp xml:id="ts0" timeString="2024-06-24T22:10:13.281"/>
+    </inkml:context>
+    <inkml:brush xml:id="br0">
+      <inkml:brushProperty name="width" value="0.035" units="cm"/>
+      <inkml:brushProperty name="height" value="0.035" units="cm"/>
+      <inkml:brushProperty name="color" value="#FFFFFF"/>
+    </inkml:brush>
+  </inkml:definitions>
+  <inkml:trace contextRef="#ctx0" brushRef="#br0">0 1 24575,'172'0'0,"535"13"0,-654-11 0,0 3 0,72 17 0,-118-21 0,0 1 0,-1 0 0,1 1 0,0 0 0,-1 0 0,0 0 0,0 0 0,0 1 0,0 0 0,0 1 0,-1-1 0,10 11 0,-12-10 0,0 1 0,1-1 0,-2 0 0,1 1 0,-1 0 0,0 0 0,0 0 0,0 0 0,-1 0 0,0 0 0,0 0 0,0 0 0,-1 0 0,-1 13 0,-1-2 0,0 0 0,-1-1 0,-1 1 0,0-1 0,-10 23 0,-2-2 0,-29 47 0,-8-1-183,-3-3 0,-4-2 0,-138 138-1,-248 166-548,443-380 732,-58 45 0,-105 64 0,139-101 0,27-9 0,0-1 0,-1 0 0,1 0 0,0 0 0,0 0 0,-1 0 0,1 0 0,0 0 0,0 0 0,0 0 0,-1 0 0,1 0 0,0 0 0,0 0 0,-1 0 0,1 0 0,0-1 0,0 1 0,0 0 0,-1 0 0,1 0 0,0 0 0,0 0 0,0 0 0,-1-1 0,1 1 0,0 0 0,0 0 0,0 0 0,0 0 0,0-1 0,0 1 0,-1 0 0,1 0 0,0 0 0,0-1 0,0 1 0,0 0 0,0 0 0,0 0 0,0-1 0,0 1 0,0 0 0,0 0 0,0-1 0,0 1 0,0 0 0,2-6 0,0 1 0,0 1 0,0-1 0,1 0 0,0 0 0,6-6 0,43-57 0,3 3 0,3 2 0,2 3 0,3 2 0,114-79 0,-156 123 61,-1 0 0,2 2 0,44-18 0,-62 29-10,0-1-1,1 1 1,-1 1 0,0-1-1,0 1 1,1-1 0,-1 1-1,0 0 1,0 1 0,1-1-1,-1 1 1,0 0 0,0 0-1,0 0 1,0 0 0,0 1-1,0 0 1,0-1 0,0 2-1,-1-1 1,1 0 0,-1 1-1,1-1 1,-1 1 0,5 5-1,5 8-79,-1-1 0,0 1-1,-1 1 1,11 23 0,-16-31 79,45 89 10,47 126 0,17 114-1545,-97-280-5341</inkml:trace>
+</inkml:ink>
+</file>
+
+<file path=ppt/ink/ink2.xml><?xml version="1.0" encoding="utf-8"?>
+<inkml:ink xmlns:inkml="http://www.w3.org/2003/InkML">
+  <inkml:definitions>
+    <inkml:context xml:id="ctx0">
+      <inkml:inkSource xml:id="inkSrc0">
+        <inkml:traceFormat>
+          <inkml:channel name="X" type="integer" min="-2.14748E9" max="2.14748E9" units="cm"/>
+          <inkml:channel name="Y" type="integer" min="-2.14748E9" max="2.14748E9" units="cm"/>
+          <inkml:channel name="F" type="integer" max="32767" units="dev"/>
+        </inkml:traceFormat>
+        <inkml:channelProperties>
+          <inkml:channelProperty channel="X" name="resolution" value="1000" units="1/cm"/>
+          <inkml:channelProperty channel="Y" name="resolution" value="1000" units="1/cm"/>
+          <inkml:channelProperty channel="F" name="resolution" value="0" units="1/dev"/>
+        </inkml:channelProperties>
+      </inkml:inkSource>
+      <inkml:timestamp xml:id="ts0" timeString="2024-06-24T22:09:41.492"/>
+    </inkml:context>
+    <inkml:brush xml:id="br0">
+      <inkml:brushProperty name="width" value="0.035" units="cm"/>
+      <inkml:brushProperty name="height" value="0.035" units="cm"/>
+      <inkml:brushProperty name="color" value="#E71224"/>
+    </inkml:brush>
+  </inkml:definitions>
+  <inkml:trace contextRef="#ctx0" brushRef="#br0">1 157 24575,'10'-5'0,"18"-17"0,30-15 0,29-10 0,1 2-8191</inkml:trace>
+</inkml:ink>
+</file>
+
+<file path=ppt/ink/ink20.xml><?xml version="1.0" encoding="utf-8"?>
+<inkml:ink xmlns:inkml="http://www.w3.org/2003/InkML">
+  <inkml:definitions>
+    <inkml:context xml:id="ctx0">
+      <inkml:inkSource xml:id="inkSrc0">
+        <inkml:traceFormat>
+          <inkml:channel name="X" type="integer" min="-2.14748E9" max="2.14748E9" units="cm"/>
+          <inkml:channel name="Y" type="integer" min="-2.14748E9" max="2.14748E9" units="cm"/>
+          <inkml:channel name="F" type="integer" max="32767" units="dev"/>
+        </inkml:traceFormat>
+        <inkml:channelProperties>
+          <inkml:channelProperty channel="X" name="resolution" value="1000" units="1/cm"/>
+          <inkml:channelProperty channel="Y" name="resolution" value="1000" units="1/cm"/>
+          <inkml:channelProperty channel="F" name="resolution" value="0" units="1/dev"/>
+        </inkml:channelProperties>
+      </inkml:inkSource>
+      <inkml:timestamp xml:id="ts0" timeString="2024-06-24T22:10:13.622"/>
+    </inkml:context>
+    <inkml:brush xml:id="br0">
+      <inkml:brushProperty name="width" value="0.035" units="cm"/>
+      <inkml:brushProperty name="height" value="0.035" units="cm"/>
+      <inkml:brushProperty name="color" value="#FFFFFF"/>
+    </inkml:brush>
+  </inkml:definitions>
+  <inkml:trace contextRef="#ctx0" brushRef="#br0">1 549 24575,'48'-44'0,"71"-51"0,-33 29 0,-64 48 0,321-269 0,-335 279 0,0 1 0,0 0 0,11-6 0,-18 12 0,-1 1 0,1 0 0,0-1 0,-1 1 0,1 0 0,0-1 0,0 1 0,-1 0 0,1 0 0,0 0 0,0-1 0,0 1 0,-1 0 0,1 0 0,0 0 0,0 0 0,0 0 0,-1 1 0,1-1 0,0 0 0,0 0 0,-1 0 0,1 1 0,0-1 0,0 0 0,-1 1 0,1-1 0,0 1 0,-1-1 0,1 1 0,-1-1 0,1 1 0,0-1 0,-1 1 0,1 0 0,-1-1 0,0 1 0,1 0 0,-1-1 0,1 1 0,-1 0 0,0 0 0,0-1 0,1 1 0,-1 1 0,2 5 0,-1 0 0,0 0 0,0 0 0,0 9 0,-1-16 0,0 82-13,-4-1 0,-18 103-1,10-96-122,-133 977-747,131-981-306,3-24-4754</inkml:trace>
+</inkml:ink>
+</file>
+
+<file path=ppt/ink/ink21.xml><?xml version="1.0" encoding="utf-8"?>
+<inkml:ink xmlns:inkml="http://www.w3.org/2003/InkML">
+  <inkml:definitions>
+    <inkml:context xml:id="ctx0">
+      <inkml:inkSource xml:id="inkSrc0">
+        <inkml:traceFormat>
+          <inkml:channel name="X" type="integer" min="-2.14748E9" max="2.14748E9" units="cm"/>
+          <inkml:channel name="Y" type="integer" min="-2.14748E9" max="2.14748E9" units="cm"/>
+          <inkml:channel name="F" type="integer" max="32767" units="dev"/>
+        </inkml:traceFormat>
+        <inkml:channelProperties>
+          <inkml:channelProperty channel="X" name="resolution" value="1000" units="1/cm"/>
+          <inkml:channelProperty channel="Y" name="resolution" value="1000" units="1/cm"/>
+          <inkml:channelProperty channel="F" name="resolution" value="0" units="1/dev"/>
+        </inkml:channelProperties>
+      </inkml:inkSource>
+      <inkml:timestamp xml:id="ts0" timeString="2024-06-24T22:10:13.973"/>
+    </inkml:context>
+    <inkml:brush xml:id="br0">
+      <inkml:brushProperty name="width" value="0.035" units="cm"/>
+      <inkml:brushProperty name="height" value="0.035" units="cm"/>
+      <inkml:brushProperty name="color" value="#FFFFFF"/>
+    </inkml:brush>
+  </inkml:definitions>
+  <inkml:trace contextRef="#ctx0" brushRef="#br0">137 0 24575,'-19'46'0,"1"0"0,2 1 0,-10 52 0,18-67 0,7-26 0,-13 44 0,2 1 0,3 1 0,-4 67 0,13-112 0,0-1 0,0 1 0,1 0 0,0-1 0,0 1 0,0-1 0,1 1 0,4 10 0,-4-14 0,0 0 0,-1 0 0,1 0 0,1 0 0,-1-1 0,0 1 0,1-1 0,-1 0 0,1 1 0,0-1 0,0-1 0,0 1 0,0 0 0,0-1 0,0 1 0,0-1 0,0 0 0,6 1 0,11 3 0,0-2 0,0-1 0,0 0 0,1-2 0,-1 0 0,34-5 0,-22 0 0,0-2 0,-1 0 0,45-18 0,-53 15 0,-1 0 0,0-1 0,-1-1 0,0-1 0,-1-1 0,0-1 0,17-17 0,-29 24 0,0 0 0,0-1 0,0 0 0,-1-1 0,-1 1 0,0-1 0,0-1 0,-1 1 0,0-1 0,0 0 0,-2 0 0,1 0 0,-1 0 0,-1-1 0,0 1 0,0-22 0,-2 27 7,0 0 0,-1 0 0,0 0 0,0 0 0,-1 1 1,1-1-1,-1 0 0,-1 0 0,1 1 0,-1 0 0,0-1 0,0 1 0,-1 0 0,1 0 0,-1 1 0,-7-8 0,3 5-172,0 1 0,-1-1 0,0 1 0,0 1 0,0-1 0,0 2 0,-1-1 0,-15-3 0,-11-2-6661</inkml:trace>
+</inkml:ink>
+</file>
+
+<file path=ppt/ink/ink22.xml><?xml version="1.0" encoding="utf-8"?>
+<inkml:ink xmlns:inkml="http://www.w3.org/2003/InkML">
+  <inkml:definitions>
+    <inkml:context xml:id="ctx0">
+      <inkml:inkSource xml:id="inkSrc0">
+        <inkml:traceFormat>
+          <inkml:channel name="X" type="integer" min="-2.14748E9" max="2.14748E9" units="cm"/>
+          <inkml:channel name="Y" type="integer" min="-2.14748E9" max="2.14748E9" units="cm"/>
+          <inkml:channel name="F" type="integer" max="32767" units="dev"/>
+        </inkml:traceFormat>
+        <inkml:channelProperties>
+          <inkml:channelProperty channel="X" name="resolution" value="1000" units="1/cm"/>
+          <inkml:channelProperty channel="Y" name="resolution" value="1000" units="1/cm"/>
+          <inkml:channelProperty channel="F" name="resolution" value="0" units="1/dev"/>
+        </inkml:channelProperties>
+      </inkml:inkSource>
+      <inkml:timestamp xml:id="ts0" timeString="2024-06-24T22:10:14.326"/>
+    </inkml:context>
+    <inkml:brush xml:id="br0">
+      <inkml:brushProperty name="width" value="0.035" units="cm"/>
+      <inkml:brushProperty name="height" value="0.035" units="cm"/>
+      <inkml:brushProperty name="color" value="#FFFFFF"/>
+    </inkml:brush>
+  </inkml:definitions>
+  <inkml:trace contextRef="#ctx0" brushRef="#br0">256 1 24575,'-10'10'0,"-14"24"0,-7 20 0,-13 27 0,-5 20 0,6 2 0,10-11 0,11-21-8191</inkml:trace>
+</inkml:ink>
+</file>
+
+<file path=ppt/ink/ink23.xml><?xml version="1.0" encoding="utf-8"?>
+<inkml:ink xmlns:inkml="http://www.w3.org/2003/InkML">
+  <inkml:definitions>
+    <inkml:context xml:id="ctx0">
+      <inkml:inkSource xml:id="inkSrc0">
+        <inkml:traceFormat>
+          <inkml:channel name="X" type="integer" min="-2.14748E9" max="2.14748E9" units="cm"/>
+          <inkml:channel name="Y" type="integer" min="-2.14748E9" max="2.14748E9" units="cm"/>
+          <inkml:channel name="F" type="integer" max="32767" units="dev"/>
+        </inkml:traceFormat>
+        <inkml:channelProperties>
+          <inkml:channelProperty channel="X" name="resolution" value="1000" units="1/cm"/>
+          <inkml:channelProperty channel="Y" name="resolution" value="1000" units="1/cm"/>
+          <inkml:channelProperty channel="F" name="resolution" value="0" units="1/dev"/>
+        </inkml:channelProperties>
+      </inkml:inkSource>
+      <inkml:timestamp xml:id="ts0" timeString="2024-06-24T22:10:14.776"/>
+    </inkml:context>
+    <inkml:brush xml:id="br0">
+      <inkml:brushProperty name="width" value="0.035" units="cm"/>
+      <inkml:brushProperty name="height" value="0.035" units="cm"/>
+      <inkml:brushProperty name="color" value="#FFFFFF"/>
+    </inkml:brush>
+  </inkml:definitions>
+  <inkml:trace contextRef="#ctx0" brushRef="#br0">802 0 24575,'0'17'0,"-1"-1"0,-1 1 0,-1-1 0,-8 30 0,-28 56 0,30-82 0,-19 42 0,-3-1 0,-3-2 0,-2-1 0,-3-2 0,-61 70 0,81-105 0,-1-1 0,-1-1 0,0 0 0,-2-2 0,0 0 0,-35 18 0,46-28 0,0-1 0,-1-1 0,0 0 0,0-1 0,0 0 0,-1-1 0,1-1 0,-1 0 0,1-1 0,-1 0 0,0-1 0,0 0 0,1-1 0,-27-6 0,33 5 0,1 0 0,0-1 0,0 1 0,0-1 0,-7-5 0,11 7 0,1 0 0,0 1 0,0-1 0,0 0 0,0-1 0,0 1 0,0 0 0,0 0 0,0 0 0,0 0 0,0-1 0,-1-2 0,2 3 0,0 1 0,0-1 0,0 0 0,0 0 0,0 0 0,0 0 0,0 1 0,0-1 0,1 0 0,-1 0 0,0 0 0,0 1 0,1-1 0,-1 0 0,0 0 0,1 1 0,-1-1 0,1 0 0,-1 1 0,1-1 0,-1 0 0,1 1 0,-1-1 0,1 1 0,1-1 0,1-2 0,1 0 0,0 1 0,0 0 0,0 0 0,0 0 0,0 0 0,0 1 0,9-3 0,43-4 0,-45 7 0,54-5 0,1 2 0,0 4 0,-1 2 0,1 4 0,109 23 0,-151-24 0,-1 1 0,-1 2 0,1 0 0,-1 1 0,-1 1 0,0 1 0,21 15 0,-31-18 0,-1 0 0,0 1 0,-1 0 0,0 1 0,0 0 0,-1 0 0,0 1 0,-1-1 0,0 2 0,-1-1 0,0 1 0,0 0 0,-2 1 0,5 15 0,-5-12 0,-1 0 0,-1 0 0,-1 0 0,0 0 0,-1 0 0,0 1 0,-2-1 0,-3 20 0,0-12 0,-2 0 0,-1 0 0,0-1 0,-22 40 0,2-15 0,-3 0 0,-2-3 0,-1 0 0,-42 40 0,-13 2 0,-8 10 0,94-93 0,-1-1 0,1 1 0,0 0 0,0 0 0,1 0 0,-1 0 0,1 0 0,0 1 0,0-1 0,0 1 0,-1 6 0,2-10 0,1 1 0,0-1 0,1 0 0,-1 1 0,0-1 0,0 0 0,0 1 0,1-1 0,-1 0 0,1 0 0,-1 1 0,1-1 0,-1 0 0,1 0 0,0 0 0,0 0 0,1 1 0,0 1 0,1-1 0,-1 0 0,1 0 0,0 0 0,0 0 0,0 0 0,0-1 0,7 3 0,9 2 0,0-1 0,1 0 0,39 2 0,73-1 0,-110-5 0,527-7-2034,-418 1-4123</inkml:trace>
+</inkml:ink>
+</file>
+
+<file path=ppt/ink/ink24.xml><?xml version="1.0" encoding="utf-8"?>
+<inkml:ink xmlns:inkml="http://www.w3.org/2003/InkML">
+  <inkml:definitions>
+    <inkml:context xml:id="ctx0">
+      <inkml:inkSource xml:id="inkSrc0">
+        <inkml:traceFormat>
+          <inkml:channel name="X" type="integer" min="-2.14748E9" max="2.14748E9" units="cm"/>
+          <inkml:channel name="Y" type="integer" min="-2.14748E9" max="2.14748E9" units="cm"/>
+          <inkml:channel name="F" type="integer" max="32767" units="dev"/>
+        </inkml:traceFormat>
+        <inkml:channelProperties>
+          <inkml:channelProperty channel="X" name="resolution" value="1000" units="1/cm"/>
+          <inkml:channelProperty channel="Y" name="resolution" value="1000" units="1/cm"/>
+          <inkml:channelProperty channel="F" name="resolution" value="0" units="1/dev"/>
+        </inkml:channelProperties>
+      </inkml:inkSource>
+      <inkml:timestamp xml:id="ts0" timeString="2024-06-24T22:10:17.791"/>
+    </inkml:context>
+    <inkml:brush xml:id="br0">
+      <inkml:brushProperty name="width" value="0.035" units="cm"/>
+      <inkml:brushProperty name="height" value="0.035" units="cm"/>
+      <inkml:brushProperty name="color" value="#FFFFFF"/>
+    </inkml:brush>
+  </inkml:definitions>
+  <inkml:trace contextRef="#ctx0" brushRef="#br0">423 287 24575,'-21'79'0,"-31"152"0,46-197 0,3-19 0,0 1 0,1-1 0,1 1 0,0-1 0,1 1 0,0 0 0,5 20 0,-5-35 0,0 0 0,0 0 0,1 1 0,-1-1 0,0 0 0,1 0 0,-1 0 0,1 0 0,0 0 0,-1 0 0,1 0 0,0 0 0,0 0 0,-1 0 0,1 0 0,0 0 0,0 0 0,0-1 0,0 1 0,0 0 0,0-1 0,0 1 0,0-1 0,1 1 0,1 0 0,0-1 0,0 0 0,0 0 0,0 0 0,0 0 0,0-1 0,0 1 0,0-1 0,0 0 0,0 0 0,3-2 0,12-4 0,-1-2 0,0 0 0,0-1 0,-1-1 0,24-19 0,69-74 0,-108 103 0,40-43 0,-1-1 0,49-72 0,-74 95 0,-2-2 0,0 1 0,-1-2 0,-1 0 0,-1 0 0,-2-1 0,10-50 0,-16 61 0,0 1 0,-1-1 0,-2-22 0,1 32 0,-1 1 0,0-1 0,0 1 0,0-1 0,0 1 0,0 0 0,-1-1 0,0 1 0,0 0 0,0 0 0,0 0 0,-1 0 0,0 1 0,-5-8 0,7 10 0,0 1 0,0-1 0,0 0 0,0 0 0,-1 1 0,1-1 0,0 1 0,0-1 0,0 1 0,0-1 0,-1 1 0,1 0 0,0-1 0,0 1 0,-1 0 0,1 0 0,0 0 0,-1 0 0,1 0 0,0 0 0,0 0 0,-1 1 0,1-1 0,0 0 0,-2 1 0,0 1 0,0 0 0,0-1 0,0 1 0,0 0 0,0 1 0,1-1 0,-1 0 0,-3 6 0,-6 9 0,1 0 0,1 2 0,0-1 0,1 1 0,-9 30 0,16-43 0,-25 72 0,-24 118 0,1 85 0,-26 108 0,68-358 0,-1-1 0,-2 0 0,-1 0 0,-17 30 0,23-50 0,0 0 0,0-1 0,-1 1 0,-1-1 0,1-1 0,-1 0 0,-1 0 0,0 0 0,0-1 0,0 0 0,-1-1 0,0 0 0,0 0 0,-15 5 0,-3-3 0,-1-1 0,0 0 0,-1-3 0,1 0 0,-1-2 0,1-1 0,-58-5 0,85 4 0,0 0 0,0-1 0,0 1 0,0 0 0,0-1 0,0 1 0,0-1 0,0 1 0,0-1 0,0 0 0,0 0 0,0 0 0,1 0 0,-1 0 0,0 0 0,-2-3 0,4 3 0,-1 0 0,1 0 0,0 1 0,0-1 0,-1 0 0,1 1 0,0-1 0,0 0 0,0 0 0,0 1 0,0-1 0,0 0 0,0 0 0,0 1 0,0-1 0,0 0 0,1 0 0,-1 0 0,13-21 0,6 3 0,1 0 0,1 1 0,0 1 0,1 1 0,25-14 0,-14 9 0,229-148-715,87-58 91,-19-17 643,-266 190-54,71-76 1,-115 109 25,-2-2 0,0 0 1,-1-1-1,-2 0 0,0-1 1,-1-1-1,9-28 0,-11 11 9,-11 41 0,-1 1 0,1-1 0,-1 1 0,0-1 0,0 1 0,0-1 0,0 1 0,0-1 0,0 1 0,0-1 0,0 1 0,0-1 0,-1 1 0,1-1 0,0 1 0,-1-1 0,0 1 0,1 0 0,-1-1 0,0 1 0,-1-3 0,1 4 8,0 0 0,0 0-1,0 0 1,0 0-1,0 0 1,0 1-1,1-1 1,-1 0-1,0 0 1,0 0-1,0 1 1,0-1-1,1 1 1,-1-1-1,0 0 1,0 1-1,0 0 1,1-1 0,-1 1-1,0-1 1,1 1-1,-1 0 1,1-1-1,-1 1 1,1 0-1,-1 0 1,1-1-1,-1 3 1,-13 19 210,2 0 0,0 1 0,1 1 0,-12 43 0,21-61-216,-36 111-5,-24 139 0,3 128 34,44-194 92,15-187-123,0 0 0,0 0 0,0 0 0,0 0 0,0 0 0,1 1 0,-1-1 0,1 0 0,1 3 0,-2-6 0,1 0 0,-1 0 0,0 1 0,0-1 0,0 0 0,1 0 0,-1 0 0,0 0 0,0 1 0,1-1 0,-1 0 0,0 0 0,0 0 0,1 0 0,-1 0 0,0 0 0,0 0 0,1 0 0,-1 0 0,0 0 0,0 0 0,1 0 0,-1 0 0,0 0 0,0 0 0,1 0 0,-1 0 0,0 0 0,0 0 0,1 0 0,-1 0 0,0-1 0,0 1 0,1 0 0,14-14 0,80-110 0,6-8 0,-66 92 24,2 2 0,1 1 0,1 2 0,68-45 0,-83 64-159,0 2 0,1 0 0,0 2 0,1 1 0,1 1 0,-1 1 0,2 1 0,-1 2 0,1 0 0,34-1 0,-25 7-6691</inkml:trace>
+</inkml:ink>
+</file>
+
+<file path=ppt/ink/ink25.xml><?xml version="1.0" encoding="utf-8"?>
+<inkml:ink xmlns:inkml="http://www.w3.org/2003/InkML">
+  <inkml:definitions>
+    <inkml:context xml:id="ctx0">
+      <inkml:inkSource xml:id="inkSrc0">
+        <inkml:traceFormat>
+          <inkml:channel name="X" type="integer" min="-2.14748E9" max="2.14748E9" units="cm"/>
+          <inkml:channel name="Y" type="integer" min="-2.14748E9" max="2.14748E9" units="cm"/>
+          <inkml:channel name="F" type="integer" max="32767" units="dev"/>
+        </inkml:traceFormat>
+        <inkml:channelProperties>
+          <inkml:channelProperty channel="X" name="resolution" value="1000" units="1/cm"/>
+          <inkml:channelProperty channel="Y" name="resolution" value="1000" units="1/cm"/>
+          <inkml:channelProperty channel="F" name="resolution" value="0" units="1/dev"/>
+        </inkml:channelProperties>
+      </inkml:inkSource>
+      <inkml:timestamp xml:id="ts0" timeString="2024-06-24T22:10:18.222"/>
+    </inkml:context>
+    <inkml:brush xml:id="br0">
+      <inkml:brushProperty name="width" value="0.035" units="cm"/>
+      <inkml:brushProperty name="height" value="0.035" units="cm"/>
+      <inkml:brushProperty name="color" value="#FFFFFF"/>
+    </inkml:brush>
+  </inkml:definitions>
+  <inkml:trace contextRef="#ctx0" brushRef="#br0">93 1 24575,'-2'0'0,"1"1"0,0-1 0,0 1 0,0-1 0,0 1 0,0 0 0,0-1 0,0 1 0,0 0 0,0 0 0,0 0 0,0 0 0,0 0 0,1 0 0,-1 0 0,0 0 0,1 0 0,-1 0 0,0 1 0,-13 27 0,12-23 0,-10 28 0,1 1 0,1 0 0,2 0 0,2 1 0,1 0 0,0 53 0,4-84 0,1 0 0,0 0 0,1 0 0,-1 0 0,1 0 0,0 0 0,0 0 0,1 0 0,3 7 0,-3-8 0,0-1 0,0 0 0,1 0 0,-1 0 0,1 0 0,0 0 0,0 0 0,0-1 0,0 1 0,1-1 0,-1 0 0,1 0 0,4 2 0,13 4 0,0 0 0,1-2 0,0 0 0,1-1 0,-1-1 0,1-2 0,-1 0 0,24-1 0,19-4 0,103-16 0,494-132 0,-659 150 0,110-30-1365,-28 5-5461</inkml:trace>
+</inkml:ink>
+</file>
+
+<file path=ppt/ink/ink26.xml><?xml version="1.0" encoding="utf-8"?>
+<inkml:ink xmlns:inkml="http://www.w3.org/2003/InkML">
+  <inkml:definitions>
+    <inkml:context xml:id="ctx0">
+      <inkml:inkSource xml:id="inkSrc0">
+        <inkml:traceFormat>
+          <inkml:channel name="X" type="integer" min="-2.14748E9" max="2.14748E9" units="cm"/>
+          <inkml:channel name="Y" type="integer" min="-2.14748E9" max="2.14748E9" units="cm"/>
+          <inkml:channel name="F" type="integer" max="32767" units="dev"/>
+        </inkml:traceFormat>
+        <inkml:channelProperties>
+          <inkml:channelProperty channel="X" name="resolution" value="1000" units="1/cm"/>
+          <inkml:channelProperty channel="Y" name="resolution" value="1000" units="1/cm"/>
+          <inkml:channelProperty channel="F" name="resolution" value="0" units="1/dev"/>
+        </inkml:channelProperties>
+      </inkml:inkSource>
+      <inkml:timestamp xml:id="ts0" timeString="2024-06-24T22:10:19.278"/>
+    </inkml:context>
+    <inkml:brush xml:id="br0">
+      <inkml:brushProperty name="width" value="0.035" units="cm"/>
+      <inkml:brushProperty name="height" value="0.035" units="cm"/>
+      <inkml:brushProperty name="color" value="#FFFFFF"/>
+    </inkml:brush>
+  </inkml:definitions>
+  <inkml:trace contextRef="#ctx0" brushRef="#br0">1 54 24575,'26'-10'0,"1"1"0,0 1 0,1 2 0,0 0 0,51-3 0,-67 8 0,5-1 0,1 1 0,0 0 0,35 4 0,-48-3 0,0 1 0,-1 0 0,1 0 0,0 1 0,-1-1 0,1 1 0,-1 0 0,1 0 0,-1 1 0,0-1 0,0 1 0,0 0 0,0 0 0,-1 0 0,1 1 0,-1-1 0,0 1 0,0 0 0,5 8 0,-4-3 0,0 0 0,0 1 0,-1-1 0,0 1 0,-1 0 0,0 0 0,-1-1 0,0 1 0,0 1 0,-2 17 0,-2-1 0,-1 0 0,-15 49 0,-20 41 0,-76 157 0,64-161 0,-55 174 0,104-279 0,-1 0 0,1 0 0,1 0 0,0 0 0,0 0 0,1 0 0,-1 0 0,3 12 0,-2-17 0,1 0 0,0-1 0,0 1 0,1 0 0,-1 0 0,0-1 0,1 1 0,0-1 0,-1 1 0,1-1 0,0 1 0,0-1 0,1 0 0,-1 0 0,0 0 0,1 0 0,-1-1 0,1 1 0,0-1 0,-1 1 0,1-1 0,0 0 0,0 0 0,0 0 0,4 0 0,20 4 0,0 0 0,1-2 0,0-2 0,-1 0 0,34-4 0,27-6 0,-1-4 0,-1-3 0,0-5 0,-2-3 0,122-51 0,-176 63 0,-1 0 0,0-2 0,-1-1 0,48-35 0,-73 48 0,-1 0 0,0 0 0,0 0 0,0-1 0,0 1 0,0-1 0,0 1 0,0-1 0,-1 1 0,1-1 0,1-5 0,-3 7 0,0 1 0,1-1 0,-1 0 0,0 0 0,0 0 0,0 0 0,0 0 0,0 0 0,-1 0 0,1 0 0,0 0 0,0 0 0,-1 0 0,1 0 0,0 0 0,-1 0 0,1 1 0,-1-1 0,1 0 0,-1 0 0,0 0 0,1 1 0,-1-1 0,-1-1 0,-2 0 0,0 0 0,0 0 0,0 0 0,-1 0 0,1 0 0,-1 1 0,1 0 0,-1 0 0,0 0 0,1 1 0,-1-1 0,0 1 0,-5 1 0,-16 0 0,1 2 0,0 1 0,0 1 0,0 1 0,1 1 0,0 1 0,0 2 0,1 0 0,0 1 0,-42 29 0,38-21 0,0 2 0,1 1 0,1 1 0,1 1 0,1 1 0,2 1 0,-35 54 0,36-45 0,1 1 0,2 1 0,1 0 0,-12 49 0,20-57 0,2-1 0,1 1 0,2-1 0,0 1 0,2 1 0,4 46 0,-2-64 0,1 0 0,0-1 0,1 1 0,0 0 0,1-1 0,0 0 0,1 0 0,0 0 0,10 15 0,-10-20 0,0 0 0,0 0 0,1 0 0,-1-1 0,1 0 0,0 0 0,1 0 0,-1-1 0,1 0 0,0 0 0,0-1 0,0 0 0,1 0 0,-1 0 0,11 1 0,7 0 0,-1-1 0,1-1 0,-1-1 0,1-1 0,0-2 0,-1 0 0,0-1 0,1-2 0,-1-1 0,37-13 0,-18 2 0,-1-1 0,-1-2 0,-1-2 0,67-47 0,-69 39 0,-1-2 0,-1-1 0,-2-1 0,-1-2 0,41-61 0,-36 44 0,-27 43 0,-10 10 0,-1 0 0,0 0 0,0 0 0,0 0 0,1 0 0,-1 0 0,0 1 0,0-1 0,0 0 0,0 0 0,1 0 0,-1 0 0,0 1 0,0-1 0,0 0 0,0 0 0,0 0 0,0 1 0,0-1 0,1 0 0,-1 0 0,0 1 0,0-1 0,0 0 0,0 0 0,0 1 0,0-1 0,0 0 0,0 0 0,0 0 0,0 1 0,0-1 0,0 0 0,-1 1 0,-5 35 0,5-32 0,-26 104 0,-60 149 0,53-176 0,-3-3 0,-68 109 0,96-172 0,-1-1 0,-1 0 0,0-1 0,-1 0 0,-1 0 0,-19 15 0,25-24 0,0 1 0,0-1 0,0 0 0,0-1 0,-1 0 0,1 0 0,-1 0 0,0-1 0,0 0 0,1-1 0,-2 0 0,1 0 0,0 0 0,0-1 0,0-1 0,-9 0 0,3-2 0,0-1 0,0 0 0,1-1 0,0 0 0,0-1 0,0 0 0,0-1 0,1-1 0,1 0 0,-20-17 0,-2-5 0,2-2 0,-30-39 0,45 52 0,2 0 0,0-1 0,-17-34 0,29 50 0,0-1 0,0 1 0,0 0 0,1-1 0,0 1 0,0-1 0,0-5 0,1 8 0,0 1 0,0-1 0,0 0 0,0 1 0,1-1 0,-1 0 0,0 1 0,1-1 0,0 1 0,-1-1 0,1 1 0,0-1 0,0 1 0,0-1 0,0 1 0,0 0 0,0-1 0,0 1 0,0 0 0,0 0 0,1 0 0,-1 0 0,3-2 0,2 0 0,1 0 0,-1 1 0,1 0 0,0 0 0,-1 0 0,1 0 0,0 1 0,0 0 0,0 1 0,8 0 0,15 1 0,37 6 0,227 53-75,-210-41-137,1186 242-1224,-1005-217 1436,-212-39 0,-53-5-33,1 0 0,-1 0 1,1 0-1,-1 0 0,1 0 1,-1 0-1,1 0 0,-1 0 1,1 0-1,-1 0 0,0 0 1,1 0-1,-1 0 0,1 0 1,-1 0-1,1-1 0,-1 1 1,1 0-1,-1 0 0,0-1 1,1 1-1,-1 0 0,1-1 1,-1 1-1,0 0 0,1-1 1,-1 1-1,0 0 0,0-1 1,1 1-1,-1-1 0,0 0 1,-7-11-5358</inkml:trace>
+</inkml:ink>
+</file>
+
+<file path=ppt/ink/ink27.xml><?xml version="1.0" encoding="utf-8"?>
+<inkml:ink xmlns:inkml="http://www.w3.org/2003/InkML">
+  <inkml:definitions>
+    <inkml:context xml:id="ctx0">
+      <inkml:inkSource xml:id="inkSrc0">
+        <inkml:traceFormat>
+          <inkml:channel name="X" type="integer" min="-2.14748E9" max="2.14748E9" units="cm"/>
+          <inkml:channel name="Y" type="integer" min="-2.14748E9" max="2.14748E9" units="cm"/>
+          <inkml:channel name="F" type="integer" max="32767" units="dev"/>
+        </inkml:traceFormat>
+        <inkml:channelProperties>
+          <inkml:channelProperty channel="X" name="resolution" value="1000" units="1/cm"/>
+          <inkml:channelProperty channel="Y" name="resolution" value="1000" units="1/cm"/>
+          <inkml:channelProperty channel="F" name="resolution" value="0" units="1/dev"/>
+        </inkml:channelProperties>
+      </inkml:inkSource>
+      <inkml:timestamp xml:id="ts0" timeString="2024-06-24T22:10:20.677"/>
+    </inkml:context>
+    <inkml:brush xml:id="br0">
+      <inkml:brushProperty name="width" value="0.035" units="cm"/>
+      <inkml:brushProperty name="height" value="0.035" units="cm"/>
+      <inkml:brushProperty name="color" value="#FFFFFF"/>
+    </inkml:brush>
+  </inkml:definitions>
+  <inkml:trace contextRef="#ctx0" brushRef="#br0">84 0 24575,'-23'139'0,"4"27"0,2 77-725,-7 835-4677,34-817 5318,11-1 0,64 295 0,-26-317 334,-37-185 938,-22-52-1146,0 0 0,1 0-1,-1 0 1,1 0 0,-1 0 0,1 0-1,-1 0 1,1 0 0,0 0 0,0 0-1,-1 0 1,1-1 0,0 1 0,0 0-1,0 0 1,0-1 0,0 1 0,0-1-1,2 2 1,-2-3 37,0 0 0,0 0 0,-1 1 1,1-1-1,0 0 0,0 0 0,-1 0 0,1 0 0,0 0 0,-1 0 0,1 0 0,-1 0 0,1 0 1,-1 0-1,0 0 0,0 0 0,1 0 0,-1 0 0,0 0 0,0-1 0,0 1 0,0-1 0,5-41 738,-1-72-1,-3 85-534,0-121-1344,-2-3-5695</inkml:trace>
+</inkml:ink>
+</file>
+
+<file path=ppt/ink/ink28.xml><?xml version="1.0" encoding="utf-8"?>
+<inkml:ink xmlns:inkml="http://www.w3.org/2003/InkML">
+  <inkml:definitions>
+    <inkml:context xml:id="ctx0">
+      <inkml:inkSource xml:id="inkSrc0">
+        <inkml:traceFormat>
+          <inkml:channel name="X" type="integer" min="-2.14748E9" max="2.14748E9" units="cm"/>
+          <inkml:channel name="Y" type="integer" min="-2.14748E9" max="2.14748E9" units="cm"/>
+          <inkml:channel name="F" type="integer" max="32767" units="dev"/>
+        </inkml:traceFormat>
+        <inkml:channelProperties>
+          <inkml:channelProperty channel="X" name="resolution" value="1000" units="1/cm"/>
+          <inkml:channelProperty channel="Y" name="resolution" value="1000" units="1/cm"/>
+          <inkml:channelProperty channel="F" name="resolution" value="0" units="1/dev"/>
+        </inkml:channelProperties>
+      </inkml:inkSource>
+      <inkml:timestamp xml:id="ts0" timeString="2024-06-24T22:10:21.128"/>
+    </inkml:context>
+    <inkml:brush xml:id="br0">
+      <inkml:brushProperty name="width" value="0.035" units="cm"/>
+      <inkml:brushProperty name="height" value="0.035" units="cm"/>
+      <inkml:brushProperty name="color" value="#FFFFFF"/>
+    </inkml:brush>
+  </inkml:definitions>
+  <inkml:trace contextRef="#ctx0" brushRef="#br0">0 91 24575,'701'-69'-995,"1"53"-2109,-588 15 2932,422-3-2076,2194 4-3380,-2148 1 5476,-582-1 153,176 4 524,-158-3-174,-1 0 0,1 2 0,21 6 0,-35-8-257,1 1-1,-1-1 1,0 1 0,1 0-1,-1 0 1,0 1 0,0-1 0,-1 1-1,1 0 1,0 0 0,-1 0 0,0 1-1,0-1 1,0 1 0,5 7-1,-5-4 228,0 0 0,0 0 0,-1-1 0,0 1 0,0 1 0,-1-1 0,0 0 0,0 12 0,-5 65 487,2-55-868,-7 114 730,6 1 1,19 162 0,122 576-682,-82-571-137,-4-27-33,70 483-631,-119-743 766,2 14 542,-2 0 0,-4 67 0,1-103-474,0 0 0,0 1 0,0-1 1,0 0-1,-1 0 0,1 0 0,-1 0 0,0 0 0,0 0 0,1 0 0,-1 0 0,0 0 0,-1 0 1,1 0-1,0 0 0,0-1 0,-1 1 0,1 0 0,-1-1 0,0 1 0,1-1 0,-1 0 1,0 0-1,0 1 0,-3 0 0,-22 7-5857</inkml:trace>
+</inkml:ink>
+</file>
+
+<file path=ppt/ink/ink29.xml><?xml version="1.0" encoding="utf-8"?>
+<inkml:ink xmlns:inkml="http://www.w3.org/2003/InkML">
+  <inkml:definitions>
+    <inkml:context xml:id="ctx0">
+      <inkml:inkSource xml:id="inkSrc0">
+        <inkml:traceFormat>
+          <inkml:channel name="X" type="integer" min="-2.14748E9" max="2.14748E9" units="cm"/>
+          <inkml:channel name="Y" type="integer" min="-2.14748E9" max="2.14748E9" units="cm"/>
+          <inkml:channel name="F" type="integer" max="32767" units="dev"/>
+        </inkml:traceFormat>
+        <inkml:channelProperties>
+          <inkml:channelProperty channel="X" name="resolution" value="1000" units="1/cm"/>
+          <inkml:channelProperty channel="Y" name="resolution" value="1000" units="1/cm"/>
+          <inkml:channelProperty channel="F" name="resolution" value="0" units="1/dev"/>
+        </inkml:channelProperties>
+      </inkml:inkSource>
+      <inkml:timestamp xml:id="ts0" timeString="2024-06-24T22:10:21.504"/>
+    </inkml:context>
+    <inkml:brush xml:id="br0">
+      <inkml:brushProperty name="width" value="0.035" units="cm"/>
+      <inkml:brushProperty name="height" value="0.035" units="cm"/>
+      <inkml:brushProperty name="color" value="#FFFFFF"/>
+    </inkml:brush>
+  </inkml:definitions>
+  <inkml:trace contextRef="#ctx0" brushRef="#br0">87 0 24575,'-25'5'0,"-13"7"0,14 1 0,57 9 0,93 0 0,146-3 0,172-5 0,167-5-5789,119-4 5789,92-3-4866,36-1 4866,-37-2-3254,-103 0 3254,-139 0-1768,-152 0 1768,-144 1 1257,-120-1 4972</inkml:trace>
+</inkml:ink>
+</file>
+
+<file path=ppt/ink/ink3.xml><?xml version="1.0" encoding="utf-8"?>
+<inkml:ink xmlns:inkml="http://www.w3.org/2003/InkML">
+  <inkml:definitions>
+    <inkml:context xml:id="ctx0">
+      <inkml:inkSource xml:id="inkSrc0">
+        <inkml:traceFormat>
+          <inkml:channel name="X" type="integer" min="-2.14748E9" max="2.14748E9" units="cm"/>
+          <inkml:channel name="Y" type="integer" min="-2.14748E9" max="2.14748E9" units="cm"/>
+          <inkml:channel name="F" type="integer" max="32767" units="dev"/>
+        </inkml:traceFormat>
+        <inkml:channelProperties>
+          <inkml:channelProperty channel="X" name="resolution" value="1000" units="1/cm"/>
+          <inkml:channelProperty channel="Y" name="resolution" value="1000" units="1/cm"/>
+          <inkml:channelProperty channel="F" name="resolution" value="0" units="1/dev"/>
+        </inkml:channelProperties>
+      </inkml:inkSource>
+      <inkml:timestamp xml:id="ts0" timeString="2024-06-24T22:09:42.298"/>
+    </inkml:context>
+    <inkml:brush xml:id="br0">
+      <inkml:brushProperty name="width" value="0.035" units="cm"/>
+      <inkml:brushProperty name="height" value="0.035" units="cm"/>
+      <inkml:brushProperty name="color" value="#E71224"/>
+    </inkml:brush>
+  </inkml:definitions>
+  <inkml:trace contextRef="#ctx0" brushRef="#br0">1 1 24575,'17'54'0,"71"301"0,-70-264 0,-5 1 0,2 95 0,-16 238 36,-2-237-1437,3-133-5425</inkml:trace>
+</inkml:ink>
+</file>
+
+<file path=ppt/ink/ink30.xml><?xml version="1.0" encoding="utf-8"?>
+<inkml:ink xmlns:inkml="http://www.w3.org/2003/InkML">
+  <inkml:definitions>
+    <inkml:context xml:id="ctx0">
+      <inkml:inkSource xml:id="inkSrc0">
+        <inkml:traceFormat>
+          <inkml:channel name="X" type="integer" min="-2.14748E9" max="2.14748E9" units="cm"/>
+          <inkml:channel name="Y" type="integer" min="-2.14748E9" max="2.14748E9" units="cm"/>
+          <inkml:channel name="F" type="integer" max="32767" units="dev"/>
+        </inkml:traceFormat>
+        <inkml:channelProperties>
+          <inkml:channelProperty channel="X" name="resolution" value="1000" units="1/cm"/>
+          <inkml:channelProperty channel="Y" name="resolution" value="1000" units="1/cm"/>
+          <inkml:channelProperty channel="F" name="resolution" value="0" units="1/dev"/>
+        </inkml:channelProperties>
+      </inkml:inkSource>
+      <inkml:timestamp xml:id="ts0" timeString="2024-06-24T22:10:22.676"/>
+    </inkml:context>
+    <inkml:brush xml:id="br0">
+      <inkml:brushProperty name="width" value="0.035" units="cm"/>
+      <inkml:brushProperty name="height" value="0.035" units="cm"/>
+      <inkml:brushProperty name="color" value="#FFFFFF"/>
+    </inkml:brush>
+  </inkml:definitions>
+  <inkml:trace contextRef="#ctx0" brushRef="#br0">1665 1 24575,'0'25'0,"-10"58"0,-29 106 0,-37 131 0,-46 127-7453,-48 113 7453,-40 76-4060,-19 6 4060,9-27 0,27-61 0,36-96-392,40-100 392,39-107-710,34-94 5134</inkml:trace>
+</inkml:ink>
+</file>
+
+<file path=ppt/ink/ink31.xml><?xml version="1.0" encoding="utf-8"?>
+<inkml:ink xmlns:inkml="http://www.w3.org/2003/InkML">
+  <inkml:definitions>
+    <inkml:context xml:id="ctx0">
+      <inkml:inkSource xml:id="inkSrc0">
+        <inkml:traceFormat>
+          <inkml:channel name="X" type="integer" min="-2.14748E9" max="2.14748E9" units="cm"/>
+          <inkml:channel name="Y" type="integer" min="-2.14748E9" max="2.14748E9" units="cm"/>
+          <inkml:channel name="F" type="integer" max="32767" units="dev"/>
+        </inkml:traceFormat>
+        <inkml:channelProperties>
+          <inkml:channelProperty channel="X" name="resolution" value="1000" units="1/cm"/>
+          <inkml:channelProperty channel="Y" name="resolution" value="1000" units="1/cm"/>
+          <inkml:channelProperty channel="F" name="resolution" value="0" units="1/dev"/>
+        </inkml:channelProperties>
+      </inkml:inkSource>
+      <inkml:timestamp xml:id="ts0" timeString="2024-06-24T22:10:23.385"/>
+    </inkml:context>
+    <inkml:brush xml:id="br0">
+      <inkml:brushProperty name="width" value="0.035" units="cm"/>
+      <inkml:brushProperty name="height" value="0.035" units="cm"/>
+      <inkml:brushProperty name="color" value="#FFFFFF"/>
+    </inkml:brush>
+  </inkml:definitions>
+  <inkml:trace contextRef="#ctx0" brushRef="#br0">169 1 24575,'0'5'0,"0"32"0,-10 39 0,-13 33 0,-8 22 0,-4-1 0,4-12 0,8-22 0,7-27-8191</inkml:trace>
+</inkml:ink>
+</file>
+
+<file path=ppt/ink/ink32.xml><?xml version="1.0" encoding="utf-8"?>
+<inkml:ink xmlns:inkml="http://www.w3.org/2003/InkML">
+  <inkml:definitions>
+    <inkml:context xml:id="ctx0">
+      <inkml:inkSource xml:id="inkSrc0">
+        <inkml:traceFormat>
+          <inkml:channel name="X" type="integer" min="-2.14748E9" max="2.14748E9" units="cm"/>
+          <inkml:channel name="Y" type="integer" min="-2.14748E9" max="2.14748E9" units="cm"/>
+          <inkml:channel name="F" type="integer" max="32767" units="dev"/>
+        </inkml:traceFormat>
+        <inkml:channelProperties>
+          <inkml:channelProperty channel="X" name="resolution" value="1000" units="1/cm"/>
+          <inkml:channelProperty channel="Y" name="resolution" value="1000" units="1/cm"/>
+          <inkml:channelProperty channel="F" name="resolution" value="0" units="1/dev"/>
+        </inkml:channelProperties>
+      </inkml:inkSource>
+      <inkml:timestamp xml:id="ts0" timeString="2024-06-24T22:10:23.771"/>
+    </inkml:context>
+    <inkml:brush xml:id="br0">
+      <inkml:brushProperty name="width" value="0.035" units="cm"/>
+      <inkml:brushProperty name="height" value="0.035" units="cm"/>
+      <inkml:brushProperty name="color" value="#FFFFFF"/>
+    </inkml:brush>
+  </inkml:definitions>
+  <inkml:trace contextRef="#ctx0" brushRef="#br0">178 1 24575,'-20'1'0,"-1"2"0,1 0 0,0 1 0,-37 14 0,38-13 0,17-4 0,1-1 0,-1 1 0,0-1 0,1 1 0,-1 0 0,0-1 0,1 1 0,-1 0 0,1 0 0,-3 2 0,4-3 0,0 1 0,0-1 0,0 0 0,0 0 0,0 1 0,0-1 0,0 0 0,0 0 0,0 1 0,0-1 0,1 0 0,-1 0 0,0 1 0,0-1 0,0 0 0,0 0 0,0 1 0,1-1 0,-1 0 0,0 0 0,0 0 0,0 0 0,1 1 0,-1-1 0,0 0 0,0 0 0,1 0 0,-1 0 0,0 0 0,0 0 0,1 0 0,-1 0 0,0 1 0,0-1 0,1 0 0,-1 0 0,0 0 0,0 0 0,1-1 0,50 7 0,81-3 0,-65-3 0,0 2 0,91 16 0,-145-15 0,0 0 0,-1 0 0,1 1 0,-1 1 0,15 7 0,-24-10 0,0 0 0,1 0 0,-1 0 0,0 1 0,0-1 0,0 1 0,0 0 0,-1 0 0,1 0 0,-1 0 0,0 0 0,0 0 0,0 1 0,0-1 0,0 1 0,-1-1 0,0 1 0,0 0 0,0 0 0,0 0 0,0 5 0,0-1 0,-2 0 0,1 0 0,-1 0 0,0 0 0,-1 0 0,0 0 0,0 0 0,-6 12 0,0-2 0,-1 0 0,-19 28 0,-21 17 0,-2-2 0,-78 71 0,-9 11 0,132-136 0,-1 0 0,1 1 0,1-1 0,-1 1 0,1 1 0,-6 12 0,11-20 0,-1 0 0,1 0 0,0 0 0,-1 1 0,1-1 0,0 0 0,0 0 0,0 0 0,0 1 0,0-1 0,0 0 0,0 0 0,0 0 0,0 0 0,1 1 0,-1-1 0,0 0 0,1 0 0,-1 0 0,1 0 0,-1 0 0,1 0 0,0 0 0,-1 0 0,1 0 0,0 0 0,0 0 0,-1 0 0,1 0 0,0 0 0,0-1 0,0 1 0,0 0 0,0-1 0,0 1 0,3 0 0,2 1 0,1-1 0,0 0 0,-1 0 0,1-1 0,0 0 0,0 0 0,0-1 0,-1 1 0,14-4 0,18-5 0,1-2 0,-2-2 0,59-27 0,-34 9 0,77-52 0,-21-7-1365,-24 4-5461</inkml:trace>
+</inkml:ink>
+</file>
+
+<file path=ppt/ink/ink33.xml><?xml version="1.0" encoding="utf-8"?>
+<inkml:ink xmlns:inkml="http://www.w3.org/2003/InkML">
+  <inkml:definitions>
+    <inkml:context xml:id="ctx0">
+      <inkml:inkSource xml:id="inkSrc0">
+        <inkml:traceFormat>
+          <inkml:channel name="X" type="integer" min="-2.14748E9" max="2.14748E9" units="cm"/>
+          <inkml:channel name="Y" type="integer" min="-2.14748E9" max="2.14748E9" units="cm"/>
+          <inkml:channel name="F" type="integer" max="32767" units="dev"/>
+        </inkml:traceFormat>
+        <inkml:channelProperties>
+          <inkml:channelProperty channel="X" name="resolution" value="1000" units="1/cm"/>
+          <inkml:channelProperty channel="Y" name="resolution" value="1000" units="1/cm"/>
+          <inkml:channelProperty channel="F" name="resolution" value="0" units="1/dev"/>
+        </inkml:channelProperties>
+      </inkml:inkSource>
+      <inkml:timestamp xml:id="ts0" timeString="2024-06-24T22:10:24.419"/>
+    </inkml:context>
+    <inkml:brush xml:id="br0">
+      <inkml:brushProperty name="width" value="0.035" units="cm"/>
+      <inkml:brushProperty name="height" value="0.035" units="cm"/>
+      <inkml:brushProperty name="color" value="#FFFFFF"/>
+    </inkml:brush>
+  </inkml:definitions>
+  <inkml:trace contextRef="#ctx0" brushRef="#br0">71 1469 24575,'-7'36'0,"-5"63"0,8-52 0,-31 781 0,31-608 0,-5-40 0,10-167 0,-1-13 0,1 0 0,-1 0 0,0 1 0,0-1 0,0 0 0,0 0 0,0 0 0,0 0 0,0 0 0,1 0 0,-1 0 0,0 0 0,0 0 0,0 0 0,0 0 0,0 0 0,1 0 0,-1 0 0,0 0 0,0 0 0,0 0 0,0 0 0,0 0 0,0 0 0,1 0 0,-1 0 0,0 0 0,0 0 0,0 0 0,0 0 0,0 0 0,0 0 0,1 0 0,-1 0 0,0 0 0,0-1 0,0 1 0,0 0 0,0 0 0,0 0 0,0 0 0,0 0 0,0 0 0,1 0 0,-1-1 0,0 1 0,0 0 0,0 0 0,0 0 0,12-15 0,-1-1 0,-1 0 0,13-26 0,6-10 0,263-379 0,29-49 0,-299 442 0,-3-1 0,22-60 0,-32 73 0,-2-1 0,-1 1 0,-1-2 0,-1 1 0,-1-31 0,-4-116-112,-9 0 1,-7 1-1,-7 1 0,-8 0 0,-8 3 1,-73-199-1,89 308 112,15 51 0,9 9 0,-1 1 0,1-1 0,0 0 0,-1 0 0,1 0 0,-1 1 0,1-1 0,0 0 0,0 0 0,-1 1 0,1-1 0,0 0 0,-1 1 0,1-1 0,0 0 0,0 1 0,0-1 0,-1 1 0,1-1 0,0 0 0,0 1 0,0-1 0,0 1 0,0-1 0,0 0 0,0 1 0,-3 15 0,1 0 0,0 31 0,5 110 0,21 175-799,111 540-1,-66-609 1238,-67-256-438,0-1 0,1 1 0,0-1 0,0 0 0,7 10 0,-10-16 0,0 1 0,0-1 0,0 0 0,1 0 0,-1 1 0,0-1 0,0 0 0,0 0 0,1 0 0,-1 0 0,0 1 0,1-1 0,-1 0 0,0 0 0,0 0 0,1 0 0,-1 0 0,0 0 0,1 0 0,-1 0 0,0 0 0,0 0 0,1 0 0,-1 0 0,0 0 0,1 0 0,-1 0 0,1 0 0,6-9 0,5-18 190,-1 0 0,8-32 0,16-43 686,-28 86-856,1 1 0,0 1 0,1-1 0,0 1 0,1 1 0,1 0-1,0 0 1,1 1 0,0 1 0,1 0 0,1 0 0,-1 2 0,1-1 0,1 2-1,0 0 1,0 1 0,0 0 0,1 1 0,0 1 0,1 0 0,-1 2 0,1-1-1,-1 2 1,26-1 0,-30 3-247,0 0-1,1 0 1,-1 2-1,0-1 1,14 5-1,3 4-6598</inkml:trace>
+</inkml:ink>
+</file>
+
+<file path=ppt/ink/ink34.xml><?xml version="1.0" encoding="utf-8"?>
+<inkml:ink xmlns:inkml="http://www.w3.org/2003/InkML">
+  <inkml:definitions>
+    <inkml:context xml:id="ctx0">
+      <inkml:inkSource xml:id="inkSrc0">
+        <inkml:traceFormat>
+          <inkml:channel name="X" type="integer" min="-2.14748E9" max="2.14748E9" units="cm"/>
+          <inkml:channel name="Y" type="integer" min="-2.14748E9" max="2.14748E9" units="cm"/>
+          <inkml:channel name="F" type="integer" max="32767" units="dev"/>
+        </inkml:traceFormat>
+        <inkml:channelProperties>
+          <inkml:channelProperty channel="X" name="resolution" value="1000" units="1/cm"/>
+          <inkml:channelProperty channel="Y" name="resolution" value="1000" units="1/cm"/>
+          <inkml:channelProperty channel="F" name="resolution" value="0" units="1/dev"/>
+        </inkml:channelProperties>
+      </inkml:inkSource>
+      <inkml:timestamp xml:id="ts0" timeString="2024-06-24T22:10:24.859"/>
+    </inkml:context>
+    <inkml:brush xml:id="br0">
+      <inkml:brushProperty name="width" value="0.035" units="cm"/>
+      <inkml:brushProperty name="height" value="0.035" units="cm"/>
+      <inkml:brushProperty name="color" value="#FFFFFF"/>
+    </inkml:brush>
+  </inkml:definitions>
+  <inkml:trace contextRef="#ctx0" brushRef="#br0">0 465 24575,'125'-62'70,"261"-125"-327,7 28-523,-382 155 780,22-8 25,0 1 0,1 2-1,0 1 1,52-5 0,-77 13-18,1 0 1,0 0 0,-1 1 0,1 1 0,-1-1 0,0 1 0,1 1-1,-1 0 1,10 4 0,-13-3-5,0-1-1,1 1 1,-1 0-1,-1 1 1,1 0-1,-1 0 1,1 0-1,-1 0 1,-1 1-1,1 0 1,-1 0-1,0 0 1,4 9-1,1 6-2,-1-1 0,-1 1 0,0 0 0,-2 1 0,5 43 0,-1 116 0,-13-48 61,-24 168 0,16-217 426,14-67-552,-2-17 40,0 0-1,0 0 0,0 0 1,0 1-1,0-1 1,0 0-1,0 0 0,0 0 1,0 0-1,0 0 0,0 0 1,0 1-1,0-1 0,1 0 1,-1 0-1,0 0 1,0 0-1,0 0 0,0 0 1,0 0-1,0 0 0,0 0 1,1 0-1,-1 0 0,0 0 1,0 1-1,0-1 0,0 0 1,0 0-1,1 0 1,-1 0-1,0 0 0,0 0 1,0 0-1,0 0 0,0 0 1,1 0-1,-1-1 0,0 1 1,0 0-1,0 0 1,0 0-1,0 0 0,0 0 1,1 0-1,16-21-6800</inkml:trace>
+</inkml:ink>
+</file>
+
+<file path=ppt/ink/ink35.xml><?xml version="1.0" encoding="utf-8"?>
+<inkml:ink xmlns:inkml="http://www.w3.org/2003/InkML">
+  <inkml:definitions>
+    <inkml:context xml:id="ctx0">
+      <inkml:inkSource xml:id="inkSrc0">
+        <inkml:traceFormat>
+          <inkml:channel name="X" type="integer" min="-2.14748E9" max="2.14748E9" units="cm"/>
+          <inkml:channel name="Y" type="integer" min="-2.14748E9" max="2.14748E9" units="cm"/>
+          <inkml:channel name="F" type="integer" max="32767" units="dev"/>
+        </inkml:traceFormat>
+        <inkml:channelProperties>
+          <inkml:channelProperty channel="X" name="resolution" value="1000" units="1/cm"/>
+          <inkml:channelProperty channel="Y" name="resolution" value="1000" units="1/cm"/>
+          <inkml:channelProperty channel="F" name="resolution" value="0" units="1/dev"/>
+        </inkml:channelProperties>
+      </inkml:inkSource>
+      <inkml:timestamp xml:id="ts0" timeString="2024-06-24T22:10:25.302"/>
+    </inkml:context>
+    <inkml:brush xml:id="br0">
+      <inkml:brushProperty name="width" value="0.035" units="cm"/>
+      <inkml:brushProperty name="height" value="0.035" units="cm"/>
+      <inkml:brushProperty name="color" value="#FFFFFF"/>
+    </inkml:brush>
+  </inkml:definitions>
+  <inkml:trace contextRef="#ctx0" brushRef="#br0">295 9 24575,'-40'72'0,"-59"145"0,-5 81 0,100-285 0,-2 6 0,-4 7 0,2 0 0,1 1 0,1 0 0,-5 48 0,11-71 0,0 0 0,0-1 0,1 1 0,-1 0 0,1 0 0,-1-1 0,1 1 0,0 0 0,1-1 0,-1 1 0,1-1 0,-1 0 0,1 1 0,0-1 0,0 0 0,0 0 0,1 0 0,-1 0 0,1-1 0,0 1 0,0-1 0,0 1 0,0-1 0,4 3 0,0-2 0,0 0 0,1-1 0,-1 0 0,1 0 0,-1 0 0,1-1 0,-1 0 0,1-1 0,0 1 0,-1-2 0,11 0 0,2-2 0,0 0 0,0-1 0,0-1 0,-1-1 0,0-1 0,31-16 0,-23 8 0,-1-1 0,-1-1 0,46-40 0,-33 21 0,-2-3 0,-2-1 0,-1-1 0,51-88 0,-52 74 0,37-94 0,-59 122 0,0-1 0,-2-1 0,-1 1 0,-1-1 0,2-45 0,-10 34 0,-1 33 0,-1 11 0,0 7 0,1 1 0,0 0 0,1 0 0,0 0 0,0 19 0,1-10 0,-7 87 0,8 139 0,4-191 0,2 0 0,3 0 0,3 0 0,23 70 0,23 63 0,-56-181 0,0 0 0,0 1 0,-1-1 0,0 1 0,-1-1 0,0 1 0,0-1 0,0 1 0,-2-1 0,1 1 0,-1-1 0,-3 11 0,2-13 0,1-1 0,-1 1 0,-1-1 0,1 0 0,-1 1 0,0-1 0,0-1 0,0 1 0,-1-1 0,0 0 0,1 0 0,-2 0 0,1 0 0,0-1 0,-1 0 0,1 0 0,-10 3 0,-11 2-341,1-1 0,-1-1-1,-52 4 1,-15-2-6485</inkml:trace>
+</inkml:ink>
+</file>
+
+<file path=ppt/ink/ink36.xml><?xml version="1.0" encoding="utf-8"?>
+<inkml:ink xmlns:inkml="http://www.w3.org/2003/InkML">
+  <inkml:definitions>
+    <inkml:context xml:id="ctx0">
+      <inkml:inkSource xml:id="inkSrc0">
+        <inkml:traceFormat>
+          <inkml:channel name="X" type="integer" min="-2.14748E9" max="2.14748E9" units="cm"/>
+          <inkml:channel name="Y" type="integer" min="-2.14748E9" max="2.14748E9" units="cm"/>
+          <inkml:channel name="F" type="integer" max="32767" units="dev"/>
+        </inkml:traceFormat>
+        <inkml:channelProperties>
+          <inkml:channelProperty channel="X" name="resolution" value="1000" units="1/cm"/>
+          <inkml:channelProperty channel="Y" name="resolution" value="1000" units="1/cm"/>
+          <inkml:channelProperty channel="F" name="resolution" value="0" units="1/dev"/>
+        </inkml:channelProperties>
+      </inkml:inkSource>
+      <inkml:timestamp xml:id="ts0" timeString="2024-06-24T22:10:26.187"/>
+    </inkml:context>
+    <inkml:brush xml:id="br0">
+      <inkml:brushProperty name="width" value="0.035" units="cm"/>
+      <inkml:brushProperty name="height" value="0.035" units="cm"/>
+      <inkml:brushProperty name="color" value="#FFFFFF"/>
+    </inkml:brush>
+  </inkml:definitions>
+  <inkml:trace contextRef="#ctx0" brushRef="#br0">1 154 24575,'-1'123'0,"4"171"0,1-220 0,26 138 0,-30-211 0,7 28 0,13 39 0,-18-61 0,1 1 0,1-1 0,-1 0 0,1 0 0,1 0 0,-1-1 0,1 1 0,0-1 0,12 11 0,-15-16 0,-1 0 0,1 0 0,-1 0 0,1 0 0,-1 0 0,1 0 0,0 0 0,0 0 0,-1-1 0,1 1 0,0-1 0,0 0 0,0 1 0,0-1 0,0 0 0,0 0 0,-1 0 0,1 0 0,0 0 0,0-1 0,0 1 0,0-1 0,0 1 0,-1-1 0,1 1 0,0-1 0,0 0 0,-1 0 0,1 0 0,-1 0 0,1 0 0,2-3 0,2-2 0,1 0 0,-1-1 0,0 0 0,-1-1 0,8-12 0,5-13 0,-2 0 0,-1 0 0,-2-2 0,-1 0 0,8-42 0,-3-7 0,6-96 0,-20 141 0,0 0 0,-3-1 0,-4-40 0,2 68 0,0 0 0,0 0 0,-1 0 0,0 0 0,-1 0 0,-1 1 0,0-1 0,0 1 0,-1 0 0,-1 1 0,1 0 0,-2 0 0,1 0 0,-10-9 0,4 9-136,0 0-1,0 1 1,-1 0-1,0 1 1,-1 0-1,0 1 1,0 1-1,0 0 0,-22-4 1,-11 0-6690</inkml:trace>
+</inkml:ink>
+</file>
+
+<file path=ppt/ink/ink37.xml><?xml version="1.0" encoding="utf-8"?>
+<inkml:ink xmlns:inkml="http://www.w3.org/2003/InkML">
+  <inkml:definitions>
+    <inkml:context xml:id="ctx0">
+      <inkml:inkSource xml:id="inkSrc0">
+        <inkml:traceFormat>
+          <inkml:channel name="X" type="integer" min="-2.14748E9" max="2.14748E9" units="cm"/>
+          <inkml:channel name="Y" type="integer" min="-2.14748E9" max="2.14748E9" units="cm"/>
+          <inkml:channel name="F" type="integer" max="32767" units="dev"/>
+        </inkml:traceFormat>
+        <inkml:channelProperties>
+          <inkml:channelProperty channel="X" name="resolution" value="1000" units="1/cm"/>
+          <inkml:channelProperty channel="Y" name="resolution" value="1000" units="1/cm"/>
+          <inkml:channelProperty channel="F" name="resolution" value="0" units="1/dev"/>
+        </inkml:channelProperties>
+      </inkml:inkSource>
+      <inkml:timestamp xml:id="ts0" timeString="2024-06-24T22:10:26.537"/>
+    </inkml:context>
+    <inkml:brush xml:id="br0">
+      <inkml:brushProperty name="width" value="0.035" units="cm"/>
+      <inkml:brushProperty name="height" value="0.035" units="cm"/>
+      <inkml:brushProperty name="color" value="#FFFFFF"/>
+    </inkml:brush>
+  </inkml:definitions>
+  <inkml:trace contextRef="#ctx0" brushRef="#br0">0 0 24575,'0'25'0,"0"44"0,0 44 0,0 39 0,0 19 0,0 5 0,5-12 0,1-25 0,6-24 0,-1-28 0,-1-24 0,-7-17 0,-10-6 0,-3-11-8191</inkml:trace>
+</inkml:ink>
+</file>
+
+<file path=ppt/ink/ink38.xml><?xml version="1.0" encoding="utf-8"?>
+<inkml:ink xmlns:inkml="http://www.w3.org/2003/InkML">
+  <inkml:definitions>
+    <inkml:context xml:id="ctx0">
+      <inkml:inkSource xml:id="inkSrc0">
+        <inkml:traceFormat>
+          <inkml:channel name="X" type="integer" min="-2.14748E9" max="2.14748E9" units="cm"/>
+          <inkml:channel name="Y" type="integer" min="-2.14748E9" max="2.14748E9" units="cm"/>
+          <inkml:channel name="F" type="integer" max="32767" units="dev"/>
+        </inkml:traceFormat>
+        <inkml:channelProperties>
+          <inkml:channelProperty channel="X" name="resolution" value="1000" units="1/cm"/>
+          <inkml:channelProperty channel="Y" name="resolution" value="1000" units="1/cm"/>
+          <inkml:channelProperty channel="F" name="resolution" value="0" units="1/dev"/>
+        </inkml:channelProperties>
+      </inkml:inkSource>
+      <inkml:timestamp xml:id="ts0" timeString="2024-06-24T22:10:26.914"/>
+    </inkml:context>
+    <inkml:brush xml:id="br0">
+      <inkml:brushProperty name="width" value="0.035" units="cm"/>
+      <inkml:brushProperty name="height" value="0.035" units="cm"/>
+      <inkml:brushProperty name="color" value="#FFFFFF"/>
+    </inkml:brush>
+  </inkml:definitions>
+  <inkml:trace contextRef="#ctx0" brushRef="#br0">1 1 24575,'0'15'0,"0"20"0,5 24 0,6 18 0,12 5 0,7-6 0,8-6 0,8-10 0,16-10 0,23-14 0,36-13 0,49-10 0,46-7 0,40-5-1600,28-18 1600,-35-6-6591</inkml:trace>
+</inkml:ink>
+</file>
+
+<file path=ppt/ink/ink4.xml><?xml version="1.0" encoding="utf-8"?>
+<inkml:ink xmlns:inkml="http://www.w3.org/2003/InkML">
+  <inkml:definitions>
+    <inkml:context xml:id="ctx0">
+      <inkml:inkSource xml:id="inkSrc0">
+        <inkml:traceFormat>
+          <inkml:channel name="X" type="integer" min="-2.14748E9" max="2.14748E9" units="cm"/>
+          <inkml:channel name="Y" type="integer" min="-2.14748E9" max="2.14748E9" units="cm"/>
+          <inkml:channel name="F" type="integer" max="32767" units="dev"/>
+        </inkml:traceFormat>
+        <inkml:channelProperties>
+          <inkml:channelProperty channel="X" name="resolution" value="1000" units="1/cm"/>
+          <inkml:channelProperty channel="Y" name="resolution" value="1000" units="1/cm"/>
+          <inkml:channelProperty channel="F" name="resolution" value="0" units="1/dev"/>
+        </inkml:channelProperties>
+      </inkml:inkSource>
+      <inkml:timestamp xml:id="ts0" timeString="2024-06-24T22:09:42.665"/>
+    </inkml:context>
+    <inkml:brush xml:id="br0">
+      <inkml:brushProperty name="width" value="0.035" units="cm"/>
+      <inkml:brushProperty name="height" value="0.035" units="cm"/>
+      <inkml:brushProperty name="color" value="#E71224"/>
+    </inkml:brush>
+  </inkml:definitions>
+  <inkml:trace contextRef="#ctx0" brushRef="#br0">1 0 24575,'10'0'0,"23"0"0,27 0 0,22 0 0,18 0 0,12 5 0,-13 2-8191</inkml:trace>
+</inkml:ink>
+</file>
+
+<file path=ppt/ink/ink5.xml><?xml version="1.0" encoding="utf-8"?>
+<inkml:ink xmlns:inkml="http://www.w3.org/2003/InkML">
+  <inkml:definitions>
+    <inkml:context xml:id="ctx0">
+      <inkml:inkSource xml:id="inkSrc0">
+        <inkml:traceFormat>
+          <inkml:channel name="X" type="integer" min="-2.14748E9" max="2.14748E9" units="cm"/>
+          <inkml:channel name="Y" type="integer" min="-2.14748E9" max="2.14748E9" units="cm"/>
+          <inkml:channel name="F" type="integer" max="32767" units="dev"/>
+        </inkml:traceFormat>
+        <inkml:channelProperties>
+          <inkml:channelProperty channel="X" name="resolution" value="1000" units="1/cm"/>
+          <inkml:channelProperty channel="Y" name="resolution" value="1000" units="1/cm"/>
+          <inkml:channelProperty channel="F" name="resolution" value="0" units="1/dev"/>
+        </inkml:channelProperties>
+      </inkml:inkSource>
+      <inkml:timestamp xml:id="ts0" timeString="2024-06-24T22:09:43.090"/>
+    </inkml:context>
+    <inkml:brush xml:id="br0">
+      <inkml:brushProperty name="width" value="0.035" units="cm"/>
+      <inkml:brushProperty name="height" value="0.035" units="cm"/>
+      <inkml:brushProperty name="color" value="#E71224"/>
+    </inkml:brush>
+  </inkml:definitions>
+  <inkml:trace contextRef="#ctx0" brushRef="#br0">183 1 24575,'-10'10'0,"-3"18"0,-10 30 0,-1 25 0,-1 13 0,-2 0 0,5-5 0,5-9 0,6-8 0,4-12 0,4-11 0,3-4 0,0-6 0,1-4 0,0 2 0,0-6-8191</inkml:trace>
+</inkml:ink>
+</file>
+
+<file path=ppt/ink/ink6.xml><?xml version="1.0" encoding="utf-8"?>
+<inkml:ink xmlns:inkml="http://www.w3.org/2003/InkML">
+  <inkml:definitions>
+    <inkml:context xml:id="ctx0">
+      <inkml:inkSource xml:id="inkSrc0">
+        <inkml:traceFormat>
+          <inkml:channel name="X" type="integer" min="-2.14748E9" max="2.14748E9" units="cm"/>
+          <inkml:channel name="Y" type="integer" min="-2.14748E9" max="2.14748E9" units="cm"/>
+          <inkml:channel name="F" type="integer" max="32767" units="dev"/>
+        </inkml:traceFormat>
+        <inkml:channelProperties>
+          <inkml:channelProperty channel="X" name="resolution" value="1000" units="1/cm"/>
+          <inkml:channelProperty channel="Y" name="resolution" value="1000" units="1/cm"/>
+          <inkml:channelProperty channel="F" name="resolution" value="0" units="1/dev"/>
+        </inkml:channelProperties>
+      </inkml:inkSource>
+      <inkml:timestamp xml:id="ts0" timeString="2024-06-24T22:09:43.434"/>
+    </inkml:context>
+    <inkml:brush xml:id="br0">
+      <inkml:brushProperty name="width" value="0.035" units="cm"/>
+      <inkml:brushProperty name="height" value="0.035" units="cm"/>
+      <inkml:brushProperty name="color" value="#E71224"/>
+    </inkml:brush>
+  </inkml:definitions>
+  <inkml:trace contextRef="#ctx0" brushRef="#br0">1 0 24575,'0'5'0,"0"7"0,0 6 0,10 0 0,3-3-8191</inkml:trace>
+</inkml:ink>
+</file>
+
+<file path=ppt/ink/ink7.xml><?xml version="1.0" encoding="utf-8"?>
+<inkml:ink xmlns:inkml="http://www.w3.org/2003/InkML">
+  <inkml:definitions>
+    <inkml:context xml:id="ctx0">
+      <inkml:inkSource xml:id="inkSrc0">
+        <inkml:traceFormat>
+          <inkml:channel name="X" type="integer" min="-2.14748E9" max="2.14748E9" units="cm"/>
+          <inkml:channel name="Y" type="integer" min="-2.14748E9" max="2.14748E9" units="cm"/>
+          <inkml:channel name="F" type="integer" max="32767" units="dev"/>
+        </inkml:traceFormat>
+        <inkml:channelProperties>
+          <inkml:channelProperty channel="X" name="resolution" value="1000" units="1/cm"/>
+          <inkml:channelProperty channel="Y" name="resolution" value="1000" units="1/cm"/>
+          <inkml:channelProperty channel="F" name="resolution" value="0" units="1/dev"/>
+        </inkml:channelProperties>
+      </inkml:inkSource>
+      <inkml:timestamp xml:id="ts0" timeString="2024-06-24T22:09:43.845"/>
+    </inkml:context>
+    <inkml:brush xml:id="br0">
+      <inkml:brushProperty name="width" value="0.035" units="cm"/>
+      <inkml:brushProperty name="height" value="0.035" units="cm"/>
+      <inkml:brushProperty name="color" value="#E71224"/>
+    </inkml:brush>
+  </inkml:definitions>
+  <inkml:trace contextRef="#ctx0" brushRef="#br0">240 1 24575,'5'5'0,"2"12"0,-6 18 0,-7 18 0,-8 25 0,-7 9 0,-5 6 0,-8 6 0,3-3 0,0-9 0,1-8 0,6-13 0,6-12 0,7-11 0,5-13-8191</inkml:trace>
+</inkml:ink>
+</file>
+
+<file path=ppt/ink/ink8.xml><?xml version="1.0" encoding="utf-8"?>
+<inkml:ink xmlns:inkml="http://www.w3.org/2003/InkML">
+  <inkml:definitions>
+    <inkml:context xml:id="ctx0">
+      <inkml:inkSource xml:id="inkSrc0">
+        <inkml:traceFormat>
+          <inkml:channel name="X" type="integer" min="-2.14748E9" max="2.14748E9" units="cm"/>
+          <inkml:channel name="Y" type="integer" min="-2.14748E9" max="2.14748E9" units="cm"/>
+          <inkml:channel name="F" type="integer" max="32767" units="dev"/>
+        </inkml:traceFormat>
+        <inkml:channelProperties>
+          <inkml:channelProperty channel="X" name="resolution" value="1000" units="1/cm"/>
+          <inkml:channelProperty channel="Y" name="resolution" value="1000" units="1/cm"/>
+          <inkml:channelProperty channel="F" name="resolution" value="0" units="1/dev"/>
+        </inkml:channelProperties>
+      </inkml:inkSource>
+      <inkml:timestamp xml:id="ts0" timeString="2024-06-24T22:09:44.201"/>
+    </inkml:context>
+    <inkml:brush xml:id="br0">
+      <inkml:brushProperty name="width" value="0.035" units="cm"/>
+      <inkml:brushProperty name="height" value="0.035" units="cm"/>
+      <inkml:brushProperty name="color" value="#E71224"/>
+    </inkml:brush>
+  </inkml:definitions>
+  <inkml:trace contextRef="#ctx0" brushRef="#br0">1 1 24575,'5'5'0,"17"1"0,4 0-8191</inkml:trace>
+</inkml:ink>
+</file>
+
+<file path=ppt/ink/ink9.xml><?xml version="1.0" encoding="utf-8"?>
+<inkml:ink xmlns:inkml="http://www.w3.org/2003/InkML">
+  <inkml:definitions>
+    <inkml:context xml:id="ctx0">
+      <inkml:inkSource xml:id="inkSrc0">
+        <inkml:traceFormat>
+          <inkml:channel name="X" type="integer" min="-2.14748E9" max="2.14748E9" units="cm"/>
+          <inkml:channel name="Y" type="integer" min="-2.14748E9" max="2.14748E9" units="cm"/>
+          <inkml:channel name="F" type="integer" max="32767" units="dev"/>
+        </inkml:traceFormat>
+        <inkml:channelProperties>
+          <inkml:channelProperty channel="X" name="resolution" value="1000" units="1/cm"/>
+          <inkml:channelProperty channel="Y" name="resolution" value="1000" units="1/cm"/>
+          <inkml:channelProperty channel="F" name="resolution" value="0" units="1/dev"/>
+        </inkml:channelProperties>
+      </inkml:inkSource>
+      <inkml:timestamp xml:id="ts0" timeString="2024-06-24T22:10:03.599"/>
+    </inkml:context>
+    <inkml:brush xml:id="br0">
+      <inkml:brushProperty name="width" value="0.035" units="cm"/>
+      <inkml:brushProperty name="height" value="0.035" units="cm"/>
+      <inkml:brushProperty name="color" value="#FFFFFF"/>
+    </inkml:brush>
+  </inkml:definitions>
+  <inkml:trace contextRef="#ctx0" brushRef="#br0">0 0 24575,'0'0'-8191</inkml:trace>
+</inkml:ink>
+</file>
+
 <file path=ppt/slideLayouts/slideLayout1.xml><?xml version="1.0" encoding="utf-8"?>
 <p:sldLayout xmlns:a="http://schemas.openxmlformats.org/drawingml/2006/main" xmlns:r="http://schemas.openxmlformats.org/officeDocument/2006/relationships" xmlns:p="http://schemas.openxmlformats.org/presentationml/2006/main" type="title" preserve="1">
   <p:cSld name="Title Slide">
@@ -264,7 +1330,7 @@
           <a:p>
             <a:fld id="{1B239388-45FC-456E-8776-854E70FB4B9B}" type="datetimeFigureOut">
               <a:rPr lang="en-US" smtClean="0"/>
-              <a:t>5/21/2024</a:t>
+              <a:t>6/24/2024</a:t>
             </a:fld>
             <a:endParaRPr lang="en-US"/>
           </a:p>
@@ -462,7 +1528,7 @@
           <a:p>
             <a:fld id="{1B239388-45FC-456E-8776-854E70FB4B9B}" type="datetimeFigureOut">
               <a:rPr lang="en-US" smtClean="0"/>
-              <a:t>5/21/2024</a:t>
+              <a:t>6/24/2024</a:t>
             </a:fld>
             <a:endParaRPr lang="en-US"/>
           </a:p>
@@ -670,7 +1736,7 @@
           <a:p>
             <a:fld id="{1B239388-45FC-456E-8776-854E70FB4B9B}" type="datetimeFigureOut">
               <a:rPr lang="en-US" smtClean="0"/>
-              <a:t>5/21/2024</a:t>
+              <a:t>6/24/2024</a:t>
             </a:fld>
             <a:endParaRPr lang="en-US"/>
           </a:p>
@@ -868,7 +1934,7 @@
           <a:p>
             <a:fld id="{1B239388-45FC-456E-8776-854E70FB4B9B}" type="datetimeFigureOut">
               <a:rPr lang="en-US" smtClean="0"/>
-              <a:t>5/21/2024</a:t>
+              <a:t>6/24/2024</a:t>
             </a:fld>
             <a:endParaRPr lang="en-US"/>
           </a:p>
@@ -1143,7 +2209,7 @@
           <a:p>
             <a:fld id="{1B239388-45FC-456E-8776-854E70FB4B9B}" type="datetimeFigureOut">
               <a:rPr lang="en-US" smtClean="0"/>
-              <a:t>5/21/2024</a:t>
+              <a:t>6/24/2024</a:t>
             </a:fld>
             <a:endParaRPr lang="en-US"/>
           </a:p>
@@ -1408,7 +2474,7 @@
           <a:p>
             <a:fld id="{1B239388-45FC-456E-8776-854E70FB4B9B}" type="datetimeFigureOut">
               <a:rPr lang="en-US" smtClean="0"/>
-              <a:t>5/21/2024</a:t>
+              <a:t>6/24/2024</a:t>
             </a:fld>
             <a:endParaRPr lang="en-US"/>
           </a:p>
@@ -1820,7 +2886,7 @@
           <a:p>
             <a:fld id="{1B239388-45FC-456E-8776-854E70FB4B9B}" type="datetimeFigureOut">
               <a:rPr lang="en-US" smtClean="0"/>
-              <a:t>5/21/2024</a:t>
+              <a:t>6/24/2024</a:t>
             </a:fld>
             <a:endParaRPr lang="en-US"/>
           </a:p>
@@ -1961,7 +3027,7 @@
           <a:p>
             <a:fld id="{1B239388-45FC-456E-8776-854E70FB4B9B}" type="datetimeFigureOut">
               <a:rPr lang="en-US" smtClean="0"/>
-              <a:t>5/21/2024</a:t>
+              <a:t>6/24/2024</a:t>
             </a:fld>
             <a:endParaRPr lang="en-US"/>
           </a:p>
@@ -2074,7 +3140,7 @@
           <a:p>
             <a:fld id="{1B239388-45FC-456E-8776-854E70FB4B9B}" type="datetimeFigureOut">
               <a:rPr lang="en-US" smtClean="0"/>
-              <a:t>5/21/2024</a:t>
+              <a:t>6/24/2024</a:t>
             </a:fld>
             <a:endParaRPr lang="en-US"/>
           </a:p>
@@ -2385,7 +3451,7 @@
           <a:p>
             <a:fld id="{1B239388-45FC-456E-8776-854E70FB4B9B}" type="datetimeFigureOut">
               <a:rPr lang="en-US" smtClean="0"/>
-              <a:t>5/21/2024</a:t>
+              <a:t>6/24/2024</a:t>
             </a:fld>
             <a:endParaRPr lang="en-US"/>
           </a:p>
@@ -2673,7 +3739,7 @@
           <a:p>
             <a:fld id="{1B239388-45FC-456E-8776-854E70FB4B9B}" type="datetimeFigureOut">
               <a:rPr lang="en-US" smtClean="0"/>
-              <a:t>5/21/2024</a:t>
+              <a:t>6/24/2024</a:t>
             </a:fld>
             <a:endParaRPr lang="en-US"/>
           </a:p>
@@ -2914,7 +3980,7 @@
           <a:p>
             <a:fld id="{1B239388-45FC-456E-8776-854E70FB4B9B}" type="datetimeFigureOut">
               <a:rPr lang="en-US" smtClean="0"/>
-              <a:t>5/21/2024</a:t>
+              <a:t>6/24/2024</a:t>
             </a:fld>
             <a:endParaRPr lang="en-US"/>
           </a:p>
@@ -9189,6 +10255,2046 @@
     <p:extLst>
       <p:ext uri="{BB962C8B-B14F-4D97-AF65-F5344CB8AC3E}">
         <p14:creationId xmlns:p14="http://schemas.microsoft.com/office/powerpoint/2010/main" val="52878898"/>
+      </p:ext>
+    </p:extLst>
+  </p:cSld>
+  <p:clrMapOvr>
+    <a:masterClrMapping/>
+  </p:clrMapOvr>
+</p:sld>
+</file>
+
+<file path=ppt/slides/slide7.xml><?xml version="1.0" encoding="utf-8"?>
+<p:sld xmlns:a="http://schemas.openxmlformats.org/drawingml/2006/main" xmlns:r="http://schemas.openxmlformats.org/officeDocument/2006/relationships" xmlns:p="http://schemas.openxmlformats.org/presentationml/2006/main">
+  <p:cSld>
+    <p:spTree>
+      <p:nvGrpSpPr>
+        <p:cNvPr id="1" name=""/>
+        <p:cNvGrpSpPr/>
+        <p:nvPr/>
+      </p:nvGrpSpPr>
+      <p:grpSpPr>
+        <a:xfrm>
+          <a:off x="0" y="0"/>
+          <a:ext cx="0" cy="0"/>
+          <a:chOff x="0" y="0"/>
+          <a:chExt cx="0" cy="0"/>
+        </a:xfrm>
+      </p:grpSpPr>
+      <p:pic>
+        <p:nvPicPr>
+          <p:cNvPr id="5" name="Picture 4">
+            <a:extLst>
+              <a:ext uri="{FF2B5EF4-FFF2-40B4-BE49-F238E27FC236}">
+                <a16:creationId xmlns:a16="http://schemas.microsoft.com/office/drawing/2014/main" id="{31C07EB7-DA06-379E-46A7-211863D2F4CC}"/>
+              </a:ext>
+            </a:extLst>
+          </p:cNvPr>
+          <p:cNvPicPr>
+            <a:picLocks noChangeAspect="1"/>
+          </p:cNvPicPr>
+          <p:nvPr/>
+        </p:nvPicPr>
+        <p:blipFill>
+          <a:blip r:embed="rId2"/>
+          <a:stretch>
+            <a:fillRect/>
+          </a:stretch>
+        </p:blipFill>
+        <p:spPr>
+          <a:xfrm>
+            <a:off x="1679944" y="49330"/>
+            <a:ext cx="7953154" cy="6759339"/>
+          </a:xfrm>
+          <a:prstGeom prst="rect">
+            <a:avLst/>
+          </a:prstGeom>
+        </p:spPr>
+      </p:pic>
+      <mc:AlternateContent xmlns:mc="http://schemas.openxmlformats.org/markup-compatibility/2006">
+        <mc:Choice xmlns:p14="http://schemas.microsoft.com/office/powerpoint/2010/main" Requires="p14">
+          <p:contentPart p14:bwMode="auto" r:id="rId3">
+            <p14:nvContentPartPr>
+              <p14:cNvPr id="2" name="Ink 1">
+                <a:extLst>
+                  <a:ext uri="{FF2B5EF4-FFF2-40B4-BE49-F238E27FC236}">
+                    <a16:creationId xmlns:a16="http://schemas.microsoft.com/office/drawing/2014/main" id="{A8B6D70B-6F1F-A904-A5F6-ECC5683096BC}"/>
+                  </a:ext>
+                </a:extLst>
+              </p14:cNvPr>
+              <p14:cNvContentPartPr/>
+              <p14:nvPr/>
+            </p14:nvContentPartPr>
+            <p14:xfrm>
+              <a:off x="5507163" y="2392409"/>
+              <a:ext cx="360" cy="385920"/>
+            </p14:xfrm>
+          </p:contentPart>
+        </mc:Choice>
+        <mc:Fallback>
+          <p:pic>
+            <p:nvPicPr>
+              <p:cNvPr id="2" name="Ink 1">
+                <a:extLst>
+                  <a:ext uri="{FF2B5EF4-FFF2-40B4-BE49-F238E27FC236}">
+                    <a16:creationId xmlns:a16="http://schemas.microsoft.com/office/drawing/2014/main" id="{A8B6D70B-6F1F-A904-A5F6-ECC5683096BC}"/>
+                  </a:ext>
+                </a:extLst>
+              </p:cNvPr>
+              <p:cNvPicPr/>
+              <p:nvPr/>
+            </p:nvPicPr>
+            <p:blipFill>
+              <a:blip r:embed="rId4"/>
+              <a:stretch>
+                <a:fillRect/>
+              </a:stretch>
+            </p:blipFill>
+            <p:spPr>
+              <a:xfrm>
+                <a:off x="5501043" y="2386289"/>
+                <a:ext cx="12600" cy="398160"/>
+              </a:xfrm>
+              <a:prstGeom prst="rect">
+                <a:avLst/>
+              </a:prstGeom>
+            </p:spPr>
+          </p:pic>
+        </mc:Fallback>
+      </mc:AlternateContent>
+      <p:grpSp>
+        <p:nvGrpSpPr>
+          <p:cNvPr id="11" name="Group 10">
+            <a:extLst>
+              <a:ext uri="{FF2B5EF4-FFF2-40B4-BE49-F238E27FC236}">
+                <a16:creationId xmlns:a16="http://schemas.microsoft.com/office/drawing/2014/main" id="{7BBB0C7E-AFB1-AF8C-7337-62C1093C9681}"/>
+              </a:ext>
+            </a:extLst>
+          </p:cNvPr>
+          <p:cNvGrpSpPr/>
+          <p:nvPr/>
+        </p:nvGrpSpPr>
+        <p:grpSpPr>
+          <a:xfrm>
+            <a:off x="5454243" y="2984609"/>
+            <a:ext cx="189720" cy="804960"/>
+            <a:chOff x="5454243" y="2984609"/>
+            <a:chExt cx="189720" cy="804960"/>
+          </a:xfrm>
+        </p:grpSpPr>
+        <mc:AlternateContent xmlns:mc="http://schemas.openxmlformats.org/markup-compatibility/2006">
+          <mc:Choice xmlns:p14="http://schemas.microsoft.com/office/powerpoint/2010/main" Requires="p14">
+            <p:contentPart p14:bwMode="auto" r:id="rId5">
+              <p14:nvContentPartPr>
+                <p14:cNvPr id="3" name="Ink 2">
+                  <a:extLst>
+                    <a:ext uri="{FF2B5EF4-FFF2-40B4-BE49-F238E27FC236}">
+                      <a16:creationId xmlns:a16="http://schemas.microsoft.com/office/drawing/2014/main" id="{9A1C86CC-C92C-F81C-77F7-010CB6E9D7AB}"/>
+                    </a:ext>
+                  </a:extLst>
+                </p14:cNvPr>
+                <p14:cNvContentPartPr/>
+                <p14:nvPr/>
+              </p14:nvContentPartPr>
+              <p14:xfrm>
+                <a:off x="5465043" y="2984609"/>
+                <a:ext cx="98280" cy="56520"/>
+              </p14:xfrm>
+            </p:contentPart>
+          </mc:Choice>
+          <mc:Fallback>
+            <p:pic>
+              <p:nvPicPr>
+                <p:cNvPr id="3" name="Ink 2">
+                  <a:extLst>
+                    <a:ext uri="{FF2B5EF4-FFF2-40B4-BE49-F238E27FC236}">
+                      <a16:creationId xmlns:a16="http://schemas.microsoft.com/office/drawing/2014/main" id="{9A1C86CC-C92C-F81C-77F7-010CB6E9D7AB}"/>
+                    </a:ext>
+                  </a:extLst>
+                </p:cNvPr>
+                <p:cNvPicPr/>
+                <p:nvPr/>
+              </p:nvPicPr>
+              <p:blipFill>
+                <a:blip r:embed="rId6"/>
+                <a:stretch>
+                  <a:fillRect/>
+                </a:stretch>
+              </p:blipFill>
+              <p:spPr>
+                <a:xfrm>
+                  <a:off x="5458923" y="2978489"/>
+                  <a:ext cx="110520" cy="68760"/>
+                </a:xfrm>
+                <a:prstGeom prst="rect">
+                  <a:avLst/>
+                </a:prstGeom>
+              </p:spPr>
+            </p:pic>
+          </mc:Fallback>
+        </mc:AlternateContent>
+        <mc:AlternateContent xmlns:mc="http://schemas.openxmlformats.org/markup-compatibility/2006">
+          <mc:Choice xmlns:p14="http://schemas.microsoft.com/office/powerpoint/2010/main" Requires="p14">
+            <p:contentPart p14:bwMode="auto" r:id="rId7">
+              <p14:nvContentPartPr>
+                <p14:cNvPr id="4" name="Ink 3">
+                  <a:extLst>
+                    <a:ext uri="{FF2B5EF4-FFF2-40B4-BE49-F238E27FC236}">
+                      <a16:creationId xmlns:a16="http://schemas.microsoft.com/office/drawing/2014/main" id="{6712D809-B925-7CF8-C226-7AE580D2721C}"/>
+                    </a:ext>
+                  </a:extLst>
+                </p14:cNvPr>
+                <p14:cNvContentPartPr/>
+                <p14:nvPr/>
+              </p14:nvContentPartPr>
+              <p14:xfrm>
+                <a:off x="5454243" y="3157769"/>
+                <a:ext cx="54720" cy="521640"/>
+              </p14:xfrm>
+            </p:contentPart>
+          </mc:Choice>
+          <mc:Fallback>
+            <p:pic>
+              <p:nvPicPr>
+                <p:cNvPr id="4" name="Ink 3">
+                  <a:extLst>
+                    <a:ext uri="{FF2B5EF4-FFF2-40B4-BE49-F238E27FC236}">
+                      <a16:creationId xmlns:a16="http://schemas.microsoft.com/office/drawing/2014/main" id="{6712D809-B925-7CF8-C226-7AE580D2721C}"/>
+                    </a:ext>
+                  </a:extLst>
+                </p:cNvPr>
+                <p:cNvPicPr/>
+                <p:nvPr/>
+              </p:nvPicPr>
+              <p:blipFill>
+                <a:blip r:embed="rId8"/>
+                <a:stretch>
+                  <a:fillRect/>
+                </a:stretch>
+              </p:blipFill>
+              <p:spPr>
+                <a:xfrm>
+                  <a:off x="5448123" y="3151649"/>
+                  <a:ext cx="66960" cy="533880"/>
+                </a:xfrm>
+                <a:prstGeom prst="rect">
+                  <a:avLst/>
+                </a:prstGeom>
+              </p:spPr>
+            </p:pic>
+          </mc:Fallback>
+        </mc:AlternateContent>
+        <mc:AlternateContent xmlns:mc="http://schemas.openxmlformats.org/markup-compatibility/2006">
+          <mc:Choice xmlns:p14="http://schemas.microsoft.com/office/powerpoint/2010/main" Requires="p14">
+            <p:contentPart p14:bwMode="auto" r:id="rId9">
+              <p14:nvContentPartPr>
+                <p14:cNvPr id="6" name="Ink 5">
+                  <a:extLst>
+                    <a:ext uri="{FF2B5EF4-FFF2-40B4-BE49-F238E27FC236}">
+                      <a16:creationId xmlns:a16="http://schemas.microsoft.com/office/drawing/2014/main" id="{44B18DD0-F06E-C638-A842-26E02F3E2E07}"/>
+                    </a:ext>
+                  </a:extLst>
+                </p14:cNvPr>
+                <p14:cNvContentPartPr/>
+                <p14:nvPr/>
+              </p14:nvContentPartPr>
+              <p14:xfrm>
+                <a:off x="5465043" y="3784889"/>
+                <a:ext cx="178920" cy="4680"/>
+              </p14:xfrm>
+            </p:contentPart>
+          </mc:Choice>
+          <mc:Fallback>
+            <p:pic>
+              <p:nvPicPr>
+                <p:cNvPr id="6" name="Ink 5">
+                  <a:extLst>
+                    <a:ext uri="{FF2B5EF4-FFF2-40B4-BE49-F238E27FC236}">
+                      <a16:creationId xmlns:a16="http://schemas.microsoft.com/office/drawing/2014/main" id="{44B18DD0-F06E-C638-A842-26E02F3E2E07}"/>
+                    </a:ext>
+                  </a:extLst>
+                </p:cNvPr>
+                <p:cNvPicPr/>
+                <p:nvPr/>
+              </p:nvPicPr>
+              <p:blipFill>
+                <a:blip r:embed="rId10"/>
+                <a:stretch>
+                  <a:fillRect/>
+                </a:stretch>
+              </p:blipFill>
+              <p:spPr>
+                <a:xfrm>
+                  <a:off x="5458923" y="3778769"/>
+                  <a:ext cx="191160" cy="16920"/>
+                </a:xfrm>
+                <a:prstGeom prst="rect">
+                  <a:avLst/>
+                </a:prstGeom>
+              </p:spPr>
+            </p:pic>
+          </mc:Fallback>
+        </mc:AlternateContent>
+      </p:grpSp>
+      <mc:AlternateContent xmlns:mc="http://schemas.openxmlformats.org/markup-compatibility/2006">
+        <mc:Choice xmlns:p14="http://schemas.microsoft.com/office/powerpoint/2010/main" Requires="p14">
+          <p:contentPart p14:bwMode="auto" r:id="rId11">
+            <p14:nvContentPartPr>
+              <p14:cNvPr id="7" name="Ink 6">
+                <a:extLst>
+                  <a:ext uri="{FF2B5EF4-FFF2-40B4-BE49-F238E27FC236}">
+                    <a16:creationId xmlns:a16="http://schemas.microsoft.com/office/drawing/2014/main" id="{2A44D66E-B070-0BAD-6245-DA9B52D372CC}"/>
+                  </a:ext>
+                </a:extLst>
+              </p14:cNvPr>
+              <p14:cNvContentPartPr/>
+              <p14:nvPr/>
+            </p14:nvContentPartPr>
+            <p14:xfrm>
+              <a:off x="5431203" y="3987209"/>
+              <a:ext cx="66240" cy="334440"/>
+            </p14:xfrm>
+          </p:contentPart>
+        </mc:Choice>
+        <mc:Fallback>
+          <p:pic>
+            <p:nvPicPr>
+              <p:cNvPr id="7" name="Ink 6">
+                <a:extLst>
+                  <a:ext uri="{FF2B5EF4-FFF2-40B4-BE49-F238E27FC236}">
+                    <a16:creationId xmlns:a16="http://schemas.microsoft.com/office/drawing/2014/main" id="{2A44D66E-B070-0BAD-6245-DA9B52D372CC}"/>
+                  </a:ext>
+                </a:extLst>
+              </p:cNvPr>
+              <p:cNvPicPr/>
+              <p:nvPr/>
+            </p:nvPicPr>
+            <p:blipFill>
+              <a:blip r:embed="rId12"/>
+              <a:stretch>
+                <a:fillRect/>
+              </a:stretch>
+            </p:blipFill>
+            <p:spPr>
+              <a:xfrm>
+                <a:off x="5425083" y="3981089"/>
+                <a:ext cx="78480" cy="346680"/>
+              </a:xfrm>
+              <a:prstGeom prst="rect">
+                <a:avLst/>
+              </a:prstGeom>
+            </p:spPr>
+          </p:pic>
+        </mc:Fallback>
+      </mc:AlternateContent>
+      <mc:AlternateContent xmlns:mc="http://schemas.openxmlformats.org/markup-compatibility/2006">
+        <mc:Choice xmlns:p14="http://schemas.microsoft.com/office/powerpoint/2010/main" Requires="p14">
+          <p:contentPart p14:bwMode="auto" r:id="rId13">
+            <p14:nvContentPartPr>
+              <p14:cNvPr id="8" name="Ink 7">
+                <a:extLst>
+                  <a:ext uri="{FF2B5EF4-FFF2-40B4-BE49-F238E27FC236}">
+                    <a16:creationId xmlns:a16="http://schemas.microsoft.com/office/drawing/2014/main" id="{9BA95B99-6A1A-7E1D-F2E5-55BB7F1E88CD}"/>
+                  </a:ext>
+                </a:extLst>
+              </p14:cNvPr>
+              <p14:cNvContentPartPr/>
+              <p14:nvPr/>
+            </p14:nvContentPartPr>
+            <p14:xfrm>
+              <a:off x="5433003" y="4529369"/>
+              <a:ext cx="8640" cy="24840"/>
+            </p14:xfrm>
+          </p:contentPart>
+        </mc:Choice>
+        <mc:Fallback>
+          <p:pic>
+            <p:nvPicPr>
+              <p:cNvPr id="8" name="Ink 7">
+                <a:extLst>
+                  <a:ext uri="{FF2B5EF4-FFF2-40B4-BE49-F238E27FC236}">
+                    <a16:creationId xmlns:a16="http://schemas.microsoft.com/office/drawing/2014/main" id="{9BA95B99-6A1A-7E1D-F2E5-55BB7F1E88CD}"/>
+                  </a:ext>
+                </a:extLst>
+              </p:cNvPr>
+              <p:cNvPicPr/>
+              <p:nvPr/>
+            </p:nvPicPr>
+            <p:blipFill>
+              <a:blip r:embed="rId14"/>
+              <a:stretch>
+                <a:fillRect/>
+              </a:stretch>
+            </p:blipFill>
+            <p:spPr>
+              <a:xfrm>
+                <a:off x="5426883" y="4523249"/>
+                <a:ext cx="20880" cy="37080"/>
+              </a:xfrm>
+              <a:prstGeom prst="rect">
+                <a:avLst/>
+              </a:prstGeom>
+            </p:spPr>
+          </p:pic>
+        </mc:Fallback>
+      </mc:AlternateContent>
+      <mc:AlternateContent xmlns:mc="http://schemas.openxmlformats.org/markup-compatibility/2006">
+        <mc:Choice xmlns:p14="http://schemas.microsoft.com/office/powerpoint/2010/main" Requires="p14">
+          <p:contentPart p14:bwMode="auto" r:id="rId15">
+            <p14:nvContentPartPr>
+              <p14:cNvPr id="9" name="Ink 8">
+                <a:extLst>
+                  <a:ext uri="{FF2B5EF4-FFF2-40B4-BE49-F238E27FC236}">
+                    <a16:creationId xmlns:a16="http://schemas.microsoft.com/office/drawing/2014/main" id="{AA2AB631-AE34-BB60-13CD-9FC81FA32B09}"/>
+                  </a:ext>
+                </a:extLst>
+              </p14:cNvPr>
+              <p14:cNvContentPartPr/>
+              <p14:nvPr/>
+            </p14:nvContentPartPr>
+            <p14:xfrm>
+              <a:off x="5506083" y="4858769"/>
+              <a:ext cx="91440" cy="332280"/>
+            </p14:xfrm>
+          </p:contentPart>
+        </mc:Choice>
+        <mc:Fallback>
+          <p:pic>
+            <p:nvPicPr>
+              <p:cNvPr id="9" name="Ink 8">
+                <a:extLst>
+                  <a:ext uri="{FF2B5EF4-FFF2-40B4-BE49-F238E27FC236}">
+                    <a16:creationId xmlns:a16="http://schemas.microsoft.com/office/drawing/2014/main" id="{AA2AB631-AE34-BB60-13CD-9FC81FA32B09}"/>
+                  </a:ext>
+                </a:extLst>
+              </p:cNvPr>
+              <p:cNvPicPr/>
+              <p:nvPr/>
+            </p:nvPicPr>
+            <p:blipFill>
+              <a:blip r:embed="rId16"/>
+              <a:stretch>
+                <a:fillRect/>
+              </a:stretch>
+            </p:blipFill>
+            <p:spPr>
+              <a:xfrm>
+                <a:off x="5499963" y="4852649"/>
+                <a:ext cx="103680" cy="344520"/>
+              </a:xfrm>
+              <a:prstGeom prst="rect">
+                <a:avLst/>
+              </a:prstGeom>
+            </p:spPr>
+          </p:pic>
+        </mc:Fallback>
+      </mc:AlternateContent>
+      <mc:AlternateContent xmlns:mc="http://schemas.openxmlformats.org/markup-compatibility/2006">
+        <mc:Choice xmlns:p14="http://schemas.microsoft.com/office/powerpoint/2010/main" Requires="p14">
+          <p:contentPart p14:bwMode="auto" r:id="rId17">
+            <p14:nvContentPartPr>
+              <p14:cNvPr id="10" name="Ink 9">
+                <a:extLst>
+                  <a:ext uri="{FF2B5EF4-FFF2-40B4-BE49-F238E27FC236}">
+                    <a16:creationId xmlns:a16="http://schemas.microsoft.com/office/drawing/2014/main" id="{7CBF6B58-C54C-07CB-DE25-8B0BE3C85666}"/>
+                  </a:ext>
+                </a:extLst>
+              </p14:cNvPr>
+              <p14:cNvContentPartPr/>
+              <p14:nvPr/>
+            </p14:nvContentPartPr>
+            <p14:xfrm>
+              <a:off x="5507163" y="5401289"/>
+              <a:ext cx="19800" cy="6480"/>
+            </p14:xfrm>
+          </p:contentPart>
+        </mc:Choice>
+        <mc:Fallback>
+          <p:pic>
+            <p:nvPicPr>
+              <p:cNvPr id="10" name="Ink 9">
+                <a:extLst>
+                  <a:ext uri="{FF2B5EF4-FFF2-40B4-BE49-F238E27FC236}">
+                    <a16:creationId xmlns:a16="http://schemas.microsoft.com/office/drawing/2014/main" id="{7CBF6B58-C54C-07CB-DE25-8B0BE3C85666}"/>
+                  </a:ext>
+                </a:extLst>
+              </p:cNvPr>
+              <p:cNvPicPr/>
+              <p:nvPr/>
+            </p:nvPicPr>
+            <p:blipFill>
+              <a:blip r:embed="rId18"/>
+              <a:stretch>
+                <a:fillRect/>
+              </a:stretch>
+            </p:blipFill>
+            <p:spPr>
+              <a:xfrm>
+                <a:off x="5501043" y="5395169"/>
+                <a:ext cx="32040" cy="18720"/>
+              </a:xfrm>
+              <a:prstGeom prst="rect">
+                <a:avLst/>
+              </a:prstGeom>
+            </p:spPr>
+          </p:pic>
+        </mc:Fallback>
+      </mc:AlternateContent>
+      <mc:AlternateContent xmlns:mc="http://schemas.openxmlformats.org/markup-compatibility/2006">
+        <mc:Choice xmlns:p14="http://schemas.microsoft.com/office/powerpoint/2010/main" Requires="p14">
+          <p:contentPart p14:bwMode="auto" r:id="rId19">
+            <p14:nvContentPartPr>
+              <p14:cNvPr id="12" name="Ink 11">
+                <a:extLst>
+                  <a:ext uri="{FF2B5EF4-FFF2-40B4-BE49-F238E27FC236}">
+                    <a16:creationId xmlns:a16="http://schemas.microsoft.com/office/drawing/2014/main" id="{F73582EA-EC95-3405-42B4-901B757D6BE5}"/>
+                  </a:ext>
+                </a:extLst>
+              </p14:cNvPr>
+              <p14:cNvContentPartPr/>
+              <p14:nvPr/>
+            </p14:nvContentPartPr>
+            <p14:xfrm>
+              <a:off x="10558323" y="3263969"/>
+              <a:ext cx="360" cy="360"/>
+            </p14:xfrm>
+          </p:contentPart>
+        </mc:Choice>
+        <mc:Fallback>
+          <p:pic>
+            <p:nvPicPr>
+              <p:cNvPr id="12" name="Ink 11">
+                <a:extLst>
+                  <a:ext uri="{FF2B5EF4-FFF2-40B4-BE49-F238E27FC236}">
+                    <a16:creationId xmlns:a16="http://schemas.microsoft.com/office/drawing/2014/main" id="{F73582EA-EC95-3405-42B4-901B757D6BE5}"/>
+                  </a:ext>
+                </a:extLst>
+              </p:cNvPr>
+              <p:cNvPicPr/>
+              <p:nvPr/>
+            </p:nvPicPr>
+            <p:blipFill>
+              <a:blip r:embed="rId20"/>
+              <a:stretch>
+                <a:fillRect/>
+              </a:stretch>
+            </p:blipFill>
+            <p:spPr>
+              <a:xfrm>
+                <a:off x="10552203" y="3257849"/>
+                <a:ext cx="12600" cy="12600"/>
+              </a:xfrm>
+              <a:prstGeom prst="rect">
+                <a:avLst/>
+              </a:prstGeom>
+            </p:spPr>
+          </p:pic>
+        </mc:Fallback>
+      </mc:AlternateContent>
+      <p:grpSp>
+        <p:nvGrpSpPr>
+          <p:cNvPr id="47" name="Group 46">
+            <a:extLst>
+              <a:ext uri="{FF2B5EF4-FFF2-40B4-BE49-F238E27FC236}">
+                <a16:creationId xmlns:a16="http://schemas.microsoft.com/office/drawing/2014/main" id="{45553130-40BF-D0F7-1559-EF7A217C1E56}"/>
+              </a:ext>
+            </a:extLst>
+          </p:cNvPr>
+          <p:cNvGrpSpPr/>
+          <p:nvPr/>
+        </p:nvGrpSpPr>
+        <p:grpSpPr>
+          <a:xfrm>
+            <a:off x="5669163" y="2433809"/>
+            <a:ext cx="4343400" cy="3449160"/>
+            <a:chOff x="5669163" y="2433809"/>
+            <a:chExt cx="4343400" cy="3449160"/>
+          </a:xfrm>
+        </p:grpSpPr>
+        <mc:AlternateContent xmlns:mc="http://schemas.openxmlformats.org/markup-compatibility/2006">
+          <mc:Choice xmlns:p14="http://schemas.microsoft.com/office/powerpoint/2010/main" Requires="p14">
+            <p:contentPart p14:bwMode="auto" r:id="rId21">
+              <p14:nvContentPartPr>
+                <p14:cNvPr id="16" name="Ink 15">
+                  <a:extLst>
+                    <a:ext uri="{FF2B5EF4-FFF2-40B4-BE49-F238E27FC236}">
+                      <a16:creationId xmlns:a16="http://schemas.microsoft.com/office/drawing/2014/main" id="{39CD555A-08A6-5B7D-7688-249A9457B020}"/>
+                    </a:ext>
+                  </a:extLst>
+                </p14:cNvPr>
+                <p14:cNvContentPartPr/>
+                <p14:nvPr/>
+              </p14:nvContentPartPr>
+              <p14:xfrm>
+                <a:off x="6122763" y="3168929"/>
+                <a:ext cx="384840" cy="279360"/>
+              </p14:xfrm>
+            </p:contentPart>
+          </mc:Choice>
+          <mc:Fallback>
+            <p:pic>
+              <p:nvPicPr>
+                <p:cNvPr id="16" name="Ink 15">
+                  <a:extLst>
+                    <a:ext uri="{FF2B5EF4-FFF2-40B4-BE49-F238E27FC236}">
+                      <a16:creationId xmlns:a16="http://schemas.microsoft.com/office/drawing/2014/main" id="{39CD555A-08A6-5B7D-7688-249A9457B020}"/>
+                    </a:ext>
+                  </a:extLst>
+                </p:cNvPr>
+                <p:cNvPicPr/>
+                <p:nvPr/>
+              </p:nvPicPr>
+              <p:blipFill>
+                <a:blip r:embed="rId22"/>
+                <a:stretch>
+                  <a:fillRect/>
+                </a:stretch>
+              </p:blipFill>
+              <p:spPr>
+                <a:xfrm>
+                  <a:off x="6116643" y="3162809"/>
+                  <a:ext cx="397080" cy="291600"/>
+                </a:xfrm>
+                <a:prstGeom prst="rect">
+                  <a:avLst/>
+                </a:prstGeom>
+              </p:spPr>
+            </p:pic>
+          </mc:Fallback>
+        </mc:AlternateContent>
+        <mc:AlternateContent xmlns:mc="http://schemas.openxmlformats.org/markup-compatibility/2006">
+          <mc:Choice xmlns:p14="http://schemas.microsoft.com/office/powerpoint/2010/main" Requires="p14">
+            <p:contentPart p14:bwMode="auto" r:id="rId23">
+              <p14:nvContentPartPr>
+                <p14:cNvPr id="13" name="Ink 12">
+                  <a:extLst>
+                    <a:ext uri="{FF2B5EF4-FFF2-40B4-BE49-F238E27FC236}">
+                      <a16:creationId xmlns:a16="http://schemas.microsoft.com/office/drawing/2014/main" id="{7701DD76-DF4A-2D0B-7761-310F0F6FD8D5}"/>
+                    </a:ext>
+                  </a:extLst>
+                </p14:cNvPr>
+                <p14:cNvContentPartPr/>
+                <p14:nvPr/>
+              </p14:nvContentPartPr>
+              <p14:xfrm>
+                <a:off x="5669163" y="2445329"/>
+                <a:ext cx="483480" cy="501840"/>
+              </p14:xfrm>
+            </p:contentPart>
+          </mc:Choice>
+          <mc:Fallback>
+            <p:pic>
+              <p:nvPicPr>
+                <p:cNvPr id="13" name="Ink 12">
+                  <a:extLst>
+                    <a:ext uri="{FF2B5EF4-FFF2-40B4-BE49-F238E27FC236}">
+                      <a16:creationId xmlns:a16="http://schemas.microsoft.com/office/drawing/2014/main" id="{7701DD76-DF4A-2D0B-7761-310F0F6FD8D5}"/>
+                    </a:ext>
+                  </a:extLst>
+                </p:cNvPr>
+                <p:cNvPicPr/>
+                <p:nvPr/>
+              </p:nvPicPr>
+              <p:blipFill>
+                <a:blip r:embed="rId24"/>
+                <a:stretch>
+                  <a:fillRect/>
+                </a:stretch>
+              </p:blipFill>
+              <p:spPr>
+                <a:xfrm>
+                  <a:off x="5663043" y="2439209"/>
+                  <a:ext cx="495720" cy="514080"/>
+                </a:xfrm>
+                <a:prstGeom prst="rect">
+                  <a:avLst/>
+                </a:prstGeom>
+              </p:spPr>
+            </p:pic>
+          </mc:Fallback>
+        </mc:AlternateContent>
+        <mc:AlternateContent xmlns:mc="http://schemas.openxmlformats.org/markup-compatibility/2006">
+          <mc:Choice xmlns:p14="http://schemas.microsoft.com/office/powerpoint/2010/main" Requires="p14">
+            <p:contentPart p14:bwMode="auto" r:id="rId25">
+              <p14:nvContentPartPr>
+                <p14:cNvPr id="14" name="Ink 13">
+                  <a:extLst>
+                    <a:ext uri="{FF2B5EF4-FFF2-40B4-BE49-F238E27FC236}">
+                      <a16:creationId xmlns:a16="http://schemas.microsoft.com/office/drawing/2014/main" id="{258776AC-F10A-BD29-6B98-166C5FC52537}"/>
+                    </a:ext>
+                  </a:extLst>
+                </p14:cNvPr>
+                <p14:cNvContentPartPr/>
+                <p14:nvPr/>
+              </p14:nvContentPartPr>
+              <p14:xfrm>
+                <a:off x="5996763" y="2605889"/>
+                <a:ext cx="602280" cy="116640"/>
+              </p14:xfrm>
+            </p:contentPart>
+          </mc:Choice>
+          <mc:Fallback>
+            <p:pic>
+              <p:nvPicPr>
+                <p:cNvPr id="14" name="Ink 13">
+                  <a:extLst>
+                    <a:ext uri="{FF2B5EF4-FFF2-40B4-BE49-F238E27FC236}">
+                      <a16:creationId xmlns:a16="http://schemas.microsoft.com/office/drawing/2014/main" id="{258776AC-F10A-BD29-6B98-166C5FC52537}"/>
+                    </a:ext>
+                  </a:extLst>
+                </p:cNvPr>
+                <p:cNvPicPr/>
+                <p:nvPr/>
+              </p:nvPicPr>
+              <p:blipFill>
+                <a:blip r:embed="rId26"/>
+                <a:stretch>
+                  <a:fillRect/>
+                </a:stretch>
+              </p:blipFill>
+              <p:spPr>
+                <a:xfrm>
+                  <a:off x="5990643" y="2599769"/>
+                  <a:ext cx="614520" cy="128880"/>
+                </a:xfrm>
+                <a:prstGeom prst="rect">
+                  <a:avLst/>
+                </a:prstGeom>
+              </p:spPr>
+            </p:pic>
+          </mc:Fallback>
+        </mc:AlternateContent>
+        <mc:AlternateContent xmlns:mc="http://schemas.openxmlformats.org/markup-compatibility/2006">
+          <mc:Choice xmlns:p14="http://schemas.microsoft.com/office/powerpoint/2010/main" Requires="p14">
+            <p:contentPart p14:bwMode="auto" r:id="rId27">
+              <p14:nvContentPartPr>
+                <p14:cNvPr id="15" name="Ink 14">
+                  <a:extLst>
+                    <a:ext uri="{FF2B5EF4-FFF2-40B4-BE49-F238E27FC236}">
+                      <a16:creationId xmlns:a16="http://schemas.microsoft.com/office/drawing/2014/main" id="{17E897F7-2FCA-0053-D12E-FBE973EEC2E0}"/>
+                    </a:ext>
+                  </a:extLst>
+                </p14:cNvPr>
+                <p14:cNvContentPartPr/>
+                <p14:nvPr/>
+              </p14:nvContentPartPr>
+              <p14:xfrm>
+                <a:off x="6388443" y="2433809"/>
+                <a:ext cx="74520" cy="571320"/>
+              </p14:xfrm>
+            </p:contentPart>
+          </mc:Choice>
+          <mc:Fallback>
+            <p:pic>
+              <p:nvPicPr>
+                <p:cNvPr id="15" name="Ink 14">
+                  <a:extLst>
+                    <a:ext uri="{FF2B5EF4-FFF2-40B4-BE49-F238E27FC236}">
+                      <a16:creationId xmlns:a16="http://schemas.microsoft.com/office/drawing/2014/main" id="{17E897F7-2FCA-0053-D12E-FBE973EEC2E0}"/>
+                    </a:ext>
+                  </a:extLst>
+                </p:cNvPr>
+                <p:cNvPicPr/>
+                <p:nvPr/>
+              </p:nvPicPr>
+              <p:blipFill>
+                <a:blip r:embed="rId28"/>
+                <a:stretch>
+                  <a:fillRect/>
+                </a:stretch>
+              </p:blipFill>
+              <p:spPr>
+                <a:xfrm>
+                  <a:off x="6382323" y="2427689"/>
+                  <a:ext cx="86760" cy="583560"/>
+                </a:xfrm>
+                <a:prstGeom prst="rect">
+                  <a:avLst/>
+                </a:prstGeom>
+              </p:spPr>
+            </p:pic>
+          </mc:Fallback>
+        </mc:AlternateContent>
+        <mc:AlternateContent xmlns:mc="http://schemas.openxmlformats.org/markup-compatibility/2006">
+          <mc:Choice xmlns:p14="http://schemas.microsoft.com/office/powerpoint/2010/main" Requires="p14">
+            <p:contentPart p14:bwMode="auto" r:id="rId29">
+              <p14:nvContentPartPr>
+                <p14:cNvPr id="17" name="Ink 16">
+                  <a:extLst>
+                    <a:ext uri="{FF2B5EF4-FFF2-40B4-BE49-F238E27FC236}">
+                      <a16:creationId xmlns:a16="http://schemas.microsoft.com/office/drawing/2014/main" id="{9A7FA529-06E2-9EEE-B097-37D3A309EE5B}"/>
+                    </a:ext>
+                  </a:extLst>
+                </p14:cNvPr>
+                <p14:cNvContentPartPr/>
+                <p14:nvPr/>
+              </p14:nvContentPartPr>
+              <p14:xfrm>
+                <a:off x="6623163" y="2532809"/>
+                <a:ext cx="416160" cy="341640"/>
+              </p14:xfrm>
+            </p:contentPart>
+          </mc:Choice>
+          <mc:Fallback>
+            <p:pic>
+              <p:nvPicPr>
+                <p:cNvPr id="17" name="Ink 16">
+                  <a:extLst>
+                    <a:ext uri="{FF2B5EF4-FFF2-40B4-BE49-F238E27FC236}">
+                      <a16:creationId xmlns:a16="http://schemas.microsoft.com/office/drawing/2014/main" id="{9A7FA529-06E2-9EEE-B097-37D3A309EE5B}"/>
+                    </a:ext>
+                  </a:extLst>
+                </p:cNvPr>
+                <p:cNvPicPr/>
+                <p:nvPr/>
+              </p:nvPicPr>
+              <p:blipFill>
+                <a:blip r:embed="rId30"/>
+                <a:stretch>
+                  <a:fillRect/>
+                </a:stretch>
+              </p:blipFill>
+              <p:spPr>
+                <a:xfrm>
+                  <a:off x="6617043" y="2526689"/>
+                  <a:ext cx="428400" cy="353880"/>
+                </a:xfrm>
+                <a:prstGeom prst="rect">
+                  <a:avLst/>
+                </a:prstGeom>
+              </p:spPr>
+            </p:pic>
+          </mc:Fallback>
+        </mc:AlternateContent>
+        <mc:AlternateContent xmlns:mc="http://schemas.openxmlformats.org/markup-compatibility/2006">
+          <mc:Choice xmlns:p14="http://schemas.microsoft.com/office/powerpoint/2010/main" Requires="p14">
+            <p:contentPart p14:bwMode="auto" r:id="rId31">
+              <p14:nvContentPartPr>
+                <p14:cNvPr id="18" name="Ink 17">
+                  <a:extLst>
+                    <a:ext uri="{FF2B5EF4-FFF2-40B4-BE49-F238E27FC236}">
+                      <a16:creationId xmlns:a16="http://schemas.microsoft.com/office/drawing/2014/main" id="{75162EFD-B6E7-D760-ABCF-320CC97A88B6}"/>
+                    </a:ext>
+                  </a:extLst>
+                </p14:cNvPr>
+                <p14:cNvContentPartPr/>
+                <p14:nvPr/>
+              </p14:nvContentPartPr>
+              <p14:xfrm>
+                <a:off x="7113123" y="2601929"/>
+                <a:ext cx="224280" cy="185760"/>
+              </p14:xfrm>
+            </p:contentPart>
+          </mc:Choice>
+          <mc:Fallback>
+            <p:pic>
+              <p:nvPicPr>
+                <p:cNvPr id="18" name="Ink 17">
+                  <a:extLst>
+                    <a:ext uri="{FF2B5EF4-FFF2-40B4-BE49-F238E27FC236}">
+                      <a16:creationId xmlns:a16="http://schemas.microsoft.com/office/drawing/2014/main" id="{75162EFD-B6E7-D760-ABCF-320CC97A88B6}"/>
+                    </a:ext>
+                  </a:extLst>
+                </p:cNvPr>
+                <p:cNvPicPr/>
+                <p:nvPr/>
+              </p:nvPicPr>
+              <p:blipFill>
+                <a:blip r:embed="rId32"/>
+                <a:stretch>
+                  <a:fillRect/>
+                </a:stretch>
+              </p:blipFill>
+              <p:spPr>
+                <a:xfrm>
+                  <a:off x="7107003" y="2595809"/>
+                  <a:ext cx="236520" cy="198000"/>
+                </a:xfrm>
+                <a:prstGeom prst="rect">
+                  <a:avLst/>
+                </a:prstGeom>
+              </p:spPr>
+            </p:pic>
+          </mc:Fallback>
+        </mc:AlternateContent>
+        <mc:AlternateContent xmlns:mc="http://schemas.openxmlformats.org/markup-compatibility/2006">
+          <mc:Choice xmlns:p14="http://schemas.microsoft.com/office/powerpoint/2010/main" Requires="p14">
+            <p:contentPart p14:bwMode="auto" r:id="rId33">
+              <p14:nvContentPartPr>
+                <p14:cNvPr id="19" name="Ink 18">
+                  <a:extLst>
+                    <a:ext uri="{FF2B5EF4-FFF2-40B4-BE49-F238E27FC236}">
+                      <a16:creationId xmlns:a16="http://schemas.microsoft.com/office/drawing/2014/main" id="{45F71D4E-E9CB-C934-27B6-DE240679C0AD}"/>
+                    </a:ext>
+                  </a:extLst>
+                </p14:cNvPr>
+                <p14:cNvContentPartPr/>
+                <p14:nvPr/>
+              </p14:nvContentPartPr>
+              <p14:xfrm>
+                <a:off x="7347123" y="2456129"/>
+                <a:ext cx="360" cy="540360"/>
+              </p14:xfrm>
+            </p:contentPart>
+          </mc:Choice>
+          <mc:Fallback>
+            <p:pic>
+              <p:nvPicPr>
+                <p:cNvPr id="19" name="Ink 18">
+                  <a:extLst>
+                    <a:ext uri="{FF2B5EF4-FFF2-40B4-BE49-F238E27FC236}">
+                      <a16:creationId xmlns:a16="http://schemas.microsoft.com/office/drawing/2014/main" id="{45F71D4E-E9CB-C934-27B6-DE240679C0AD}"/>
+                    </a:ext>
+                  </a:extLst>
+                </p:cNvPr>
+                <p:cNvPicPr/>
+                <p:nvPr/>
+              </p:nvPicPr>
+              <p:blipFill>
+                <a:blip r:embed="rId34"/>
+                <a:stretch>
+                  <a:fillRect/>
+                </a:stretch>
+              </p:blipFill>
+              <p:spPr>
+                <a:xfrm>
+                  <a:off x="7341003" y="2450009"/>
+                  <a:ext cx="12600" cy="552600"/>
+                </a:xfrm>
+                <a:prstGeom prst="rect">
+                  <a:avLst/>
+                </a:prstGeom>
+              </p:spPr>
+            </p:pic>
+          </mc:Fallback>
+        </mc:AlternateContent>
+        <mc:AlternateContent xmlns:mc="http://schemas.openxmlformats.org/markup-compatibility/2006">
+          <mc:Choice xmlns:p14="http://schemas.microsoft.com/office/powerpoint/2010/main" Requires="p14">
+            <p:contentPart p14:bwMode="auto" r:id="rId35">
+              <p14:nvContentPartPr>
+                <p14:cNvPr id="20" name="Ink 19">
+                  <a:extLst>
+                    <a:ext uri="{FF2B5EF4-FFF2-40B4-BE49-F238E27FC236}">
+                      <a16:creationId xmlns:a16="http://schemas.microsoft.com/office/drawing/2014/main" id="{1B0072C8-97CC-9701-F79C-99F513129200}"/>
+                    </a:ext>
+                  </a:extLst>
+                </p14:cNvPr>
+                <p14:cNvContentPartPr/>
+                <p14:nvPr/>
+              </p14:nvContentPartPr>
+              <p14:xfrm>
+                <a:off x="6860403" y="3227969"/>
+                <a:ext cx="350280" cy="293400"/>
+              </p14:xfrm>
+            </p:contentPart>
+          </mc:Choice>
+          <mc:Fallback>
+            <p:pic>
+              <p:nvPicPr>
+                <p:cNvPr id="20" name="Ink 19">
+                  <a:extLst>
+                    <a:ext uri="{FF2B5EF4-FFF2-40B4-BE49-F238E27FC236}">
+                      <a16:creationId xmlns:a16="http://schemas.microsoft.com/office/drawing/2014/main" id="{1B0072C8-97CC-9701-F79C-99F513129200}"/>
+                    </a:ext>
+                  </a:extLst>
+                </p:cNvPr>
+                <p:cNvPicPr/>
+                <p:nvPr/>
+              </p:nvPicPr>
+              <p:blipFill>
+                <a:blip r:embed="rId36"/>
+                <a:stretch>
+                  <a:fillRect/>
+                </a:stretch>
+              </p:blipFill>
+              <p:spPr>
+                <a:xfrm>
+                  <a:off x="6854283" y="3221849"/>
+                  <a:ext cx="362520" cy="305640"/>
+                </a:xfrm>
+                <a:prstGeom prst="rect">
+                  <a:avLst/>
+                </a:prstGeom>
+              </p:spPr>
+            </p:pic>
+          </mc:Fallback>
+        </mc:AlternateContent>
+        <mc:AlternateContent xmlns:mc="http://schemas.openxmlformats.org/markup-compatibility/2006">
+          <mc:Choice xmlns:p14="http://schemas.microsoft.com/office/powerpoint/2010/main" Requires="p14">
+            <p:contentPart p14:bwMode="auto" r:id="rId37">
+              <p14:nvContentPartPr>
+                <p14:cNvPr id="22" name="Ink 21">
+                  <a:extLst>
+                    <a:ext uri="{FF2B5EF4-FFF2-40B4-BE49-F238E27FC236}">
+                      <a16:creationId xmlns:a16="http://schemas.microsoft.com/office/drawing/2014/main" id="{97F45C63-988D-8B0D-31AC-FCBD72F9CDD6}"/>
+                    </a:ext>
+                  </a:extLst>
+                </p14:cNvPr>
+                <p14:cNvContentPartPr/>
+                <p14:nvPr/>
+              </p14:nvContentPartPr>
+              <p14:xfrm>
+                <a:off x="7361523" y="2466569"/>
+                <a:ext cx="410760" cy="1278720"/>
+              </p14:xfrm>
+            </p:contentPart>
+          </mc:Choice>
+          <mc:Fallback>
+            <p:pic>
+              <p:nvPicPr>
+                <p:cNvPr id="22" name="Ink 21">
+                  <a:extLst>
+                    <a:ext uri="{FF2B5EF4-FFF2-40B4-BE49-F238E27FC236}">
+                      <a16:creationId xmlns:a16="http://schemas.microsoft.com/office/drawing/2014/main" id="{97F45C63-988D-8B0D-31AC-FCBD72F9CDD6}"/>
+                    </a:ext>
+                  </a:extLst>
+                </p:cNvPr>
+                <p:cNvPicPr/>
+                <p:nvPr/>
+              </p:nvPicPr>
+              <p:blipFill>
+                <a:blip r:embed="rId38"/>
+                <a:stretch>
+                  <a:fillRect/>
+                </a:stretch>
+              </p:blipFill>
+              <p:spPr>
+                <a:xfrm>
+                  <a:off x="7355403" y="2460449"/>
+                  <a:ext cx="423000" cy="1290960"/>
+                </a:xfrm>
+                <a:prstGeom prst="rect">
+                  <a:avLst/>
+                </a:prstGeom>
+              </p:spPr>
+            </p:pic>
+          </mc:Fallback>
+        </mc:AlternateContent>
+        <mc:AlternateContent xmlns:mc="http://schemas.openxmlformats.org/markup-compatibility/2006">
+          <mc:Choice xmlns:p14="http://schemas.microsoft.com/office/powerpoint/2010/main" Requires="p14">
+            <p:contentPart p14:bwMode="auto" r:id="rId39">
+              <p14:nvContentPartPr>
+                <p14:cNvPr id="23" name="Ink 22">
+                  <a:extLst>
+                    <a:ext uri="{FF2B5EF4-FFF2-40B4-BE49-F238E27FC236}">
+                      <a16:creationId xmlns:a16="http://schemas.microsoft.com/office/drawing/2014/main" id="{51BA443C-8617-9422-5C2D-978FDF710E88}"/>
+                    </a:ext>
+                  </a:extLst>
+                </p14:cNvPr>
+                <p14:cNvContentPartPr/>
+                <p14:nvPr/>
+              </p14:nvContentPartPr>
+              <p14:xfrm>
+                <a:off x="7846803" y="2711009"/>
+                <a:ext cx="441720" cy="626400"/>
+              </p14:xfrm>
+            </p:contentPart>
+          </mc:Choice>
+          <mc:Fallback>
+            <p:pic>
+              <p:nvPicPr>
+                <p:cNvPr id="23" name="Ink 22">
+                  <a:extLst>
+                    <a:ext uri="{FF2B5EF4-FFF2-40B4-BE49-F238E27FC236}">
+                      <a16:creationId xmlns:a16="http://schemas.microsoft.com/office/drawing/2014/main" id="{51BA443C-8617-9422-5C2D-978FDF710E88}"/>
+                    </a:ext>
+                  </a:extLst>
+                </p:cNvPr>
+                <p:cNvPicPr/>
+                <p:nvPr/>
+              </p:nvPicPr>
+              <p:blipFill>
+                <a:blip r:embed="rId40"/>
+                <a:stretch>
+                  <a:fillRect/>
+                </a:stretch>
+              </p:blipFill>
+              <p:spPr>
+                <a:xfrm>
+                  <a:off x="7840683" y="2704889"/>
+                  <a:ext cx="453960" cy="638640"/>
+                </a:xfrm>
+                <a:prstGeom prst="rect">
+                  <a:avLst/>
+                </a:prstGeom>
+              </p:spPr>
+            </p:pic>
+          </mc:Fallback>
+        </mc:AlternateContent>
+        <mc:AlternateContent xmlns:mc="http://schemas.openxmlformats.org/markup-compatibility/2006">
+          <mc:Choice xmlns:p14="http://schemas.microsoft.com/office/powerpoint/2010/main" Requires="p14">
+            <p:contentPart p14:bwMode="auto" r:id="rId41">
+              <p14:nvContentPartPr>
+                <p14:cNvPr id="24" name="Ink 23">
+                  <a:extLst>
+                    <a:ext uri="{FF2B5EF4-FFF2-40B4-BE49-F238E27FC236}">
+                      <a16:creationId xmlns:a16="http://schemas.microsoft.com/office/drawing/2014/main" id="{EFD828D9-6779-6170-EDA7-6D59D67B3F1D}"/>
+                    </a:ext>
+                  </a:extLst>
+                </p14:cNvPr>
+                <p14:cNvContentPartPr/>
+                <p14:nvPr/>
+              </p14:nvContentPartPr>
+              <p14:xfrm>
+                <a:off x="8388603" y="2747729"/>
+                <a:ext cx="250920" cy="613800"/>
+              </p14:xfrm>
+            </p:contentPart>
+          </mc:Choice>
+          <mc:Fallback>
+            <p:pic>
+              <p:nvPicPr>
+                <p:cNvPr id="24" name="Ink 23">
+                  <a:extLst>
+                    <a:ext uri="{FF2B5EF4-FFF2-40B4-BE49-F238E27FC236}">
+                      <a16:creationId xmlns:a16="http://schemas.microsoft.com/office/drawing/2014/main" id="{EFD828D9-6779-6170-EDA7-6D59D67B3F1D}"/>
+                    </a:ext>
+                  </a:extLst>
+                </p:cNvPr>
+                <p:cNvPicPr/>
+                <p:nvPr/>
+              </p:nvPicPr>
+              <p:blipFill>
+                <a:blip r:embed="rId42"/>
+                <a:stretch>
+                  <a:fillRect/>
+                </a:stretch>
+              </p:blipFill>
+              <p:spPr>
+                <a:xfrm>
+                  <a:off x="8382483" y="2741609"/>
+                  <a:ext cx="263160" cy="626040"/>
+                </a:xfrm>
+                <a:prstGeom prst="rect">
+                  <a:avLst/>
+                </a:prstGeom>
+              </p:spPr>
+            </p:pic>
+          </mc:Fallback>
+        </mc:AlternateContent>
+        <mc:AlternateContent xmlns:mc="http://schemas.openxmlformats.org/markup-compatibility/2006">
+          <mc:Choice xmlns:p14="http://schemas.microsoft.com/office/powerpoint/2010/main" Requires="p14">
+            <p:contentPart p14:bwMode="auto" r:id="rId43">
+              <p14:nvContentPartPr>
+                <p14:cNvPr id="25" name="Ink 24">
+                  <a:extLst>
+                    <a:ext uri="{FF2B5EF4-FFF2-40B4-BE49-F238E27FC236}">
+                      <a16:creationId xmlns:a16="http://schemas.microsoft.com/office/drawing/2014/main" id="{7548BA63-3DB8-69E3-F6ED-E2A13CAD7E76}"/>
+                    </a:ext>
+                  </a:extLst>
+                </p14:cNvPr>
+                <p14:cNvContentPartPr/>
+                <p14:nvPr/>
+              </p14:nvContentPartPr>
+              <p14:xfrm>
+                <a:off x="8073603" y="3550889"/>
+                <a:ext cx="248040" cy="241920"/>
+              </p14:xfrm>
+            </p:contentPart>
+          </mc:Choice>
+          <mc:Fallback>
+            <p:pic>
+              <p:nvPicPr>
+                <p:cNvPr id="25" name="Ink 24">
+                  <a:extLst>
+                    <a:ext uri="{FF2B5EF4-FFF2-40B4-BE49-F238E27FC236}">
+                      <a16:creationId xmlns:a16="http://schemas.microsoft.com/office/drawing/2014/main" id="{7548BA63-3DB8-69E3-F6ED-E2A13CAD7E76}"/>
+                    </a:ext>
+                  </a:extLst>
+                </p:cNvPr>
+                <p:cNvPicPr/>
+                <p:nvPr/>
+              </p:nvPicPr>
+              <p:blipFill>
+                <a:blip r:embed="rId44"/>
+                <a:stretch>
+                  <a:fillRect/>
+                </a:stretch>
+              </p:blipFill>
+              <p:spPr>
+                <a:xfrm>
+                  <a:off x="8067483" y="3544769"/>
+                  <a:ext cx="260280" cy="254160"/>
+                </a:xfrm>
+                <a:prstGeom prst="rect">
+                  <a:avLst/>
+                </a:prstGeom>
+              </p:spPr>
+            </p:pic>
+          </mc:Fallback>
+        </mc:AlternateContent>
+        <mc:AlternateContent xmlns:mc="http://schemas.openxmlformats.org/markup-compatibility/2006">
+          <mc:Choice xmlns:p14="http://schemas.microsoft.com/office/powerpoint/2010/main" Requires="p14">
+            <p:contentPart p14:bwMode="auto" r:id="rId45">
+              <p14:nvContentPartPr>
+                <p14:cNvPr id="26" name="Ink 25">
+                  <a:extLst>
+                    <a:ext uri="{FF2B5EF4-FFF2-40B4-BE49-F238E27FC236}">
+                      <a16:creationId xmlns:a16="http://schemas.microsoft.com/office/drawing/2014/main" id="{B4858331-200C-F3DE-2811-2CB282521BD5}"/>
+                    </a:ext>
+                  </a:extLst>
+                </p14:cNvPr>
+                <p14:cNvContentPartPr/>
+                <p14:nvPr/>
+              </p14:nvContentPartPr>
+              <p14:xfrm>
+                <a:off x="9158283" y="2785169"/>
+                <a:ext cx="92160" cy="196920"/>
+              </p14:xfrm>
+            </p:contentPart>
+          </mc:Choice>
+          <mc:Fallback>
+            <p:pic>
+              <p:nvPicPr>
+                <p:cNvPr id="26" name="Ink 25">
+                  <a:extLst>
+                    <a:ext uri="{FF2B5EF4-FFF2-40B4-BE49-F238E27FC236}">
+                      <a16:creationId xmlns:a16="http://schemas.microsoft.com/office/drawing/2014/main" id="{B4858331-200C-F3DE-2811-2CB282521BD5}"/>
+                    </a:ext>
+                  </a:extLst>
+                </p:cNvPr>
+                <p:cNvPicPr/>
+                <p:nvPr/>
+              </p:nvPicPr>
+              <p:blipFill>
+                <a:blip r:embed="rId46"/>
+                <a:stretch>
+                  <a:fillRect/>
+                </a:stretch>
+              </p:blipFill>
+              <p:spPr>
+                <a:xfrm>
+                  <a:off x="9152163" y="2779049"/>
+                  <a:ext cx="104400" cy="209160"/>
+                </a:xfrm>
+                <a:prstGeom prst="rect">
+                  <a:avLst/>
+                </a:prstGeom>
+              </p:spPr>
+            </p:pic>
+          </mc:Fallback>
+        </mc:AlternateContent>
+        <mc:AlternateContent xmlns:mc="http://schemas.openxmlformats.org/markup-compatibility/2006">
+          <mc:Choice xmlns:p14="http://schemas.microsoft.com/office/powerpoint/2010/main" Requires="p14">
+            <p:contentPart p14:bwMode="auto" r:id="rId47">
+              <p14:nvContentPartPr>
+                <p14:cNvPr id="27" name="Ink 26">
+                  <a:extLst>
+                    <a:ext uri="{FF2B5EF4-FFF2-40B4-BE49-F238E27FC236}">
+                      <a16:creationId xmlns:a16="http://schemas.microsoft.com/office/drawing/2014/main" id="{23B5FF04-2C07-E83E-D7BF-EBB4E4866393}"/>
+                    </a:ext>
+                  </a:extLst>
+                </p14:cNvPr>
+                <p14:cNvContentPartPr/>
+                <p14:nvPr/>
+              </p14:nvContentPartPr>
+              <p14:xfrm>
+                <a:off x="8982603" y="2849249"/>
+                <a:ext cx="524880" cy="698400"/>
+              </p14:xfrm>
+            </p:contentPart>
+          </mc:Choice>
+          <mc:Fallback>
+            <p:pic>
+              <p:nvPicPr>
+                <p:cNvPr id="27" name="Ink 26">
+                  <a:extLst>
+                    <a:ext uri="{FF2B5EF4-FFF2-40B4-BE49-F238E27FC236}">
+                      <a16:creationId xmlns:a16="http://schemas.microsoft.com/office/drawing/2014/main" id="{23B5FF04-2C07-E83E-D7BF-EBB4E4866393}"/>
+                    </a:ext>
+                  </a:extLst>
+                </p:cNvPr>
+                <p:cNvPicPr/>
+                <p:nvPr/>
+              </p:nvPicPr>
+              <p:blipFill>
+                <a:blip r:embed="rId48"/>
+                <a:stretch>
+                  <a:fillRect/>
+                </a:stretch>
+              </p:blipFill>
+              <p:spPr>
+                <a:xfrm>
+                  <a:off x="8976483" y="2843129"/>
+                  <a:ext cx="537120" cy="710640"/>
+                </a:xfrm>
+                <a:prstGeom prst="rect">
+                  <a:avLst/>
+                </a:prstGeom>
+              </p:spPr>
+            </p:pic>
+          </mc:Fallback>
+        </mc:AlternateContent>
+        <mc:AlternateContent xmlns:mc="http://schemas.openxmlformats.org/markup-compatibility/2006">
+          <mc:Choice xmlns:p14="http://schemas.microsoft.com/office/powerpoint/2010/main" Requires="p14">
+            <p:contentPart p14:bwMode="auto" r:id="rId49">
+              <p14:nvContentPartPr>
+                <p14:cNvPr id="30" name="Ink 29">
+                  <a:extLst>
+                    <a:ext uri="{FF2B5EF4-FFF2-40B4-BE49-F238E27FC236}">
+                      <a16:creationId xmlns:a16="http://schemas.microsoft.com/office/drawing/2014/main" id="{3D2900D0-C7DC-4A0A-8337-4248B92BF2CC}"/>
+                    </a:ext>
+                  </a:extLst>
+                </p14:cNvPr>
+                <p14:cNvContentPartPr/>
+                <p14:nvPr/>
+              </p14:nvContentPartPr>
+              <p14:xfrm>
+                <a:off x="6429483" y="4362329"/>
+                <a:ext cx="739440" cy="523080"/>
+              </p14:xfrm>
+            </p:contentPart>
+          </mc:Choice>
+          <mc:Fallback>
+            <p:pic>
+              <p:nvPicPr>
+                <p:cNvPr id="30" name="Ink 29">
+                  <a:extLst>
+                    <a:ext uri="{FF2B5EF4-FFF2-40B4-BE49-F238E27FC236}">
+                      <a16:creationId xmlns:a16="http://schemas.microsoft.com/office/drawing/2014/main" id="{3D2900D0-C7DC-4A0A-8337-4248B92BF2CC}"/>
+                    </a:ext>
+                  </a:extLst>
+                </p:cNvPr>
+                <p:cNvPicPr/>
+                <p:nvPr/>
+              </p:nvPicPr>
+              <p:blipFill>
+                <a:blip r:embed="rId50"/>
+                <a:stretch>
+                  <a:fillRect/>
+                </a:stretch>
+              </p:blipFill>
+              <p:spPr>
+                <a:xfrm>
+                  <a:off x="6423363" y="4356209"/>
+                  <a:ext cx="751680" cy="535320"/>
+                </a:xfrm>
+                <a:prstGeom prst="rect">
+                  <a:avLst/>
+                </a:prstGeom>
+              </p:spPr>
+            </p:pic>
+          </mc:Fallback>
+        </mc:AlternateContent>
+        <mc:AlternateContent xmlns:mc="http://schemas.openxmlformats.org/markup-compatibility/2006">
+          <mc:Choice xmlns:p14="http://schemas.microsoft.com/office/powerpoint/2010/main" Requires="p14">
+            <p:contentPart p14:bwMode="auto" r:id="rId51">
+              <p14:nvContentPartPr>
+                <p14:cNvPr id="31" name="Ink 30">
+                  <a:extLst>
+                    <a:ext uri="{FF2B5EF4-FFF2-40B4-BE49-F238E27FC236}">
+                      <a16:creationId xmlns:a16="http://schemas.microsoft.com/office/drawing/2014/main" id="{C4003333-C9F1-5D8F-922F-64648BABA1C8}"/>
+                    </a:ext>
+                  </a:extLst>
+                </p14:cNvPr>
+                <p14:cNvContentPartPr/>
+                <p14:nvPr/>
+              </p14:nvContentPartPr>
+              <p14:xfrm>
+                <a:off x="6739443" y="4986569"/>
+                <a:ext cx="494640" cy="177120"/>
+              </p14:xfrm>
+            </p:contentPart>
+          </mc:Choice>
+          <mc:Fallback>
+            <p:pic>
+              <p:nvPicPr>
+                <p:cNvPr id="31" name="Ink 30">
+                  <a:extLst>
+                    <a:ext uri="{FF2B5EF4-FFF2-40B4-BE49-F238E27FC236}">
+                      <a16:creationId xmlns:a16="http://schemas.microsoft.com/office/drawing/2014/main" id="{C4003333-C9F1-5D8F-922F-64648BABA1C8}"/>
+                    </a:ext>
+                  </a:extLst>
+                </p:cNvPr>
+                <p:cNvPicPr/>
+                <p:nvPr/>
+              </p:nvPicPr>
+              <p:blipFill>
+                <a:blip r:embed="rId52"/>
+                <a:stretch>
+                  <a:fillRect/>
+                </a:stretch>
+              </p:blipFill>
+              <p:spPr>
+                <a:xfrm>
+                  <a:off x="6733323" y="4980449"/>
+                  <a:ext cx="506880" cy="189360"/>
+                </a:xfrm>
+                <a:prstGeom prst="rect">
+                  <a:avLst/>
+                </a:prstGeom>
+              </p:spPr>
+            </p:pic>
+          </mc:Fallback>
+        </mc:AlternateContent>
+        <mc:AlternateContent xmlns:mc="http://schemas.openxmlformats.org/markup-compatibility/2006">
+          <mc:Choice xmlns:p14="http://schemas.microsoft.com/office/powerpoint/2010/main" Requires="p14">
+            <p:contentPart p14:bwMode="auto" r:id="rId53">
+              <p14:nvContentPartPr>
+                <p14:cNvPr id="32" name="Ink 31">
+                  <a:extLst>
+                    <a:ext uri="{FF2B5EF4-FFF2-40B4-BE49-F238E27FC236}">
+                      <a16:creationId xmlns:a16="http://schemas.microsoft.com/office/drawing/2014/main" id="{8256C19D-4466-93AF-6454-37FFC5A75EF8}"/>
+                    </a:ext>
+                  </a:extLst>
+                </p14:cNvPr>
+                <p14:cNvContentPartPr/>
+                <p14:nvPr/>
+              </p14:nvContentPartPr>
+              <p14:xfrm>
+                <a:off x="7293843" y="4265129"/>
+                <a:ext cx="1000800" cy="847440"/>
+              </p14:xfrm>
+            </p:contentPart>
+          </mc:Choice>
+          <mc:Fallback>
+            <p:pic>
+              <p:nvPicPr>
+                <p:cNvPr id="32" name="Ink 31">
+                  <a:extLst>
+                    <a:ext uri="{FF2B5EF4-FFF2-40B4-BE49-F238E27FC236}">
+                      <a16:creationId xmlns:a16="http://schemas.microsoft.com/office/drawing/2014/main" id="{8256C19D-4466-93AF-6454-37FFC5A75EF8}"/>
+                    </a:ext>
+                  </a:extLst>
+                </p:cNvPr>
+                <p:cNvPicPr/>
+                <p:nvPr/>
+              </p:nvPicPr>
+              <p:blipFill>
+                <a:blip r:embed="rId54"/>
+                <a:stretch>
+                  <a:fillRect/>
+                </a:stretch>
+              </p:blipFill>
+              <p:spPr>
+                <a:xfrm>
+                  <a:off x="7287723" y="4259009"/>
+                  <a:ext cx="1013040" cy="859680"/>
+                </a:xfrm>
+                <a:prstGeom prst="rect">
+                  <a:avLst/>
+                </a:prstGeom>
+              </p:spPr>
+            </p:pic>
+          </mc:Fallback>
+        </mc:AlternateContent>
+        <mc:AlternateContent xmlns:mc="http://schemas.openxmlformats.org/markup-compatibility/2006">
+          <mc:Choice xmlns:p14="http://schemas.microsoft.com/office/powerpoint/2010/main" Requires="p14">
+            <p:contentPart p14:bwMode="auto" r:id="rId55">
+              <p14:nvContentPartPr>
+                <p14:cNvPr id="34" name="Ink 33">
+                  <a:extLst>
+                    <a:ext uri="{FF2B5EF4-FFF2-40B4-BE49-F238E27FC236}">
+                      <a16:creationId xmlns:a16="http://schemas.microsoft.com/office/drawing/2014/main" id="{869A82E7-F0F1-5B45-293A-646A83B02E83}"/>
+                    </a:ext>
+                  </a:extLst>
+                </p14:cNvPr>
+                <p14:cNvContentPartPr/>
+                <p14:nvPr/>
+              </p14:nvContentPartPr>
+              <p14:xfrm>
+                <a:off x="6253803" y="4242449"/>
+                <a:ext cx="84960" cy="1084320"/>
+              </p14:xfrm>
+            </p:contentPart>
+          </mc:Choice>
+          <mc:Fallback>
+            <p:pic>
+              <p:nvPicPr>
+                <p:cNvPr id="34" name="Ink 33">
+                  <a:extLst>
+                    <a:ext uri="{FF2B5EF4-FFF2-40B4-BE49-F238E27FC236}">
+                      <a16:creationId xmlns:a16="http://schemas.microsoft.com/office/drawing/2014/main" id="{869A82E7-F0F1-5B45-293A-646A83B02E83}"/>
+                    </a:ext>
+                  </a:extLst>
+                </p:cNvPr>
+                <p:cNvPicPr/>
+                <p:nvPr/>
+              </p:nvPicPr>
+              <p:blipFill>
+                <a:blip r:embed="rId56"/>
+                <a:stretch>
+                  <a:fillRect/>
+                </a:stretch>
+              </p:blipFill>
+              <p:spPr>
+                <a:xfrm>
+                  <a:off x="6247683" y="4236329"/>
+                  <a:ext cx="97200" cy="1096560"/>
+                </a:xfrm>
+                <a:prstGeom prst="rect">
+                  <a:avLst/>
+                </a:prstGeom>
+              </p:spPr>
+            </p:pic>
+          </mc:Fallback>
+        </mc:AlternateContent>
+        <mc:AlternateContent xmlns:mc="http://schemas.openxmlformats.org/markup-compatibility/2006">
+          <mc:Choice xmlns:p14="http://schemas.microsoft.com/office/powerpoint/2010/main" Requires="p14">
+            <p:contentPart p14:bwMode="auto" r:id="rId57">
+              <p14:nvContentPartPr>
+                <p14:cNvPr id="35" name="Ink 34">
+                  <a:extLst>
+                    <a:ext uri="{FF2B5EF4-FFF2-40B4-BE49-F238E27FC236}">
+                      <a16:creationId xmlns:a16="http://schemas.microsoft.com/office/drawing/2014/main" id="{C5359E11-06CD-D49D-5CCD-238D9255D97E}"/>
+                    </a:ext>
+                  </a:extLst>
+                </p14:cNvPr>
+                <p14:cNvContentPartPr/>
+                <p14:nvPr/>
+              </p14:nvContentPartPr>
+              <p14:xfrm>
+                <a:off x="6113763" y="4081889"/>
+                <a:ext cx="2193480" cy="1208160"/>
+              </p14:xfrm>
+            </p:contentPart>
+          </mc:Choice>
+          <mc:Fallback>
+            <p:pic>
+              <p:nvPicPr>
+                <p:cNvPr id="35" name="Ink 34">
+                  <a:extLst>
+                    <a:ext uri="{FF2B5EF4-FFF2-40B4-BE49-F238E27FC236}">
+                      <a16:creationId xmlns:a16="http://schemas.microsoft.com/office/drawing/2014/main" id="{C5359E11-06CD-D49D-5CCD-238D9255D97E}"/>
+                    </a:ext>
+                  </a:extLst>
+                </p:cNvPr>
+                <p:cNvPicPr/>
+                <p:nvPr/>
+              </p:nvPicPr>
+              <p:blipFill>
+                <a:blip r:embed="rId58"/>
+                <a:stretch>
+                  <a:fillRect/>
+                </a:stretch>
+              </p:blipFill>
+              <p:spPr>
+                <a:xfrm>
+                  <a:off x="6107643" y="4075769"/>
+                  <a:ext cx="2205720" cy="1220400"/>
+                </a:xfrm>
+                <a:prstGeom prst="rect">
+                  <a:avLst/>
+                </a:prstGeom>
+              </p:spPr>
+            </p:pic>
+          </mc:Fallback>
+        </mc:AlternateContent>
+        <mc:AlternateContent xmlns:mc="http://schemas.openxmlformats.org/markup-compatibility/2006">
+          <mc:Choice xmlns:p14="http://schemas.microsoft.com/office/powerpoint/2010/main" Requires="p14">
+            <p:contentPart p14:bwMode="auto" r:id="rId59">
+              <p14:nvContentPartPr>
+                <p14:cNvPr id="36" name="Ink 35">
+                  <a:extLst>
+                    <a:ext uri="{FF2B5EF4-FFF2-40B4-BE49-F238E27FC236}">
+                      <a16:creationId xmlns:a16="http://schemas.microsoft.com/office/drawing/2014/main" id="{7227360C-7ACC-CF01-3942-F4CBA76EDED2}"/>
+                    </a:ext>
+                  </a:extLst>
+                </p14:cNvPr>
+                <p14:cNvContentPartPr/>
+                <p14:nvPr/>
+              </p14:nvContentPartPr>
+              <p14:xfrm>
+                <a:off x="6390603" y="5326769"/>
+                <a:ext cx="2479680" cy="44640"/>
+              </p14:xfrm>
+            </p:contentPart>
+          </mc:Choice>
+          <mc:Fallback>
+            <p:pic>
+              <p:nvPicPr>
+                <p:cNvPr id="36" name="Ink 35">
+                  <a:extLst>
+                    <a:ext uri="{FF2B5EF4-FFF2-40B4-BE49-F238E27FC236}">
+                      <a16:creationId xmlns:a16="http://schemas.microsoft.com/office/drawing/2014/main" id="{7227360C-7ACC-CF01-3942-F4CBA76EDED2}"/>
+                    </a:ext>
+                  </a:extLst>
+                </p:cNvPr>
+                <p:cNvPicPr/>
+                <p:nvPr/>
+              </p:nvPicPr>
+              <p:blipFill>
+                <a:blip r:embed="rId60"/>
+                <a:stretch>
+                  <a:fillRect/>
+                </a:stretch>
+              </p:blipFill>
+              <p:spPr>
+                <a:xfrm>
+                  <a:off x="6384483" y="5320649"/>
+                  <a:ext cx="2491920" cy="56880"/>
+                </a:xfrm>
+                <a:prstGeom prst="rect">
+                  <a:avLst/>
+                </a:prstGeom>
+              </p:spPr>
+            </p:pic>
+          </mc:Fallback>
+        </mc:AlternateContent>
+        <mc:AlternateContent xmlns:mc="http://schemas.openxmlformats.org/markup-compatibility/2006">
+          <mc:Choice xmlns:p14="http://schemas.microsoft.com/office/powerpoint/2010/main" Requires="p14">
+            <p:contentPart p14:bwMode="auto" r:id="rId61">
+              <p14:nvContentPartPr>
+                <p14:cNvPr id="38" name="Ink 37">
+                  <a:extLst>
+                    <a:ext uri="{FF2B5EF4-FFF2-40B4-BE49-F238E27FC236}">
+                      <a16:creationId xmlns:a16="http://schemas.microsoft.com/office/drawing/2014/main" id="{71450793-6539-429B-FD24-55C45AB06B8C}"/>
+                    </a:ext>
+                  </a:extLst>
+                </p14:cNvPr>
+                <p14:cNvContentPartPr/>
+                <p14:nvPr/>
+              </p14:nvContentPartPr>
+              <p14:xfrm>
+                <a:off x="7906563" y="3976409"/>
+                <a:ext cx="599400" cy="1906560"/>
+              </p14:xfrm>
+            </p:contentPart>
+          </mc:Choice>
+          <mc:Fallback>
+            <p:pic>
+              <p:nvPicPr>
+                <p:cNvPr id="38" name="Ink 37">
+                  <a:extLst>
+                    <a:ext uri="{FF2B5EF4-FFF2-40B4-BE49-F238E27FC236}">
+                      <a16:creationId xmlns:a16="http://schemas.microsoft.com/office/drawing/2014/main" id="{71450793-6539-429B-FD24-55C45AB06B8C}"/>
+                    </a:ext>
+                  </a:extLst>
+                </p:cNvPr>
+                <p:cNvPicPr/>
+                <p:nvPr/>
+              </p:nvPicPr>
+              <p:blipFill>
+                <a:blip r:embed="rId62"/>
+                <a:stretch>
+                  <a:fillRect/>
+                </a:stretch>
+              </p:blipFill>
+              <p:spPr>
+                <a:xfrm>
+                  <a:off x="7900443" y="3970289"/>
+                  <a:ext cx="611640" cy="1918800"/>
+                </a:xfrm>
+                <a:prstGeom prst="rect">
+                  <a:avLst/>
+                </a:prstGeom>
+              </p:spPr>
+            </p:pic>
+          </mc:Fallback>
+        </mc:AlternateContent>
+        <mc:AlternateContent xmlns:mc="http://schemas.openxmlformats.org/markup-compatibility/2006">
+          <mc:Choice xmlns:p14="http://schemas.microsoft.com/office/powerpoint/2010/main" Requires="p14">
+            <p:contentPart p14:bwMode="auto" r:id="rId63">
+              <p14:nvContentPartPr>
+                <p14:cNvPr id="39" name="Ink 38">
+                  <a:extLst>
+                    <a:ext uri="{FF2B5EF4-FFF2-40B4-BE49-F238E27FC236}">
+                      <a16:creationId xmlns:a16="http://schemas.microsoft.com/office/drawing/2014/main" id="{ABB48999-C6F2-1771-DA04-D8329DF0078C}"/>
+                    </a:ext>
+                  </a:extLst>
+                </p14:cNvPr>
+                <p14:cNvContentPartPr/>
+                <p14:nvPr/>
+              </p14:nvContentPartPr>
+              <p14:xfrm>
+                <a:off x="8721603" y="4178369"/>
+                <a:ext cx="61200" cy="278280"/>
+              </p14:xfrm>
+            </p:contentPart>
+          </mc:Choice>
+          <mc:Fallback>
+            <p:pic>
+              <p:nvPicPr>
+                <p:cNvPr id="39" name="Ink 38">
+                  <a:extLst>
+                    <a:ext uri="{FF2B5EF4-FFF2-40B4-BE49-F238E27FC236}">
+                      <a16:creationId xmlns:a16="http://schemas.microsoft.com/office/drawing/2014/main" id="{ABB48999-C6F2-1771-DA04-D8329DF0078C}"/>
+                    </a:ext>
+                  </a:extLst>
+                </p:cNvPr>
+                <p:cNvPicPr/>
+                <p:nvPr/>
+              </p:nvPicPr>
+              <p:blipFill>
+                <a:blip r:embed="rId64"/>
+                <a:stretch>
+                  <a:fillRect/>
+                </a:stretch>
+              </p:blipFill>
+              <p:spPr>
+                <a:xfrm>
+                  <a:off x="8715483" y="4172249"/>
+                  <a:ext cx="73440" cy="290520"/>
+                </a:xfrm>
+                <a:prstGeom prst="rect">
+                  <a:avLst/>
+                </a:prstGeom>
+              </p:spPr>
+            </p:pic>
+          </mc:Fallback>
+        </mc:AlternateContent>
+        <mc:AlternateContent xmlns:mc="http://schemas.openxmlformats.org/markup-compatibility/2006">
+          <mc:Choice xmlns:p14="http://schemas.microsoft.com/office/powerpoint/2010/main" Requires="p14">
+            <p:contentPart p14:bwMode="auto" r:id="rId65">
+              <p14:nvContentPartPr>
+                <p14:cNvPr id="40" name="Ink 39">
+                  <a:extLst>
+                    <a:ext uri="{FF2B5EF4-FFF2-40B4-BE49-F238E27FC236}">
+                      <a16:creationId xmlns:a16="http://schemas.microsoft.com/office/drawing/2014/main" id="{42575830-A992-8163-3B36-BBD0606D2A74}"/>
+                    </a:ext>
+                  </a:extLst>
+                </p14:cNvPr>
+                <p14:cNvContentPartPr/>
+                <p14:nvPr/>
+              </p14:nvContentPartPr>
+              <p14:xfrm>
+                <a:off x="8644203" y="4476089"/>
+                <a:ext cx="312120" cy="308880"/>
+              </p14:xfrm>
+            </p:contentPart>
+          </mc:Choice>
+          <mc:Fallback>
+            <p:pic>
+              <p:nvPicPr>
+                <p:cNvPr id="40" name="Ink 39">
+                  <a:extLst>
+                    <a:ext uri="{FF2B5EF4-FFF2-40B4-BE49-F238E27FC236}">
+                      <a16:creationId xmlns:a16="http://schemas.microsoft.com/office/drawing/2014/main" id="{42575830-A992-8163-3B36-BBD0606D2A74}"/>
+                    </a:ext>
+                  </a:extLst>
+                </p:cNvPr>
+                <p:cNvPicPr/>
+                <p:nvPr/>
+              </p:nvPicPr>
+              <p:blipFill>
+                <a:blip r:embed="rId66"/>
+                <a:stretch>
+                  <a:fillRect/>
+                </a:stretch>
+              </p:blipFill>
+              <p:spPr>
+                <a:xfrm>
+                  <a:off x="8638083" y="4469969"/>
+                  <a:ext cx="324360" cy="321120"/>
+                </a:xfrm>
+                <a:prstGeom prst="rect">
+                  <a:avLst/>
+                </a:prstGeom>
+              </p:spPr>
+            </p:pic>
+          </mc:Fallback>
+        </mc:AlternateContent>
+        <mc:AlternateContent xmlns:mc="http://schemas.openxmlformats.org/markup-compatibility/2006">
+          <mc:Choice xmlns:p14="http://schemas.microsoft.com/office/powerpoint/2010/main" Requires="p14">
+            <p:contentPart p14:bwMode="auto" r:id="rId67">
+              <p14:nvContentPartPr>
+                <p14:cNvPr id="41" name="Ink 40">
+                  <a:extLst>
+                    <a:ext uri="{FF2B5EF4-FFF2-40B4-BE49-F238E27FC236}">
+                      <a16:creationId xmlns:a16="http://schemas.microsoft.com/office/drawing/2014/main" id="{521DBFF5-1489-CF1F-1E5D-7F7F86B0FD4B}"/>
+                    </a:ext>
+                  </a:extLst>
+                </p14:cNvPr>
+                <p14:cNvContentPartPr/>
+                <p14:nvPr/>
+              </p14:nvContentPartPr>
+              <p14:xfrm>
+                <a:off x="8895123" y="4107089"/>
+                <a:ext cx="486720" cy="1041840"/>
+              </p14:xfrm>
+            </p:contentPart>
+          </mc:Choice>
+          <mc:Fallback>
+            <p:pic>
+              <p:nvPicPr>
+                <p:cNvPr id="41" name="Ink 40">
+                  <a:extLst>
+                    <a:ext uri="{FF2B5EF4-FFF2-40B4-BE49-F238E27FC236}">
+                      <a16:creationId xmlns:a16="http://schemas.microsoft.com/office/drawing/2014/main" id="{521DBFF5-1489-CF1F-1E5D-7F7F86B0FD4B}"/>
+                    </a:ext>
+                  </a:extLst>
+                </p:cNvPr>
+                <p:cNvPicPr/>
+                <p:nvPr/>
+              </p:nvPicPr>
+              <p:blipFill>
+                <a:blip r:embed="rId68"/>
+                <a:stretch>
+                  <a:fillRect/>
+                </a:stretch>
+              </p:blipFill>
+              <p:spPr>
+                <a:xfrm>
+                  <a:off x="8889003" y="4100969"/>
+                  <a:ext cx="498960" cy="1054080"/>
+                </a:xfrm>
+                <a:prstGeom prst="rect">
+                  <a:avLst/>
+                </a:prstGeom>
+              </p:spPr>
+            </p:pic>
+          </mc:Fallback>
+        </mc:AlternateContent>
+        <mc:AlternateContent xmlns:mc="http://schemas.openxmlformats.org/markup-compatibility/2006">
+          <mc:Choice xmlns:p14="http://schemas.microsoft.com/office/powerpoint/2010/main" Requires="p14">
+            <p:contentPart p14:bwMode="auto" r:id="rId69">
+              <p14:nvContentPartPr>
+                <p14:cNvPr id="42" name="Ink 41">
+                  <a:extLst>
+                    <a:ext uri="{FF2B5EF4-FFF2-40B4-BE49-F238E27FC236}">
+                      <a16:creationId xmlns:a16="http://schemas.microsoft.com/office/drawing/2014/main" id="{632310A5-C674-B719-52C5-0FD5CFA0C3BA}"/>
+                    </a:ext>
+                  </a:extLst>
+                </p14:cNvPr>
+                <p14:cNvContentPartPr/>
+                <p14:nvPr/>
+              </p14:nvContentPartPr>
+              <p14:xfrm>
+                <a:off x="8825283" y="5148569"/>
+                <a:ext cx="493920" cy="355680"/>
+              </p14:xfrm>
+            </p:contentPart>
+          </mc:Choice>
+          <mc:Fallback>
+            <p:pic>
+              <p:nvPicPr>
+                <p:cNvPr id="42" name="Ink 41">
+                  <a:extLst>
+                    <a:ext uri="{FF2B5EF4-FFF2-40B4-BE49-F238E27FC236}">
+                      <a16:creationId xmlns:a16="http://schemas.microsoft.com/office/drawing/2014/main" id="{632310A5-C674-B719-52C5-0FD5CFA0C3BA}"/>
+                    </a:ext>
+                  </a:extLst>
+                </p:cNvPr>
+                <p:cNvPicPr/>
+                <p:nvPr/>
+              </p:nvPicPr>
+              <p:blipFill>
+                <a:blip r:embed="rId70"/>
+                <a:stretch>
+                  <a:fillRect/>
+                </a:stretch>
+              </p:blipFill>
+              <p:spPr>
+                <a:xfrm>
+                  <a:off x="8819163" y="5142449"/>
+                  <a:ext cx="506160" cy="367920"/>
+                </a:xfrm>
+                <a:prstGeom prst="rect">
+                  <a:avLst/>
+                </a:prstGeom>
+              </p:spPr>
+            </p:pic>
+          </mc:Fallback>
+        </mc:AlternateContent>
+        <mc:AlternateContent xmlns:mc="http://schemas.openxmlformats.org/markup-compatibility/2006">
+          <mc:Choice xmlns:p14="http://schemas.microsoft.com/office/powerpoint/2010/main" Requires="p14">
+            <p:contentPart p14:bwMode="auto" r:id="rId71">
+              <p14:nvContentPartPr>
+                <p14:cNvPr id="43" name="Ink 42">
+                  <a:extLst>
+                    <a:ext uri="{FF2B5EF4-FFF2-40B4-BE49-F238E27FC236}">
+                      <a16:creationId xmlns:a16="http://schemas.microsoft.com/office/drawing/2014/main" id="{E96393A3-EB3C-A803-4C0B-E5D4283735CE}"/>
+                    </a:ext>
+                  </a:extLst>
+                </p14:cNvPr>
+                <p14:cNvContentPartPr/>
+                <p14:nvPr/>
+              </p14:nvContentPartPr>
+              <p14:xfrm>
+                <a:off x="9675603" y="4228409"/>
+                <a:ext cx="336960" cy="450360"/>
+              </p14:xfrm>
+            </p:contentPart>
+          </mc:Choice>
+          <mc:Fallback>
+            <p:pic>
+              <p:nvPicPr>
+                <p:cNvPr id="43" name="Ink 42">
+                  <a:extLst>
+                    <a:ext uri="{FF2B5EF4-FFF2-40B4-BE49-F238E27FC236}">
+                      <a16:creationId xmlns:a16="http://schemas.microsoft.com/office/drawing/2014/main" id="{E96393A3-EB3C-A803-4C0B-E5D4283735CE}"/>
+                    </a:ext>
+                  </a:extLst>
+                </p:cNvPr>
+                <p:cNvPicPr/>
+                <p:nvPr/>
+              </p:nvPicPr>
+              <p:blipFill>
+                <a:blip r:embed="rId72"/>
+                <a:stretch>
+                  <a:fillRect/>
+                </a:stretch>
+              </p:blipFill>
+              <p:spPr>
+                <a:xfrm>
+                  <a:off x="9669483" y="4222289"/>
+                  <a:ext cx="349200" cy="462600"/>
+                </a:xfrm>
+                <a:prstGeom prst="rect">
+                  <a:avLst/>
+                </a:prstGeom>
+              </p:spPr>
+            </p:pic>
+          </mc:Fallback>
+        </mc:AlternateContent>
+        <mc:AlternateContent xmlns:mc="http://schemas.openxmlformats.org/markup-compatibility/2006">
+          <mc:Choice xmlns:p14="http://schemas.microsoft.com/office/powerpoint/2010/main" Requires="p14">
+            <p:contentPart p14:bwMode="auto" r:id="rId73">
+              <p14:nvContentPartPr>
+                <p14:cNvPr id="44" name="Ink 43">
+                  <a:extLst>
+                    <a:ext uri="{FF2B5EF4-FFF2-40B4-BE49-F238E27FC236}">
+                      <a16:creationId xmlns:a16="http://schemas.microsoft.com/office/drawing/2014/main" id="{A5E166FF-8597-3D74-16FF-5795D4D12C10}"/>
+                    </a:ext>
+                  </a:extLst>
+                </p14:cNvPr>
+                <p14:cNvContentPartPr/>
+                <p14:nvPr/>
+              </p14:nvContentPartPr>
+              <p14:xfrm>
+                <a:off x="9270963" y="4271969"/>
+                <a:ext cx="129600" cy="376200"/>
+              </p14:xfrm>
+            </p:contentPart>
+          </mc:Choice>
+          <mc:Fallback>
+            <p:pic>
+              <p:nvPicPr>
+                <p:cNvPr id="44" name="Ink 43">
+                  <a:extLst>
+                    <a:ext uri="{FF2B5EF4-FFF2-40B4-BE49-F238E27FC236}">
+                      <a16:creationId xmlns:a16="http://schemas.microsoft.com/office/drawing/2014/main" id="{A5E166FF-8597-3D74-16FF-5795D4D12C10}"/>
+                    </a:ext>
+                  </a:extLst>
+                </p:cNvPr>
+                <p:cNvPicPr/>
+                <p:nvPr/>
+              </p:nvPicPr>
+              <p:blipFill>
+                <a:blip r:embed="rId74"/>
+                <a:stretch>
+                  <a:fillRect/>
+                </a:stretch>
+              </p:blipFill>
+              <p:spPr>
+                <a:xfrm>
+                  <a:off x="9264843" y="4265849"/>
+                  <a:ext cx="141840" cy="388440"/>
+                </a:xfrm>
+                <a:prstGeom prst="rect">
+                  <a:avLst/>
+                </a:prstGeom>
+              </p:spPr>
+            </p:pic>
+          </mc:Fallback>
+        </mc:AlternateContent>
+        <mc:AlternateContent xmlns:mc="http://schemas.openxmlformats.org/markup-compatibility/2006">
+          <mc:Choice xmlns:p14="http://schemas.microsoft.com/office/powerpoint/2010/main" Requires="p14">
+            <p:contentPart p14:bwMode="auto" r:id="rId75">
+              <p14:nvContentPartPr>
+                <p14:cNvPr id="45" name="Ink 44">
+                  <a:extLst>
+                    <a:ext uri="{FF2B5EF4-FFF2-40B4-BE49-F238E27FC236}">
+                      <a16:creationId xmlns:a16="http://schemas.microsoft.com/office/drawing/2014/main" id="{57AB4B5D-EF34-F47D-D5B8-92C90F3AF996}"/>
+                    </a:ext>
+                  </a:extLst>
+                </p14:cNvPr>
+                <p14:cNvContentPartPr/>
+                <p14:nvPr/>
+              </p14:nvContentPartPr>
+              <p14:xfrm>
+                <a:off x="9526923" y="4338209"/>
+                <a:ext cx="17280" cy="500400"/>
+              </p14:xfrm>
+            </p:contentPart>
+          </mc:Choice>
+          <mc:Fallback>
+            <p:pic>
+              <p:nvPicPr>
+                <p:cNvPr id="45" name="Ink 44">
+                  <a:extLst>
+                    <a:ext uri="{FF2B5EF4-FFF2-40B4-BE49-F238E27FC236}">
+                      <a16:creationId xmlns:a16="http://schemas.microsoft.com/office/drawing/2014/main" id="{57AB4B5D-EF34-F47D-D5B8-92C90F3AF996}"/>
+                    </a:ext>
+                  </a:extLst>
+                </p:cNvPr>
+                <p:cNvPicPr/>
+                <p:nvPr/>
+              </p:nvPicPr>
+              <p:blipFill>
+                <a:blip r:embed="rId76"/>
+                <a:stretch>
+                  <a:fillRect/>
+                </a:stretch>
+              </p:blipFill>
+              <p:spPr>
+                <a:xfrm>
+                  <a:off x="9520803" y="4332089"/>
+                  <a:ext cx="29520" cy="512640"/>
+                </a:xfrm>
+                <a:prstGeom prst="rect">
+                  <a:avLst/>
+                </a:prstGeom>
+              </p:spPr>
+            </p:pic>
+          </mc:Fallback>
+        </mc:AlternateContent>
+        <mc:AlternateContent xmlns:mc="http://schemas.openxmlformats.org/markup-compatibility/2006">
+          <mc:Choice xmlns:p14="http://schemas.microsoft.com/office/powerpoint/2010/main" Requires="p14">
+            <p:contentPart p14:bwMode="auto" r:id="rId77">
+              <p14:nvContentPartPr>
+                <p14:cNvPr id="46" name="Ink 45">
+                  <a:extLst>
+                    <a:ext uri="{FF2B5EF4-FFF2-40B4-BE49-F238E27FC236}">
+                      <a16:creationId xmlns:a16="http://schemas.microsoft.com/office/drawing/2014/main" id="{4B97EEC3-49ED-7706-AC86-84A1340CBF16}"/>
+                    </a:ext>
+                  </a:extLst>
+                </p14:cNvPr>
+                <p14:cNvContentPartPr/>
+                <p14:nvPr/>
+              </p14:nvContentPartPr>
+              <p14:xfrm>
+                <a:off x="9143883" y="4964969"/>
+                <a:ext cx="574920" cy="217440"/>
+              </p14:xfrm>
+            </p:contentPart>
+          </mc:Choice>
+          <mc:Fallback>
+            <p:pic>
+              <p:nvPicPr>
+                <p:cNvPr id="46" name="Ink 45">
+                  <a:extLst>
+                    <a:ext uri="{FF2B5EF4-FFF2-40B4-BE49-F238E27FC236}">
+                      <a16:creationId xmlns:a16="http://schemas.microsoft.com/office/drawing/2014/main" id="{4B97EEC3-49ED-7706-AC86-84A1340CBF16}"/>
+                    </a:ext>
+                  </a:extLst>
+                </p:cNvPr>
+                <p:cNvPicPr/>
+                <p:nvPr/>
+              </p:nvPicPr>
+              <p:blipFill>
+                <a:blip r:embed="rId78"/>
+                <a:stretch>
+                  <a:fillRect/>
+                </a:stretch>
+              </p:blipFill>
+              <p:spPr>
+                <a:xfrm>
+                  <a:off x="9137763" y="4958849"/>
+                  <a:ext cx="587160" cy="229680"/>
+                </a:xfrm>
+                <a:prstGeom prst="rect">
+                  <a:avLst/>
+                </a:prstGeom>
+              </p:spPr>
+            </p:pic>
+          </mc:Fallback>
+        </mc:AlternateContent>
+      </p:grpSp>
+    </p:spTree>
+    <p:extLst>
+      <p:ext uri="{BB962C8B-B14F-4D97-AF65-F5344CB8AC3E}">
+        <p14:creationId xmlns:p14="http://schemas.microsoft.com/office/powerpoint/2010/main" val="3227987544"/>
       </p:ext>
     </p:extLst>
   </p:cSld>

</xml_diff>